<commit_message>
Improved the default evaluation
</commit_message>
<xml_diff>
--- a/docs/docu_v1.pptx
+++ b/docs/docu_v1.pptx
@@ -287,7 +287,7 @@
           <a:p>
             <a:fld id="{40AC6573-0F6A-409A-81A3-E5A359E080D0}" type="datetimeFigureOut">
               <a:rPr lang="en-US" smtClean="0"/>
-              <a:t>11/4/2020</a:t>
+              <a:t>11/6/2020</a:t>
             </a:fld>
             <a:endParaRPr lang="en-US"/>
           </a:p>
@@ -457,7 +457,7 @@
           <a:p>
             <a:fld id="{40AC6573-0F6A-409A-81A3-E5A359E080D0}" type="datetimeFigureOut">
               <a:rPr lang="en-US" smtClean="0"/>
-              <a:t>11/4/2020</a:t>
+              <a:t>11/6/2020</a:t>
             </a:fld>
             <a:endParaRPr lang="en-US"/>
           </a:p>
@@ -637,7 +637,7 @@
           <a:p>
             <a:fld id="{40AC6573-0F6A-409A-81A3-E5A359E080D0}" type="datetimeFigureOut">
               <a:rPr lang="en-US" smtClean="0"/>
-              <a:t>11/4/2020</a:t>
+              <a:t>11/6/2020</a:t>
             </a:fld>
             <a:endParaRPr lang="en-US"/>
           </a:p>
@@ -807,7 +807,7 @@
           <a:p>
             <a:fld id="{40AC6573-0F6A-409A-81A3-E5A359E080D0}" type="datetimeFigureOut">
               <a:rPr lang="en-US" smtClean="0"/>
-              <a:t>11/4/2020</a:t>
+              <a:t>11/6/2020</a:t>
             </a:fld>
             <a:endParaRPr lang="en-US"/>
           </a:p>
@@ -1053,7 +1053,7 @@
           <a:p>
             <a:fld id="{40AC6573-0F6A-409A-81A3-E5A359E080D0}" type="datetimeFigureOut">
               <a:rPr lang="en-US" smtClean="0"/>
-              <a:t>11/4/2020</a:t>
+              <a:t>11/6/2020</a:t>
             </a:fld>
             <a:endParaRPr lang="en-US"/>
           </a:p>
@@ -1285,7 +1285,7 @@
           <a:p>
             <a:fld id="{40AC6573-0F6A-409A-81A3-E5A359E080D0}" type="datetimeFigureOut">
               <a:rPr lang="en-US" smtClean="0"/>
-              <a:t>11/4/2020</a:t>
+              <a:t>11/6/2020</a:t>
             </a:fld>
             <a:endParaRPr lang="en-US"/>
           </a:p>
@@ -1652,7 +1652,7 @@
           <a:p>
             <a:fld id="{40AC6573-0F6A-409A-81A3-E5A359E080D0}" type="datetimeFigureOut">
               <a:rPr lang="en-US" smtClean="0"/>
-              <a:t>11/4/2020</a:t>
+              <a:t>11/6/2020</a:t>
             </a:fld>
             <a:endParaRPr lang="en-US"/>
           </a:p>
@@ -1770,7 +1770,7 @@
           <a:p>
             <a:fld id="{40AC6573-0F6A-409A-81A3-E5A359E080D0}" type="datetimeFigureOut">
               <a:rPr lang="en-US" smtClean="0"/>
-              <a:t>11/4/2020</a:t>
+              <a:t>11/6/2020</a:t>
             </a:fld>
             <a:endParaRPr lang="en-US"/>
           </a:p>
@@ -1865,7 +1865,7 @@
           <a:p>
             <a:fld id="{40AC6573-0F6A-409A-81A3-E5A359E080D0}" type="datetimeFigureOut">
               <a:rPr lang="en-US" smtClean="0"/>
-              <a:t>11/4/2020</a:t>
+              <a:t>11/6/2020</a:t>
             </a:fld>
             <a:endParaRPr lang="en-US"/>
           </a:p>
@@ -2142,7 +2142,7 @@
           <a:p>
             <a:fld id="{40AC6573-0F6A-409A-81A3-E5A359E080D0}" type="datetimeFigureOut">
               <a:rPr lang="en-US" smtClean="0"/>
-              <a:t>11/4/2020</a:t>
+              <a:t>11/6/2020</a:t>
             </a:fld>
             <a:endParaRPr lang="en-US"/>
           </a:p>
@@ -2399,7 +2399,7 @@
           <a:p>
             <a:fld id="{40AC6573-0F6A-409A-81A3-E5A359E080D0}" type="datetimeFigureOut">
               <a:rPr lang="en-US" smtClean="0"/>
-              <a:t>11/4/2020</a:t>
+              <a:t>11/6/2020</a:t>
             </a:fld>
             <a:endParaRPr lang="en-US"/>
           </a:p>
@@ -2612,7 +2612,7 @@
           <a:p>
             <a:fld id="{40AC6573-0F6A-409A-81A3-E5A359E080D0}" type="datetimeFigureOut">
               <a:rPr lang="en-US" smtClean="0"/>
-              <a:t>11/4/2020</a:t>
+              <a:t>11/6/2020</a:t>
             </a:fld>
             <a:endParaRPr lang="en-US"/>
           </a:p>
@@ -12429,7 +12429,7 @@
                             <a:latin typeface="Cambria Math" panose="02040503050406030204" pitchFamily="18" charset="0"/>
                             <a:cs typeface="Arial" panose="020B0604020202020204" pitchFamily="34" charset="0"/>
                           </a:rPr>
-                          <m:t>min</m:t>
+                          <m:t>max</m:t>
                         </m:r>
                         <m:r>
                           <a:rPr lang="de-DE" altLang="de-DE" sz="1000" b="0" i="1" smtClean="0">
@@ -12514,7 +12514,17 @@
                                 <a:latin typeface="Cambria Math" panose="02040503050406030204" pitchFamily="18" charset="0"/>
                                 <a:cs typeface="Arial" panose="020B0604020202020204" pitchFamily="34" charset="0"/>
                               </a:rPr>
-                              <m:t>max</m:t>
+                              <m:t>m</m:t>
+                            </m:r>
+                            <m:r>
+                              <a:rPr lang="de-DE" altLang="de-DE" sz="1000" b="0" i="1" smtClean="0">
+                                <a:solidFill>
+                                  <a:prstClr val="black"/>
+                                </a:solidFill>
+                                <a:latin typeface="Cambria Math" panose="02040503050406030204" pitchFamily="18" charset="0"/>
+                                <a:cs typeface="Arial" panose="020B0604020202020204" pitchFamily="34" charset="0"/>
+                              </a:rPr>
+                              <m:t>𝑖𝑛</m:t>
                             </m:r>
                           </m:fName>
                           <m:e>
@@ -12586,14 +12596,14 @@
                           <m:rPr>
                             <m:sty m:val="p"/>
                           </m:rPr>
-                          <a:rPr lang="de-DE" altLang="de-DE" sz="1000" b="0" i="0" smtClean="0">
+                          <a:rPr lang="de-DE" altLang="de-DE" sz="1000">
                             <a:solidFill>
                               <a:prstClr val="black"/>
                             </a:solidFill>
                             <a:latin typeface="Cambria Math" panose="02040503050406030204" pitchFamily="18" charset="0"/>
                             <a:cs typeface="Arial" panose="020B0604020202020204" pitchFamily="34" charset="0"/>
                           </a:rPr>
-                          <m:t>min</m:t>
+                          <m:t>max</m:t>
                         </m:r>
                         <m:r>
                           <a:rPr lang="de-DE" altLang="de-DE" sz="1000" b="0" i="1" smtClean="0">
@@ -13314,8 +13324,8 @@
           </a:ln>
         </p:spPr>
       </p:pic>
-      <mc:AlternateContent xmlns:mc="http://schemas.openxmlformats.org/markup-compatibility/2006">
-        <mc:Choice xmlns:a14="http://schemas.microsoft.com/office/drawing/2010/main" Requires="a14">
+      <mc:AlternateContent xmlns:mc="http://schemas.openxmlformats.org/markup-compatibility/2006" xmlns:a14="http://schemas.microsoft.com/office/drawing/2010/main">
+        <mc:Choice Requires="a14">
           <p:sp>
             <p:nvSpPr>
               <p:cNvPr id="9" name="Rechteck 8"/>
@@ -13404,7 +13414,7 @@
             </p:txBody>
           </p:sp>
         </mc:Choice>
-        <mc:Fallback>
+        <mc:Fallback xmlns="">
           <p:sp>
             <p:nvSpPr>
               <p:cNvPr id="9" name="Rechteck 8"/>
@@ -13448,8 +13458,8 @@
           </p:sp>
         </mc:Fallback>
       </mc:AlternateContent>
-      <mc:AlternateContent xmlns:mc="http://schemas.openxmlformats.org/markup-compatibility/2006">
-        <mc:Choice xmlns:a14="http://schemas.microsoft.com/office/drawing/2010/main" Requires="a14">
+      <mc:AlternateContent xmlns:mc="http://schemas.openxmlformats.org/markup-compatibility/2006" xmlns:a14="http://schemas.microsoft.com/office/drawing/2010/main">
+        <mc:Choice Requires="a14">
           <p:sp>
             <p:nvSpPr>
               <p:cNvPr id="10" name="Rechteck 9"/>
@@ -13538,7 +13548,7 @@
             </p:txBody>
           </p:sp>
         </mc:Choice>
-        <mc:Fallback>
+        <mc:Fallback xmlns="">
           <p:sp>
             <p:nvSpPr>
               <p:cNvPr id="10" name="Rechteck 9"/>
@@ -13582,8 +13592,8 @@
           </p:sp>
         </mc:Fallback>
       </mc:AlternateContent>
-      <mc:AlternateContent xmlns:mc="http://schemas.openxmlformats.org/markup-compatibility/2006">
-        <mc:Choice xmlns:a14="http://schemas.microsoft.com/office/drawing/2010/main" Requires="a14">
+      <mc:AlternateContent xmlns:mc="http://schemas.openxmlformats.org/markup-compatibility/2006" xmlns:a14="http://schemas.microsoft.com/office/drawing/2010/main">
+        <mc:Choice Requires="a14">
           <p:sp>
             <p:nvSpPr>
               <p:cNvPr id="11" name="Rechteck 10"/>
@@ -13672,7 +13682,7 @@
             </p:txBody>
           </p:sp>
         </mc:Choice>
-        <mc:Fallback>
+        <mc:Fallback xmlns="">
           <p:sp>
             <p:nvSpPr>
               <p:cNvPr id="11" name="Rechteck 10"/>

</xml_diff>

<commit_message>
Added variable and fixed consumable quantity
</commit_message>
<xml_diff>
--- a/docs/docu_v1.pptx
+++ b/docs/docu_v1.pptx
@@ -12,10 +12,11 @@
     <p:sldId id="261" r:id="rId6"/>
     <p:sldId id="257" r:id="rId7"/>
     <p:sldId id="267" r:id="rId8"/>
-    <p:sldId id="260" r:id="rId9"/>
-    <p:sldId id="264" r:id="rId10"/>
-    <p:sldId id="256" r:id="rId11"/>
-    <p:sldId id="258" r:id="rId12"/>
+    <p:sldId id="268" r:id="rId9"/>
+    <p:sldId id="260" r:id="rId10"/>
+    <p:sldId id="264" r:id="rId11"/>
+    <p:sldId id="256" r:id="rId12"/>
+    <p:sldId id="258" r:id="rId13"/>
   </p:sldIdLst>
   <p:sldSz cx="9144000" cy="5715000" type="screen16x10"/>
   <p:notesSz cx="6858000" cy="9144000"/>
@@ -126,6 +127,7 @@
             <p14:sldId id="261"/>
             <p14:sldId id="257"/>
             <p14:sldId id="267"/>
+            <p14:sldId id="268"/>
             <p14:sldId id="260"/>
             <p14:sldId id="264"/>
           </p14:sldIdLst>
@@ -287,7 +289,7 @@
           <a:p>
             <a:fld id="{40AC6573-0F6A-409A-81A3-E5A359E080D0}" type="datetimeFigureOut">
               <a:rPr lang="en-US" smtClean="0"/>
-              <a:t>11/6/2020</a:t>
+              <a:t>12/10/2020</a:t>
             </a:fld>
             <a:endParaRPr lang="en-US"/>
           </a:p>
@@ -457,7 +459,7 @@
           <a:p>
             <a:fld id="{40AC6573-0F6A-409A-81A3-E5A359E080D0}" type="datetimeFigureOut">
               <a:rPr lang="en-US" smtClean="0"/>
-              <a:t>11/6/2020</a:t>
+              <a:t>12/10/2020</a:t>
             </a:fld>
             <a:endParaRPr lang="en-US"/>
           </a:p>
@@ -637,7 +639,7 @@
           <a:p>
             <a:fld id="{40AC6573-0F6A-409A-81A3-E5A359E080D0}" type="datetimeFigureOut">
               <a:rPr lang="en-US" smtClean="0"/>
-              <a:t>11/6/2020</a:t>
+              <a:t>12/10/2020</a:t>
             </a:fld>
             <a:endParaRPr lang="en-US"/>
           </a:p>
@@ -807,7 +809,7 @@
           <a:p>
             <a:fld id="{40AC6573-0F6A-409A-81A3-E5A359E080D0}" type="datetimeFigureOut">
               <a:rPr lang="en-US" smtClean="0"/>
-              <a:t>11/6/2020</a:t>
+              <a:t>12/10/2020</a:t>
             </a:fld>
             <a:endParaRPr lang="en-US"/>
           </a:p>
@@ -1053,7 +1055,7 @@
           <a:p>
             <a:fld id="{40AC6573-0F6A-409A-81A3-E5A359E080D0}" type="datetimeFigureOut">
               <a:rPr lang="en-US" smtClean="0"/>
-              <a:t>11/6/2020</a:t>
+              <a:t>12/10/2020</a:t>
             </a:fld>
             <a:endParaRPr lang="en-US"/>
           </a:p>
@@ -1285,7 +1287,7 @@
           <a:p>
             <a:fld id="{40AC6573-0F6A-409A-81A3-E5A359E080D0}" type="datetimeFigureOut">
               <a:rPr lang="en-US" smtClean="0"/>
-              <a:t>11/6/2020</a:t>
+              <a:t>12/10/2020</a:t>
             </a:fld>
             <a:endParaRPr lang="en-US"/>
           </a:p>
@@ -1652,7 +1654,7 @@
           <a:p>
             <a:fld id="{40AC6573-0F6A-409A-81A3-E5A359E080D0}" type="datetimeFigureOut">
               <a:rPr lang="en-US" smtClean="0"/>
-              <a:t>11/6/2020</a:t>
+              <a:t>12/10/2020</a:t>
             </a:fld>
             <a:endParaRPr lang="en-US"/>
           </a:p>
@@ -1770,7 +1772,7 @@
           <a:p>
             <a:fld id="{40AC6573-0F6A-409A-81A3-E5A359E080D0}" type="datetimeFigureOut">
               <a:rPr lang="en-US" smtClean="0"/>
-              <a:t>11/6/2020</a:t>
+              <a:t>12/10/2020</a:t>
             </a:fld>
             <a:endParaRPr lang="en-US"/>
           </a:p>
@@ -1865,7 +1867,7 @@
           <a:p>
             <a:fld id="{40AC6573-0F6A-409A-81A3-E5A359E080D0}" type="datetimeFigureOut">
               <a:rPr lang="en-US" smtClean="0"/>
-              <a:t>11/6/2020</a:t>
+              <a:t>12/10/2020</a:t>
             </a:fld>
             <a:endParaRPr lang="en-US"/>
           </a:p>
@@ -2142,7 +2144,7 @@
           <a:p>
             <a:fld id="{40AC6573-0F6A-409A-81A3-E5A359E080D0}" type="datetimeFigureOut">
               <a:rPr lang="en-US" smtClean="0"/>
-              <a:t>11/6/2020</a:t>
+              <a:t>12/10/2020</a:t>
             </a:fld>
             <a:endParaRPr lang="en-US"/>
           </a:p>
@@ -2399,7 +2401,7 @@
           <a:p>
             <a:fld id="{40AC6573-0F6A-409A-81A3-E5A359E080D0}" type="datetimeFigureOut">
               <a:rPr lang="en-US" smtClean="0"/>
-              <a:t>11/6/2020</a:t>
+              <a:t>12/10/2020</a:t>
             </a:fld>
             <a:endParaRPr lang="en-US"/>
           </a:p>
@@ -2612,7 +2614,7 @@
           <a:p>
             <a:fld id="{40AC6573-0F6A-409A-81A3-E5A359E080D0}" type="datetimeFigureOut">
               <a:rPr lang="en-US" smtClean="0"/>
-              <a:t>11/6/2020</a:t>
+              <a:t>12/10/2020</a:t>
             </a:fld>
             <a:endParaRPr lang="en-US"/>
           </a:p>
@@ -3112,6 +3114,2283 @@
           <a:chExt cx="0" cy="0"/>
         </a:xfrm>
       </p:grpSpPr>
+      <mc:AlternateContent xmlns:mc="http://schemas.openxmlformats.org/markup-compatibility/2006" xmlns:a14="http://schemas.microsoft.com/office/drawing/2010/main">
+        <mc:Choice Requires="a14">
+          <p:sp>
+            <p:nvSpPr>
+              <p:cNvPr id="3" name="Rechteck 2"/>
+              <p:cNvSpPr/>
+              <p:nvPr/>
+            </p:nvSpPr>
+            <p:spPr>
+              <a:xfrm>
+                <a:off x="63166" y="530270"/>
+                <a:ext cx="3835256" cy="5220660"/>
+              </a:xfrm>
+              <a:prstGeom prst="rect">
+                <a:avLst/>
+              </a:prstGeom>
+            </p:spPr>
+            <p:txBody>
+              <a:bodyPr wrap="square">
+                <a:spAutoFit/>
+              </a:bodyPr>
+              <a:lstStyle/>
+              <a:p>
+                <a:r>
+                  <a:rPr lang="en-US" altLang="de-DE" sz="1000" dirty="0" smtClean="0">
+                    <a:latin typeface="Arial" panose="020B0604020202020204" pitchFamily="34" charset="0"/>
+                    <a:cs typeface="Arial" panose="020B0604020202020204" pitchFamily="34" charset="0"/>
+                  </a:rPr>
+                  <a:t>Then we calculate the meta data for </a:t>
+                </a:r>
+                <a:r>
+                  <a:rPr lang="en-US" altLang="de-DE" sz="1000" dirty="0">
+                    <a:latin typeface="Arial" panose="020B0604020202020204" pitchFamily="34" charset="0"/>
+                    <a:cs typeface="Arial" panose="020B0604020202020204" pitchFamily="34" charset="0"/>
+                  </a:rPr>
+                  <a:t>each </a:t>
+                </a:r>
+                <a:r>
+                  <a:rPr lang="en-US" altLang="de-DE" sz="1000" b="1" dirty="0">
+                    <a:latin typeface="Arial" panose="020B0604020202020204" pitchFamily="34" charset="0"/>
+                    <a:cs typeface="Arial" panose="020B0604020202020204" pitchFamily="34" charset="0"/>
+                  </a:rPr>
+                  <a:t>permutation</a:t>
+                </a:r>
+                <a:r>
+                  <a:rPr lang="en-US" altLang="de-DE" sz="1000" dirty="0" smtClean="0">
+                    <a:latin typeface="Arial" panose="020B0604020202020204" pitchFamily="34" charset="0"/>
+                    <a:cs typeface="Arial" panose="020B0604020202020204" pitchFamily="34" charset="0"/>
+                  </a:rPr>
+                  <a:t>.</a:t>
+                </a:r>
+              </a:p>
+              <a:p>
+                <a:endParaRPr lang="en-US" altLang="de-DE" sz="1000" dirty="0">
+                  <a:latin typeface="Arial" panose="020B0604020202020204" pitchFamily="34" charset="0"/>
+                  <a:cs typeface="Arial" panose="020B0604020202020204" pitchFamily="34" charset="0"/>
+                </a:endParaRPr>
+              </a:p>
+              <a:p>
+                <a:r>
+                  <a:rPr lang="en-US" altLang="de-DE" sz="1000" dirty="0" smtClean="0">
+                    <a:latin typeface="Arial" panose="020B0604020202020204" pitchFamily="34" charset="0"/>
+                    <a:cs typeface="Arial" panose="020B0604020202020204" pitchFamily="34" charset="0"/>
+                  </a:rPr>
+                  <a:t>Currently we have:</a:t>
+                </a:r>
+              </a:p>
+              <a:p>
+                <a:endParaRPr lang="en-US" altLang="de-DE" sz="1000" dirty="0">
+                  <a:latin typeface="Arial" panose="020B0604020202020204" pitchFamily="34" charset="0"/>
+                  <a:cs typeface="Arial" panose="020B0604020202020204" pitchFamily="34" charset="0"/>
+                </a:endParaRPr>
+              </a:p>
+              <a:p>
+                <a:pPr marL="171450" indent="-171450">
+                  <a:buFont typeface="Arial" panose="020B0604020202020204" pitchFamily="34" charset="0"/>
+                  <a:buChar char="•"/>
+                </a:pPr>
+                <a:r>
+                  <a:rPr lang="en-US" altLang="de-DE" sz="1000" b="1" dirty="0" smtClean="0">
+                    <a:latin typeface="Arial" panose="020B0604020202020204" pitchFamily="34" charset="0"/>
+                    <a:cs typeface="Arial" panose="020B0604020202020204" pitchFamily="34" charset="0"/>
+                  </a:rPr>
+                  <a:t>Price</a:t>
+                </a:r>
+              </a:p>
+              <a:p>
+                <a:pPr marL="171450" indent="-171450">
+                  <a:buFont typeface="Arial" panose="020B0604020202020204" pitchFamily="34" charset="0"/>
+                  <a:buChar char="•"/>
+                </a:pPr>
+                <a:r>
+                  <a:rPr lang="en-US" altLang="de-DE" sz="1000" b="1" dirty="0" smtClean="0">
+                    <a:latin typeface="Arial" panose="020B0604020202020204" pitchFamily="34" charset="0"/>
+                    <a:cs typeface="Arial" panose="020B0604020202020204" pitchFamily="34" charset="0"/>
+                  </a:rPr>
+                  <a:t>Time</a:t>
+                </a:r>
+              </a:p>
+              <a:p>
+                <a:pPr marL="171450" indent="-171450">
+                  <a:buFont typeface="Arial" panose="020B0604020202020204" pitchFamily="34" charset="0"/>
+                  <a:buChar char="•"/>
+                </a:pPr>
+                <a:r>
+                  <a:rPr lang="en-US" altLang="de-DE" sz="1000" b="1" dirty="0" smtClean="0">
+                    <a:latin typeface="Arial" panose="020B0604020202020204" pitchFamily="34" charset="0"/>
+                    <a:cs typeface="Arial" panose="020B0604020202020204" pitchFamily="34" charset="0"/>
+                  </a:rPr>
+                  <a:t>CO2-e</a:t>
+                </a:r>
+              </a:p>
+              <a:p>
+                <a:pPr marL="171450" indent="-171450">
+                  <a:buFont typeface="Arial" panose="020B0604020202020204" pitchFamily="34" charset="0"/>
+                  <a:buChar char="•"/>
+                </a:pPr>
+                <a:r>
+                  <a:rPr lang="en-US" altLang="de-DE" sz="1000" b="1" dirty="0" smtClean="0">
+                    <a:solidFill>
+                      <a:srgbClr val="FF0000"/>
+                    </a:solidFill>
+                    <a:latin typeface="Arial" panose="020B0604020202020204" pitchFamily="34" charset="0"/>
+                    <a:cs typeface="Arial" panose="020B0604020202020204" pitchFamily="34" charset="0"/>
+                  </a:rPr>
+                  <a:t>???</a:t>
+                </a:r>
+                <a:endParaRPr lang="en-US" altLang="de-DE" sz="1000" b="1" dirty="0">
+                  <a:solidFill>
+                    <a:srgbClr val="FF0000"/>
+                  </a:solidFill>
+                  <a:latin typeface="Arial" panose="020B0604020202020204" pitchFamily="34" charset="0"/>
+                  <a:cs typeface="Arial" panose="020B0604020202020204" pitchFamily="34" charset="0"/>
+                </a:endParaRPr>
+              </a:p>
+              <a:p>
+                <a:pPr lvl="0"/>
+                <a:endParaRPr lang="en-US" altLang="de-DE" sz="1000" dirty="0" smtClean="0">
+                  <a:latin typeface="Arial" panose="020B0604020202020204" pitchFamily="34" charset="0"/>
+                  <a:cs typeface="Arial" panose="020B0604020202020204" pitchFamily="34" charset="0"/>
+                </a:endParaRPr>
+              </a:p>
+              <a:p>
+                <a:pPr lvl="0"/>
+                <a:r>
+                  <a:rPr lang="en-US" altLang="de-DE" sz="1000" dirty="0" smtClean="0">
+                    <a:latin typeface="Arial" panose="020B0604020202020204" pitchFamily="34" charset="0"/>
+                    <a:cs typeface="Arial" panose="020B0604020202020204" pitchFamily="34" charset="0"/>
+                  </a:rPr>
+                  <a:t>Subsequently</a:t>
+                </a:r>
+                <a:r>
+                  <a:rPr lang="en-US" altLang="de-DE" sz="1000" dirty="0">
+                    <a:solidFill>
+                      <a:prstClr val="black"/>
+                    </a:solidFill>
+                    <a:latin typeface="Arial" panose="020B0604020202020204" pitchFamily="34" charset="0"/>
+                    <a:cs typeface="Arial" panose="020B0604020202020204" pitchFamily="34" charset="0"/>
+                  </a:rPr>
+                  <a:t>, we evaluate and rank the </a:t>
+                </a:r>
+                <a:r>
+                  <a:rPr lang="en-US" altLang="de-DE" sz="1000" b="1" dirty="0">
+                    <a:solidFill>
+                      <a:prstClr val="black"/>
+                    </a:solidFill>
+                    <a:latin typeface="Arial" panose="020B0604020202020204" pitchFamily="34" charset="0"/>
+                    <a:cs typeface="Arial" panose="020B0604020202020204" pitchFamily="34" charset="0"/>
+                  </a:rPr>
+                  <a:t>permutations</a:t>
+                </a:r>
+                <a:r>
+                  <a:rPr lang="en-US" altLang="de-DE" sz="1000" dirty="0" smtClean="0">
+                    <a:solidFill>
+                      <a:prstClr val="black"/>
+                    </a:solidFill>
+                    <a:latin typeface="Arial" panose="020B0604020202020204" pitchFamily="34" charset="0"/>
+                    <a:cs typeface="Arial" panose="020B0604020202020204" pitchFamily="34" charset="0"/>
+                  </a:rPr>
+                  <a:t>.</a:t>
+                </a:r>
+              </a:p>
+              <a:p>
+                <a:pPr lvl="0"/>
+                <a:endParaRPr lang="en-US" altLang="de-DE" sz="1000" dirty="0">
+                  <a:solidFill>
+                    <a:prstClr val="black"/>
+                  </a:solidFill>
+                  <a:latin typeface="Arial" panose="020B0604020202020204" pitchFamily="34" charset="0"/>
+                  <a:cs typeface="Arial" panose="020B0604020202020204" pitchFamily="34" charset="0"/>
+                </a:endParaRPr>
+              </a:p>
+              <a:p>
+                <a:pPr lvl="0"/>
+                <a:r>
+                  <a:rPr lang="en-US" altLang="de-DE" sz="1000" dirty="0" smtClean="0">
+                    <a:solidFill>
+                      <a:prstClr val="black"/>
+                    </a:solidFill>
+                    <a:latin typeface="Arial" panose="020B0604020202020204" pitchFamily="34" charset="0"/>
+                    <a:cs typeface="Arial" panose="020B0604020202020204" pitchFamily="34" charset="0"/>
+                  </a:rPr>
+                  <a:t>Currently we have two functions:</a:t>
+                </a:r>
+              </a:p>
+              <a:p>
+                <a:pPr lvl="0"/>
+                <a:endParaRPr lang="en-US" altLang="de-DE" sz="1000" dirty="0">
+                  <a:solidFill>
+                    <a:prstClr val="black"/>
+                  </a:solidFill>
+                  <a:latin typeface="Arial" panose="020B0604020202020204" pitchFamily="34" charset="0"/>
+                  <a:cs typeface="Arial" panose="020B0604020202020204" pitchFamily="34" charset="0"/>
+                </a:endParaRPr>
+              </a:p>
+              <a:p>
+                <a:pPr marL="228600" lvl="0" indent="-228600">
+                  <a:buAutoNum type="arabicPeriod"/>
+                </a:pPr>
+                <a:r>
+                  <a:rPr lang="en-US" altLang="de-DE" sz="1000" dirty="0" smtClean="0">
+                    <a:solidFill>
+                      <a:prstClr val="black"/>
+                    </a:solidFill>
+                    <a:latin typeface="Arial" panose="020B0604020202020204" pitchFamily="34" charset="0"/>
+                    <a:cs typeface="Arial" panose="020B0604020202020204" pitchFamily="34" charset="0"/>
+                  </a:rPr>
+                  <a:t>Regarding one meta information (e.g. lowest price).</a:t>
+                </a:r>
+              </a:p>
+              <a:p>
+                <a:pPr marL="228600" lvl="0" indent="-228600">
+                  <a:buAutoNum type="arabicPeriod"/>
+                </a:pPr>
+                <a:endParaRPr lang="en-US" altLang="de-DE" sz="1000" dirty="0" smtClean="0">
+                  <a:solidFill>
+                    <a:prstClr val="black"/>
+                  </a:solidFill>
+                  <a:latin typeface="Arial" panose="020B0604020202020204" pitchFamily="34" charset="0"/>
+                  <a:cs typeface="Arial" panose="020B0604020202020204" pitchFamily="34" charset="0"/>
+                </a:endParaRPr>
+              </a:p>
+              <a:p>
+                <a:pPr marL="228600" lvl="0" indent="-228600">
+                  <a:buAutoNum type="arabicPeriod"/>
+                </a:pPr>
+                <a:r>
+                  <a:rPr lang="en-US" altLang="de-DE" sz="1000" u="sng" dirty="0" smtClean="0">
+                    <a:solidFill>
+                      <a:prstClr val="black"/>
+                    </a:solidFill>
+                    <a:latin typeface="Arial" panose="020B0604020202020204" pitchFamily="34" charset="0"/>
+                    <a:cs typeface="Arial" panose="020B0604020202020204" pitchFamily="34" charset="0"/>
+                  </a:rPr>
+                  <a:t>The lowest sum of the normalized and weighted meta data.</a:t>
+                </a:r>
+              </a:p>
+              <a:p>
+                <a:pPr lvl="0"/>
+                <a:endParaRPr lang="en-US" altLang="de-DE" sz="1000" dirty="0" smtClean="0">
+                  <a:solidFill>
+                    <a:prstClr val="black"/>
+                  </a:solidFill>
+                  <a:latin typeface="Arial" panose="020B0604020202020204" pitchFamily="34" charset="0"/>
+                  <a:cs typeface="Arial" panose="020B0604020202020204" pitchFamily="34" charset="0"/>
+                </a:endParaRPr>
+              </a:p>
+              <a:p>
+                <a:pPr lvl="0"/>
+                <a:r>
+                  <a:rPr lang="en-US" altLang="de-DE" sz="1000" dirty="0" smtClean="0">
+                    <a:solidFill>
+                      <a:prstClr val="black"/>
+                    </a:solidFill>
+                    <a:latin typeface="Arial" panose="020B0604020202020204" pitchFamily="34" charset="0"/>
+                    <a:cs typeface="Arial" panose="020B0604020202020204" pitchFamily="34" charset="0"/>
+                  </a:rPr>
+                  <a:t>Rescale the range </a:t>
+                </a:r>
+                <a:r>
+                  <a:rPr lang="en-US" altLang="de-DE" sz="1000" dirty="0">
+                    <a:solidFill>
+                      <a:prstClr val="black"/>
+                    </a:solidFill>
+                    <a:latin typeface="Arial" panose="020B0604020202020204" pitchFamily="34" charset="0"/>
+                    <a:cs typeface="Arial" panose="020B0604020202020204" pitchFamily="34" charset="0"/>
+                  </a:rPr>
+                  <a:t>of </a:t>
+                </a:r>
+                <a:r>
+                  <a:rPr lang="en-US" altLang="de-DE" sz="1000" dirty="0" smtClean="0">
+                    <a:solidFill>
+                      <a:prstClr val="black"/>
+                    </a:solidFill>
+                    <a:latin typeface="Arial" panose="020B0604020202020204" pitchFamily="34" charset="0"/>
+                    <a:cs typeface="Arial" panose="020B0604020202020204" pitchFamily="34" charset="0"/>
+                  </a:rPr>
+                  <a:t>feature </a:t>
+                </a:r>
+                <a14:m>
+                  <m:oMath xmlns:m="http://schemas.openxmlformats.org/officeDocument/2006/math">
+                    <m:sSub>
+                      <m:sSubPr>
+                        <m:ctrlPr>
+                          <a:rPr lang="de-DE" altLang="de-DE" sz="1000" i="1" smtClean="0">
+                            <a:solidFill>
+                              <a:prstClr val="black"/>
+                            </a:solidFill>
+                            <a:latin typeface="Cambria Math" panose="02040503050406030204" pitchFamily="18" charset="0"/>
+                            <a:cs typeface="Arial" panose="020B0604020202020204" pitchFamily="34" charset="0"/>
+                          </a:rPr>
+                        </m:ctrlPr>
+                      </m:sSubPr>
+                      <m:e>
+                        <m:r>
+                          <a:rPr lang="de-DE" altLang="de-DE" sz="1000" b="0" i="1" smtClean="0">
+                            <a:solidFill>
+                              <a:prstClr val="black"/>
+                            </a:solidFill>
+                            <a:latin typeface="Cambria Math" panose="02040503050406030204" pitchFamily="18" charset="0"/>
+                            <a:cs typeface="Arial" panose="020B0604020202020204" pitchFamily="34" charset="0"/>
+                          </a:rPr>
+                          <m:t>𝑥</m:t>
+                        </m:r>
+                      </m:e>
+                      <m:sub>
+                        <m:r>
+                          <a:rPr lang="de-DE" altLang="de-DE" sz="1000" b="0" i="1" smtClean="0">
+                            <a:solidFill>
+                              <a:prstClr val="black"/>
+                            </a:solidFill>
+                            <a:latin typeface="Cambria Math" panose="02040503050406030204" pitchFamily="18" charset="0"/>
+                            <a:cs typeface="Arial" panose="020B0604020202020204" pitchFamily="34" charset="0"/>
+                          </a:rPr>
+                          <m:t>𝑖</m:t>
+                        </m:r>
+                      </m:sub>
+                    </m:sSub>
+                  </m:oMath>
+                </a14:m>
+                <a:r>
+                  <a:rPr lang="en-US" altLang="de-DE" sz="1000" dirty="0" smtClean="0">
+                    <a:solidFill>
+                      <a:prstClr val="black"/>
+                    </a:solidFill>
+                    <a:latin typeface="Arial" panose="020B0604020202020204" pitchFamily="34" charset="0"/>
+                    <a:cs typeface="Arial" panose="020B0604020202020204" pitchFamily="34" charset="0"/>
+                  </a:rPr>
+                  <a:t> (price, time, co2-e) </a:t>
+                </a:r>
+                <a:r>
+                  <a:rPr lang="en-US" altLang="de-DE" sz="1000" dirty="0">
+                    <a:solidFill>
+                      <a:prstClr val="black"/>
+                    </a:solidFill>
+                    <a:latin typeface="Arial" panose="020B0604020202020204" pitchFamily="34" charset="0"/>
+                    <a:cs typeface="Arial" panose="020B0604020202020204" pitchFamily="34" charset="0"/>
+                  </a:rPr>
+                  <a:t>to </a:t>
+                </a:r>
+                <a:r>
+                  <a:rPr lang="en-US" altLang="de-DE" sz="1000" dirty="0" smtClean="0">
+                    <a:solidFill>
+                      <a:prstClr val="black"/>
+                    </a:solidFill>
+                    <a:latin typeface="Arial" panose="020B0604020202020204" pitchFamily="34" charset="0"/>
+                    <a:cs typeface="Arial" panose="020B0604020202020204" pitchFamily="34" charset="0"/>
+                  </a:rPr>
+                  <a:t>be in the </a:t>
+                </a:r>
+                <a:r>
+                  <a:rPr lang="en-US" altLang="de-DE" sz="1000" dirty="0">
+                    <a:solidFill>
+                      <a:prstClr val="black"/>
+                    </a:solidFill>
+                    <a:latin typeface="Arial" panose="020B0604020202020204" pitchFamily="34" charset="0"/>
+                    <a:cs typeface="Arial" panose="020B0604020202020204" pitchFamily="34" charset="0"/>
+                  </a:rPr>
+                  <a:t>range </a:t>
+                </a:r>
+                <a:r>
+                  <a:rPr lang="en-US" altLang="de-DE" sz="1000" dirty="0" smtClean="0">
+                    <a:solidFill>
+                      <a:prstClr val="black"/>
+                    </a:solidFill>
+                    <a:latin typeface="Arial" panose="020B0604020202020204" pitchFamily="34" charset="0"/>
+                    <a:cs typeface="Arial" panose="020B0604020202020204" pitchFamily="34" charset="0"/>
+                  </a:rPr>
+                  <a:t>[</a:t>
+                </a:r>
+                <a:r>
+                  <a:rPr lang="en-US" altLang="de-DE" sz="1000" dirty="0">
+                    <a:solidFill>
+                      <a:prstClr val="black"/>
+                    </a:solidFill>
+                    <a:latin typeface="Arial" panose="020B0604020202020204" pitchFamily="34" charset="0"/>
+                    <a:cs typeface="Arial" panose="020B0604020202020204" pitchFamily="34" charset="0"/>
+                  </a:rPr>
+                  <a:t>0, 1</a:t>
+                </a:r>
+                <a:r>
+                  <a:rPr lang="en-US" altLang="de-DE" sz="1000" dirty="0" smtClean="0">
+                    <a:solidFill>
+                      <a:prstClr val="black"/>
+                    </a:solidFill>
+                    <a:latin typeface="Arial" panose="020B0604020202020204" pitchFamily="34" charset="0"/>
+                    <a:cs typeface="Arial" panose="020B0604020202020204" pitchFamily="34" charset="0"/>
+                  </a:rPr>
+                  <a:t>] with 0 the lowest and 1 the highest value by</a:t>
+                </a:r>
+              </a:p>
+              <a:p>
+                <a:pPr lvl="0"/>
+                <a:endParaRPr lang="en-US" altLang="de-DE" sz="1000" dirty="0">
+                  <a:solidFill>
+                    <a:prstClr val="black"/>
+                  </a:solidFill>
+                  <a:latin typeface="Arial" panose="020B0604020202020204" pitchFamily="34" charset="0"/>
+                  <a:cs typeface="Arial" panose="020B0604020202020204" pitchFamily="34" charset="0"/>
+                </a:endParaRPr>
+              </a:p>
+              <a:p>
+                <a:pPr lvl="0" algn="ctr"/>
+                <a14:m>
+                  <m:oMath xmlns:m="http://schemas.openxmlformats.org/officeDocument/2006/math">
+                    <m:sSup>
+                      <m:sSupPr>
+                        <m:ctrlPr>
+                          <a:rPr lang="en-US" altLang="de-DE" sz="1000" i="1" smtClean="0">
+                            <a:solidFill>
+                              <a:prstClr val="black"/>
+                            </a:solidFill>
+                            <a:latin typeface="Cambria Math" panose="02040503050406030204" pitchFamily="18" charset="0"/>
+                            <a:cs typeface="Arial" panose="020B0604020202020204" pitchFamily="34" charset="0"/>
+                          </a:rPr>
+                        </m:ctrlPr>
+                      </m:sSupPr>
+                      <m:e>
+                        <m:sSub>
+                          <m:sSubPr>
+                            <m:ctrlPr>
+                              <a:rPr lang="de-DE" altLang="de-DE" sz="1000" i="1">
+                                <a:solidFill>
+                                  <a:prstClr val="black"/>
+                                </a:solidFill>
+                                <a:latin typeface="Cambria Math" panose="02040503050406030204" pitchFamily="18" charset="0"/>
+                                <a:cs typeface="Arial" panose="020B0604020202020204" pitchFamily="34" charset="0"/>
+                              </a:rPr>
+                            </m:ctrlPr>
+                          </m:sSubPr>
+                          <m:e>
+                            <m:r>
+                              <a:rPr lang="de-DE" altLang="de-DE" sz="1000" i="1">
+                                <a:solidFill>
+                                  <a:prstClr val="black"/>
+                                </a:solidFill>
+                                <a:latin typeface="Cambria Math" panose="02040503050406030204" pitchFamily="18" charset="0"/>
+                                <a:cs typeface="Arial" panose="020B0604020202020204" pitchFamily="34" charset="0"/>
+                              </a:rPr>
+                              <m:t>𝑥</m:t>
+                            </m:r>
+                          </m:e>
+                          <m:sub>
+                            <m:r>
+                              <a:rPr lang="de-DE" altLang="de-DE" sz="1000" i="1">
+                                <a:solidFill>
+                                  <a:prstClr val="black"/>
+                                </a:solidFill>
+                                <a:latin typeface="Cambria Math" panose="02040503050406030204" pitchFamily="18" charset="0"/>
+                                <a:cs typeface="Arial" panose="020B0604020202020204" pitchFamily="34" charset="0"/>
+                              </a:rPr>
+                              <m:t>𝑖</m:t>
+                            </m:r>
+                          </m:sub>
+                        </m:sSub>
+                      </m:e>
+                      <m:sup>
+                        <m:r>
+                          <a:rPr lang="de-DE" altLang="de-DE" sz="1000" b="0" i="1" smtClean="0">
+                            <a:solidFill>
+                              <a:prstClr val="black"/>
+                            </a:solidFill>
+                            <a:latin typeface="Cambria Math" panose="02040503050406030204" pitchFamily="18" charset="0"/>
+                            <a:cs typeface="Arial" panose="020B0604020202020204" pitchFamily="34" charset="0"/>
+                          </a:rPr>
+                          <m:t>′</m:t>
+                        </m:r>
+                      </m:sup>
+                    </m:sSup>
+                    <m:r>
+                      <a:rPr lang="de-DE" altLang="de-DE" sz="1000" b="0" i="1" smtClean="0">
+                        <a:solidFill>
+                          <a:prstClr val="black"/>
+                        </a:solidFill>
+                        <a:latin typeface="Cambria Math" panose="02040503050406030204" pitchFamily="18" charset="0"/>
+                        <a:cs typeface="Arial" panose="020B0604020202020204" pitchFamily="34" charset="0"/>
+                      </a:rPr>
+                      <m:t>=</m:t>
+                    </m:r>
+                    <m:f>
+                      <m:fPr>
+                        <m:ctrlPr>
+                          <a:rPr lang="de-DE" altLang="de-DE" sz="1000" b="0" i="1" smtClean="0">
+                            <a:solidFill>
+                              <a:prstClr val="black"/>
+                            </a:solidFill>
+                            <a:latin typeface="Cambria Math" panose="02040503050406030204" pitchFamily="18" charset="0"/>
+                            <a:cs typeface="Arial" panose="020B0604020202020204" pitchFamily="34" charset="0"/>
+                          </a:rPr>
+                        </m:ctrlPr>
+                      </m:fPr>
+                      <m:num>
+                        <m:sSub>
+                          <m:sSubPr>
+                            <m:ctrlPr>
+                              <a:rPr lang="de-DE" altLang="de-DE" sz="1000" i="1">
+                                <a:solidFill>
+                                  <a:prstClr val="black"/>
+                                </a:solidFill>
+                                <a:latin typeface="Cambria Math" panose="02040503050406030204" pitchFamily="18" charset="0"/>
+                                <a:cs typeface="Arial" panose="020B0604020202020204" pitchFamily="34" charset="0"/>
+                              </a:rPr>
+                            </m:ctrlPr>
+                          </m:sSubPr>
+                          <m:e>
+                            <m:r>
+                              <a:rPr lang="de-DE" altLang="de-DE" sz="1000" i="1">
+                                <a:solidFill>
+                                  <a:prstClr val="black"/>
+                                </a:solidFill>
+                                <a:latin typeface="Cambria Math" panose="02040503050406030204" pitchFamily="18" charset="0"/>
+                                <a:cs typeface="Arial" panose="020B0604020202020204" pitchFamily="34" charset="0"/>
+                              </a:rPr>
+                              <m:t>𝑥</m:t>
+                            </m:r>
+                          </m:e>
+                          <m:sub>
+                            <m:r>
+                              <a:rPr lang="de-DE" altLang="de-DE" sz="1000" i="1">
+                                <a:solidFill>
+                                  <a:prstClr val="black"/>
+                                </a:solidFill>
+                                <a:latin typeface="Cambria Math" panose="02040503050406030204" pitchFamily="18" charset="0"/>
+                                <a:cs typeface="Arial" panose="020B0604020202020204" pitchFamily="34" charset="0"/>
+                              </a:rPr>
+                              <m:t>𝑖</m:t>
+                            </m:r>
+                          </m:sub>
+                        </m:sSub>
+                        <m:r>
+                          <a:rPr lang="de-DE" altLang="de-DE" sz="1000" b="0" i="1" smtClean="0">
+                            <a:solidFill>
+                              <a:prstClr val="black"/>
+                            </a:solidFill>
+                            <a:latin typeface="Cambria Math" panose="02040503050406030204" pitchFamily="18" charset="0"/>
+                            <a:cs typeface="Arial" panose="020B0604020202020204" pitchFamily="34" charset="0"/>
+                          </a:rPr>
+                          <m:t>−</m:t>
+                        </m:r>
+                        <m:r>
+                          <m:rPr>
+                            <m:sty m:val="p"/>
+                          </m:rPr>
+                          <a:rPr lang="de-DE" altLang="de-DE" sz="1000" b="0" i="0" smtClean="0">
+                            <a:solidFill>
+                              <a:prstClr val="black"/>
+                            </a:solidFill>
+                            <a:latin typeface="Cambria Math" panose="02040503050406030204" pitchFamily="18" charset="0"/>
+                            <a:cs typeface="Arial" panose="020B0604020202020204" pitchFamily="34" charset="0"/>
+                          </a:rPr>
+                          <m:t>max</m:t>
+                        </m:r>
+                        <m:r>
+                          <a:rPr lang="de-DE" altLang="de-DE" sz="1000" b="0" i="1" smtClean="0">
+                            <a:solidFill>
+                              <a:prstClr val="black"/>
+                            </a:solidFill>
+                            <a:latin typeface="Cambria Math" panose="02040503050406030204" pitchFamily="18" charset="0"/>
+                            <a:cs typeface="Arial" panose="020B0604020202020204" pitchFamily="34" charset="0"/>
+                          </a:rPr>
+                          <m:t>⁡(</m:t>
+                        </m:r>
+                        <m:sSub>
+                          <m:sSubPr>
+                            <m:ctrlPr>
+                              <a:rPr lang="de-DE" altLang="de-DE" sz="1000" i="1">
+                                <a:solidFill>
+                                  <a:prstClr val="black"/>
+                                </a:solidFill>
+                                <a:latin typeface="Cambria Math" panose="02040503050406030204" pitchFamily="18" charset="0"/>
+                                <a:cs typeface="Arial" panose="020B0604020202020204" pitchFamily="34" charset="0"/>
+                              </a:rPr>
+                            </m:ctrlPr>
+                          </m:sSubPr>
+                          <m:e>
+                            <m:r>
+                              <a:rPr lang="de-DE" altLang="de-DE" sz="1000" i="1">
+                                <a:solidFill>
+                                  <a:prstClr val="black"/>
+                                </a:solidFill>
+                                <a:latin typeface="Cambria Math" panose="02040503050406030204" pitchFamily="18" charset="0"/>
+                                <a:cs typeface="Arial" panose="020B0604020202020204" pitchFamily="34" charset="0"/>
+                              </a:rPr>
+                              <m:t>𝑥</m:t>
+                            </m:r>
+                          </m:e>
+                          <m:sub>
+                            <m:r>
+                              <a:rPr lang="de-DE" altLang="de-DE" sz="1000" i="1">
+                                <a:solidFill>
+                                  <a:prstClr val="black"/>
+                                </a:solidFill>
+                                <a:latin typeface="Cambria Math" panose="02040503050406030204" pitchFamily="18" charset="0"/>
+                                <a:cs typeface="Arial" panose="020B0604020202020204" pitchFamily="34" charset="0"/>
+                              </a:rPr>
+                              <m:t>𝑖</m:t>
+                            </m:r>
+                          </m:sub>
+                        </m:sSub>
+                        <m:r>
+                          <a:rPr lang="de-DE" altLang="de-DE" sz="1000" b="0" i="1" smtClean="0">
+                            <a:solidFill>
+                              <a:prstClr val="black"/>
+                            </a:solidFill>
+                            <a:latin typeface="Cambria Math" panose="02040503050406030204" pitchFamily="18" charset="0"/>
+                            <a:cs typeface="Arial" panose="020B0604020202020204" pitchFamily="34" charset="0"/>
+                          </a:rPr>
+                          <m:t>)</m:t>
+                        </m:r>
+                      </m:num>
+                      <m:den>
+                        <m:func>
+                          <m:funcPr>
+                            <m:ctrlPr>
+                              <a:rPr lang="de-DE" altLang="de-DE" sz="1000" b="0" i="1" smtClean="0">
+                                <a:solidFill>
+                                  <a:prstClr val="black"/>
+                                </a:solidFill>
+                                <a:latin typeface="Cambria Math" panose="02040503050406030204" pitchFamily="18" charset="0"/>
+                                <a:cs typeface="Arial" panose="020B0604020202020204" pitchFamily="34" charset="0"/>
+                              </a:rPr>
+                            </m:ctrlPr>
+                          </m:funcPr>
+                          <m:fName>
+                            <m:r>
+                              <m:rPr>
+                                <m:sty m:val="p"/>
+                              </m:rPr>
+                              <a:rPr lang="de-DE" altLang="de-DE" sz="1000" b="0" i="0" smtClean="0">
+                                <a:solidFill>
+                                  <a:prstClr val="black"/>
+                                </a:solidFill>
+                                <a:latin typeface="Cambria Math" panose="02040503050406030204" pitchFamily="18" charset="0"/>
+                                <a:cs typeface="Arial" panose="020B0604020202020204" pitchFamily="34" charset="0"/>
+                              </a:rPr>
+                              <m:t>m</m:t>
+                            </m:r>
+                            <m:r>
+                              <a:rPr lang="de-DE" altLang="de-DE" sz="1000" b="0" i="1" smtClean="0">
+                                <a:solidFill>
+                                  <a:prstClr val="black"/>
+                                </a:solidFill>
+                                <a:latin typeface="Cambria Math" panose="02040503050406030204" pitchFamily="18" charset="0"/>
+                                <a:cs typeface="Arial" panose="020B0604020202020204" pitchFamily="34" charset="0"/>
+                              </a:rPr>
+                              <m:t>𝑖𝑛</m:t>
+                            </m:r>
+                          </m:fName>
+                          <m:e>
+                            <m:d>
+                              <m:dPr>
+                                <m:ctrlPr>
+                                  <a:rPr lang="de-DE" altLang="de-DE" sz="1000" b="0" i="1" smtClean="0">
+                                    <a:solidFill>
+                                      <a:prstClr val="black"/>
+                                    </a:solidFill>
+                                    <a:latin typeface="Cambria Math" panose="02040503050406030204" pitchFamily="18" charset="0"/>
+                                    <a:cs typeface="Arial" panose="020B0604020202020204" pitchFamily="34" charset="0"/>
+                                  </a:rPr>
+                                </m:ctrlPr>
+                              </m:dPr>
+                              <m:e>
+                                <m:sSub>
+                                  <m:sSubPr>
+                                    <m:ctrlPr>
+                                      <a:rPr lang="de-DE" altLang="de-DE" sz="1000" i="1">
+                                        <a:solidFill>
+                                          <a:prstClr val="black"/>
+                                        </a:solidFill>
+                                        <a:latin typeface="Cambria Math" panose="02040503050406030204" pitchFamily="18" charset="0"/>
+                                        <a:cs typeface="Arial" panose="020B0604020202020204" pitchFamily="34" charset="0"/>
+                                      </a:rPr>
+                                    </m:ctrlPr>
+                                  </m:sSubPr>
+                                  <m:e>
+                                    <m:r>
+                                      <a:rPr lang="de-DE" altLang="de-DE" sz="1000" i="1">
+                                        <a:solidFill>
+                                          <a:prstClr val="black"/>
+                                        </a:solidFill>
+                                        <a:latin typeface="Cambria Math" panose="02040503050406030204" pitchFamily="18" charset="0"/>
+                                        <a:cs typeface="Arial" panose="020B0604020202020204" pitchFamily="34" charset="0"/>
+                                      </a:rPr>
+                                      <m:t>𝑥</m:t>
+                                    </m:r>
+                                  </m:e>
+                                  <m:sub>
+                                    <m:r>
+                                      <a:rPr lang="de-DE" altLang="de-DE" sz="1000" i="1">
+                                        <a:solidFill>
+                                          <a:prstClr val="black"/>
+                                        </a:solidFill>
+                                        <a:latin typeface="Cambria Math" panose="02040503050406030204" pitchFamily="18" charset="0"/>
+                                        <a:cs typeface="Arial" panose="020B0604020202020204" pitchFamily="34" charset="0"/>
+                                      </a:rPr>
+                                      <m:t>𝑖</m:t>
+                                    </m:r>
+                                  </m:sub>
+                                </m:sSub>
+                              </m:e>
+                            </m:d>
+                          </m:e>
+                        </m:func>
+                        <m:r>
+                          <a:rPr lang="de-DE" altLang="de-DE" sz="1000" b="0" i="1" smtClean="0">
+                            <a:solidFill>
+                              <a:prstClr val="black"/>
+                            </a:solidFill>
+                            <a:latin typeface="Cambria Math" panose="02040503050406030204" pitchFamily="18" charset="0"/>
+                            <a:cs typeface="Arial" panose="020B0604020202020204" pitchFamily="34" charset="0"/>
+                          </a:rPr>
+                          <m:t>−</m:t>
+                        </m:r>
+                        <m:r>
+                          <m:rPr>
+                            <m:sty m:val="p"/>
+                          </m:rPr>
+                          <a:rPr lang="de-DE" altLang="de-DE" sz="1000">
+                            <a:solidFill>
+                              <a:prstClr val="black"/>
+                            </a:solidFill>
+                            <a:latin typeface="Cambria Math" panose="02040503050406030204" pitchFamily="18" charset="0"/>
+                            <a:cs typeface="Arial" panose="020B0604020202020204" pitchFamily="34" charset="0"/>
+                          </a:rPr>
+                          <m:t>max</m:t>
+                        </m:r>
+                        <m:r>
+                          <a:rPr lang="de-DE" altLang="de-DE" sz="1000" b="0" i="1" smtClean="0">
+                            <a:solidFill>
+                              <a:prstClr val="black"/>
+                            </a:solidFill>
+                            <a:latin typeface="Cambria Math" panose="02040503050406030204" pitchFamily="18" charset="0"/>
+                            <a:cs typeface="Arial" panose="020B0604020202020204" pitchFamily="34" charset="0"/>
+                          </a:rPr>
+                          <m:t>⁡(</m:t>
+                        </m:r>
+                        <m:sSub>
+                          <m:sSubPr>
+                            <m:ctrlPr>
+                              <a:rPr lang="de-DE" altLang="de-DE" sz="1000" i="1">
+                                <a:solidFill>
+                                  <a:prstClr val="black"/>
+                                </a:solidFill>
+                                <a:latin typeface="Cambria Math" panose="02040503050406030204" pitchFamily="18" charset="0"/>
+                                <a:cs typeface="Arial" panose="020B0604020202020204" pitchFamily="34" charset="0"/>
+                              </a:rPr>
+                            </m:ctrlPr>
+                          </m:sSubPr>
+                          <m:e>
+                            <m:r>
+                              <a:rPr lang="de-DE" altLang="de-DE" sz="1000" i="1">
+                                <a:solidFill>
+                                  <a:prstClr val="black"/>
+                                </a:solidFill>
+                                <a:latin typeface="Cambria Math" panose="02040503050406030204" pitchFamily="18" charset="0"/>
+                                <a:cs typeface="Arial" panose="020B0604020202020204" pitchFamily="34" charset="0"/>
+                              </a:rPr>
+                              <m:t>𝑥</m:t>
+                            </m:r>
+                          </m:e>
+                          <m:sub>
+                            <m:r>
+                              <a:rPr lang="de-DE" altLang="de-DE" sz="1000" i="1">
+                                <a:solidFill>
+                                  <a:prstClr val="black"/>
+                                </a:solidFill>
+                                <a:latin typeface="Cambria Math" panose="02040503050406030204" pitchFamily="18" charset="0"/>
+                                <a:cs typeface="Arial" panose="020B0604020202020204" pitchFamily="34" charset="0"/>
+                              </a:rPr>
+                              <m:t>𝑖</m:t>
+                            </m:r>
+                          </m:sub>
+                        </m:sSub>
+                        <m:r>
+                          <a:rPr lang="de-DE" altLang="de-DE" sz="1000" b="0" i="1" smtClean="0">
+                            <a:solidFill>
+                              <a:prstClr val="black"/>
+                            </a:solidFill>
+                            <a:latin typeface="Cambria Math" panose="02040503050406030204" pitchFamily="18" charset="0"/>
+                            <a:cs typeface="Arial" panose="020B0604020202020204" pitchFamily="34" charset="0"/>
+                          </a:rPr>
+                          <m:t>)</m:t>
+                        </m:r>
+                      </m:den>
+                    </m:f>
+                  </m:oMath>
+                </a14:m>
+                <a:r>
+                  <a:rPr lang="en-US" altLang="de-DE" sz="1000" dirty="0" smtClean="0">
+                    <a:solidFill>
+                      <a:prstClr val="black"/>
+                    </a:solidFill>
+                    <a:latin typeface="Arial" panose="020B0604020202020204" pitchFamily="34" charset="0"/>
+                    <a:cs typeface="Arial" panose="020B0604020202020204" pitchFamily="34" charset="0"/>
+                  </a:rPr>
+                  <a:t> 	(Min-Max Normalization)</a:t>
+                </a:r>
+              </a:p>
+              <a:p>
+                <a:pPr lvl="0"/>
+                <a:endParaRPr lang="en-US" altLang="de-DE" sz="1000" dirty="0" smtClean="0">
+                  <a:solidFill>
+                    <a:prstClr val="black"/>
+                  </a:solidFill>
+                  <a:latin typeface="Arial" panose="020B0604020202020204" pitchFamily="34" charset="0"/>
+                  <a:cs typeface="Arial" panose="020B0604020202020204" pitchFamily="34" charset="0"/>
+                </a:endParaRPr>
+              </a:p>
+              <a:p>
+                <a:pPr lvl="0"/>
+                <a:r>
+                  <a:rPr lang="en-US" altLang="de-DE" sz="1000" dirty="0" smtClean="0">
+                    <a:solidFill>
+                      <a:prstClr val="black"/>
+                    </a:solidFill>
+                    <a:latin typeface="Arial" panose="020B0604020202020204" pitchFamily="34" charset="0"/>
+                    <a:cs typeface="Arial" panose="020B0604020202020204" pitchFamily="34" charset="0"/>
+                  </a:rPr>
+                  <a:t>Calculate the weighted value for each feature</a:t>
+                </a:r>
+                <a14:m>
+                  <m:oMath xmlns:m="http://schemas.openxmlformats.org/officeDocument/2006/math">
+                    <m:sSub>
+                      <m:sSubPr>
+                        <m:ctrlPr>
+                          <a:rPr lang="de-DE" altLang="de-DE" sz="1000" i="1">
+                            <a:solidFill>
+                              <a:prstClr val="black"/>
+                            </a:solidFill>
+                            <a:latin typeface="Cambria Math" panose="02040503050406030204" pitchFamily="18" charset="0"/>
+                            <a:cs typeface="Arial" panose="020B0604020202020204" pitchFamily="34" charset="0"/>
+                          </a:rPr>
+                        </m:ctrlPr>
+                      </m:sSubPr>
+                      <m:e>
+                        <m:r>
+                          <a:rPr lang="de-DE" altLang="de-DE" sz="1000" b="0" i="1" smtClean="0">
+                            <a:solidFill>
+                              <a:prstClr val="black"/>
+                            </a:solidFill>
+                            <a:latin typeface="Cambria Math" panose="02040503050406030204" pitchFamily="18" charset="0"/>
+                            <a:cs typeface="Arial" panose="020B0604020202020204" pitchFamily="34" charset="0"/>
+                          </a:rPr>
+                          <m:t> </m:t>
+                        </m:r>
+                        <m:r>
+                          <a:rPr lang="de-DE" altLang="de-DE" sz="1000" i="1">
+                            <a:solidFill>
+                              <a:prstClr val="black"/>
+                            </a:solidFill>
+                            <a:latin typeface="Cambria Math" panose="02040503050406030204" pitchFamily="18" charset="0"/>
+                            <a:cs typeface="Arial" panose="020B0604020202020204" pitchFamily="34" charset="0"/>
+                          </a:rPr>
+                          <m:t>𝑥</m:t>
+                        </m:r>
+                      </m:e>
+                      <m:sub>
+                        <m:r>
+                          <a:rPr lang="de-DE" altLang="de-DE" sz="1000" i="1">
+                            <a:solidFill>
+                              <a:prstClr val="black"/>
+                            </a:solidFill>
+                            <a:latin typeface="Cambria Math" panose="02040503050406030204" pitchFamily="18" charset="0"/>
+                            <a:cs typeface="Arial" panose="020B0604020202020204" pitchFamily="34" charset="0"/>
+                          </a:rPr>
+                          <m:t>𝑖</m:t>
+                        </m:r>
+                      </m:sub>
+                    </m:sSub>
+                  </m:oMath>
+                </a14:m>
+                <a:r>
+                  <a:rPr lang="en-US" altLang="de-DE" sz="1000" dirty="0" smtClean="0">
+                    <a:solidFill>
+                      <a:prstClr val="black"/>
+                    </a:solidFill>
+                    <a:latin typeface="Arial" panose="020B0604020202020204" pitchFamily="34" charset="0"/>
+                    <a:cs typeface="Arial" panose="020B0604020202020204" pitchFamily="34" charset="0"/>
+                  </a:rPr>
+                  <a:t>.</a:t>
+                </a:r>
+              </a:p>
+              <a:p>
+                <a:pPr lvl="0"/>
+                <a:endParaRPr lang="en-US" altLang="de-DE" sz="1000" dirty="0">
+                  <a:solidFill>
+                    <a:prstClr val="black"/>
+                  </a:solidFill>
+                  <a:latin typeface="Arial" panose="020B0604020202020204" pitchFamily="34" charset="0"/>
+                  <a:cs typeface="Arial" panose="020B0604020202020204" pitchFamily="34" charset="0"/>
+                </a:endParaRPr>
+              </a:p>
+              <a:p>
+                <a:pPr lvl="0"/>
+                <a14:m>
+                  <m:oMathPara xmlns:m="http://schemas.openxmlformats.org/officeDocument/2006/math">
+                    <m:oMathParaPr>
+                      <m:jc m:val="centerGroup"/>
+                    </m:oMathParaPr>
+                    <m:oMath xmlns:m="http://schemas.openxmlformats.org/officeDocument/2006/math">
+                      <m:sSub>
+                        <m:sSubPr>
+                          <m:ctrlPr>
+                            <a:rPr lang="de-DE" altLang="de-DE" sz="1000" i="1">
+                              <a:solidFill>
+                                <a:prstClr val="black"/>
+                              </a:solidFill>
+                              <a:latin typeface="Cambria Math" panose="02040503050406030204" pitchFamily="18" charset="0"/>
+                              <a:cs typeface="Arial" panose="020B0604020202020204" pitchFamily="34" charset="0"/>
+                            </a:rPr>
+                          </m:ctrlPr>
+                        </m:sSubPr>
+                        <m:e>
+                          <m:r>
+                            <a:rPr lang="de-DE" altLang="de-DE" sz="1000" i="1">
+                              <a:solidFill>
+                                <a:prstClr val="black"/>
+                              </a:solidFill>
+                              <a:latin typeface="Cambria Math" panose="02040503050406030204" pitchFamily="18" charset="0"/>
+                              <a:cs typeface="Arial" panose="020B0604020202020204" pitchFamily="34" charset="0"/>
+                            </a:rPr>
+                            <m:t>𝑥</m:t>
+                          </m:r>
+                        </m:e>
+                        <m:sub>
+                          <m:r>
+                            <a:rPr lang="de-DE" altLang="de-DE" sz="1000" i="1">
+                              <a:solidFill>
+                                <a:prstClr val="black"/>
+                              </a:solidFill>
+                              <a:latin typeface="Cambria Math" panose="02040503050406030204" pitchFamily="18" charset="0"/>
+                              <a:cs typeface="Arial" panose="020B0604020202020204" pitchFamily="34" charset="0"/>
+                            </a:rPr>
+                            <m:t>𝑖</m:t>
+                          </m:r>
+                        </m:sub>
+                      </m:sSub>
+                      <m:r>
+                        <a:rPr lang="de-DE" altLang="de-DE" sz="1000" b="0" i="1" smtClean="0">
+                          <a:solidFill>
+                            <a:prstClr val="black"/>
+                          </a:solidFill>
+                          <a:latin typeface="Cambria Math" panose="02040503050406030204" pitchFamily="18" charset="0"/>
+                          <a:cs typeface="Arial" panose="020B0604020202020204" pitchFamily="34" charset="0"/>
+                        </a:rPr>
+                        <m:t>__</m:t>
+                      </m:r>
+                      <m:r>
+                        <a:rPr lang="de-DE" altLang="de-DE" sz="1000" b="0" i="1" smtClean="0">
+                          <a:solidFill>
+                            <a:prstClr val="black"/>
+                          </a:solidFill>
+                          <a:latin typeface="Cambria Math" panose="02040503050406030204" pitchFamily="18" charset="0"/>
+                          <a:cs typeface="Arial" panose="020B0604020202020204" pitchFamily="34" charset="0"/>
+                        </a:rPr>
+                        <m:t>𝑤𝑒𝑖𝑔h𝑡𝑒𝑑</m:t>
+                      </m:r>
+                      <m:r>
+                        <a:rPr lang="de-DE" altLang="de-DE" sz="1000" b="0" i="1" smtClean="0">
+                          <a:solidFill>
+                            <a:prstClr val="black"/>
+                          </a:solidFill>
+                          <a:latin typeface="Cambria Math" panose="02040503050406030204" pitchFamily="18" charset="0"/>
+                          <a:cs typeface="Arial" panose="020B0604020202020204" pitchFamily="34" charset="0"/>
+                        </a:rPr>
+                        <m:t>=</m:t>
+                      </m:r>
+                      <m:sSup>
+                        <m:sSupPr>
+                          <m:ctrlPr>
+                            <a:rPr lang="en-US" altLang="de-DE" sz="1000" i="1">
+                              <a:solidFill>
+                                <a:prstClr val="black"/>
+                              </a:solidFill>
+                              <a:latin typeface="Cambria Math" panose="02040503050406030204" pitchFamily="18" charset="0"/>
+                              <a:cs typeface="Arial" panose="020B0604020202020204" pitchFamily="34" charset="0"/>
+                            </a:rPr>
+                          </m:ctrlPr>
+                        </m:sSupPr>
+                        <m:e>
+                          <m:sSub>
+                            <m:sSubPr>
+                              <m:ctrlPr>
+                                <a:rPr lang="de-DE" altLang="de-DE" sz="1000" i="1">
+                                  <a:solidFill>
+                                    <a:prstClr val="black"/>
+                                  </a:solidFill>
+                                  <a:latin typeface="Cambria Math" panose="02040503050406030204" pitchFamily="18" charset="0"/>
+                                  <a:cs typeface="Arial" panose="020B0604020202020204" pitchFamily="34" charset="0"/>
+                                </a:rPr>
+                              </m:ctrlPr>
+                            </m:sSubPr>
+                            <m:e>
+                              <m:r>
+                                <a:rPr lang="de-DE" altLang="de-DE" sz="1000" i="1">
+                                  <a:solidFill>
+                                    <a:prstClr val="black"/>
+                                  </a:solidFill>
+                                  <a:latin typeface="Cambria Math" panose="02040503050406030204" pitchFamily="18" charset="0"/>
+                                  <a:cs typeface="Arial" panose="020B0604020202020204" pitchFamily="34" charset="0"/>
+                                </a:rPr>
+                                <m:t>𝑥</m:t>
+                              </m:r>
+                            </m:e>
+                            <m:sub>
+                              <m:r>
+                                <a:rPr lang="de-DE" altLang="de-DE" sz="1000" i="1">
+                                  <a:solidFill>
+                                    <a:prstClr val="black"/>
+                                  </a:solidFill>
+                                  <a:latin typeface="Cambria Math" panose="02040503050406030204" pitchFamily="18" charset="0"/>
+                                  <a:cs typeface="Arial" panose="020B0604020202020204" pitchFamily="34" charset="0"/>
+                                </a:rPr>
+                                <m:t>𝑖</m:t>
+                              </m:r>
+                            </m:sub>
+                          </m:sSub>
+                        </m:e>
+                        <m:sup>
+                          <m:r>
+                            <a:rPr lang="de-DE" altLang="de-DE" sz="1000" i="1">
+                              <a:solidFill>
+                                <a:prstClr val="black"/>
+                              </a:solidFill>
+                              <a:latin typeface="Cambria Math" panose="02040503050406030204" pitchFamily="18" charset="0"/>
+                              <a:cs typeface="Arial" panose="020B0604020202020204" pitchFamily="34" charset="0"/>
+                            </a:rPr>
+                            <m:t>′</m:t>
+                          </m:r>
+                        </m:sup>
+                      </m:sSup>
+                      <m:r>
+                        <a:rPr lang="de-DE" altLang="de-DE" sz="1000" b="0" i="0" smtClean="0">
+                          <a:solidFill>
+                            <a:prstClr val="black"/>
+                          </a:solidFill>
+                          <a:latin typeface="Cambria Math" panose="02040503050406030204" pitchFamily="18" charset="0"/>
+                          <a:cs typeface="Arial" panose="020B0604020202020204" pitchFamily="34" charset="0"/>
+                        </a:rPr>
+                        <m:t>∗</m:t>
+                      </m:r>
+                      <m:sSub>
+                        <m:sSubPr>
+                          <m:ctrlPr>
+                            <a:rPr lang="de-DE" altLang="de-DE" sz="1000" i="1">
+                              <a:solidFill>
+                                <a:prstClr val="black"/>
+                              </a:solidFill>
+                              <a:latin typeface="Cambria Math" panose="02040503050406030204" pitchFamily="18" charset="0"/>
+                              <a:cs typeface="Arial" panose="020B0604020202020204" pitchFamily="34" charset="0"/>
+                            </a:rPr>
+                          </m:ctrlPr>
+                        </m:sSubPr>
+                        <m:e>
+                          <m:r>
+                            <a:rPr lang="de-DE" altLang="de-DE" sz="1000" i="1">
+                              <a:solidFill>
+                                <a:prstClr val="black"/>
+                              </a:solidFill>
+                              <a:latin typeface="Cambria Math" panose="02040503050406030204" pitchFamily="18" charset="0"/>
+                              <a:cs typeface="Arial" panose="020B0604020202020204" pitchFamily="34" charset="0"/>
+                            </a:rPr>
+                            <m:t>𝑥</m:t>
+                          </m:r>
+                        </m:e>
+                        <m:sub>
+                          <m:r>
+                            <a:rPr lang="de-DE" altLang="de-DE" sz="1000" i="1">
+                              <a:solidFill>
+                                <a:prstClr val="black"/>
+                              </a:solidFill>
+                              <a:latin typeface="Cambria Math" panose="02040503050406030204" pitchFamily="18" charset="0"/>
+                              <a:cs typeface="Arial" panose="020B0604020202020204" pitchFamily="34" charset="0"/>
+                            </a:rPr>
+                            <m:t>𝑖</m:t>
+                          </m:r>
+                        </m:sub>
+                      </m:sSub>
+                      <m:r>
+                        <a:rPr lang="de-DE" altLang="de-DE" sz="1000" b="0" i="1" smtClean="0">
+                          <a:solidFill>
+                            <a:prstClr val="black"/>
+                          </a:solidFill>
+                          <a:latin typeface="Cambria Math" panose="02040503050406030204" pitchFamily="18" charset="0"/>
+                          <a:cs typeface="Arial" panose="020B0604020202020204" pitchFamily="34" charset="0"/>
+                        </a:rPr>
+                        <m:t>__</m:t>
+                      </m:r>
+                      <m:r>
+                        <a:rPr lang="de-DE" altLang="de-DE" sz="1000" b="0" i="1" smtClean="0">
+                          <a:solidFill>
+                            <a:prstClr val="black"/>
+                          </a:solidFill>
+                          <a:latin typeface="Cambria Math" panose="02040503050406030204" pitchFamily="18" charset="0"/>
+                          <a:cs typeface="Arial" panose="020B0604020202020204" pitchFamily="34" charset="0"/>
+                        </a:rPr>
+                        <m:t>𝑖𝑚𝑝𝑜𝑟𝑡𝑎𝑛𝑐𝑒</m:t>
+                      </m:r>
+                    </m:oMath>
+                  </m:oMathPara>
+                </a14:m>
+                <a:endParaRPr lang="en-US" altLang="de-DE" sz="1000" dirty="0" smtClean="0">
+                  <a:solidFill>
+                    <a:prstClr val="black"/>
+                  </a:solidFill>
+                  <a:latin typeface="Arial" panose="020B0604020202020204" pitchFamily="34" charset="0"/>
+                  <a:cs typeface="Arial" panose="020B0604020202020204" pitchFamily="34" charset="0"/>
+                </a:endParaRPr>
+              </a:p>
+              <a:p>
+                <a:pPr lvl="0"/>
+                <a:endParaRPr lang="en-US" altLang="de-DE" sz="1000" dirty="0" smtClean="0">
+                  <a:solidFill>
+                    <a:prstClr val="black"/>
+                  </a:solidFill>
+                  <a:latin typeface="Arial" panose="020B0604020202020204" pitchFamily="34" charset="0"/>
+                  <a:cs typeface="Arial" panose="020B0604020202020204" pitchFamily="34" charset="0"/>
+                </a:endParaRPr>
+              </a:p>
+              <a:p>
+                <a:pPr lvl="0"/>
+                <a:r>
+                  <a:rPr lang="en-US" altLang="de-DE" sz="1000" dirty="0" smtClean="0">
+                    <a:solidFill>
+                      <a:prstClr val="black"/>
+                    </a:solidFill>
+                    <a:latin typeface="Arial" panose="020B0604020202020204" pitchFamily="34" charset="0"/>
+                    <a:cs typeface="Arial" panose="020B0604020202020204" pitchFamily="34" charset="0"/>
+                  </a:rPr>
+                  <a:t>Calculate </a:t>
+                </a:r>
+                <a:r>
+                  <a:rPr lang="en-US" altLang="de-DE" sz="1000" dirty="0">
+                    <a:solidFill>
+                      <a:prstClr val="black"/>
+                    </a:solidFill>
+                    <a:latin typeface="Arial" panose="020B0604020202020204" pitchFamily="34" charset="0"/>
+                    <a:cs typeface="Arial" panose="020B0604020202020204" pitchFamily="34" charset="0"/>
+                  </a:rPr>
+                  <a:t>the comparative value </a:t>
+                </a:r>
+                <a:r>
+                  <a:rPr lang="en-US" altLang="de-DE" sz="1000" dirty="0" smtClean="0">
+                    <a:solidFill>
+                      <a:prstClr val="black"/>
+                    </a:solidFill>
+                    <a:latin typeface="Arial" panose="020B0604020202020204" pitchFamily="34" charset="0"/>
+                    <a:cs typeface="Arial" panose="020B0604020202020204" pitchFamily="34" charset="0"/>
+                  </a:rPr>
+                  <a:t>for each </a:t>
+                </a:r>
+                <a:r>
+                  <a:rPr lang="en-US" altLang="de-DE" sz="1000" b="1" dirty="0" smtClean="0">
+                    <a:solidFill>
+                      <a:prstClr val="black"/>
+                    </a:solidFill>
+                    <a:latin typeface="Arial" panose="020B0604020202020204" pitchFamily="34" charset="0"/>
+                    <a:cs typeface="Arial" panose="020B0604020202020204" pitchFamily="34" charset="0"/>
+                  </a:rPr>
+                  <a:t>permutation</a:t>
+                </a:r>
+                <a:r>
+                  <a:rPr lang="en-US" altLang="de-DE" sz="1000" dirty="0" smtClean="0">
+                    <a:solidFill>
+                      <a:prstClr val="black"/>
+                    </a:solidFill>
+                    <a:latin typeface="Arial" panose="020B0604020202020204" pitchFamily="34" charset="0"/>
+                    <a:cs typeface="Arial" panose="020B0604020202020204" pitchFamily="34" charset="0"/>
+                  </a:rPr>
+                  <a:t> by</a:t>
+                </a:r>
+                <a:endParaRPr lang="de-DE" altLang="de-DE" sz="1000" i="1" dirty="0" smtClean="0">
+                  <a:solidFill>
+                    <a:prstClr val="black"/>
+                  </a:solidFill>
+                  <a:latin typeface="Cambria Math" panose="02040503050406030204" pitchFamily="18" charset="0"/>
+                  <a:cs typeface="Arial" panose="020B0604020202020204" pitchFamily="34" charset="0"/>
+                </a:endParaRPr>
+              </a:p>
+              <a:p>
+                <a:pPr lvl="0"/>
+                <a14:m>
+                  <m:oMathPara xmlns:m="http://schemas.openxmlformats.org/officeDocument/2006/math">
+                    <m:oMathParaPr>
+                      <m:jc m:val="centerGroup"/>
+                    </m:oMathParaPr>
+                    <m:oMath xmlns:m="http://schemas.openxmlformats.org/officeDocument/2006/math">
+                      <m:nary>
+                        <m:naryPr>
+                          <m:chr m:val="∑"/>
+                          <m:ctrlPr>
+                            <a:rPr lang="en-US" altLang="de-DE" sz="1000" i="1">
+                              <a:solidFill>
+                                <a:prstClr val="black"/>
+                              </a:solidFill>
+                              <a:latin typeface="Cambria Math" panose="02040503050406030204" pitchFamily="18" charset="0"/>
+                              <a:cs typeface="Arial" panose="020B0604020202020204" pitchFamily="34" charset="0"/>
+                            </a:rPr>
+                          </m:ctrlPr>
+                        </m:naryPr>
+                        <m:sub>
+                          <m:r>
+                            <a:rPr lang="en-US" altLang="de-DE" sz="1000" i="1">
+                              <a:solidFill>
+                                <a:prstClr val="black"/>
+                              </a:solidFill>
+                              <a:latin typeface="Cambria Math" panose="02040503050406030204" pitchFamily="18" charset="0"/>
+                              <a:cs typeface="Arial" panose="020B0604020202020204" pitchFamily="34" charset="0"/>
+                            </a:rPr>
+                            <m:t>𝑖</m:t>
+                          </m:r>
+                          <m:r>
+                            <a:rPr lang="en-US" altLang="de-DE" sz="1000" i="1">
+                              <a:solidFill>
+                                <a:prstClr val="black"/>
+                              </a:solidFill>
+                              <a:latin typeface="Cambria Math" panose="02040503050406030204" pitchFamily="18" charset="0"/>
+                              <a:cs typeface="Arial" panose="020B0604020202020204" pitchFamily="34" charset="0"/>
+                            </a:rPr>
+                            <m:t>=0</m:t>
+                          </m:r>
+                        </m:sub>
+                        <m:sup>
+                          <m:r>
+                            <a:rPr lang="en-US" altLang="de-DE" sz="1000" i="1">
+                              <a:solidFill>
+                                <a:prstClr val="black"/>
+                              </a:solidFill>
+                              <a:latin typeface="Cambria Math" panose="02040503050406030204" pitchFamily="18" charset="0"/>
+                              <a:cs typeface="Arial" panose="020B0604020202020204" pitchFamily="34" charset="0"/>
+                            </a:rPr>
+                            <m:t>𝑛</m:t>
+                          </m:r>
+                        </m:sup>
+                        <m:e>
+                          <m:sSub>
+                            <m:sSubPr>
+                              <m:ctrlPr>
+                                <a:rPr lang="de-DE" altLang="de-DE" sz="1000" i="1">
+                                  <a:solidFill>
+                                    <a:prstClr val="black"/>
+                                  </a:solidFill>
+                                  <a:latin typeface="Cambria Math" panose="02040503050406030204" pitchFamily="18" charset="0"/>
+                                  <a:cs typeface="Arial" panose="020B0604020202020204" pitchFamily="34" charset="0"/>
+                                </a:rPr>
+                              </m:ctrlPr>
+                            </m:sSubPr>
+                            <m:e>
+                              <m:r>
+                                <a:rPr lang="de-DE" altLang="de-DE" sz="1000" i="1">
+                                  <a:solidFill>
+                                    <a:prstClr val="black"/>
+                                  </a:solidFill>
+                                  <a:latin typeface="Cambria Math" panose="02040503050406030204" pitchFamily="18" charset="0"/>
+                                  <a:cs typeface="Arial" panose="020B0604020202020204" pitchFamily="34" charset="0"/>
+                                </a:rPr>
+                                <m:t>𝑥</m:t>
+                              </m:r>
+                            </m:e>
+                            <m:sub>
+                              <m:r>
+                                <a:rPr lang="de-DE" altLang="de-DE" sz="1000" i="1">
+                                  <a:solidFill>
+                                    <a:prstClr val="black"/>
+                                  </a:solidFill>
+                                  <a:latin typeface="Cambria Math" panose="02040503050406030204" pitchFamily="18" charset="0"/>
+                                  <a:cs typeface="Arial" panose="020B0604020202020204" pitchFamily="34" charset="0"/>
+                                </a:rPr>
+                                <m:t>𝑖</m:t>
+                              </m:r>
+                            </m:sub>
+                          </m:sSub>
+                          <m:r>
+                            <a:rPr lang="de-DE" altLang="de-DE" sz="1000" i="1">
+                              <a:solidFill>
+                                <a:prstClr val="black"/>
+                              </a:solidFill>
+                              <a:latin typeface="Cambria Math" panose="02040503050406030204" pitchFamily="18" charset="0"/>
+                              <a:cs typeface="Arial" panose="020B0604020202020204" pitchFamily="34" charset="0"/>
+                            </a:rPr>
+                            <m:t>__</m:t>
+                          </m:r>
+                          <m:r>
+                            <a:rPr lang="de-DE" altLang="de-DE" sz="1000" i="1">
+                              <a:solidFill>
+                                <a:prstClr val="black"/>
+                              </a:solidFill>
+                              <a:latin typeface="Cambria Math" panose="02040503050406030204" pitchFamily="18" charset="0"/>
+                              <a:cs typeface="Arial" panose="020B0604020202020204" pitchFamily="34" charset="0"/>
+                            </a:rPr>
+                            <m:t>𝑤𝑒𝑖𝑔h𝑡𝑒𝑑</m:t>
+                          </m:r>
+                        </m:e>
+                      </m:nary>
+                    </m:oMath>
+                  </m:oMathPara>
+                </a14:m>
+                <a:endParaRPr lang="en-US" altLang="de-DE" sz="1000" dirty="0" smtClean="0">
+                  <a:solidFill>
+                    <a:prstClr val="black"/>
+                  </a:solidFill>
+                  <a:latin typeface="Arial" panose="020B0604020202020204" pitchFamily="34" charset="0"/>
+                  <a:cs typeface="Arial" panose="020B0604020202020204" pitchFamily="34" charset="0"/>
+                </a:endParaRPr>
+              </a:p>
+              <a:p>
+                <a:pPr lvl="0"/>
+                <a:endParaRPr lang="en-US" altLang="de-DE" sz="1000" dirty="0" smtClean="0">
+                  <a:solidFill>
+                    <a:prstClr val="black"/>
+                  </a:solidFill>
+                  <a:latin typeface="Arial" panose="020B0604020202020204" pitchFamily="34" charset="0"/>
+                  <a:cs typeface="Arial" panose="020B0604020202020204" pitchFamily="34" charset="0"/>
+                </a:endParaRPr>
+              </a:p>
+              <a:p>
+                <a:pPr lvl="0"/>
+                <a:r>
+                  <a:rPr lang="en-US" altLang="de-DE" sz="1000" dirty="0" smtClean="0">
+                    <a:solidFill>
+                      <a:prstClr val="black"/>
+                    </a:solidFill>
+                    <a:latin typeface="Arial" panose="020B0604020202020204" pitchFamily="34" charset="0"/>
+                    <a:cs typeface="Arial" panose="020B0604020202020204" pitchFamily="34" charset="0"/>
+                  </a:rPr>
+                  <a:t>Rank the permutations by their comparative value.</a:t>
+                </a:r>
+                <a:endParaRPr lang="en-US" altLang="de-DE" sz="1000" dirty="0">
+                  <a:solidFill>
+                    <a:prstClr val="black"/>
+                  </a:solidFill>
+                  <a:latin typeface="Arial" panose="020B0604020202020204" pitchFamily="34" charset="0"/>
+                  <a:cs typeface="Arial" panose="020B0604020202020204" pitchFamily="34" charset="0"/>
+                </a:endParaRPr>
+              </a:p>
+            </p:txBody>
+          </p:sp>
+        </mc:Choice>
+        <mc:Fallback xmlns="">
+          <p:sp>
+            <p:nvSpPr>
+              <p:cNvPr id="3" name="Rechteck 2"/>
+              <p:cNvSpPr>
+                <a:spLocks noRot="1" noChangeAspect="1" noMove="1" noResize="1" noEditPoints="1" noAdjustHandles="1" noChangeArrowheads="1" noChangeShapeType="1" noTextEdit="1"/>
+              </p:cNvSpPr>
+              <p:nvPr/>
+            </p:nvSpPr>
+            <p:spPr>
+              <a:xfrm>
+                <a:off x="63166" y="530270"/>
+                <a:ext cx="3835256" cy="5220660"/>
+              </a:xfrm>
+              <a:prstGeom prst="rect">
+                <a:avLst/>
+              </a:prstGeom>
+              <a:blipFill rotWithShape="0">
+                <a:blip r:embed="rId2"/>
+                <a:stretch>
+                  <a:fillRect b="-4322"/>
+                </a:stretch>
+              </a:blipFill>
+            </p:spPr>
+            <p:txBody>
+              <a:bodyPr/>
+              <a:lstStyle/>
+              <a:p>
+                <a:r>
+                  <a:rPr lang="en-US">
+                    <a:noFill/>
+                  </a:rPr>
+                  <a:t> </a:t>
+                </a:r>
+              </a:p>
+            </p:txBody>
+          </p:sp>
+        </mc:Fallback>
+      </mc:AlternateContent>
+      <p:sp>
+        <p:nvSpPr>
+          <p:cNvPr id="4" name="Textfeld 3"/>
+          <p:cNvSpPr txBox="1"/>
+          <p:nvPr/>
+        </p:nvSpPr>
+        <p:spPr>
+          <a:xfrm>
+            <a:off x="63165" y="59961"/>
+            <a:ext cx="1965332" cy="276999"/>
+          </a:xfrm>
+          <a:prstGeom prst="rect">
+            <a:avLst/>
+          </a:prstGeom>
+          <a:noFill/>
+        </p:spPr>
+        <p:txBody>
+          <a:bodyPr wrap="square" rtlCol="0">
+            <a:spAutoFit/>
+          </a:bodyPr>
+          <a:lstStyle/>
+          <a:p>
+            <a:r>
+              <a:rPr lang="en-US" sz="1200" b="1" dirty="0" smtClean="0">
+                <a:latin typeface="Arial" panose="020B0604020202020204" pitchFamily="34" charset="0"/>
+                <a:cs typeface="Arial" panose="020B0604020202020204" pitchFamily="34" charset="0"/>
+              </a:rPr>
+              <a:t>Evaluation and Ranking</a:t>
+            </a:r>
+            <a:endParaRPr lang="en-US" sz="1200" b="1" dirty="0">
+              <a:latin typeface="Arial" panose="020B0604020202020204" pitchFamily="34" charset="0"/>
+              <a:cs typeface="Arial" panose="020B0604020202020204" pitchFamily="34" charset="0"/>
+            </a:endParaRPr>
+          </a:p>
+        </p:txBody>
+      </p:sp>
+      <p:pic>
+        <p:nvPicPr>
+          <p:cNvPr id="8" name="Grafik 7"/>
+          <p:cNvPicPr>
+            <a:picLocks noChangeAspect="1"/>
+          </p:cNvPicPr>
+          <p:nvPr/>
+        </p:nvPicPr>
+        <p:blipFill>
+          <a:blip r:embed="rId3"/>
+          <a:stretch>
+            <a:fillRect/>
+          </a:stretch>
+        </p:blipFill>
+        <p:spPr>
+          <a:xfrm>
+            <a:off x="4392291" y="66413"/>
+            <a:ext cx="4688209" cy="4654550"/>
+          </a:xfrm>
+          <a:prstGeom prst="rect">
+            <a:avLst/>
+          </a:prstGeom>
+          <a:ln>
+            <a:solidFill>
+              <a:schemeClr val="tx1">
+                <a:lumMod val="75000"/>
+                <a:lumOff val="25000"/>
+              </a:schemeClr>
+            </a:solidFill>
+          </a:ln>
+        </p:spPr>
+      </p:pic>
+      <mc:AlternateContent xmlns:mc="http://schemas.openxmlformats.org/markup-compatibility/2006" xmlns:a14="http://schemas.microsoft.com/office/drawing/2010/main">
+        <mc:Choice Requires="a14">
+          <p:sp>
+            <p:nvSpPr>
+              <p:cNvPr id="9" name="Rechteck 8"/>
+              <p:cNvSpPr/>
+              <p:nvPr/>
+            </p:nvSpPr>
+            <p:spPr>
+              <a:xfrm>
+                <a:off x="7632700" y="3790950"/>
+                <a:ext cx="216000" cy="869950"/>
+              </a:xfrm>
+              <a:prstGeom prst="rect">
+                <a:avLst/>
+              </a:prstGeom>
+              <a:noFill/>
+              <a:ln>
+                <a:solidFill>
+                  <a:srgbClr val="FF0000"/>
+                </a:solidFill>
+              </a:ln>
+            </p:spPr>
+            <p:style>
+              <a:lnRef idx="2">
+                <a:schemeClr val="accent1">
+                  <a:shade val="50000"/>
+                </a:schemeClr>
+              </a:lnRef>
+              <a:fillRef idx="1">
+                <a:schemeClr val="accent1"/>
+              </a:fillRef>
+              <a:effectRef idx="0">
+                <a:schemeClr val="accent1"/>
+              </a:effectRef>
+              <a:fontRef idx="minor">
+                <a:schemeClr val="lt1"/>
+              </a:fontRef>
+            </p:style>
+            <p:txBody>
+              <a:bodyPr rtlCol="0" anchor="t"/>
+              <a:lstStyle/>
+              <a:p>
+                <a:pPr algn="ctr"/>
+                <a14:m>
+                  <m:oMathPara xmlns:m="http://schemas.openxmlformats.org/officeDocument/2006/math">
+                    <m:oMathParaPr>
+                      <m:jc m:val="center"/>
+                    </m:oMathParaPr>
+                    <m:oMath xmlns:m="http://schemas.openxmlformats.org/officeDocument/2006/math">
+                      <m:nary>
+                        <m:naryPr>
+                          <m:chr m:val="∑"/>
+                          <m:subHide m:val="on"/>
+                          <m:supHide m:val="on"/>
+                          <m:ctrlPr>
+                            <a:rPr lang="en-US" sz="600" i="1" smtClean="0">
+                              <a:solidFill>
+                                <a:srgbClr val="FF0000"/>
+                              </a:solidFill>
+                              <a:latin typeface="Cambria Math" panose="02040503050406030204" pitchFamily="18" charset="0"/>
+                            </a:rPr>
+                          </m:ctrlPr>
+                        </m:naryPr>
+                        <m:sub/>
+                        <m:sup/>
+                        <m:e>
+                          <m:r>
+                            <a:rPr lang="de-DE" sz="600" b="0" i="1" smtClean="0">
+                              <a:solidFill>
+                                <a:srgbClr val="FF0000"/>
+                              </a:solidFill>
+                              <a:latin typeface="Cambria Math" panose="02040503050406030204" pitchFamily="18" charset="0"/>
+                            </a:rPr>
+                            <m:t> </m:t>
+                          </m:r>
+                        </m:e>
+                      </m:nary>
+                    </m:oMath>
+                  </m:oMathPara>
+                </a14:m>
+                <a:endParaRPr lang="en-US" sz="600" dirty="0">
+                  <a:solidFill>
+                    <a:srgbClr val="FF0000"/>
+                  </a:solidFill>
+                </a:endParaRPr>
+              </a:p>
+            </p:txBody>
+          </p:sp>
+        </mc:Choice>
+        <mc:Fallback xmlns="">
+          <p:sp>
+            <p:nvSpPr>
+              <p:cNvPr id="9" name="Rechteck 8"/>
+              <p:cNvSpPr>
+                <a:spLocks noRot="1" noChangeAspect="1" noMove="1" noResize="1" noEditPoints="1" noAdjustHandles="1" noChangeArrowheads="1" noChangeShapeType="1" noTextEdit="1"/>
+              </p:cNvSpPr>
+              <p:nvPr/>
+            </p:nvSpPr>
+            <p:spPr>
+              <a:xfrm>
+                <a:off x="7632700" y="3790950"/>
+                <a:ext cx="216000" cy="869950"/>
+              </a:xfrm>
+              <a:prstGeom prst="rect">
+                <a:avLst/>
+              </a:prstGeom>
+              <a:blipFill rotWithShape="0">
+                <a:blip r:embed="rId4"/>
+                <a:stretch>
+                  <a:fillRect l="-115789" t="-34483" r="-63158"/>
+                </a:stretch>
+              </a:blipFill>
+              <a:ln>
+                <a:solidFill>
+                  <a:srgbClr val="FF0000"/>
+                </a:solidFill>
+              </a:ln>
+            </p:spPr>
+            <p:txBody>
+              <a:bodyPr/>
+              <a:lstStyle/>
+              <a:p>
+                <a:r>
+                  <a:rPr lang="en-US">
+                    <a:noFill/>
+                  </a:rPr>
+                  <a:t> </a:t>
+                </a:r>
+              </a:p>
+            </p:txBody>
+          </p:sp>
+        </mc:Fallback>
+      </mc:AlternateContent>
+      <mc:AlternateContent xmlns:mc="http://schemas.openxmlformats.org/markup-compatibility/2006" xmlns:a14="http://schemas.microsoft.com/office/drawing/2010/main">
+        <mc:Choice Requires="a14">
+          <p:sp>
+            <p:nvSpPr>
+              <p:cNvPr id="10" name="Rechteck 9"/>
+              <p:cNvSpPr/>
+              <p:nvPr/>
+            </p:nvSpPr>
+            <p:spPr>
+              <a:xfrm>
+                <a:off x="7880350" y="3790950"/>
+                <a:ext cx="216000" cy="869950"/>
+              </a:xfrm>
+              <a:prstGeom prst="rect">
+                <a:avLst/>
+              </a:prstGeom>
+              <a:noFill/>
+              <a:ln>
+                <a:solidFill>
+                  <a:srgbClr val="FF0000"/>
+                </a:solidFill>
+              </a:ln>
+            </p:spPr>
+            <p:style>
+              <a:lnRef idx="2">
+                <a:schemeClr val="accent1">
+                  <a:shade val="50000"/>
+                </a:schemeClr>
+              </a:lnRef>
+              <a:fillRef idx="1">
+                <a:schemeClr val="accent1"/>
+              </a:fillRef>
+              <a:effectRef idx="0">
+                <a:schemeClr val="accent1"/>
+              </a:effectRef>
+              <a:fontRef idx="minor">
+                <a:schemeClr val="lt1"/>
+              </a:fontRef>
+            </p:style>
+            <p:txBody>
+              <a:bodyPr rtlCol="0" anchor="t"/>
+              <a:lstStyle/>
+              <a:p>
+                <a:pPr algn="ctr"/>
+                <a14:m>
+                  <m:oMathPara xmlns:m="http://schemas.openxmlformats.org/officeDocument/2006/math">
+                    <m:oMathParaPr>
+                      <m:jc m:val="center"/>
+                    </m:oMathParaPr>
+                    <m:oMath xmlns:m="http://schemas.openxmlformats.org/officeDocument/2006/math">
+                      <m:nary>
+                        <m:naryPr>
+                          <m:chr m:val="∑"/>
+                          <m:subHide m:val="on"/>
+                          <m:supHide m:val="on"/>
+                          <m:ctrlPr>
+                            <a:rPr lang="en-US" sz="600" i="1" smtClean="0">
+                              <a:solidFill>
+                                <a:srgbClr val="FF0000"/>
+                              </a:solidFill>
+                              <a:latin typeface="Cambria Math" panose="02040503050406030204" pitchFamily="18" charset="0"/>
+                            </a:rPr>
+                          </m:ctrlPr>
+                        </m:naryPr>
+                        <m:sub/>
+                        <m:sup/>
+                        <m:e>
+                          <m:r>
+                            <a:rPr lang="de-DE" sz="600" b="0" i="1" smtClean="0">
+                              <a:solidFill>
+                                <a:srgbClr val="FF0000"/>
+                              </a:solidFill>
+                              <a:latin typeface="Cambria Math" panose="02040503050406030204" pitchFamily="18" charset="0"/>
+                            </a:rPr>
+                            <m:t> </m:t>
+                          </m:r>
+                        </m:e>
+                      </m:nary>
+                    </m:oMath>
+                  </m:oMathPara>
+                </a14:m>
+                <a:endParaRPr lang="en-US" sz="600" dirty="0">
+                  <a:solidFill>
+                    <a:srgbClr val="FF0000"/>
+                  </a:solidFill>
+                </a:endParaRPr>
+              </a:p>
+            </p:txBody>
+          </p:sp>
+        </mc:Choice>
+        <mc:Fallback xmlns="">
+          <p:sp>
+            <p:nvSpPr>
+              <p:cNvPr id="10" name="Rechteck 9"/>
+              <p:cNvSpPr>
+                <a:spLocks noRot="1" noChangeAspect="1" noMove="1" noResize="1" noEditPoints="1" noAdjustHandles="1" noChangeArrowheads="1" noChangeShapeType="1" noTextEdit="1"/>
+              </p:cNvSpPr>
+              <p:nvPr/>
+            </p:nvSpPr>
+            <p:spPr>
+              <a:xfrm>
+                <a:off x="7880350" y="3790950"/>
+                <a:ext cx="216000" cy="869950"/>
+              </a:xfrm>
+              <a:prstGeom prst="rect">
+                <a:avLst/>
+              </a:prstGeom>
+              <a:blipFill rotWithShape="0">
+                <a:blip r:embed="rId5"/>
+                <a:stretch>
+                  <a:fillRect l="-118919" t="-34483" r="-67568"/>
+                </a:stretch>
+              </a:blipFill>
+              <a:ln>
+                <a:solidFill>
+                  <a:srgbClr val="FF0000"/>
+                </a:solidFill>
+              </a:ln>
+            </p:spPr>
+            <p:txBody>
+              <a:bodyPr/>
+              <a:lstStyle/>
+              <a:p>
+                <a:r>
+                  <a:rPr lang="en-US">
+                    <a:noFill/>
+                  </a:rPr>
+                  <a:t> </a:t>
+                </a:r>
+              </a:p>
+            </p:txBody>
+          </p:sp>
+        </mc:Fallback>
+      </mc:AlternateContent>
+      <mc:AlternateContent xmlns:mc="http://schemas.openxmlformats.org/markup-compatibility/2006" xmlns:a14="http://schemas.microsoft.com/office/drawing/2010/main">
+        <mc:Choice Requires="a14">
+          <p:sp>
+            <p:nvSpPr>
+              <p:cNvPr id="11" name="Rechteck 10"/>
+              <p:cNvSpPr/>
+              <p:nvPr/>
+            </p:nvSpPr>
+            <p:spPr>
+              <a:xfrm>
+                <a:off x="8124775" y="3790950"/>
+                <a:ext cx="216000" cy="869950"/>
+              </a:xfrm>
+              <a:prstGeom prst="rect">
+                <a:avLst/>
+              </a:prstGeom>
+              <a:noFill/>
+              <a:ln>
+                <a:solidFill>
+                  <a:srgbClr val="FF0000"/>
+                </a:solidFill>
+              </a:ln>
+            </p:spPr>
+            <p:style>
+              <a:lnRef idx="2">
+                <a:schemeClr val="accent1">
+                  <a:shade val="50000"/>
+                </a:schemeClr>
+              </a:lnRef>
+              <a:fillRef idx="1">
+                <a:schemeClr val="accent1"/>
+              </a:fillRef>
+              <a:effectRef idx="0">
+                <a:schemeClr val="accent1"/>
+              </a:effectRef>
+              <a:fontRef idx="minor">
+                <a:schemeClr val="lt1"/>
+              </a:fontRef>
+            </p:style>
+            <p:txBody>
+              <a:bodyPr rtlCol="0" anchor="t"/>
+              <a:lstStyle/>
+              <a:p>
+                <a:pPr algn="ctr"/>
+                <a14:m>
+                  <m:oMathPara xmlns:m="http://schemas.openxmlformats.org/officeDocument/2006/math">
+                    <m:oMathParaPr>
+                      <m:jc m:val="center"/>
+                    </m:oMathParaPr>
+                    <m:oMath xmlns:m="http://schemas.openxmlformats.org/officeDocument/2006/math">
+                      <m:nary>
+                        <m:naryPr>
+                          <m:chr m:val="∑"/>
+                          <m:subHide m:val="on"/>
+                          <m:supHide m:val="on"/>
+                          <m:ctrlPr>
+                            <a:rPr lang="en-US" sz="600" i="1" smtClean="0">
+                              <a:solidFill>
+                                <a:srgbClr val="FF0000"/>
+                              </a:solidFill>
+                              <a:latin typeface="Cambria Math" panose="02040503050406030204" pitchFamily="18" charset="0"/>
+                            </a:rPr>
+                          </m:ctrlPr>
+                        </m:naryPr>
+                        <m:sub/>
+                        <m:sup/>
+                        <m:e>
+                          <m:r>
+                            <a:rPr lang="de-DE" sz="600" b="0" i="1" smtClean="0">
+                              <a:solidFill>
+                                <a:srgbClr val="FF0000"/>
+                              </a:solidFill>
+                              <a:latin typeface="Cambria Math" panose="02040503050406030204" pitchFamily="18" charset="0"/>
+                            </a:rPr>
+                            <m:t> </m:t>
+                          </m:r>
+                        </m:e>
+                      </m:nary>
+                    </m:oMath>
+                  </m:oMathPara>
+                </a14:m>
+                <a:endParaRPr lang="en-US" sz="600" dirty="0">
+                  <a:solidFill>
+                    <a:srgbClr val="FF0000"/>
+                  </a:solidFill>
+                </a:endParaRPr>
+              </a:p>
+            </p:txBody>
+          </p:sp>
+        </mc:Choice>
+        <mc:Fallback xmlns="">
+          <p:sp>
+            <p:nvSpPr>
+              <p:cNvPr id="11" name="Rechteck 10"/>
+              <p:cNvSpPr>
+                <a:spLocks noRot="1" noChangeAspect="1" noMove="1" noResize="1" noEditPoints="1" noAdjustHandles="1" noChangeArrowheads="1" noChangeShapeType="1" noTextEdit="1"/>
+              </p:cNvSpPr>
+              <p:nvPr/>
+            </p:nvSpPr>
+            <p:spPr>
+              <a:xfrm>
+                <a:off x="8124775" y="3790950"/>
+                <a:ext cx="216000" cy="869950"/>
+              </a:xfrm>
+              <a:prstGeom prst="rect">
+                <a:avLst/>
+              </a:prstGeom>
+              <a:blipFill rotWithShape="0">
+                <a:blip r:embed="rId5"/>
+                <a:stretch>
+                  <a:fillRect l="-118919" t="-34483" r="-67568"/>
+                </a:stretch>
+              </a:blipFill>
+              <a:ln>
+                <a:solidFill>
+                  <a:srgbClr val="FF0000"/>
+                </a:solidFill>
+              </a:ln>
+            </p:spPr>
+            <p:txBody>
+              <a:bodyPr/>
+              <a:lstStyle/>
+              <a:p>
+                <a:r>
+                  <a:rPr lang="en-US">
+                    <a:noFill/>
+                  </a:rPr>
+                  <a:t> </a:t>
+                </a:r>
+              </a:p>
+            </p:txBody>
+          </p:sp>
+        </mc:Fallback>
+      </mc:AlternateContent>
+      <p:cxnSp>
+        <p:nvCxnSpPr>
+          <p:cNvPr id="13" name="Gewinkelte Verbindung 12"/>
+          <p:cNvCxnSpPr>
+            <a:stCxn id="9" idx="0"/>
+          </p:cNvCxnSpPr>
+          <p:nvPr/>
+        </p:nvCxnSpPr>
+        <p:spPr>
+          <a:xfrm rot="16200000" flipV="1">
+            <a:off x="5838850" y="1889100"/>
+            <a:ext cx="2527300" cy="1276400"/>
+          </a:xfrm>
+          <a:prstGeom prst="bentConnector3">
+            <a:avLst>
+              <a:gd name="adj1" fmla="val 100000"/>
+            </a:avLst>
+          </a:prstGeom>
+          <a:ln>
+            <a:solidFill>
+              <a:srgbClr val="FF0000"/>
+            </a:solidFill>
+            <a:tailEnd type="triangle"/>
+          </a:ln>
+        </p:spPr>
+        <p:style>
+          <a:lnRef idx="1">
+            <a:schemeClr val="accent1"/>
+          </a:lnRef>
+          <a:fillRef idx="0">
+            <a:schemeClr val="accent1"/>
+          </a:fillRef>
+          <a:effectRef idx="0">
+            <a:schemeClr val="accent1"/>
+          </a:effectRef>
+          <a:fontRef idx="minor">
+            <a:schemeClr val="tx1"/>
+          </a:fontRef>
+        </p:style>
+      </p:cxnSp>
+      <p:cxnSp>
+        <p:nvCxnSpPr>
+          <p:cNvPr id="16" name="Gewinkelte Verbindung 15"/>
+          <p:cNvCxnSpPr>
+            <a:stCxn id="10" idx="0"/>
+          </p:cNvCxnSpPr>
+          <p:nvPr/>
+        </p:nvCxnSpPr>
+        <p:spPr>
+          <a:xfrm rot="16200000" flipV="1">
+            <a:off x="6121425" y="1924025"/>
+            <a:ext cx="2209800" cy="1524050"/>
+          </a:xfrm>
+          <a:prstGeom prst="bentConnector3">
+            <a:avLst>
+              <a:gd name="adj1" fmla="val 100000"/>
+            </a:avLst>
+          </a:prstGeom>
+          <a:ln>
+            <a:solidFill>
+              <a:srgbClr val="FF0000"/>
+            </a:solidFill>
+            <a:tailEnd type="triangle"/>
+          </a:ln>
+        </p:spPr>
+        <p:style>
+          <a:lnRef idx="1">
+            <a:schemeClr val="accent1"/>
+          </a:lnRef>
+          <a:fillRef idx="0">
+            <a:schemeClr val="accent1"/>
+          </a:fillRef>
+          <a:effectRef idx="0">
+            <a:schemeClr val="accent1"/>
+          </a:effectRef>
+          <a:fontRef idx="minor">
+            <a:schemeClr val="tx1"/>
+          </a:fontRef>
+        </p:style>
+      </p:cxnSp>
+      <p:cxnSp>
+        <p:nvCxnSpPr>
+          <p:cNvPr id="20" name="Gewinkelte Verbindung 19"/>
+          <p:cNvCxnSpPr>
+            <a:stCxn id="11" idx="0"/>
+          </p:cNvCxnSpPr>
+          <p:nvPr/>
+        </p:nvCxnSpPr>
+        <p:spPr>
+          <a:xfrm rot="16200000" flipV="1">
+            <a:off x="6415088" y="1973262"/>
+            <a:ext cx="1866900" cy="1768475"/>
+          </a:xfrm>
+          <a:prstGeom prst="bentConnector3">
+            <a:avLst>
+              <a:gd name="adj1" fmla="val 100000"/>
+            </a:avLst>
+          </a:prstGeom>
+          <a:ln>
+            <a:solidFill>
+              <a:srgbClr val="FF0000"/>
+            </a:solidFill>
+            <a:tailEnd type="triangle"/>
+          </a:ln>
+        </p:spPr>
+        <p:style>
+          <a:lnRef idx="1">
+            <a:schemeClr val="accent1"/>
+          </a:lnRef>
+          <a:fillRef idx="0">
+            <a:schemeClr val="accent1"/>
+          </a:fillRef>
+          <a:effectRef idx="0">
+            <a:schemeClr val="accent1"/>
+          </a:effectRef>
+          <a:fontRef idx="minor">
+            <a:schemeClr val="tx1"/>
+          </a:fontRef>
+        </p:style>
+      </p:cxnSp>
+      <p:sp>
+        <p:nvSpPr>
+          <p:cNvPr id="26" name="Geschweifte Klammer links 25"/>
+          <p:cNvSpPr/>
+          <p:nvPr/>
+        </p:nvSpPr>
+        <p:spPr>
+          <a:xfrm>
+            <a:off x="4284292" y="2686049"/>
+            <a:ext cx="46359" cy="825501"/>
+          </a:xfrm>
+          <a:prstGeom prst="leftBrace">
+            <a:avLst/>
+          </a:prstGeom>
+          <a:ln>
+            <a:solidFill>
+              <a:srgbClr val="FF0000"/>
+            </a:solidFill>
+          </a:ln>
+        </p:spPr>
+        <p:style>
+          <a:lnRef idx="1">
+            <a:schemeClr val="accent1"/>
+          </a:lnRef>
+          <a:fillRef idx="0">
+            <a:schemeClr val="accent1"/>
+          </a:fillRef>
+          <a:effectRef idx="0">
+            <a:schemeClr val="accent1"/>
+          </a:effectRef>
+          <a:fontRef idx="minor">
+            <a:schemeClr val="tx1"/>
+          </a:fontRef>
+        </p:style>
+        <p:txBody>
+          <a:bodyPr rtlCol="0" anchor="ctr"/>
+          <a:lstStyle/>
+          <a:p>
+            <a:pPr algn="ctr"/>
+            <a:endParaRPr lang="en-US"/>
+          </a:p>
+        </p:txBody>
+      </p:sp>
+      <p:cxnSp>
+        <p:nvCxnSpPr>
+          <p:cNvPr id="27" name="Gewinkelte Verbindung 26"/>
+          <p:cNvCxnSpPr>
+            <a:stCxn id="26" idx="1"/>
+          </p:cNvCxnSpPr>
+          <p:nvPr/>
+        </p:nvCxnSpPr>
+        <p:spPr>
+          <a:xfrm rot="10800000" flipH="1" flipV="1">
+            <a:off x="4284292" y="3098800"/>
+            <a:ext cx="198808" cy="1079500"/>
+          </a:xfrm>
+          <a:prstGeom prst="bentConnector4">
+            <a:avLst>
+              <a:gd name="adj1" fmla="val -41522"/>
+              <a:gd name="adj2" fmla="val 100294"/>
+            </a:avLst>
+          </a:prstGeom>
+          <a:ln>
+            <a:solidFill>
+              <a:srgbClr val="FF0000"/>
+            </a:solidFill>
+            <a:tailEnd type="triangle"/>
+          </a:ln>
+        </p:spPr>
+        <p:style>
+          <a:lnRef idx="1">
+            <a:schemeClr val="accent1"/>
+          </a:lnRef>
+          <a:fillRef idx="0">
+            <a:schemeClr val="accent1"/>
+          </a:fillRef>
+          <a:effectRef idx="0">
+            <a:schemeClr val="accent1"/>
+          </a:effectRef>
+          <a:fontRef idx="minor">
+            <a:schemeClr val="tx1"/>
+          </a:fontRef>
+        </p:style>
+      </p:cxnSp>
+      <p:sp>
+        <p:nvSpPr>
+          <p:cNvPr id="33" name="Textfeld 32"/>
+          <p:cNvSpPr txBox="1"/>
+          <p:nvPr/>
+        </p:nvSpPr>
+        <p:spPr>
+          <a:xfrm rot="16200000">
+            <a:off x="3418182" y="3515439"/>
+            <a:ext cx="1270000" cy="246221"/>
+          </a:xfrm>
+          <a:prstGeom prst="rect">
+            <a:avLst/>
+          </a:prstGeom>
+          <a:noFill/>
+        </p:spPr>
+        <p:txBody>
+          <a:bodyPr wrap="square" lIns="0" tIns="0" rIns="0" bIns="0" rtlCol="0" anchor="ctr">
+            <a:spAutoFit/>
+          </a:bodyPr>
+          <a:lstStyle/>
+          <a:p>
+            <a:pPr algn="ctr"/>
+            <a:r>
+              <a:rPr lang="en-US" sz="800" dirty="0" smtClean="0">
+                <a:solidFill>
+                  <a:srgbClr val="FF0000"/>
+                </a:solidFill>
+                <a:latin typeface="Arial" panose="020B0604020202020204" pitchFamily="34" charset="0"/>
+                <a:cs typeface="Arial" panose="020B0604020202020204" pitchFamily="34" charset="0"/>
+              </a:rPr>
+              <a:t>Summary of the consumables of each RS</a:t>
+            </a:r>
+          </a:p>
+        </p:txBody>
+      </p:sp>
+      <p:sp>
+        <p:nvSpPr>
+          <p:cNvPr id="36" name="Rechteck 35"/>
+          <p:cNvSpPr/>
+          <p:nvPr/>
+        </p:nvSpPr>
+        <p:spPr>
+          <a:xfrm>
+            <a:off x="4775200" y="5038463"/>
+            <a:ext cx="4368800" cy="553998"/>
+          </a:xfrm>
+          <a:prstGeom prst="rect">
+            <a:avLst/>
+          </a:prstGeom>
+        </p:spPr>
+        <p:txBody>
+          <a:bodyPr wrap="square">
+            <a:spAutoFit/>
+          </a:bodyPr>
+          <a:lstStyle/>
+          <a:p>
+            <a:pPr lvl="0"/>
+            <a:r>
+              <a:rPr lang="en-US" altLang="de-DE" sz="1000" dirty="0">
+                <a:solidFill>
+                  <a:prstClr val="black"/>
+                </a:solidFill>
+                <a:latin typeface="Arial" panose="020B0604020202020204" pitchFamily="34" charset="0"/>
+                <a:cs typeface="Arial" panose="020B0604020202020204" pitchFamily="34" charset="0"/>
+              </a:rPr>
+              <a:t>Coming soon:</a:t>
+            </a:r>
+            <a:br>
+              <a:rPr lang="en-US" altLang="de-DE" sz="1000" dirty="0">
+                <a:solidFill>
+                  <a:prstClr val="black"/>
+                </a:solidFill>
+                <a:latin typeface="Arial" panose="020B0604020202020204" pitchFamily="34" charset="0"/>
+                <a:cs typeface="Arial" panose="020B0604020202020204" pitchFamily="34" charset="0"/>
+              </a:rPr>
+            </a:br>
+            <a:r>
+              <a:rPr lang="en-US" altLang="de-DE" sz="1000" dirty="0">
+                <a:solidFill>
+                  <a:prstClr val="black"/>
+                </a:solidFill>
+                <a:latin typeface="Arial" panose="020B0604020202020204" pitchFamily="34" charset="0"/>
+                <a:cs typeface="Arial" panose="020B0604020202020204" pitchFamily="34" charset="0"/>
+              </a:rPr>
+              <a:t/>
+            </a:r>
+            <a:br>
+              <a:rPr lang="en-US" altLang="de-DE" sz="1000" dirty="0">
+                <a:solidFill>
+                  <a:prstClr val="black"/>
+                </a:solidFill>
+                <a:latin typeface="Arial" panose="020B0604020202020204" pitchFamily="34" charset="0"/>
+                <a:cs typeface="Arial" panose="020B0604020202020204" pitchFamily="34" charset="0"/>
+              </a:rPr>
+            </a:br>
+            <a:r>
+              <a:rPr lang="en-US" altLang="de-DE" sz="1000" b="1" dirty="0">
+                <a:solidFill>
+                  <a:prstClr val="black"/>
+                </a:solidFill>
+                <a:latin typeface="Arial" panose="020B0604020202020204" pitchFamily="34" charset="0"/>
+                <a:cs typeface="Arial" panose="020B0604020202020204" pitchFamily="34" charset="0"/>
+              </a:rPr>
+              <a:t>CRITIC</a:t>
+            </a:r>
+            <a:r>
+              <a:rPr lang="en-US" altLang="de-DE" sz="1000" dirty="0">
+                <a:solidFill>
+                  <a:prstClr val="black"/>
+                </a:solidFill>
+                <a:latin typeface="Arial" panose="020B0604020202020204" pitchFamily="34" charset="0"/>
+                <a:cs typeface="Arial" panose="020B0604020202020204" pitchFamily="34" charset="0"/>
+              </a:rPr>
+              <a:t> (</a:t>
+            </a:r>
+            <a:r>
+              <a:rPr lang="en-US" altLang="de-DE" sz="1000" dirty="0" err="1">
+                <a:solidFill>
+                  <a:prstClr val="black"/>
+                </a:solidFill>
+                <a:latin typeface="Arial" panose="020B0604020202020204" pitchFamily="34" charset="0"/>
+                <a:cs typeface="Arial" panose="020B0604020202020204" pitchFamily="34" charset="0"/>
+              </a:rPr>
+              <a:t>CRiteria</a:t>
+            </a:r>
+            <a:r>
+              <a:rPr lang="en-US" altLang="de-DE" sz="1000" dirty="0">
+                <a:solidFill>
+                  <a:prstClr val="black"/>
+                </a:solidFill>
+                <a:latin typeface="Arial" panose="020B0604020202020204" pitchFamily="34" charset="0"/>
+                <a:cs typeface="Arial" panose="020B0604020202020204" pitchFamily="34" charset="0"/>
+              </a:rPr>
+              <a:t> Importance Through </a:t>
+            </a:r>
+            <a:r>
+              <a:rPr lang="en-US" altLang="de-DE" sz="1000" dirty="0" err="1">
+                <a:solidFill>
+                  <a:prstClr val="black"/>
+                </a:solidFill>
+                <a:latin typeface="Arial" panose="020B0604020202020204" pitchFamily="34" charset="0"/>
+                <a:cs typeface="Arial" panose="020B0604020202020204" pitchFamily="34" charset="0"/>
+              </a:rPr>
+              <a:t>Intercriteria</a:t>
+            </a:r>
+            <a:r>
+              <a:rPr lang="en-US" altLang="de-DE" sz="1000" dirty="0">
+                <a:solidFill>
+                  <a:prstClr val="black"/>
+                </a:solidFill>
+                <a:latin typeface="Arial" panose="020B0604020202020204" pitchFamily="34" charset="0"/>
+                <a:cs typeface="Arial" panose="020B0604020202020204" pitchFamily="34" charset="0"/>
+              </a:rPr>
+              <a:t> Correlation</a:t>
+            </a:r>
+            <a:r>
+              <a:rPr lang="en-US" altLang="de-DE" sz="1000" dirty="0" smtClean="0">
+                <a:solidFill>
+                  <a:prstClr val="black"/>
+                </a:solidFill>
+                <a:latin typeface="Arial" panose="020B0604020202020204" pitchFamily="34" charset="0"/>
+                <a:cs typeface="Arial" panose="020B0604020202020204" pitchFamily="34" charset="0"/>
+              </a:rPr>
+              <a:t>)</a:t>
+            </a:r>
+            <a:endParaRPr lang="en-US" altLang="de-DE" sz="1000" u="sng" dirty="0">
+              <a:solidFill>
+                <a:prstClr val="black"/>
+              </a:solidFill>
+              <a:latin typeface="Arial" panose="020B0604020202020204" pitchFamily="34" charset="0"/>
+              <a:cs typeface="Arial" panose="020B0604020202020204" pitchFamily="34" charset="0"/>
+            </a:endParaRPr>
+          </a:p>
+        </p:txBody>
+      </p:sp>
+    </p:spTree>
+    <p:extLst>
+      <p:ext uri="{BB962C8B-B14F-4D97-AF65-F5344CB8AC3E}">
+        <p14:creationId xmlns:p14="http://schemas.microsoft.com/office/powerpoint/2010/main" val="561935692"/>
+      </p:ext>
+    </p:extLst>
+  </p:cSld>
+  <p:clrMapOvr>
+    <a:masterClrMapping/>
+  </p:clrMapOvr>
+</p:sld>
+</file>
+
+<file path=ppt/slides/slide11.xml><?xml version="1.0" encoding="utf-8"?>
+<p:sld xmlns:a="http://schemas.openxmlformats.org/drawingml/2006/main" xmlns:r="http://schemas.openxmlformats.org/officeDocument/2006/relationships" xmlns:p="http://schemas.openxmlformats.org/presentationml/2006/main">
+  <p:cSld>
+    <p:spTree>
+      <p:nvGrpSpPr>
+        <p:cNvPr id="1" name=""/>
+        <p:cNvGrpSpPr/>
+        <p:nvPr/>
+      </p:nvGrpSpPr>
+      <p:grpSpPr>
+        <a:xfrm>
+          <a:off x="0" y="0"/>
+          <a:ext cx="0" cy="0"/>
+          <a:chOff x="0" y="0"/>
+          <a:chExt cx="0" cy="0"/>
+        </a:xfrm>
+      </p:grpSpPr>
       <p:pic>
         <p:nvPicPr>
           <p:cNvPr id="5" name="Grafik 4"/>
@@ -3184,7 +5463,7 @@
 </p:sld>
 </file>
 
-<file path=ppt/slides/slide11.xml><?xml version="1.0" encoding="utf-8"?>
+<file path=ppt/slides/slide12.xml><?xml version="1.0" encoding="utf-8"?>
 <p:sld xmlns:a="http://schemas.openxmlformats.org/drawingml/2006/main" xmlns:r="http://schemas.openxmlformats.org/officeDocument/2006/relationships" xmlns:p="http://schemas.openxmlformats.org/presentationml/2006/main">
   <p:cSld>
     <p:spTree>
@@ -10653,6 +12932,36 @@
           <a:chExt cx="0" cy="0"/>
         </a:xfrm>
       </p:grpSpPr>
+    </p:spTree>
+    <p:extLst>
+      <p:ext uri="{BB962C8B-B14F-4D97-AF65-F5344CB8AC3E}">
+        <p14:creationId xmlns:p14="http://schemas.microsoft.com/office/powerpoint/2010/main" val="1514780008"/>
+      </p:ext>
+    </p:extLst>
+  </p:cSld>
+  <p:clrMapOvr>
+    <a:masterClrMapping/>
+  </p:clrMapOvr>
+</p:sld>
+</file>
+
+<file path=ppt/slides/slide9.xml><?xml version="1.0" encoding="utf-8"?>
+<p:sld xmlns:a="http://schemas.openxmlformats.org/drawingml/2006/main" xmlns:r="http://schemas.openxmlformats.org/officeDocument/2006/relationships" xmlns:p="http://schemas.openxmlformats.org/presentationml/2006/main">
+  <p:cSld>
+    <p:spTree>
+      <p:nvGrpSpPr>
+        <p:cNvPr id="1" name=""/>
+        <p:cNvGrpSpPr/>
+        <p:nvPr/>
+      </p:nvGrpSpPr>
+      <p:grpSpPr>
+        <a:xfrm>
+          <a:off x="0" y="0"/>
+          <a:ext cx="0" cy="0"/>
+          <a:chOff x="0" y="0"/>
+          <a:chExt cx="0" cy="0"/>
+        </a:xfrm>
+      </p:grpSpPr>
       <p:sp>
         <p:nvSpPr>
           <p:cNvPr id="2" name="Textfeld 1"/>
@@ -11839,2283 +14148,6 @@
       </p:par>
     </p:tnLst>
   </p:timing>
-</p:sld>
-</file>
-
-<file path=ppt/slides/slide9.xml><?xml version="1.0" encoding="utf-8"?>
-<p:sld xmlns:a="http://schemas.openxmlformats.org/drawingml/2006/main" xmlns:r="http://schemas.openxmlformats.org/officeDocument/2006/relationships" xmlns:p="http://schemas.openxmlformats.org/presentationml/2006/main">
-  <p:cSld>
-    <p:spTree>
-      <p:nvGrpSpPr>
-        <p:cNvPr id="1" name=""/>
-        <p:cNvGrpSpPr/>
-        <p:nvPr/>
-      </p:nvGrpSpPr>
-      <p:grpSpPr>
-        <a:xfrm>
-          <a:off x="0" y="0"/>
-          <a:ext cx="0" cy="0"/>
-          <a:chOff x="0" y="0"/>
-          <a:chExt cx="0" cy="0"/>
-        </a:xfrm>
-      </p:grpSpPr>
-      <mc:AlternateContent xmlns:mc="http://schemas.openxmlformats.org/markup-compatibility/2006">
-        <mc:Choice xmlns:a14="http://schemas.microsoft.com/office/drawing/2010/main" Requires="a14">
-          <p:sp>
-            <p:nvSpPr>
-              <p:cNvPr id="3" name="Rechteck 2"/>
-              <p:cNvSpPr/>
-              <p:nvPr/>
-            </p:nvSpPr>
-            <p:spPr>
-              <a:xfrm>
-                <a:off x="63166" y="530270"/>
-                <a:ext cx="3835256" cy="5220660"/>
-              </a:xfrm>
-              <a:prstGeom prst="rect">
-                <a:avLst/>
-              </a:prstGeom>
-            </p:spPr>
-            <p:txBody>
-              <a:bodyPr wrap="square">
-                <a:spAutoFit/>
-              </a:bodyPr>
-              <a:lstStyle/>
-              <a:p>
-                <a:r>
-                  <a:rPr lang="en-US" altLang="de-DE" sz="1000" dirty="0" smtClean="0">
-                    <a:latin typeface="Arial" panose="020B0604020202020204" pitchFamily="34" charset="0"/>
-                    <a:cs typeface="Arial" panose="020B0604020202020204" pitchFamily="34" charset="0"/>
-                  </a:rPr>
-                  <a:t>Then we calculate the meta data for </a:t>
-                </a:r>
-                <a:r>
-                  <a:rPr lang="en-US" altLang="de-DE" sz="1000" dirty="0">
-                    <a:latin typeface="Arial" panose="020B0604020202020204" pitchFamily="34" charset="0"/>
-                    <a:cs typeface="Arial" panose="020B0604020202020204" pitchFamily="34" charset="0"/>
-                  </a:rPr>
-                  <a:t>each </a:t>
-                </a:r>
-                <a:r>
-                  <a:rPr lang="en-US" altLang="de-DE" sz="1000" b="1" dirty="0">
-                    <a:latin typeface="Arial" panose="020B0604020202020204" pitchFamily="34" charset="0"/>
-                    <a:cs typeface="Arial" panose="020B0604020202020204" pitchFamily="34" charset="0"/>
-                  </a:rPr>
-                  <a:t>permutation</a:t>
-                </a:r>
-                <a:r>
-                  <a:rPr lang="en-US" altLang="de-DE" sz="1000" dirty="0" smtClean="0">
-                    <a:latin typeface="Arial" panose="020B0604020202020204" pitchFamily="34" charset="0"/>
-                    <a:cs typeface="Arial" panose="020B0604020202020204" pitchFamily="34" charset="0"/>
-                  </a:rPr>
-                  <a:t>.</a:t>
-                </a:r>
-              </a:p>
-              <a:p>
-                <a:endParaRPr lang="en-US" altLang="de-DE" sz="1000" dirty="0">
-                  <a:latin typeface="Arial" panose="020B0604020202020204" pitchFamily="34" charset="0"/>
-                  <a:cs typeface="Arial" panose="020B0604020202020204" pitchFamily="34" charset="0"/>
-                </a:endParaRPr>
-              </a:p>
-              <a:p>
-                <a:r>
-                  <a:rPr lang="en-US" altLang="de-DE" sz="1000" dirty="0" smtClean="0">
-                    <a:latin typeface="Arial" panose="020B0604020202020204" pitchFamily="34" charset="0"/>
-                    <a:cs typeface="Arial" panose="020B0604020202020204" pitchFamily="34" charset="0"/>
-                  </a:rPr>
-                  <a:t>Currently we have:</a:t>
-                </a:r>
-              </a:p>
-              <a:p>
-                <a:endParaRPr lang="en-US" altLang="de-DE" sz="1000" dirty="0">
-                  <a:latin typeface="Arial" panose="020B0604020202020204" pitchFamily="34" charset="0"/>
-                  <a:cs typeface="Arial" panose="020B0604020202020204" pitchFamily="34" charset="0"/>
-                </a:endParaRPr>
-              </a:p>
-              <a:p>
-                <a:pPr marL="171450" indent="-171450">
-                  <a:buFont typeface="Arial" panose="020B0604020202020204" pitchFamily="34" charset="0"/>
-                  <a:buChar char="•"/>
-                </a:pPr>
-                <a:r>
-                  <a:rPr lang="en-US" altLang="de-DE" sz="1000" b="1" dirty="0" smtClean="0">
-                    <a:latin typeface="Arial" panose="020B0604020202020204" pitchFamily="34" charset="0"/>
-                    <a:cs typeface="Arial" panose="020B0604020202020204" pitchFamily="34" charset="0"/>
-                  </a:rPr>
-                  <a:t>Price</a:t>
-                </a:r>
-              </a:p>
-              <a:p>
-                <a:pPr marL="171450" indent="-171450">
-                  <a:buFont typeface="Arial" panose="020B0604020202020204" pitchFamily="34" charset="0"/>
-                  <a:buChar char="•"/>
-                </a:pPr>
-                <a:r>
-                  <a:rPr lang="en-US" altLang="de-DE" sz="1000" b="1" dirty="0" smtClean="0">
-                    <a:latin typeface="Arial" panose="020B0604020202020204" pitchFamily="34" charset="0"/>
-                    <a:cs typeface="Arial" panose="020B0604020202020204" pitchFamily="34" charset="0"/>
-                  </a:rPr>
-                  <a:t>Time</a:t>
-                </a:r>
-              </a:p>
-              <a:p>
-                <a:pPr marL="171450" indent="-171450">
-                  <a:buFont typeface="Arial" panose="020B0604020202020204" pitchFamily="34" charset="0"/>
-                  <a:buChar char="•"/>
-                </a:pPr>
-                <a:r>
-                  <a:rPr lang="en-US" altLang="de-DE" sz="1000" b="1" dirty="0" smtClean="0">
-                    <a:latin typeface="Arial" panose="020B0604020202020204" pitchFamily="34" charset="0"/>
-                    <a:cs typeface="Arial" panose="020B0604020202020204" pitchFamily="34" charset="0"/>
-                  </a:rPr>
-                  <a:t>CO2-e</a:t>
-                </a:r>
-              </a:p>
-              <a:p>
-                <a:pPr marL="171450" indent="-171450">
-                  <a:buFont typeface="Arial" panose="020B0604020202020204" pitchFamily="34" charset="0"/>
-                  <a:buChar char="•"/>
-                </a:pPr>
-                <a:r>
-                  <a:rPr lang="en-US" altLang="de-DE" sz="1000" b="1" dirty="0" smtClean="0">
-                    <a:solidFill>
-                      <a:srgbClr val="FF0000"/>
-                    </a:solidFill>
-                    <a:latin typeface="Arial" panose="020B0604020202020204" pitchFamily="34" charset="0"/>
-                    <a:cs typeface="Arial" panose="020B0604020202020204" pitchFamily="34" charset="0"/>
-                  </a:rPr>
-                  <a:t>???</a:t>
-                </a:r>
-                <a:endParaRPr lang="en-US" altLang="de-DE" sz="1000" b="1" dirty="0">
-                  <a:solidFill>
-                    <a:srgbClr val="FF0000"/>
-                  </a:solidFill>
-                  <a:latin typeface="Arial" panose="020B0604020202020204" pitchFamily="34" charset="0"/>
-                  <a:cs typeface="Arial" panose="020B0604020202020204" pitchFamily="34" charset="0"/>
-                </a:endParaRPr>
-              </a:p>
-              <a:p>
-                <a:pPr lvl="0"/>
-                <a:endParaRPr lang="en-US" altLang="de-DE" sz="1000" dirty="0" smtClean="0">
-                  <a:latin typeface="Arial" panose="020B0604020202020204" pitchFamily="34" charset="0"/>
-                  <a:cs typeface="Arial" panose="020B0604020202020204" pitchFamily="34" charset="0"/>
-                </a:endParaRPr>
-              </a:p>
-              <a:p>
-                <a:pPr lvl="0"/>
-                <a:r>
-                  <a:rPr lang="en-US" altLang="de-DE" sz="1000" dirty="0" smtClean="0">
-                    <a:latin typeface="Arial" panose="020B0604020202020204" pitchFamily="34" charset="0"/>
-                    <a:cs typeface="Arial" panose="020B0604020202020204" pitchFamily="34" charset="0"/>
-                  </a:rPr>
-                  <a:t>Subsequently</a:t>
-                </a:r>
-                <a:r>
-                  <a:rPr lang="en-US" altLang="de-DE" sz="1000" dirty="0">
-                    <a:solidFill>
-                      <a:prstClr val="black"/>
-                    </a:solidFill>
-                    <a:latin typeface="Arial" panose="020B0604020202020204" pitchFamily="34" charset="0"/>
-                    <a:cs typeface="Arial" panose="020B0604020202020204" pitchFamily="34" charset="0"/>
-                  </a:rPr>
-                  <a:t>, we evaluate and rank the </a:t>
-                </a:r>
-                <a:r>
-                  <a:rPr lang="en-US" altLang="de-DE" sz="1000" b="1" dirty="0">
-                    <a:solidFill>
-                      <a:prstClr val="black"/>
-                    </a:solidFill>
-                    <a:latin typeface="Arial" panose="020B0604020202020204" pitchFamily="34" charset="0"/>
-                    <a:cs typeface="Arial" panose="020B0604020202020204" pitchFamily="34" charset="0"/>
-                  </a:rPr>
-                  <a:t>permutations</a:t>
-                </a:r>
-                <a:r>
-                  <a:rPr lang="en-US" altLang="de-DE" sz="1000" dirty="0" smtClean="0">
-                    <a:solidFill>
-                      <a:prstClr val="black"/>
-                    </a:solidFill>
-                    <a:latin typeface="Arial" panose="020B0604020202020204" pitchFamily="34" charset="0"/>
-                    <a:cs typeface="Arial" panose="020B0604020202020204" pitchFamily="34" charset="0"/>
-                  </a:rPr>
-                  <a:t>.</a:t>
-                </a:r>
-              </a:p>
-              <a:p>
-                <a:pPr lvl="0"/>
-                <a:endParaRPr lang="en-US" altLang="de-DE" sz="1000" dirty="0">
-                  <a:solidFill>
-                    <a:prstClr val="black"/>
-                  </a:solidFill>
-                  <a:latin typeface="Arial" panose="020B0604020202020204" pitchFamily="34" charset="0"/>
-                  <a:cs typeface="Arial" panose="020B0604020202020204" pitchFamily="34" charset="0"/>
-                </a:endParaRPr>
-              </a:p>
-              <a:p>
-                <a:pPr lvl="0"/>
-                <a:r>
-                  <a:rPr lang="en-US" altLang="de-DE" sz="1000" dirty="0" smtClean="0">
-                    <a:solidFill>
-                      <a:prstClr val="black"/>
-                    </a:solidFill>
-                    <a:latin typeface="Arial" panose="020B0604020202020204" pitchFamily="34" charset="0"/>
-                    <a:cs typeface="Arial" panose="020B0604020202020204" pitchFamily="34" charset="0"/>
-                  </a:rPr>
-                  <a:t>Currently we have two functions:</a:t>
-                </a:r>
-              </a:p>
-              <a:p>
-                <a:pPr lvl="0"/>
-                <a:endParaRPr lang="en-US" altLang="de-DE" sz="1000" dirty="0">
-                  <a:solidFill>
-                    <a:prstClr val="black"/>
-                  </a:solidFill>
-                  <a:latin typeface="Arial" panose="020B0604020202020204" pitchFamily="34" charset="0"/>
-                  <a:cs typeface="Arial" panose="020B0604020202020204" pitchFamily="34" charset="0"/>
-                </a:endParaRPr>
-              </a:p>
-              <a:p>
-                <a:pPr marL="228600" lvl="0" indent="-228600">
-                  <a:buAutoNum type="arabicPeriod"/>
-                </a:pPr>
-                <a:r>
-                  <a:rPr lang="en-US" altLang="de-DE" sz="1000" dirty="0" smtClean="0">
-                    <a:solidFill>
-                      <a:prstClr val="black"/>
-                    </a:solidFill>
-                    <a:latin typeface="Arial" panose="020B0604020202020204" pitchFamily="34" charset="0"/>
-                    <a:cs typeface="Arial" panose="020B0604020202020204" pitchFamily="34" charset="0"/>
-                  </a:rPr>
-                  <a:t>Regarding one meta information (e.g. lowest price).</a:t>
-                </a:r>
-              </a:p>
-              <a:p>
-                <a:pPr marL="228600" lvl="0" indent="-228600">
-                  <a:buAutoNum type="arabicPeriod"/>
-                </a:pPr>
-                <a:endParaRPr lang="en-US" altLang="de-DE" sz="1000" dirty="0" smtClean="0">
-                  <a:solidFill>
-                    <a:prstClr val="black"/>
-                  </a:solidFill>
-                  <a:latin typeface="Arial" panose="020B0604020202020204" pitchFamily="34" charset="0"/>
-                  <a:cs typeface="Arial" panose="020B0604020202020204" pitchFamily="34" charset="0"/>
-                </a:endParaRPr>
-              </a:p>
-              <a:p>
-                <a:pPr marL="228600" lvl="0" indent="-228600">
-                  <a:buAutoNum type="arabicPeriod"/>
-                </a:pPr>
-                <a:r>
-                  <a:rPr lang="en-US" altLang="de-DE" sz="1000" u="sng" dirty="0" smtClean="0">
-                    <a:solidFill>
-                      <a:prstClr val="black"/>
-                    </a:solidFill>
-                    <a:latin typeface="Arial" panose="020B0604020202020204" pitchFamily="34" charset="0"/>
-                    <a:cs typeface="Arial" panose="020B0604020202020204" pitchFamily="34" charset="0"/>
-                  </a:rPr>
-                  <a:t>The lowest sum of the normalized and weighted meta data.</a:t>
-                </a:r>
-              </a:p>
-              <a:p>
-                <a:pPr lvl="0"/>
-                <a:endParaRPr lang="en-US" altLang="de-DE" sz="1000" dirty="0" smtClean="0">
-                  <a:solidFill>
-                    <a:prstClr val="black"/>
-                  </a:solidFill>
-                  <a:latin typeface="Arial" panose="020B0604020202020204" pitchFamily="34" charset="0"/>
-                  <a:cs typeface="Arial" panose="020B0604020202020204" pitchFamily="34" charset="0"/>
-                </a:endParaRPr>
-              </a:p>
-              <a:p>
-                <a:pPr lvl="0"/>
-                <a:r>
-                  <a:rPr lang="en-US" altLang="de-DE" sz="1000" dirty="0" smtClean="0">
-                    <a:solidFill>
-                      <a:prstClr val="black"/>
-                    </a:solidFill>
-                    <a:latin typeface="Arial" panose="020B0604020202020204" pitchFamily="34" charset="0"/>
-                    <a:cs typeface="Arial" panose="020B0604020202020204" pitchFamily="34" charset="0"/>
-                  </a:rPr>
-                  <a:t>Rescale the range </a:t>
-                </a:r>
-                <a:r>
-                  <a:rPr lang="en-US" altLang="de-DE" sz="1000" dirty="0">
-                    <a:solidFill>
-                      <a:prstClr val="black"/>
-                    </a:solidFill>
-                    <a:latin typeface="Arial" panose="020B0604020202020204" pitchFamily="34" charset="0"/>
-                    <a:cs typeface="Arial" panose="020B0604020202020204" pitchFamily="34" charset="0"/>
-                  </a:rPr>
-                  <a:t>of </a:t>
-                </a:r>
-                <a:r>
-                  <a:rPr lang="en-US" altLang="de-DE" sz="1000" dirty="0" smtClean="0">
-                    <a:solidFill>
-                      <a:prstClr val="black"/>
-                    </a:solidFill>
-                    <a:latin typeface="Arial" panose="020B0604020202020204" pitchFamily="34" charset="0"/>
-                    <a:cs typeface="Arial" panose="020B0604020202020204" pitchFamily="34" charset="0"/>
-                  </a:rPr>
-                  <a:t>feature </a:t>
-                </a:r>
-                <a14:m>
-                  <m:oMath xmlns:m="http://schemas.openxmlformats.org/officeDocument/2006/math">
-                    <m:sSub>
-                      <m:sSubPr>
-                        <m:ctrlPr>
-                          <a:rPr lang="de-DE" altLang="de-DE" sz="1000" i="1" smtClean="0">
-                            <a:solidFill>
-                              <a:prstClr val="black"/>
-                            </a:solidFill>
-                            <a:latin typeface="Cambria Math" panose="02040503050406030204" pitchFamily="18" charset="0"/>
-                            <a:cs typeface="Arial" panose="020B0604020202020204" pitchFamily="34" charset="0"/>
-                          </a:rPr>
-                        </m:ctrlPr>
-                      </m:sSubPr>
-                      <m:e>
-                        <m:r>
-                          <a:rPr lang="de-DE" altLang="de-DE" sz="1000" b="0" i="1" smtClean="0">
-                            <a:solidFill>
-                              <a:prstClr val="black"/>
-                            </a:solidFill>
-                            <a:latin typeface="Cambria Math" panose="02040503050406030204" pitchFamily="18" charset="0"/>
-                            <a:cs typeface="Arial" panose="020B0604020202020204" pitchFamily="34" charset="0"/>
-                          </a:rPr>
-                          <m:t>𝑥</m:t>
-                        </m:r>
-                      </m:e>
-                      <m:sub>
-                        <m:r>
-                          <a:rPr lang="de-DE" altLang="de-DE" sz="1000" b="0" i="1" smtClean="0">
-                            <a:solidFill>
-                              <a:prstClr val="black"/>
-                            </a:solidFill>
-                            <a:latin typeface="Cambria Math" panose="02040503050406030204" pitchFamily="18" charset="0"/>
-                            <a:cs typeface="Arial" panose="020B0604020202020204" pitchFamily="34" charset="0"/>
-                          </a:rPr>
-                          <m:t>𝑖</m:t>
-                        </m:r>
-                      </m:sub>
-                    </m:sSub>
-                  </m:oMath>
-                </a14:m>
-                <a:r>
-                  <a:rPr lang="en-US" altLang="de-DE" sz="1000" dirty="0" smtClean="0">
-                    <a:solidFill>
-                      <a:prstClr val="black"/>
-                    </a:solidFill>
-                    <a:latin typeface="Arial" panose="020B0604020202020204" pitchFamily="34" charset="0"/>
-                    <a:cs typeface="Arial" panose="020B0604020202020204" pitchFamily="34" charset="0"/>
-                  </a:rPr>
-                  <a:t> (price, time, co2-e) </a:t>
-                </a:r>
-                <a:r>
-                  <a:rPr lang="en-US" altLang="de-DE" sz="1000" dirty="0">
-                    <a:solidFill>
-                      <a:prstClr val="black"/>
-                    </a:solidFill>
-                    <a:latin typeface="Arial" panose="020B0604020202020204" pitchFamily="34" charset="0"/>
-                    <a:cs typeface="Arial" panose="020B0604020202020204" pitchFamily="34" charset="0"/>
-                  </a:rPr>
-                  <a:t>to </a:t>
-                </a:r>
-                <a:r>
-                  <a:rPr lang="en-US" altLang="de-DE" sz="1000" dirty="0" smtClean="0">
-                    <a:solidFill>
-                      <a:prstClr val="black"/>
-                    </a:solidFill>
-                    <a:latin typeface="Arial" panose="020B0604020202020204" pitchFamily="34" charset="0"/>
-                    <a:cs typeface="Arial" panose="020B0604020202020204" pitchFamily="34" charset="0"/>
-                  </a:rPr>
-                  <a:t>be in the </a:t>
-                </a:r>
-                <a:r>
-                  <a:rPr lang="en-US" altLang="de-DE" sz="1000" dirty="0">
-                    <a:solidFill>
-                      <a:prstClr val="black"/>
-                    </a:solidFill>
-                    <a:latin typeface="Arial" panose="020B0604020202020204" pitchFamily="34" charset="0"/>
-                    <a:cs typeface="Arial" panose="020B0604020202020204" pitchFamily="34" charset="0"/>
-                  </a:rPr>
-                  <a:t>range </a:t>
-                </a:r>
-                <a:r>
-                  <a:rPr lang="en-US" altLang="de-DE" sz="1000" dirty="0" smtClean="0">
-                    <a:solidFill>
-                      <a:prstClr val="black"/>
-                    </a:solidFill>
-                    <a:latin typeface="Arial" panose="020B0604020202020204" pitchFamily="34" charset="0"/>
-                    <a:cs typeface="Arial" panose="020B0604020202020204" pitchFamily="34" charset="0"/>
-                  </a:rPr>
-                  <a:t>[</a:t>
-                </a:r>
-                <a:r>
-                  <a:rPr lang="en-US" altLang="de-DE" sz="1000" dirty="0">
-                    <a:solidFill>
-                      <a:prstClr val="black"/>
-                    </a:solidFill>
-                    <a:latin typeface="Arial" panose="020B0604020202020204" pitchFamily="34" charset="0"/>
-                    <a:cs typeface="Arial" panose="020B0604020202020204" pitchFamily="34" charset="0"/>
-                  </a:rPr>
-                  <a:t>0, 1</a:t>
-                </a:r>
-                <a:r>
-                  <a:rPr lang="en-US" altLang="de-DE" sz="1000" dirty="0" smtClean="0">
-                    <a:solidFill>
-                      <a:prstClr val="black"/>
-                    </a:solidFill>
-                    <a:latin typeface="Arial" panose="020B0604020202020204" pitchFamily="34" charset="0"/>
-                    <a:cs typeface="Arial" panose="020B0604020202020204" pitchFamily="34" charset="0"/>
-                  </a:rPr>
-                  <a:t>] with 0 the lowest and 1 the highest value by</a:t>
-                </a:r>
-              </a:p>
-              <a:p>
-                <a:pPr lvl="0"/>
-                <a:endParaRPr lang="en-US" altLang="de-DE" sz="1000" dirty="0">
-                  <a:solidFill>
-                    <a:prstClr val="black"/>
-                  </a:solidFill>
-                  <a:latin typeface="Arial" panose="020B0604020202020204" pitchFamily="34" charset="0"/>
-                  <a:cs typeface="Arial" panose="020B0604020202020204" pitchFamily="34" charset="0"/>
-                </a:endParaRPr>
-              </a:p>
-              <a:p>
-                <a:pPr lvl="0" algn="ctr"/>
-                <a14:m>
-                  <m:oMath xmlns:m="http://schemas.openxmlformats.org/officeDocument/2006/math">
-                    <m:sSup>
-                      <m:sSupPr>
-                        <m:ctrlPr>
-                          <a:rPr lang="en-US" altLang="de-DE" sz="1000" i="1" smtClean="0">
-                            <a:solidFill>
-                              <a:prstClr val="black"/>
-                            </a:solidFill>
-                            <a:latin typeface="Cambria Math" panose="02040503050406030204" pitchFamily="18" charset="0"/>
-                            <a:cs typeface="Arial" panose="020B0604020202020204" pitchFamily="34" charset="0"/>
-                          </a:rPr>
-                        </m:ctrlPr>
-                      </m:sSupPr>
-                      <m:e>
-                        <m:sSub>
-                          <m:sSubPr>
-                            <m:ctrlPr>
-                              <a:rPr lang="de-DE" altLang="de-DE" sz="1000" i="1">
-                                <a:solidFill>
-                                  <a:prstClr val="black"/>
-                                </a:solidFill>
-                                <a:latin typeface="Cambria Math" panose="02040503050406030204" pitchFamily="18" charset="0"/>
-                                <a:cs typeface="Arial" panose="020B0604020202020204" pitchFamily="34" charset="0"/>
-                              </a:rPr>
-                            </m:ctrlPr>
-                          </m:sSubPr>
-                          <m:e>
-                            <m:r>
-                              <a:rPr lang="de-DE" altLang="de-DE" sz="1000" i="1">
-                                <a:solidFill>
-                                  <a:prstClr val="black"/>
-                                </a:solidFill>
-                                <a:latin typeface="Cambria Math" panose="02040503050406030204" pitchFamily="18" charset="0"/>
-                                <a:cs typeface="Arial" panose="020B0604020202020204" pitchFamily="34" charset="0"/>
-                              </a:rPr>
-                              <m:t>𝑥</m:t>
-                            </m:r>
-                          </m:e>
-                          <m:sub>
-                            <m:r>
-                              <a:rPr lang="de-DE" altLang="de-DE" sz="1000" i="1">
-                                <a:solidFill>
-                                  <a:prstClr val="black"/>
-                                </a:solidFill>
-                                <a:latin typeface="Cambria Math" panose="02040503050406030204" pitchFamily="18" charset="0"/>
-                                <a:cs typeface="Arial" panose="020B0604020202020204" pitchFamily="34" charset="0"/>
-                              </a:rPr>
-                              <m:t>𝑖</m:t>
-                            </m:r>
-                          </m:sub>
-                        </m:sSub>
-                      </m:e>
-                      <m:sup>
-                        <m:r>
-                          <a:rPr lang="de-DE" altLang="de-DE" sz="1000" b="0" i="1" smtClean="0">
-                            <a:solidFill>
-                              <a:prstClr val="black"/>
-                            </a:solidFill>
-                            <a:latin typeface="Cambria Math" panose="02040503050406030204" pitchFamily="18" charset="0"/>
-                            <a:cs typeface="Arial" panose="020B0604020202020204" pitchFamily="34" charset="0"/>
-                          </a:rPr>
-                          <m:t>′</m:t>
-                        </m:r>
-                      </m:sup>
-                    </m:sSup>
-                    <m:r>
-                      <a:rPr lang="de-DE" altLang="de-DE" sz="1000" b="0" i="1" smtClean="0">
-                        <a:solidFill>
-                          <a:prstClr val="black"/>
-                        </a:solidFill>
-                        <a:latin typeface="Cambria Math" panose="02040503050406030204" pitchFamily="18" charset="0"/>
-                        <a:cs typeface="Arial" panose="020B0604020202020204" pitchFamily="34" charset="0"/>
-                      </a:rPr>
-                      <m:t>=</m:t>
-                    </m:r>
-                    <m:f>
-                      <m:fPr>
-                        <m:ctrlPr>
-                          <a:rPr lang="de-DE" altLang="de-DE" sz="1000" b="0" i="1" smtClean="0">
-                            <a:solidFill>
-                              <a:prstClr val="black"/>
-                            </a:solidFill>
-                            <a:latin typeface="Cambria Math" panose="02040503050406030204" pitchFamily="18" charset="0"/>
-                            <a:cs typeface="Arial" panose="020B0604020202020204" pitchFamily="34" charset="0"/>
-                          </a:rPr>
-                        </m:ctrlPr>
-                      </m:fPr>
-                      <m:num>
-                        <m:sSub>
-                          <m:sSubPr>
-                            <m:ctrlPr>
-                              <a:rPr lang="de-DE" altLang="de-DE" sz="1000" i="1">
-                                <a:solidFill>
-                                  <a:prstClr val="black"/>
-                                </a:solidFill>
-                                <a:latin typeface="Cambria Math" panose="02040503050406030204" pitchFamily="18" charset="0"/>
-                                <a:cs typeface="Arial" panose="020B0604020202020204" pitchFamily="34" charset="0"/>
-                              </a:rPr>
-                            </m:ctrlPr>
-                          </m:sSubPr>
-                          <m:e>
-                            <m:r>
-                              <a:rPr lang="de-DE" altLang="de-DE" sz="1000" i="1">
-                                <a:solidFill>
-                                  <a:prstClr val="black"/>
-                                </a:solidFill>
-                                <a:latin typeface="Cambria Math" panose="02040503050406030204" pitchFamily="18" charset="0"/>
-                                <a:cs typeface="Arial" panose="020B0604020202020204" pitchFamily="34" charset="0"/>
-                              </a:rPr>
-                              <m:t>𝑥</m:t>
-                            </m:r>
-                          </m:e>
-                          <m:sub>
-                            <m:r>
-                              <a:rPr lang="de-DE" altLang="de-DE" sz="1000" i="1">
-                                <a:solidFill>
-                                  <a:prstClr val="black"/>
-                                </a:solidFill>
-                                <a:latin typeface="Cambria Math" panose="02040503050406030204" pitchFamily="18" charset="0"/>
-                                <a:cs typeface="Arial" panose="020B0604020202020204" pitchFamily="34" charset="0"/>
-                              </a:rPr>
-                              <m:t>𝑖</m:t>
-                            </m:r>
-                          </m:sub>
-                        </m:sSub>
-                        <m:r>
-                          <a:rPr lang="de-DE" altLang="de-DE" sz="1000" b="0" i="1" smtClean="0">
-                            <a:solidFill>
-                              <a:prstClr val="black"/>
-                            </a:solidFill>
-                            <a:latin typeface="Cambria Math" panose="02040503050406030204" pitchFamily="18" charset="0"/>
-                            <a:cs typeface="Arial" panose="020B0604020202020204" pitchFamily="34" charset="0"/>
-                          </a:rPr>
-                          <m:t>−</m:t>
-                        </m:r>
-                        <m:r>
-                          <m:rPr>
-                            <m:sty m:val="p"/>
-                          </m:rPr>
-                          <a:rPr lang="de-DE" altLang="de-DE" sz="1000" b="0" i="0" smtClean="0">
-                            <a:solidFill>
-                              <a:prstClr val="black"/>
-                            </a:solidFill>
-                            <a:latin typeface="Cambria Math" panose="02040503050406030204" pitchFamily="18" charset="0"/>
-                            <a:cs typeface="Arial" panose="020B0604020202020204" pitchFamily="34" charset="0"/>
-                          </a:rPr>
-                          <m:t>max</m:t>
-                        </m:r>
-                        <m:r>
-                          <a:rPr lang="de-DE" altLang="de-DE" sz="1000" b="0" i="1" smtClean="0">
-                            <a:solidFill>
-                              <a:prstClr val="black"/>
-                            </a:solidFill>
-                            <a:latin typeface="Cambria Math" panose="02040503050406030204" pitchFamily="18" charset="0"/>
-                            <a:cs typeface="Arial" panose="020B0604020202020204" pitchFamily="34" charset="0"/>
-                          </a:rPr>
-                          <m:t>⁡(</m:t>
-                        </m:r>
-                        <m:sSub>
-                          <m:sSubPr>
-                            <m:ctrlPr>
-                              <a:rPr lang="de-DE" altLang="de-DE" sz="1000" i="1">
-                                <a:solidFill>
-                                  <a:prstClr val="black"/>
-                                </a:solidFill>
-                                <a:latin typeface="Cambria Math" panose="02040503050406030204" pitchFamily="18" charset="0"/>
-                                <a:cs typeface="Arial" panose="020B0604020202020204" pitchFamily="34" charset="0"/>
-                              </a:rPr>
-                            </m:ctrlPr>
-                          </m:sSubPr>
-                          <m:e>
-                            <m:r>
-                              <a:rPr lang="de-DE" altLang="de-DE" sz="1000" i="1">
-                                <a:solidFill>
-                                  <a:prstClr val="black"/>
-                                </a:solidFill>
-                                <a:latin typeface="Cambria Math" panose="02040503050406030204" pitchFamily="18" charset="0"/>
-                                <a:cs typeface="Arial" panose="020B0604020202020204" pitchFamily="34" charset="0"/>
-                              </a:rPr>
-                              <m:t>𝑥</m:t>
-                            </m:r>
-                          </m:e>
-                          <m:sub>
-                            <m:r>
-                              <a:rPr lang="de-DE" altLang="de-DE" sz="1000" i="1">
-                                <a:solidFill>
-                                  <a:prstClr val="black"/>
-                                </a:solidFill>
-                                <a:latin typeface="Cambria Math" panose="02040503050406030204" pitchFamily="18" charset="0"/>
-                                <a:cs typeface="Arial" panose="020B0604020202020204" pitchFamily="34" charset="0"/>
-                              </a:rPr>
-                              <m:t>𝑖</m:t>
-                            </m:r>
-                          </m:sub>
-                        </m:sSub>
-                        <m:r>
-                          <a:rPr lang="de-DE" altLang="de-DE" sz="1000" b="0" i="1" smtClean="0">
-                            <a:solidFill>
-                              <a:prstClr val="black"/>
-                            </a:solidFill>
-                            <a:latin typeface="Cambria Math" panose="02040503050406030204" pitchFamily="18" charset="0"/>
-                            <a:cs typeface="Arial" panose="020B0604020202020204" pitchFamily="34" charset="0"/>
-                          </a:rPr>
-                          <m:t>)</m:t>
-                        </m:r>
-                      </m:num>
-                      <m:den>
-                        <m:func>
-                          <m:funcPr>
-                            <m:ctrlPr>
-                              <a:rPr lang="de-DE" altLang="de-DE" sz="1000" b="0" i="1" smtClean="0">
-                                <a:solidFill>
-                                  <a:prstClr val="black"/>
-                                </a:solidFill>
-                                <a:latin typeface="Cambria Math" panose="02040503050406030204" pitchFamily="18" charset="0"/>
-                                <a:cs typeface="Arial" panose="020B0604020202020204" pitchFamily="34" charset="0"/>
-                              </a:rPr>
-                            </m:ctrlPr>
-                          </m:funcPr>
-                          <m:fName>
-                            <m:r>
-                              <m:rPr>
-                                <m:sty m:val="p"/>
-                              </m:rPr>
-                              <a:rPr lang="de-DE" altLang="de-DE" sz="1000" b="0" i="0" smtClean="0">
-                                <a:solidFill>
-                                  <a:prstClr val="black"/>
-                                </a:solidFill>
-                                <a:latin typeface="Cambria Math" panose="02040503050406030204" pitchFamily="18" charset="0"/>
-                                <a:cs typeface="Arial" panose="020B0604020202020204" pitchFamily="34" charset="0"/>
-                              </a:rPr>
-                              <m:t>m</m:t>
-                            </m:r>
-                            <m:r>
-                              <a:rPr lang="de-DE" altLang="de-DE" sz="1000" b="0" i="1" smtClean="0">
-                                <a:solidFill>
-                                  <a:prstClr val="black"/>
-                                </a:solidFill>
-                                <a:latin typeface="Cambria Math" panose="02040503050406030204" pitchFamily="18" charset="0"/>
-                                <a:cs typeface="Arial" panose="020B0604020202020204" pitchFamily="34" charset="0"/>
-                              </a:rPr>
-                              <m:t>𝑖𝑛</m:t>
-                            </m:r>
-                          </m:fName>
-                          <m:e>
-                            <m:d>
-                              <m:dPr>
-                                <m:ctrlPr>
-                                  <a:rPr lang="de-DE" altLang="de-DE" sz="1000" b="0" i="1" smtClean="0">
-                                    <a:solidFill>
-                                      <a:prstClr val="black"/>
-                                    </a:solidFill>
-                                    <a:latin typeface="Cambria Math" panose="02040503050406030204" pitchFamily="18" charset="0"/>
-                                    <a:cs typeface="Arial" panose="020B0604020202020204" pitchFamily="34" charset="0"/>
-                                  </a:rPr>
-                                </m:ctrlPr>
-                              </m:dPr>
-                              <m:e>
-                                <m:sSub>
-                                  <m:sSubPr>
-                                    <m:ctrlPr>
-                                      <a:rPr lang="de-DE" altLang="de-DE" sz="1000" i="1">
-                                        <a:solidFill>
-                                          <a:prstClr val="black"/>
-                                        </a:solidFill>
-                                        <a:latin typeface="Cambria Math" panose="02040503050406030204" pitchFamily="18" charset="0"/>
-                                        <a:cs typeface="Arial" panose="020B0604020202020204" pitchFamily="34" charset="0"/>
-                                      </a:rPr>
-                                    </m:ctrlPr>
-                                  </m:sSubPr>
-                                  <m:e>
-                                    <m:r>
-                                      <a:rPr lang="de-DE" altLang="de-DE" sz="1000" i="1">
-                                        <a:solidFill>
-                                          <a:prstClr val="black"/>
-                                        </a:solidFill>
-                                        <a:latin typeface="Cambria Math" panose="02040503050406030204" pitchFamily="18" charset="0"/>
-                                        <a:cs typeface="Arial" panose="020B0604020202020204" pitchFamily="34" charset="0"/>
-                                      </a:rPr>
-                                      <m:t>𝑥</m:t>
-                                    </m:r>
-                                  </m:e>
-                                  <m:sub>
-                                    <m:r>
-                                      <a:rPr lang="de-DE" altLang="de-DE" sz="1000" i="1">
-                                        <a:solidFill>
-                                          <a:prstClr val="black"/>
-                                        </a:solidFill>
-                                        <a:latin typeface="Cambria Math" panose="02040503050406030204" pitchFamily="18" charset="0"/>
-                                        <a:cs typeface="Arial" panose="020B0604020202020204" pitchFamily="34" charset="0"/>
-                                      </a:rPr>
-                                      <m:t>𝑖</m:t>
-                                    </m:r>
-                                  </m:sub>
-                                </m:sSub>
-                              </m:e>
-                            </m:d>
-                          </m:e>
-                        </m:func>
-                        <m:r>
-                          <a:rPr lang="de-DE" altLang="de-DE" sz="1000" b="0" i="1" smtClean="0">
-                            <a:solidFill>
-                              <a:prstClr val="black"/>
-                            </a:solidFill>
-                            <a:latin typeface="Cambria Math" panose="02040503050406030204" pitchFamily="18" charset="0"/>
-                            <a:cs typeface="Arial" panose="020B0604020202020204" pitchFamily="34" charset="0"/>
-                          </a:rPr>
-                          <m:t>−</m:t>
-                        </m:r>
-                        <m:r>
-                          <m:rPr>
-                            <m:sty m:val="p"/>
-                          </m:rPr>
-                          <a:rPr lang="de-DE" altLang="de-DE" sz="1000">
-                            <a:solidFill>
-                              <a:prstClr val="black"/>
-                            </a:solidFill>
-                            <a:latin typeface="Cambria Math" panose="02040503050406030204" pitchFamily="18" charset="0"/>
-                            <a:cs typeface="Arial" panose="020B0604020202020204" pitchFamily="34" charset="0"/>
-                          </a:rPr>
-                          <m:t>max</m:t>
-                        </m:r>
-                        <m:r>
-                          <a:rPr lang="de-DE" altLang="de-DE" sz="1000" b="0" i="1" smtClean="0">
-                            <a:solidFill>
-                              <a:prstClr val="black"/>
-                            </a:solidFill>
-                            <a:latin typeface="Cambria Math" panose="02040503050406030204" pitchFamily="18" charset="0"/>
-                            <a:cs typeface="Arial" panose="020B0604020202020204" pitchFamily="34" charset="0"/>
-                          </a:rPr>
-                          <m:t>⁡(</m:t>
-                        </m:r>
-                        <m:sSub>
-                          <m:sSubPr>
-                            <m:ctrlPr>
-                              <a:rPr lang="de-DE" altLang="de-DE" sz="1000" i="1">
-                                <a:solidFill>
-                                  <a:prstClr val="black"/>
-                                </a:solidFill>
-                                <a:latin typeface="Cambria Math" panose="02040503050406030204" pitchFamily="18" charset="0"/>
-                                <a:cs typeface="Arial" panose="020B0604020202020204" pitchFamily="34" charset="0"/>
-                              </a:rPr>
-                            </m:ctrlPr>
-                          </m:sSubPr>
-                          <m:e>
-                            <m:r>
-                              <a:rPr lang="de-DE" altLang="de-DE" sz="1000" i="1">
-                                <a:solidFill>
-                                  <a:prstClr val="black"/>
-                                </a:solidFill>
-                                <a:latin typeface="Cambria Math" panose="02040503050406030204" pitchFamily="18" charset="0"/>
-                                <a:cs typeface="Arial" panose="020B0604020202020204" pitchFamily="34" charset="0"/>
-                              </a:rPr>
-                              <m:t>𝑥</m:t>
-                            </m:r>
-                          </m:e>
-                          <m:sub>
-                            <m:r>
-                              <a:rPr lang="de-DE" altLang="de-DE" sz="1000" i="1">
-                                <a:solidFill>
-                                  <a:prstClr val="black"/>
-                                </a:solidFill>
-                                <a:latin typeface="Cambria Math" panose="02040503050406030204" pitchFamily="18" charset="0"/>
-                                <a:cs typeface="Arial" panose="020B0604020202020204" pitchFamily="34" charset="0"/>
-                              </a:rPr>
-                              <m:t>𝑖</m:t>
-                            </m:r>
-                          </m:sub>
-                        </m:sSub>
-                        <m:r>
-                          <a:rPr lang="de-DE" altLang="de-DE" sz="1000" b="0" i="1" smtClean="0">
-                            <a:solidFill>
-                              <a:prstClr val="black"/>
-                            </a:solidFill>
-                            <a:latin typeface="Cambria Math" panose="02040503050406030204" pitchFamily="18" charset="0"/>
-                            <a:cs typeface="Arial" panose="020B0604020202020204" pitchFamily="34" charset="0"/>
-                          </a:rPr>
-                          <m:t>)</m:t>
-                        </m:r>
-                      </m:den>
-                    </m:f>
-                  </m:oMath>
-                </a14:m>
-                <a:r>
-                  <a:rPr lang="en-US" altLang="de-DE" sz="1000" dirty="0" smtClean="0">
-                    <a:solidFill>
-                      <a:prstClr val="black"/>
-                    </a:solidFill>
-                    <a:latin typeface="Arial" panose="020B0604020202020204" pitchFamily="34" charset="0"/>
-                    <a:cs typeface="Arial" panose="020B0604020202020204" pitchFamily="34" charset="0"/>
-                  </a:rPr>
-                  <a:t> 	(Min-Max Normalization)</a:t>
-                </a:r>
-              </a:p>
-              <a:p>
-                <a:pPr lvl="0"/>
-                <a:endParaRPr lang="en-US" altLang="de-DE" sz="1000" dirty="0" smtClean="0">
-                  <a:solidFill>
-                    <a:prstClr val="black"/>
-                  </a:solidFill>
-                  <a:latin typeface="Arial" panose="020B0604020202020204" pitchFamily="34" charset="0"/>
-                  <a:cs typeface="Arial" panose="020B0604020202020204" pitchFamily="34" charset="0"/>
-                </a:endParaRPr>
-              </a:p>
-              <a:p>
-                <a:pPr lvl="0"/>
-                <a:r>
-                  <a:rPr lang="en-US" altLang="de-DE" sz="1000" dirty="0" smtClean="0">
-                    <a:solidFill>
-                      <a:prstClr val="black"/>
-                    </a:solidFill>
-                    <a:latin typeface="Arial" panose="020B0604020202020204" pitchFamily="34" charset="0"/>
-                    <a:cs typeface="Arial" panose="020B0604020202020204" pitchFamily="34" charset="0"/>
-                  </a:rPr>
-                  <a:t>Calculate the weighted value for each feature</a:t>
-                </a:r>
-                <a14:m>
-                  <m:oMath xmlns:m="http://schemas.openxmlformats.org/officeDocument/2006/math">
-                    <m:sSub>
-                      <m:sSubPr>
-                        <m:ctrlPr>
-                          <a:rPr lang="de-DE" altLang="de-DE" sz="1000" i="1">
-                            <a:solidFill>
-                              <a:prstClr val="black"/>
-                            </a:solidFill>
-                            <a:latin typeface="Cambria Math" panose="02040503050406030204" pitchFamily="18" charset="0"/>
-                            <a:cs typeface="Arial" panose="020B0604020202020204" pitchFamily="34" charset="0"/>
-                          </a:rPr>
-                        </m:ctrlPr>
-                      </m:sSubPr>
-                      <m:e>
-                        <m:r>
-                          <a:rPr lang="de-DE" altLang="de-DE" sz="1000" b="0" i="1" smtClean="0">
-                            <a:solidFill>
-                              <a:prstClr val="black"/>
-                            </a:solidFill>
-                            <a:latin typeface="Cambria Math" panose="02040503050406030204" pitchFamily="18" charset="0"/>
-                            <a:cs typeface="Arial" panose="020B0604020202020204" pitchFamily="34" charset="0"/>
-                          </a:rPr>
-                          <m:t> </m:t>
-                        </m:r>
-                        <m:r>
-                          <a:rPr lang="de-DE" altLang="de-DE" sz="1000" i="1">
-                            <a:solidFill>
-                              <a:prstClr val="black"/>
-                            </a:solidFill>
-                            <a:latin typeface="Cambria Math" panose="02040503050406030204" pitchFamily="18" charset="0"/>
-                            <a:cs typeface="Arial" panose="020B0604020202020204" pitchFamily="34" charset="0"/>
-                          </a:rPr>
-                          <m:t>𝑥</m:t>
-                        </m:r>
-                      </m:e>
-                      <m:sub>
-                        <m:r>
-                          <a:rPr lang="de-DE" altLang="de-DE" sz="1000" i="1">
-                            <a:solidFill>
-                              <a:prstClr val="black"/>
-                            </a:solidFill>
-                            <a:latin typeface="Cambria Math" panose="02040503050406030204" pitchFamily="18" charset="0"/>
-                            <a:cs typeface="Arial" panose="020B0604020202020204" pitchFamily="34" charset="0"/>
-                          </a:rPr>
-                          <m:t>𝑖</m:t>
-                        </m:r>
-                      </m:sub>
-                    </m:sSub>
-                  </m:oMath>
-                </a14:m>
-                <a:r>
-                  <a:rPr lang="en-US" altLang="de-DE" sz="1000" dirty="0" smtClean="0">
-                    <a:solidFill>
-                      <a:prstClr val="black"/>
-                    </a:solidFill>
-                    <a:latin typeface="Arial" panose="020B0604020202020204" pitchFamily="34" charset="0"/>
-                    <a:cs typeface="Arial" panose="020B0604020202020204" pitchFamily="34" charset="0"/>
-                  </a:rPr>
-                  <a:t>.</a:t>
-                </a:r>
-              </a:p>
-              <a:p>
-                <a:pPr lvl="0"/>
-                <a:endParaRPr lang="en-US" altLang="de-DE" sz="1000" dirty="0">
-                  <a:solidFill>
-                    <a:prstClr val="black"/>
-                  </a:solidFill>
-                  <a:latin typeface="Arial" panose="020B0604020202020204" pitchFamily="34" charset="0"/>
-                  <a:cs typeface="Arial" panose="020B0604020202020204" pitchFamily="34" charset="0"/>
-                </a:endParaRPr>
-              </a:p>
-              <a:p>
-                <a:pPr lvl="0"/>
-                <a14:m>
-                  <m:oMathPara xmlns:m="http://schemas.openxmlformats.org/officeDocument/2006/math">
-                    <m:oMathParaPr>
-                      <m:jc m:val="centerGroup"/>
-                    </m:oMathParaPr>
-                    <m:oMath xmlns:m="http://schemas.openxmlformats.org/officeDocument/2006/math">
-                      <m:sSub>
-                        <m:sSubPr>
-                          <m:ctrlPr>
-                            <a:rPr lang="de-DE" altLang="de-DE" sz="1000" i="1">
-                              <a:solidFill>
-                                <a:prstClr val="black"/>
-                              </a:solidFill>
-                              <a:latin typeface="Cambria Math" panose="02040503050406030204" pitchFamily="18" charset="0"/>
-                              <a:cs typeface="Arial" panose="020B0604020202020204" pitchFamily="34" charset="0"/>
-                            </a:rPr>
-                          </m:ctrlPr>
-                        </m:sSubPr>
-                        <m:e>
-                          <m:r>
-                            <a:rPr lang="de-DE" altLang="de-DE" sz="1000" i="1">
-                              <a:solidFill>
-                                <a:prstClr val="black"/>
-                              </a:solidFill>
-                              <a:latin typeface="Cambria Math" panose="02040503050406030204" pitchFamily="18" charset="0"/>
-                              <a:cs typeface="Arial" panose="020B0604020202020204" pitchFamily="34" charset="0"/>
-                            </a:rPr>
-                            <m:t>𝑥</m:t>
-                          </m:r>
-                        </m:e>
-                        <m:sub>
-                          <m:r>
-                            <a:rPr lang="de-DE" altLang="de-DE" sz="1000" i="1">
-                              <a:solidFill>
-                                <a:prstClr val="black"/>
-                              </a:solidFill>
-                              <a:latin typeface="Cambria Math" panose="02040503050406030204" pitchFamily="18" charset="0"/>
-                              <a:cs typeface="Arial" panose="020B0604020202020204" pitchFamily="34" charset="0"/>
-                            </a:rPr>
-                            <m:t>𝑖</m:t>
-                          </m:r>
-                        </m:sub>
-                      </m:sSub>
-                      <m:r>
-                        <a:rPr lang="de-DE" altLang="de-DE" sz="1000" b="0" i="1" smtClean="0">
-                          <a:solidFill>
-                            <a:prstClr val="black"/>
-                          </a:solidFill>
-                          <a:latin typeface="Cambria Math" panose="02040503050406030204" pitchFamily="18" charset="0"/>
-                          <a:cs typeface="Arial" panose="020B0604020202020204" pitchFamily="34" charset="0"/>
-                        </a:rPr>
-                        <m:t>__</m:t>
-                      </m:r>
-                      <m:r>
-                        <a:rPr lang="de-DE" altLang="de-DE" sz="1000" b="0" i="1" smtClean="0">
-                          <a:solidFill>
-                            <a:prstClr val="black"/>
-                          </a:solidFill>
-                          <a:latin typeface="Cambria Math" panose="02040503050406030204" pitchFamily="18" charset="0"/>
-                          <a:cs typeface="Arial" panose="020B0604020202020204" pitchFamily="34" charset="0"/>
-                        </a:rPr>
-                        <m:t>𝑤𝑒𝑖𝑔h𝑡𝑒𝑑</m:t>
-                      </m:r>
-                      <m:r>
-                        <a:rPr lang="de-DE" altLang="de-DE" sz="1000" b="0" i="1" smtClean="0">
-                          <a:solidFill>
-                            <a:prstClr val="black"/>
-                          </a:solidFill>
-                          <a:latin typeface="Cambria Math" panose="02040503050406030204" pitchFamily="18" charset="0"/>
-                          <a:cs typeface="Arial" panose="020B0604020202020204" pitchFamily="34" charset="0"/>
-                        </a:rPr>
-                        <m:t>=</m:t>
-                      </m:r>
-                      <m:sSup>
-                        <m:sSupPr>
-                          <m:ctrlPr>
-                            <a:rPr lang="en-US" altLang="de-DE" sz="1000" i="1">
-                              <a:solidFill>
-                                <a:prstClr val="black"/>
-                              </a:solidFill>
-                              <a:latin typeface="Cambria Math" panose="02040503050406030204" pitchFamily="18" charset="0"/>
-                              <a:cs typeface="Arial" panose="020B0604020202020204" pitchFamily="34" charset="0"/>
-                            </a:rPr>
-                          </m:ctrlPr>
-                        </m:sSupPr>
-                        <m:e>
-                          <m:sSub>
-                            <m:sSubPr>
-                              <m:ctrlPr>
-                                <a:rPr lang="de-DE" altLang="de-DE" sz="1000" i="1">
-                                  <a:solidFill>
-                                    <a:prstClr val="black"/>
-                                  </a:solidFill>
-                                  <a:latin typeface="Cambria Math" panose="02040503050406030204" pitchFamily="18" charset="0"/>
-                                  <a:cs typeface="Arial" panose="020B0604020202020204" pitchFamily="34" charset="0"/>
-                                </a:rPr>
-                              </m:ctrlPr>
-                            </m:sSubPr>
-                            <m:e>
-                              <m:r>
-                                <a:rPr lang="de-DE" altLang="de-DE" sz="1000" i="1">
-                                  <a:solidFill>
-                                    <a:prstClr val="black"/>
-                                  </a:solidFill>
-                                  <a:latin typeface="Cambria Math" panose="02040503050406030204" pitchFamily="18" charset="0"/>
-                                  <a:cs typeface="Arial" panose="020B0604020202020204" pitchFamily="34" charset="0"/>
-                                </a:rPr>
-                                <m:t>𝑥</m:t>
-                              </m:r>
-                            </m:e>
-                            <m:sub>
-                              <m:r>
-                                <a:rPr lang="de-DE" altLang="de-DE" sz="1000" i="1">
-                                  <a:solidFill>
-                                    <a:prstClr val="black"/>
-                                  </a:solidFill>
-                                  <a:latin typeface="Cambria Math" panose="02040503050406030204" pitchFamily="18" charset="0"/>
-                                  <a:cs typeface="Arial" panose="020B0604020202020204" pitchFamily="34" charset="0"/>
-                                </a:rPr>
-                                <m:t>𝑖</m:t>
-                              </m:r>
-                            </m:sub>
-                          </m:sSub>
-                        </m:e>
-                        <m:sup>
-                          <m:r>
-                            <a:rPr lang="de-DE" altLang="de-DE" sz="1000" i="1">
-                              <a:solidFill>
-                                <a:prstClr val="black"/>
-                              </a:solidFill>
-                              <a:latin typeface="Cambria Math" panose="02040503050406030204" pitchFamily="18" charset="0"/>
-                              <a:cs typeface="Arial" panose="020B0604020202020204" pitchFamily="34" charset="0"/>
-                            </a:rPr>
-                            <m:t>′</m:t>
-                          </m:r>
-                        </m:sup>
-                      </m:sSup>
-                      <m:r>
-                        <a:rPr lang="de-DE" altLang="de-DE" sz="1000" b="0" i="0" smtClean="0">
-                          <a:solidFill>
-                            <a:prstClr val="black"/>
-                          </a:solidFill>
-                          <a:latin typeface="Cambria Math" panose="02040503050406030204" pitchFamily="18" charset="0"/>
-                          <a:cs typeface="Arial" panose="020B0604020202020204" pitchFamily="34" charset="0"/>
-                        </a:rPr>
-                        <m:t>∗</m:t>
-                      </m:r>
-                      <m:sSub>
-                        <m:sSubPr>
-                          <m:ctrlPr>
-                            <a:rPr lang="de-DE" altLang="de-DE" sz="1000" i="1">
-                              <a:solidFill>
-                                <a:prstClr val="black"/>
-                              </a:solidFill>
-                              <a:latin typeface="Cambria Math" panose="02040503050406030204" pitchFamily="18" charset="0"/>
-                              <a:cs typeface="Arial" panose="020B0604020202020204" pitchFamily="34" charset="0"/>
-                            </a:rPr>
-                          </m:ctrlPr>
-                        </m:sSubPr>
-                        <m:e>
-                          <m:r>
-                            <a:rPr lang="de-DE" altLang="de-DE" sz="1000" i="1">
-                              <a:solidFill>
-                                <a:prstClr val="black"/>
-                              </a:solidFill>
-                              <a:latin typeface="Cambria Math" panose="02040503050406030204" pitchFamily="18" charset="0"/>
-                              <a:cs typeface="Arial" panose="020B0604020202020204" pitchFamily="34" charset="0"/>
-                            </a:rPr>
-                            <m:t>𝑥</m:t>
-                          </m:r>
-                        </m:e>
-                        <m:sub>
-                          <m:r>
-                            <a:rPr lang="de-DE" altLang="de-DE" sz="1000" i="1">
-                              <a:solidFill>
-                                <a:prstClr val="black"/>
-                              </a:solidFill>
-                              <a:latin typeface="Cambria Math" panose="02040503050406030204" pitchFamily="18" charset="0"/>
-                              <a:cs typeface="Arial" panose="020B0604020202020204" pitchFamily="34" charset="0"/>
-                            </a:rPr>
-                            <m:t>𝑖</m:t>
-                          </m:r>
-                        </m:sub>
-                      </m:sSub>
-                      <m:r>
-                        <a:rPr lang="de-DE" altLang="de-DE" sz="1000" b="0" i="1" smtClean="0">
-                          <a:solidFill>
-                            <a:prstClr val="black"/>
-                          </a:solidFill>
-                          <a:latin typeface="Cambria Math" panose="02040503050406030204" pitchFamily="18" charset="0"/>
-                          <a:cs typeface="Arial" panose="020B0604020202020204" pitchFamily="34" charset="0"/>
-                        </a:rPr>
-                        <m:t>__</m:t>
-                      </m:r>
-                      <m:r>
-                        <a:rPr lang="de-DE" altLang="de-DE" sz="1000" b="0" i="1" smtClean="0">
-                          <a:solidFill>
-                            <a:prstClr val="black"/>
-                          </a:solidFill>
-                          <a:latin typeface="Cambria Math" panose="02040503050406030204" pitchFamily="18" charset="0"/>
-                          <a:cs typeface="Arial" panose="020B0604020202020204" pitchFamily="34" charset="0"/>
-                        </a:rPr>
-                        <m:t>𝑖𝑚𝑝𝑜𝑟𝑡𝑎𝑛𝑐𝑒</m:t>
-                      </m:r>
-                    </m:oMath>
-                  </m:oMathPara>
-                </a14:m>
-                <a:endParaRPr lang="en-US" altLang="de-DE" sz="1000" dirty="0" smtClean="0">
-                  <a:solidFill>
-                    <a:prstClr val="black"/>
-                  </a:solidFill>
-                  <a:latin typeface="Arial" panose="020B0604020202020204" pitchFamily="34" charset="0"/>
-                  <a:cs typeface="Arial" panose="020B0604020202020204" pitchFamily="34" charset="0"/>
-                </a:endParaRPr>
-              </a:p>
-              <a:p>
-                <a:pPr lvl="0"/>
-                <a:endParaRPr lang="en-US" altLang="de-DE" sz="1000" dirty="0" smtClean="0">
-                  <a:solidFill>
-                    <a:prstClr val="black"/>
-                  </a:solidFill>
-                  <a:latin typeface="Arial" panose="020B0604020202020204" pitchFamily="34" charset="0"/>
-                  <a:cs typeface="Arial" panose="020B0604020202020204" pitchFamily="34" charset="0"/>
-                </a:endParaRPr>
-              </a:p>
-              <a:p>
-                <a:pPr lvl="0"/>
-                <a:r>
-                  <a:rPr lang="en-US" altLang="de-DE" sz="1000" dirty="0" smtClean="0">
-                    <a:solidFill>
-                      <a:prstClr val="black"/>
-                    </a:solidFill>
-                    <a:latin typeface="Arial" panose="020B0604020202020204" pitchFamily="34" charset="0"/>
-                    <a:cs typeface="Arial" panose="020B0604020202020204" pitchFamily="34" charset="0"/>
-                  </a:rPr>
-                  <a:t>Calculate </a:t>
-                </a:r>
-                <a:r>
-                  <a:rPr lang="en-US" altLang="de-DE" sz="1000" dirty="0">
-                    <a:solidFill>
-                      <a:prstClr val="black"/>
-                    </a:solidFill>
-                    <a:latin typeface="Arial" panose="020B0604020202020204" pitchFamily="34" charset="0"/>
-                    <a:cs typeface="Arial" panose="020B0604020202020204" pitchFamily="34" charset="0"/>
-                  </a:rPr>
-                  <a:t>the comparative value </a:t>
-                </a:r>
-                <a:r>
-                  <a:rPr lang="en-US" altLang="de-DE" sz="1000" dirty="0" smtClean="0">
-                    <a:solidFill>
-                      <a:prstClr val="black"/>
-                    </a:solidFill>
-                    <a:latin typeface="Arial" panose="020B0604020202020204" pitchFamily="34" charset="0"/>
-                    <a:cs typeface="Arial" panose="020B0604020202020204" pitchFamily="34" charset="0"/>
-                  </a:rPr>
-                  <a:t>for each </a:t>
-                </a:r>
-                <a:r>
-                  <a:rPr lang="en-US" altLang="de-DE" sz="1000" b="1" dirty="0" smtClean="0">
-                    <a:solidFill>
-                      <a:prstClr val="black"/>
-                    </a:solidFill>
-                    <a:latin typeface="Arial" panose="020B0604020202020204" pitchFamily="34" charset="0"/>
-                    <a:cs typeface="Arial" panose="020B0604020202020204" pitchFamily="34" charset="0"/>
-                  </a:rPr>
-                  <a:t>permutation</a:t>
-                </a:r>
-                <a:r>
-                  <a:rPr lang="en-US" altLang="de-DE" sz="1000" dirty="0" smtClean="0">
-                    <a:solidFill>
-                      <a:prstClr val="black"/>
-                    </a:solidFill>
-                    <a:latin typeface="Arial" panose="020B0604020202020204" pitchFamily="34" charset="0"/>
-                    <a:cs typeface="Arial" panose="020B0604020202020204" pitchFamily="34" charset="0"/>
-                  </a:rPr>
-                  <a:t> by</a:t>
-                </a:r>
-                <a:endParaRPr lang="de-DE" altLang="de-DE" sz="1000" i="1" dirty="0" smtClean="0">
-                  <a:solidFill>
-                    <a:prstClr val="black"/>
-                  </a:solidFill>
-                  <a:latin typeface="Cambria Math" panose="02040503050406030204" pitchFamily="18" charset="0"/>
-                  <a:cs typeface="Arial" panose="020B0604020202020204" pitchFamily="34" charset="0"/>
-                </a:endParaRPr>
-              </a:p>
-              <a:p>
-                <a:pPr lvl="0"/>
-                <a14:m>
-                  <m:oMathPara xmlns:m="http://schemas.openxmlformats.org/officeDocument/2006/math">
-                    <m:oMathParaPr>
-                      <m:jc m:val="centerGroup"/>
-                    </m:oMathParaPr>
-                    <m:oMath xmlns:m="http://schemas.openxmlformats.org/officeDocument/2006/math">
-                      <m:nary>
-                        <m:naryPr>
-                          <m:chr m:val="∑"/>
-                          <m:ctrlPr>
-                            <a:rPr lang="en-US" altLang="de-DE" sz="1000" i="1">
-                              <a:solidFill>
-                                <a:prstClr val="black"/>
-                              </a:solidFill>
-                              <a:latin typeface="Cambria Math" panose="02040503050406030204" pitchFamily="18" charset="0"/>
-                              <a:cs typeface="Arial" panose="020B0604020202020204" pitchFamily="34" charset="0"/>
-                            </a:rPr>
-                          </m:ctrlPr>
-                        </m:naryPr>
-                        <m:sub>
-                          <m:r>
-                            <a:rPr lang="en-US" altLang="de-DE" sz="1000" i="1">
-                              <a:solidFill>
-                                <a:prstClr val="black"/>
-                              </a:solidFill>
-                              <a:latin typeface="Cambria Math" panose="02040503050406030204" pitchFamily="18" charset="0"/>
-                              <a:cs typeface="Arial" panose="020B0604020202020204" pitchFamily="34" charset="0"/>
-                            </a:rPr>
-                            <m:t>𝑖</m:t>
-                          </m:r>
-                          <m:r>
-                            <a:rPr lang="en-US" altLang="de-DE" sz="1000" i="1">
-                              <a:solidFill>
-                                <a:prstClr val="black"/>
-                              </a:solidFill>
-                              <a:latin typeface="Cambria Math" panose="02040503050406030204" pitchFamily="18" charset="0"/>
-                              <a:cs typeface="Arial" panose="020B0604020202020204" pitchFamily="34" charset="0"/>
-                            </a:rPr>
-                            <m:t>=0</m:t>
-                          </m:r>
-                        </m:sub>
-                        <m:sup>
-                          <m:r>
-                            <a:rPr lang="en-US" altLang="de-DE" sz="1000" i="1">
-                              <a:solidFill>
-                                <a:prstClr val="black"/>
-                              </a:solidFill>
-                              <a:latin typeface="Cambria Math" panose="02040503050406030204" pitchFamily="18" charset="0"/>
-                              <a:cs typeface="Arial" panose="020B0604020202020204" pitchFamily="34" charset="0"/>
-                            </a:rPr>
-                            <m:t>𝑛</m:t>
-                          </m:r>
-                        </m:sup>
-                        <m:e>
-                          <m:sSub>
-                            <m:sSubPr>
-                              <m:ctrlPr>
-                                <a:rPr lang="de-DE" altLang="de-DE" sz="1000" i="1">
-                                  <a:solidFill>
-                                    <a:prstClr val="black"/>
-                                  </a:solidFill>
-                                  <a:latin typeface="Cambria Math" panose="02040503050406030204" pitchFamily="18" charset="0"/>
-                                  <a:cs typeface="Arial" panose="020B0604020202020204" pitchFamily="34" charset="0"/>
-                                </a:rPr>
-                              </m:ctrlPr>
-                            </m:sSubPr>
-                            <m:e>
-                              <m:r>
-                                <a:rPr lang="de-DE" altLang="de-DE" sz="1000" i="1">
-                                  <a:solidFill>
-                                    <a:prstClr val="black"/>
-                                  </a:solidFill>
-                                  <a:latin typeface="Cambria Math" panose="02040503050406030204" pitchFamily="18" charset="0"/>
-                                  <a:cs typeface="Arial" panose="020B0604020202020204" pitchFamily="34" charset="0"/>
-                                </a:rPr>
-                                <m:t>𝑥</m:t>
-                              </m:r>
-                            </m:e>
-                            <m:sub>
-                              <m:r>
-                                <a:rPr lang="de-DE" altLang="de-DE" sz="1000" i="1">
-                                  <a:solidFill>
-                                    <a:prstClr val="black"/>
-                                  </a:solidFill>
-                                  <a:latin typeface="Cambria Math" panose="02040503050406030204" pitchFamily="18" charset="0"/>
-                                  <a:cs typeface="Arial" panose="020B0604020202020204" pitchFamily="34" charset="0"/>
-                                </a:rPr>
-                                <m:t>𝑖</m:t>
-                              </m:r>
-                            </m:sub>
-                          </m:sSub>
-                          <m:r>
-                            <a:rPr lang="de-DE" altLang="de-DE" sz="1000" i="1">
-                              <a:solidFill>
-                                <a:prstClr val="black"/>
-                              </a:solidFill>
-                              <a:latin typeface="Cambria Math" panose="02040503050406030204" pitchFamily="18" charset="0"/>
-                              <a:cs typeface="Arial" panose="020B0604020202020204" pitchFamily="34" charset="0"/>
-                            </a:rPr>
-                            <m:t>__</m:t>
-                          </m:r>
-                          <m:r>
-                            <a:rPr lang="de-DE" altLang="de-DE" sz="1000" i="1">
-                              <a:solidFill>
-                                <a:prstClr val="black"/>
-                              </a:solidFill>
-                              <a:latin typeface="Cambria Math" panose="02040503050406030204" pitchFamily="18" charset="0"/>
-                              <a:cs typeface="Arial" panose="020B0604020202020204" pitchFamily="34" charset="0"/>
-                            </a:rPr>
-                            <m:t>𝑤𝑒𝑖𝑔h𝑡𝑒𝑑</m:t>
-                          </m:r>
-                        </m:e>
-                      </m:nary>
-                    </m:oMath>
-                  </m:oMathPara>
-                </a14:m>
-                <a:endParaRPr lang="en-US" altLang="de-DE" sz="1000" dirty="0" smtClean="0">
-                  <a:solidFill>
-                    <a:prstClr val="black"/>
-                  </a:solidFill>
-                  <a:latin typeface="Arial" panose="020B0604020202020204" pitchFamily="34" charset="0"/>
-                  <a:cs typeface="Arial" panose="020B0604020202020204" pitchFamily="34" charset="0"/>
-                </a:endParaRPr>
-              </a:p>
-              <a:p>
-                <a:pPr lvl="0"/>
-                <a:endParaRPr lang="en-US" altLang="de-DE" sz="1000" dirty="0" smtClean="0">
-                  <a:solidFill>
-                    <a:prstClr val="black"/>
-                  </a:solidFill>
-                  <a:latin typeface="Arial" panose="020B0604020202020204" pitchFamily="34" charset="0"/>
-                  <a:cs typeface="Arial" panose="020B0604020202020204" pitchFamily="34" charset="0"/>
-                </a:endParaRPr>
-              </a:p>
-              <a:p>
-                <a:pPr lvl="0"/>
-                <a:r>
-                  <a:rPr lang="en-US" altLang="de-DE" sz="1000" dirty="0" smtClean="0">
-                    <a:solidFill>
-                      <a:prstClr val="black"/>
-                    </a:solidFill>
-                    <a:latin typeface="Arial" panose="020B0604020202020204" pitchFamily="34" charset="0"/>
-                    <a:cs typeface="Arial" panose="020B0604020202020204" pitchFamily="34" charset="0"/>
-                  </a:rPr>
-                  <a:t>Rank the permutations by their comparative value.</a:t>
-                </a:r>
-                <a:endParaRPr lang="en-US" altLang="de-DE" sz="1000" dirty="0">
-                  <a:solidFill>
-                    <a:prstClr val="black"/>
-                  </a:solidFill>
-                  <a:latin typeface="Arial" panose="020B0604020202020204" pitchFamily="34" charset="0"/>
-                  <a:cs typeface="Arial" panose="020B0604020202020204" pitchFamily="34" charset="0"/>
-                </a:endParaRPr>
-              </a:p>
-            </p:txBody>
-          </p:sp>
-        </mc:Choice>
-        <mc:Fallback>
-          <p:sp>
-            <p:nvSpPr>
-              <p:cNvPr id="3" name="Rechteck 2"/>
-              <p:cNvSpPr>
-                <a:spLocks noRot="1" noChangeAspect="1" noMove="1" noResize="1" noEditPoints="1" noAdjustHandles="1" noChangeArrowheads="1" noChangeShapeType="1" noTextEdit="1"/>
-              </p:cNvSpPr>
-              <p:nvPr/>
-            </p:nvSpPr>
-            <p:spPr>
-              <a:xfrm>
-                <a:off x="63166" y="530270"/>
-                <a:ext cx="3835256" cy="5220660"/>
-              </a:xfrm>
-              <a:prstGeom prst="rect">
-                <a:avLst/>
-              </a:prstGeom>
-              <a:blipFill rotWithShape="0">
-                <a:blip r:embed="rId2"/>
-                <a:stretch>
-                  <a:fillRect b="-4322"/>
-                </a:stretch>
-              </a:blipFill>
-            </p:spPr>
-            <p:txBody>
-              <a:bodyPr/>
-              <a:lstStyle/>
-              <a:p>
-                <a:r>
-                  <a:rPr lang="en-US">
-                    <a:noFill/>
-                  </a:rPr>
-                  <a:t> </a:t>
-                </a:r>
-              </a:p>
-            </p:txBody>
-          </p:sp>
-        </mc:Fallback>
-      </mc:AlternateContent>
-      <p:sp>
-        <p:nvSpPr>
-          <p:cNvPr id="4" name="Textfeld 3"/>
-          <p:cNvSpPr txBox="1"/>
-          <p:nvPr/>
-        </p:nvSpPr>
-        <p:spPr>
-          <a:xfrm>
-            <a:off x="63165" y="59961"/>
-            <a:ext cx="1965332" cy="276999"/>
-          </a:xfrm>
-          <a:prstGeom prst="rect">
-            <a:avLst/>
-          </a:prstGeom>
-          <a:noFill/>
-        </p:spPr>
-        <p:txBody>
-          <a:bodyPr wrap="square" rtlCol="0">
-            <a:spAutoFit/>
-          </a:bodyPr>
-          <a:lstStyle/>
-          <a:p>
-            <a:r>
-              <a:rPr lang="en-US" sz="1200" b="1" dirty="0" smtClean="0">
-                <a:latin typeface="Arial" panose="020B0604020202020204" pitchFamily="34" charset="0"/>
-                <a:cs typeface="Arial" panose="020B0604020202020204" pitchFamily="34" charset="0"/>
-              </a:rPr>
-              <a:t>Evaluation and Ranking</a:t>
-            </a:r>
-            <a:endParaRPr lang="en-US" sz="1200" b="1" dirty="0">
-              <a:latin typeface="Arial" panose="020B0604020202020204" pitchFamily="34" charset="0"/>
-              <a:cs typeface="Arial" panose="020B0604020202020204" pitchFamily="34" charset="0"/>
-            </a:endParaRPr>
-          </a:p>
-        </p:txBody>
-      </p:sp>
-      <p:pic>
-        <p:nvPicPr>
-          <p:cNvPr id="8" name="Grafik 7"/>
-          <p:cNvPicPr>
-            <a:picLocks noChangeAspect="1"/>
-          </p:cNvPicPr>
-          <p:nvPr/>
-        </p:nvPicPr>
-        <p:blipFill>
-          <a:blip r:embed="rId3"/>
-          <a:stretch>
-            <a:fillRect/>
-          </a:stretch>
-        </p:blipFill>
-        <p:spPr>
-          <a:xfrm>
-            <a:off x="4392291" y="66413"/>
-            <a:ext cx="4688209" cy="4654550"/>
-          </a:xfrm>
-          <a:prstGeom prst="rect">
-            <a:avLst/>
-          </a:prstGeom>
-          <a:ln>
-            <a:solidFill>
-              <a:schemeClr val="tx1">
-                <a:lumMod val="75000"/>
-                <a:lumOff val="25000"/>
-              </a:schemeClr>
-            </a:solidFill>
-          </a:ln>
-        </p:spPr>
-      </p:pic>
-      <mc:AlternateContent xmlns:mc="http://schemas.openxmlformats.org/markup-compatibility/2006" xmlns:a14="http://schemas.microsoft.com/office/drawing/2010/main">
-        <mc:Choice Requires="a14">
-          <p:sp>
-            <p:nvSpPr>
-              <p:cNvPr id="9" name="Rechteck 8"/>
-              <p:cNvSpPr/>
-              <p:nvPr/>
-            </p:nvSpPr>
-            <p:spPr>
-              <a:xfrm>
-                <a:off x="7632700" y="3790950"/>
-                <a:ext cx="216000" cy="869950"/>
-              </a:xfrm>
-              <a:prstGeom prst="rect">
-                <a:avLst/>
-              </a:prstGeom>
-              <a:noFill/>
-              <a:ln>
-                <a:solidFill>
-                  <a:srgbClr val="FF0000"/>
-                </a:solidFill>
-              </a:ln>
-            </p:spPr>
-            <p:style>
-              <a:lnRef idx="2">
-                <a:schemeClr val="accent1">
-                  <a:shade val="50000"/>
-                </a:schemeClr>
-              </a:lnRef>
-              <a:fillRef idx="1">
-                <a:schemeClr val="accent1"/>
-              </a:fillRef>
-              <a:effectRef idx="0">
-                <a:schemeClr val="accent1"/>
-              </a:effectRef>
-              <a:fontRef idx="minor">
-                <a:schemeClr val="lt1"/>
-              </a:fontRef>
-            </p:style>
-            <p:txBody>
-              <a:bodyPr rtlCol="0" anchor="t"/>
-              <a:lstStyle/>
-              <a:p>
-                <a:pPr algn="ctr"/>
-                <a14:m>
-                  <m:oMathPara xmlns:m="http://schemas.openxmlformats.org/officeDocument/2006/math">
-                    <m:oMathParaPr>
-                      <m:jc m:val="center"/>
-                    </m:oMathParaPr>
-                    <m:oMath xmlns:m="http://schemas.openxmlformats.org/officeDocument/2006/math">
-                      <m:nary>
-                        <m:naryPr>
-                          <m:chr m:val="∑"/>
-                          <m:subHide m:val="on"/>
-                          <m:supHide m:val="on"/>
-                          <m:ctrlPr>
-                            <a:rPr lang="en-US" sz="600" i="1" smtClean="0">
-                              <a:solidFill>
-                                <a:srgbClr val="FF0000"/>
-                              </a:solidFill>
-                              <a:latin typeface="Cambria Math" panose="02040503050406030204" pitchFamily="18" charset="0"/>
-                            </a:rPr>
-                          </m:ctrlPr>
-                        </m:naryPr>
-                        <m:sub/>
-                        <m:sup/>
-                        <m:e>
-                          <m:r>
-                            <a:rPr lang="de-DE" sz="600" b="0" i="1" smtClean="0">
-                              <a:solidFill>
-                                <a:srgbClr val="FF0000"/>
-                              </a:solidFill>
-                              <a:latin typeface="Cambria Math" panose="02040503050406030204" pitchFamily="18" charset="0"/>
-                            </a:rPr>
-                            <m:t> </m:t>
-                          </m:r>
-                        </m:e>
-                      </m:nary>
-                    </m:oMath>
-                  </m:oMathPara>
-                </a14:m>
-                <a:endParaRPr lang="en-US" sz="600" dirty="0">
-                  <a:solidFill>
-                    <a:srgbClr val="FF0000"/>
-                  </a:solidFill>
-                </a:endParaRPr>
-              </a:p>
-            </p:txBody>
-          </p:sp>
-        </mc:Choice>
-        <mc:Fallback xmlns="">
-          <p:sp>
-            <p:nvSpPr>
-              <p:cNvPr id="9" name="Rechteck 8"/>
-              <p:cNvSpPr>
-                <a:spLocks noRot="1" noChangeAspect="1" noMove="1" noResize="1" noEditPoints="1" noAdjustHandles="1" noChangeArrowheads="1" noChangeShapeType="1" noTextEdit="1"/>
-              </p:cNvSpPr>
-              <p:nvPr/>
-            </p:nvSpPr>
-            <p:spPr>
-              <a:xfrm>
-                <a:off x="7632700" y="3790950"/>
-                <a:ext cx="216000" cy="869950"/>
-              </a:xfrm>
-              <a:prstGeom prst="rect">
-                <a:avLst/>
-              </a:prstGeom>
-              <a:blipFill rotWithShape="0">
-                <a:blip r:embed="rId4"/>
-                <a:stretch>
-                  <a:fillRect l="-115789" t="-34483" r="-63158"/>
-                </a:stretch>
-              </a:blipFill>
-              <a:ln>
-                <a:solidFill>
-                  <a:srgbClr val="FF0000"/>
-                </a:solidFill>
-              </a:ln>
-            </p:spPr>
-            <p:txBody>
-              <a:bodyPr/>
-              <a:lstStyle/>
-              <a:p>
-                <a:r>
-                  <a:rPr lang="en-US">
-                    <a:noFill/>
-                  </a:rPr>
-                  <a:t> </a:t>
-                </a:r>
-              </a:p>
-            </p:txBody>
-          </p:sp>
-        </mc:Fallback>
-      </mc:AlternateContent>
-      <mc:AlternateContent xmlns:mc="http://schemas.openxmlformats.org/markup-compatibility/2006" xmlns:a14="http://schemas.microsoft.com/office/drawing/2010/main">
-        <mc:Choice Requires="a14">
-          <p:sp>
-            <p:nvSpPr>
-              <p:cNvPr id="10" name="Rechteck 9"/>
-              <p:cNvSpPr/>
-              <p:nvPr/>
-            </p:nvSpPr>
-            <p:spPr>
-              <a:xfrm>
-                <a:off x="7880350" y="3790950"/>
-                <a:ext cx="216000" cy="869950"/>
-              </a:xfrm>
-              <a:prstGeom prst="rect">
-                <a:avLst/>
-              </a:prstGeom>
-              <a:noFill/>
-              <a:ln>
-                <a:solidFill>
-                  <a:srgbClr val="FF0000"/>
-                </a:solidFill>
-              </a:ln>
-            </p:spPr>
-            <p:style>
-              <a:lnRef idx="2">
-                <a:schemeClr val="accent1">
-                  <a:shade val="50000"/>
-                </a:schemeClr>
-              </a:lnRef>
-              <a:fillRef idx="1">
-                <a:schemeClr val="accent1"/>
-              </a:fillRef>
-              <a:effectRef idx="0">
-                <a:schemeClr val="accent1"/>
-              </a:effectRef>
-              <a:fontRef idx="minor">
-                <a:schemeClr val="lt1"/>
-              </a:fontRef>
-            </p:style>
-            <p:txBody>
-              <a:bodyPr rtlCol="0" anchor="t"/>
-              <a:lstStyle/>
-              <a:p>
-                <a:pPr algn="ctr"/>
-                <a14:m>
-                  <m:oMathPara xmlns:m="http://schemas.openxmlformats.org/officeDocument/2006/math">
-                    <m:oMathParaPr>
-                      <m:jc m:val="center"/>
-                    </m:oMathParaPr>
-                    <m:oMath xmlns:m="http://schemas.openxmlformats.org/officeDocument/2006/math">
-                      <m:nary>
-                        <m:naryPr>
-                          <m:chr m:val="∑"/>
-                          <m:subHide m:val="on"/>
-                          <m:supHide m:val="on"/>
-                          <m:ctrlPr>
-                            <a:rPr lang="en-US" sz="600" i="1" smtClean="0">
-                              <a:solidFill>
-                                <a:srgbClr val="FF0000"/>
-                              </a:solidFill>
-                              <a:latin typeface="Cambria Math" panose="02040503050406030204" pitchFamily="18" charset="0"/>
-                            </a:rPr>
-                          </m:ctrlPr>
-                        </m:naryPr>
-                        <m:sub/>
-                        <m:sup/>
-                        <m:e>
-                          <m:r>
-                            <a:rPr lang="de-DE" sz="600" b="0" i="1" smtClean="0">
-                              <a:solidFill>
-                                <a:srgbClr val="FF0000"/>
-                              </a:solidFill>
-                              <a:latin typeface="Cambria Math" panose="02040503050406030204" pitchFamily="18" charset="0"/>
-                            </a:rPr>
-                            <m:t> </m:t>
-                          </m:r>
-                        </m:e>
-                      </m:nary>
-                    </m:oMath>
-                  </m:oMathPara>
-                </a14:m>
-                <a:endParaRPr lang="en-US" sz="600" dirty="0">
-                  <a:solidFill>
-                    <a:srgbClr val="FF0000"/>
-                  </a:solidFill>
-                </a:endParaRPr>
-              </a:p>
-            </p:txBody>
-          </p:sp>
-        </mc:Choice>
-        <mc:Fallback xmlns="">
-          <p:sp>
-            <p:nvSpPr>
-              <p:cNvPr id="10" name="Rechteck 9"/>
-              <p:cNvSpPr>
-                <a:spLocks noRot="1" noChangeAspect="1" noMove="1" noResize="1" noEditPoints="1" noAdjustHandles="1" noChangeArrowheads="1" noChangeShapeType="1" noTextEdit="1"/>
-              </p:cNvSpPr>
-              <p:nvPr/>
-            </p:nvSpPr>
-            <p:spPr>
-              <a:xfrm>
-                <a:off x="7880350" y="3790950"/>
-                <a:ext cx="216000" cy="869950"/>
-              </a:xfrm>
-              <a:prstGeom prst="rect">
-                <a:avLst/>
-              </a:prstGeom>
-              <a:blipFill rotWithShape="0">
-                <a:blip r:embed="rId5"/>
-                <a:stretch>
-                  <a:fillRect l="-118919" t="-34483" r="-67568"/>
-                </a:stretch>
-              </a:blipFill>
-              <a:ln>
-                <a:solidFill>
-                  <a:srgbClr val="FF0000"/>
-                </a:solidFill>
-              </a:ln>
-            </p:spPr>
-            <p:txBody>
-              <a:bodyPr/>
-              <a:lstStyle/>
-              <a:p>
-                <a:r>
-                  <a:rPr lang="en-US">
-                    <a:noFill/>
-                  </a:rPr>
-                  <a:t> </a:t>
-                </a:r>
-              </a:p>
-            </p:txBody>
-          </p:sp>
-        </mc:Fallback>
-      </mc:AlternateContent>
-      <mc:AlternateContent xmlns:mc="http://schemas.openxmlformats.org/markup-compatibility/2006" xmlns:a14="http://schemas.microsoft.com/office/drawing/2010/main">
-        <mc:Choice Requires="a14">
-          <p:sp>
-            <p:nvSpPr>
-              <p:cNvPr id="11" name="Rechteck 10"/>
-              <p:cNvSpPr/>
-              <p:nvPr/>
-            </p:nvSpPr>
-            <p:spPr>
-              <a:xfrm>
-                <a:off x="8124775" y="3790950"/>
-                <a:ext cx="216000" cy="869950"/>
-              </a:xfrm>
-              <a:prstGeom prst="rect">
-                <a:avLst/>
-              </a:prstGeom>
-              <a:noFill/>
-              <a:ln>
-                <a:solidFill>
-                  <a:srgbClr val="FF0000"/>
-                </a:solidFill>
-              </a:ln>
-            </p:spPr>
-            <p:style>
-              <a:lnRef idx="2">
-                <a:schemeClr val="accent1">
-                  <a:shade val="50000"/>
-                </a:schemeClr>
-              </a:lnRef>
-              <a:fillRef idx="1">
-                <a:schemeClr val="accent1"/>
-              </a:fillRef>
-              <a:effectRef idx="0">
-                <a:schemeClr val="accent1"/>
-              </a:effectRef>
-              <a:fontRef idx="minor">
-                <a:schemeClr val="lt1"/>
-              </a:fontRef>
-            </p:style>
-            <p:txBody>
-              <a:bodyPr rtlCol="0" anchor="t"/>
-              <a:lstStyle/>
-              <a:p>
-                <a:pPr algn="ctr"/>
-                <a14:m>
-                  <m:oMathPara xmlns:m="http://schemas.openxmlformats.org/officeDocument/2006/math">
-                    <m:oMathParaPr>
-                      <m:jc m:val="center"/>
-                    </m:oMathParaPr>
-                    <m:oMath xmlns:m="http://schemas.openxmlformats.org/officeDocument/2006/math">
-                      <m:nary>
-                        <m:naryPr>
-                          <m:chr m:val="∑"/>
-                          <m:subHide m:val="on"/>
-                          <m:supHide m:val="on"/>
-                          <m:ctrlPr>
-                            <a:rPr lang="en-US" sz="600" i="1" smtClean="0">
-                              <a:solidFill>
-                                <a:srgbClr val="FF0000"/>
-                              </a:solidFill>
-                              <a:latin typeface="Cambria Math" panose="02040503050406030204" pitchFamily="18" charset="0"/>
-                            </a:rPr>
-                          </m:ctrlPr>
-                        </m:naryPr>
-                        <m:sub/>
-                        <m:sup/>
-                        <m:e>
-                          <m:r>
-                            <a:rPr lang="de-DE" sz="600" b="0" i="1" smtClean="0">
-                              <a:solidFill>
-                                <a:srgbClr val="FF0000"/>
-                              </a:solidFill>
-                              <a:latin typeface="Cambria Math" panose="02040503050406030204" pitchFamily="18" charset="0"/>
-                            </a:rPr>
-                            <m:t> </m:t>
-                          </m:r>
-                        </m:e>
-                      </m:nary>
-                    </m:oMath>
-                  </m:oMathPara>
-                </a14:m>
-                <a:endParaRPr lang="en-US" sz="600" dirty="0">
-                  <a:solidFill>
-                    <a:srgbClr val="FF0000"/>
-                  </a:solidFill>
-                </a:endParaRPr>
-              </a:p>
-            </p:txBody>
-          </p:sp>
-        </mc:Choice>
-        <mc:Fallback xmlns="">
-          <p:sp>
-            <p:nvSpPr>
-              <p:cNvPr id="11" name="Rechteck 10"/>
-              <p:cNvSpPr>
-                <a:spLocks noRot="1" noChangeAspect="1" noMove="1" noResize="1" noEditPoints="1" noAdjustHandles="1" noChangeArrowheads="1" noChangeShapeType="1" noTextEdit="1"/>
-              </p:cNvSpPr>
-              <p:nvPr/>
-            </p:nvSpPr>
-            <p:spPr>
-              <a:xfrm>
-                <a:off x="8124775" y="3790950"/>
-                <a:ext cx="216000" cy="869950"/>
-              </a:xfrm>
-              <a:prstGeom prst="rect">
-                <a:avLst/>
-              </a:prstGeom>
-              <a:blipFill rotWithShape="0">
-                <a:blip r:embed="rId5"/>
-                <a:stretch>
-                  <a:fillRect l="-118919" t="-34483" r="-67568"/>
-                </a:stretch>
-              </a:blipFill>
-              <a:ln>
-                <a:solidFill>
-                  <a:srgbClr val="FF0000"/>
-                </a:solidFill>
-              </a:ln>
-            </p:spPr>
-            <p:txBody>
-              <a:bodyPr/>
-              <a:lstStyle/>
-              <a:p>
-                <a:r>
-                  <a:rPr lang="en-US">
-                    <a:noFill/>
-                  </a:rPr>
-                  <a:t> </a:t>
-                </a:r>
-              </a:p>
-            </p:txBody>
-          </p:sp>
-        </mc:Fallback>
-      </mc:AlternateContent>
-      <p:cxnSp>
-        <p:nvCxnSpPr>
-          <p:cNvPr id="13" name="Gewinkelte Verbindung 12"/>
-          <p:cNvCxnSpPr>
-            <a:stCxn id="9" idx="0"/>
-          </p:cNvCxnSpPr>
-          <p:nvPr/>
-        </p:nvCxnSpPr>
-        <p:spPr>
-          <a:xfrm rot="16200000" flipV="1">
-            <a:off x="5838850" y="1889100"/>
-            <a:ext cx="2527300" cy="1276400"/>
-          </a:xfrm>
-          <a:prstGeom prst="bentConnector3">
-            <a:avLst>
-              <a:gd name="adj1" fmla="val 100000"/>
-            </a:avLst>
-          </a:prstGeom>
-          <a:ln>
-            <a:solidFill>
-              <a:srgbClr val="FF0000"/>
-            </a:solidFill>
-            <a:tailEnd type="triangle"/>
-          </a:ln>
-        </p:spPr>
-        <p:style>
-          <a:lnRef idx="1">
-            <a:schemeClr val="accent1"/>
-          </a:lnRef>
-          <a:fillRef idx="0">
-            <a:schemeClr val="accent1"/>
-          </a:fillRef>
-          <a:effectRef idx="0">
-            <a:schemeClr val="accent1"/>
-          </a:effectRef>
-          <a:fontRef idx="minor">
-            <a:schemeClr val="tx1"/>
-          </a:fontRef>
-        </p:style>
-      </p:cxnSp>
-      <p:cxnSp>
-        <p:nvCxnSpPr>
-          <p:cNvPr id="16" name="Gewinkelte Verbindung 15"/>
-          <p:cNvCxnSpPr>
-            <a:stCxn id="10" idx="0"/>
-          </p:cNvCxnSpPr>
-          <p:nvPr/>
-        </p:nvCxnSpPr>
-        <p:spPr>
-          <a:xfrm rot="16200000" flipV="1">
-            <a:off x="6121425" y="1924025"/>
-            <a:ext cx="2209800" cy="1524050"/>
-          </a:xfrm>
-          <a:prstGeom prst="bentConnector3">
-            <a:avLst>
-              <a:gd name="adj1" fmla="val 100000"/>
-            </a:avLst>
-          </a:prstGeom>
-          <a:ln>
-            <a:solidFill>
-              <a:srgbClr val="FF0000"/>
-            </a:solidFill>
-            <a:tailEnd type="triangle"/>
-          </a:ln>
-        </p:spPr>
-        <p:style>
-          <a:lnRef idx="1">
-            <a:schemeClr val="accent1"/>
-          </a:lnRef>
-          <a:fillRef idx="0">
-            <a:schemeClr val="accent1"/>
-          </a:fillRef>
-          <a:effectRef idx="0">
-            <a:schemeClr val="accent1"/>
-          </a:effectRef>
-          <a:fontRef idx="minor">
-            <a:schemeClr val="tx1"/>
-          </a:fontRef>
-        </p:style>
-      </p:cxnSp>
-      <p:cxnSp>
-        <p:nvCxnSpPr>
-          <p:cNvPr id="20" name="Gewinkelte Verbindung 19"/>
-          <p:cNvCxnSpPr>
-            <a:stCxn id="11" idx="0"/>
-          </p:cNvCxnSpPr>
-          <p:nvPr/>
-        </p:nvCxnSpPr>
-        <p:spPr>
-          <a:xfrm rot="16200000" flipV="1">
-            <a:off x="6415088" y="1973262"/>
-            <a:ext cx="1866900" cy="1768475"/>
-          </a:xfrm>
-          <a:prstGeom prst="bentConnector3">
-            <a:avLst>
-              <a:gd name="adj1" fmla="val 100000"/>
-            </a:avLst>
-          </a:prstGeom>
-          <a:ln>
-            <a:solidFill>
-              <a:srgbClr val="FF0000"/>
-            </a:solidFill>
-            <a:tailEnd type="triangle"/>
-          </a:ln>
-        </p:spPr>
-        <p:style>
-          <a:lnRef idx="1">
-            <a:schemeClr val="accent1"/>
-          </a:lnRef>
-          <a:fillRef idx="0">
-            <a:schemeClr val="accent1"/>
-          </a:fillRef>
-          <a:effectRef idx="0">
-            <a:schemeClr val="accent1"/>
-          </a:effectRef>
-          <a:fontRef idx="minor">
-            <a:schemeClr val="tx1"/>
-          </a:fontRef>
-        </p:style>
-      </p:cxnSp>
-      <p:sp>
-        <p:nvSpPr>
-          <p:cNvPr id="26" name="Geschweifte Klammer links 25"/>
-          <p:cNvSpPr/>
-          <p:nvPr/>
-        </p:nvSpPr>
-        <p:spPr>
-          <a:xfrm>
-            <a:off x="4284292" y="2686049"/>
-            <a:ext cx="46359" cy="825501"/>
-          </a:xfrm>
-          <a:prstGeom prst="leftBrace">
-            <a:avLst/>
-          </a:prstGeom>
-          <a:ln>
-            <a:solidFill>
-              <a:srgbClr val="FF0000"/>
-            </a:solidFill>
-          </a:ln>
-        </p:spPr>
-        <p:style>
-          <a:lnRef idx="1">
-            <a:schemeClr val="accent1"/>
-          </a:lnRef>
-          <a:fillRef idx="0">
-            <a:schemeClr val="accent1"/>
-          </a:fillRef>
-          <a:effectRef idx="0">
-            <a:schemeClr val="accent1"/>
-          </a:effectRef>
-          <a:fontRef idx="minor">
-            <a:schemeClr val="tx1"/>
-          </a:fontRef>
-        </p:style>
-        <p:txBody>
-          <a:bodyPr rtlCol="0" anchor="ctr"/>
-          <a:lstStyle/>
-          <a:p>
-            <a:pPr algn="ctr"/>
-            <a:endParaRPr lang="en-US"/>
-          </a:p>
-        </p:txBody>
-      </p:sp>
-      <p:cxnSp>
-        <p:nvCxnSpPr>
-          <p:cNvPr id="27" name="Gewinkelte Verbindung 26"/>
-          <p:cNvCxnSpPr>
-            <a:stCxn id="26" idx="1"/>
-          </p:cNvCxnSpPr>
-          <p:nvPr/>
-        </p:nvCxnSpPr>
-        <p:spPr>
-          <a:xfrm rot="10800000" flipH="1" flipV="1">
-            <a:off x="4284292" y="3098800"/>
-            <a:ext cx="198808" cy="1079500"/>
-          </a:xfrm>
-          <a:prstGeom prst="bentConnector4">
-            <a:avLst>
-              <a:gd name="adj1" fmla="val -41522"/>
-              <a:gd name="adj2" fmla="val 100294"/>
-            </a:avLst>
-          </a:prstGeom>
-          <a:ln>
-            <a:solidFill>
-              <a:srgbClr val="FF0000"/>
-            </a:solidFill>
-            <a:tailEnd type="triangle"/>
-          </a:ln>
-        </p:spPr>
-        <p:style>
-          <a:lnRef idx="1">
-            <a:schemeClr val="accent1"/>
-          </a:lnRef>
-          <a:fillRef idx="0">
-            <a:schemeClr val="accent1"/>
-          </a:fillRef>
-          <a:effectRef idx="0">
-            <a:schemeClr val="accent1"/>
-          </a:effectRef>
-          <a:fontRef idx="minor">
-            <a:schemeClr val="tx1"/>
-          </a:fontRef>
-        </p:style>
-      </p:cxnSp>
-      <p:sp>
-        <p:nvSpPr>
-          <p:cNvPr id="33" name="Textfeld 32"/>
-          <p:cNvSpPr txBox="1"/>
-          <p:nvPr/>
-        </p:nvSpPr>
-        <p:spPr>
-          <a:xfrm rot="16200000">
-            <a:off x="3418182" y="3515439"/>
-            <a:ext cx="1270000" cy="246221"/>
-          </a:xfrm>
-          <a:prstGeom prst="rect">
-            <a:avLst/>
-          </a:prstGeom>
-          <a:noFill/>
-        </p:spPr>
-        <p:txBody>
-          <a:bodyPr wrap="square" lIns="0" tIns="0" rIns="0" bIns="0" rtlCol="0" anchor="ctr">
-            <a:spAutoFit/>
-          </a:bodyPr>
-          <a:lstStyle/>
-          <a:p>
-            <a:pPr algn="ctr"/>
-            <a:r>
-              <a:rPr lang="en-US" sz="800" dirty="0" smtClean="0">
-                <a:solidFill>
-                  <a:srgbClr val="FF0000"/>
-                </a:solidFill>
-                <a:latin typeface="Arial" panose="020B0604020202020204" pitchFamily="34" charset="0"/>
-                <a:cs typeface="Arial" panose="020B0604020202020204" pitchFamily="34" charset="0"/>
-              </a:rPr>
-              <a:t>Summary of the consumables of each RS</a:t>
-            </a:r>
-          </a:p>
-        </p:txBody>
-      </p:sp>
-      <p:sp>
-        <p:nvSpPr>
-          <p:cNvPr id="36" name="Rechteck 35"/>
-          <p:cNvSpPr/>
-          <p:nvPr/>
-        </p:nvSpPr>
-        <p:spPr>
-          <a:xfrm>
-            <a:off x="4775200" y="5038463"/>
-            <a:ext cx="4368800" cy="553998"/>
-          </a:xfrm>
-          <a:prstGeom prst="rect">
-            <a:avLst/>
-          </a:prstGeom>
-        </p:spPr>
-        <p:txBody>
-          <a:bodyPr wrap="square">
-            <a:spAutoFit/>
-          </a:bodyPr>
-          <a:lstStyle/>
-          <a:p>
-            <a:pPr lvl="0"/>
-            <a:r>
-              <a:rPr lang="en-US" altLang="de-DE" sz="1000" dirty="0">
-                <a:solidFill>
-                  <a:prstClr val="black"/>
-                </a:solidFill>
-                <a:latin typeface="Arial" panose="020B0604020202020204" pitchFamily="34" charset="0"/>
-                <a:cs typeface="Arial" panose="020B0604020202020204" pitchFamily="34" charset="0"/>
-              </a:rPr>
-              <a:t>Coming soon:</a:t>
-            </a:r>
-            <a:br>
-              <a:rPr lang="en-US" altLang="de-DE" sz="1000" dirty="0">
-                <a:solidFill>
-                  <a:prstClr val="black"/>
-                </a:solidFill>
-                <a:latin typeface="Arial" panose="020B0604020202020204" pitchFamily="34" charset="0"/>
-                <a:cs typeface="Arial" panose="020B0604020202020204" pitchFamily="34" charset="0"/>
-              </a:rPr>
-            </a:br>
-            <a:r>
-              <a:rPr lang="en-US" altLang="de-DE" sz="1000" dirty="0">
-                <a:solidFill>
-                  <a:prstClr val="black"/>
-                </a:solidFill>
-                <a:latin typeface="Arial" panose="020B0604020202020204" pitchFamily="34" charset="0"/>
-                <a:cs typeface="Arial" panose="020B0604020202020204" pitchFamily="34" charset="0"/>
-              </a:rPr>
-              <a:t/>
-            </a:r>
-            <a:br>
-              <a:rPr lang="en-US" altLang="de-DE" sz="1000" dirty="0">
-                <a:solidFill>
-                  <a:prstClr val="black"/>
-                </a:solidFill>
-                <a:latin typeface="Arial" panose="020B0604020202020204" pitchFamily="34" charset="0"/>
-                <a:cs typeface="Arial" panose="020B0604020202020204" pitchFamily="34" charset="0"/>
-              </a:rPr>
-            </a:br>
-            <a:r>
-              <a:rPr lang="en-US" altLang="de-DE" sz="1000" b="1" dirty="0">
-                <a:solidFill>
-                  <a:prstClr val="black"/>
-                </a:solidFill>
-                <a:latin typeface="Arial" panose="020B0604020202020204" pitchFamily="34" charset="0"/>
-                <a:cs typeface="Arial" panose="020B0604020202020204" pitchFamily="34" charset="0"/>
-              </a:rPr>
-              <a:t>CRITIC</a:t>
-            </a:r>
-            <a:r>
-              <a:rPr lang="en-US" altLang="de-DE" sz="1000" dirty="0">
-                <a:solidFill>
-                  <a:prstClr val="black"/>
-                </a:solidFill>
-                <a:latin typeface="Arial" panose="020B0604020202020204" pitchFamily="34" charset="0"/>
-                <a:cs typeface="Arial" panose="020B0604020202020204" pitchFamily="34" charset="0"/>
-              </a:rPr>
-              <a:t> (</a:t>
-            </a:r>
-            <a:r>
-              <a:rPr lang="en-US" altLang="de-DE" sz="1000" dirty="0" err="1">
-                <a:solidFill>
-                  <a:prstClr val="black"/>
-                </a:solidFill>
-                <a:latin typeface="Arial" panose="020B0604020202020204" pitchFamily="34" charset="0"/>
-                <a:cs typeface="Arial" panose="020B0604020202020204" pitchFamily="34" charset="0"/>
-              </a:rPr>
-              <a:t>CRiteria</a:t>
-            </a:r>
-            <a:r>
-              <a:rPr lang="en-US" altLang="de-DE" sz="1000" dirty="0">
-                <a:solidFill>
-                  <a:prstClr val="black"/>
-                </a:solidFill>
-                <a:latin typeface="Arial" panose="020B0604020202020204" pitchFamily="34" charset="0"/>
-                <a:cs typeface="Arial" panose="020B0604020202020204" pitchFamily="34" charset="0"/>
-              </a:rPr>
-              <a:t> Importance Through </a:t>
-            </a:r>
-            <a:r>
-              <a:rPr lang="en-US" altLang="de-DE" sz="1000" dirty="0" err="1">
-                <a:solidFill>
-                  <a:prstClr val="black"/>
-                </a:solidFill>
-                <a:latin typeface="Arial" panose="020B0604020202020204" pitchFamily="34" charset="0"/>
-                <a:cs typeface="Arial" panose="020B0604020202020204" pitchFamily="34" charset="0"/>
-              </a:rPr>
-              <a:t>Intercriteria</a:t>
-            </a:r>
-            <a:r>
-              <a:rPr lang="en-US" altLang="de-DE" sz="1000" dirty="0">
-                <a:solidFill>
-                  <a:prstClr val="black"/>
-                </a:solidFill>
-                <a:latin typeface="Arial" panose="020B0604020202020204" pitchFamily="34" charset="0"/>
-                <a:cs typeface="Arial" panose="020B0604020202020204" pitchFamily="34" charset="0"/>
-              </a:rPr>
-              <a:t> Correlation</a:t>
-            </a:r>
-            <a:r>
-              <a:rPr lang="en-US" altLang="de-DE" sz="1000" dirty="0" smtClean="0">
-                <a:solidFill>
-                  <a:prstClr val="black"/>
-                </a:solidFill>
-                <a:latin typeface="Arial" panose="020B0604020202020204" pitchFamily="34" charset="0"/>
-                <a:cs typeface="Arial" panose="020B0604020202020204" pitchFamily="34" charset="0"/>
-              </a:rPr>
-              <a:t>)</a:t>
-            </a:r>
-            <a:endParaRPr lang="en-US" altLang="de-DE" sz="1000" u="sng" dirty="0">
-              <a:solidFill>
-                <a:prstClr val="black"/>
-              </a:solidFill>
-              <a:latin typeface="Arial" panose="020B0604020202020204" pitchFamily="34" charset="0"/>
-              <a:cs typeface="Arial" panose="020B0604020202020204" pitchFamily="34" charset="0"/>
-            </a:endParaRPr>
-          </a:p>
-        </p:txBody>
-      </p:sp>
-    </p:spTree>
-    <p:extLst>
-      <p:ext uri="{BB962C8B-B14F-4D97-AF65-F5344CB8AC3E}">
-        <p14:creationId xmlns:p14="http://schemas.microsoft.com/office/powerpoint/2010/main" val="561935692"/>
-      </p:ext>
-    </p:extLst>
-  </p:cSld>
-  <p:clrMapOvr>
-    <a:masterClrMapping/>
-  </p:clrMapOvr>
 </p:sld>
 </file>
 

</xml_diff>

<commit_message>
Cleaning up for publishing...
</commit_message>
<xml_diff>
--- a/docs/docu_v1.pptx
+++ b/docs/docu_v1.pptx
@@ -8,14 +8,14 @@
     <p:sldId id="266" r:id="rId2"/>
     <p:sldId id="269" r:id="rId3"/>
     <p:sldId id="270" r:id="rId4"/>
-    <p:sldId id="259" r:id="rId5"/>
-    <p:sldId id="262" r:id="rId6"/>
-    <p:sldId id="265" r:id="rId7"/>
-    <p:sldId id="261" r:id="rId8"/>
-    <p:sldId id="257" r:id="rId9"/>
-    <p:sldId id="267" r:id="rId10"/>
-    <p:sldId id="260" r:id="rId11"/>
-    <p:sldId id="268" r:id="rId12"/>
+    <p:sldId id="268" r:id="rId5"/>
+    <p:sldId id="259" r:id="rId6"/>
+    <p:sldId id="262" r:id="rId7"/>
+    <p:sldId id="265" r:id="rId8"/>
+    <p:sldId id="261" r:id="rId9"/>
+    <p:sldId id="257" r:id="rId10"/>
+    <p:sldId id="267" r:id="rId11"/>
+    <p:sldId id="260" r:id="rId12"/>
     <p:sldId id="264" r:id="rId13"/>
     <p:sldId id="256" r:id="rId14"/>
     <p:sldId id="258" r:id="rId15"/>
@@ -125,6 +125,7 @@
             <p14:sldId id="266"/>
             <p14:sldId id="269"/>
             <p14:sldId id="270"/>
+            <p14:sldId id="268"/>
             <p14:sldId id="259"/>
             <p14:sldId id="262"/>
             <p14:sldId id="265"/>
@@ -132,7 +133,6 @@
             <p14:sldId id="257"/>
             <p14:sldId id="267"/>
             <p14:sldId id="260"/>
-            <p14:sldId id="268"/>
             <p14:sldId id="264"/>
           </p14:sldIdLst>
         </p14:section>
@@ -147,6 +147,11 @@
     <p:ext uri="{EFAFB233-063F-42B5-8137-9DF3F51BA10A}">
       <p15:sldGuideLst xmlns:p15="http://schemas.microsoft.com/office/powerpoint/2012/main">
         <p15:guide id="1" orient="horz" pos="1800" userDrawn="1">
+          <p15:clr>
+            <a:srgbClr val="A4A3A4"/>
+          </p15:clr>
+        </p15:guide>
+        <p15:guide id="2" pos="2880">
           <p15:clr>
             <a:srgbClr val="A4A3A4"/>
           </p15:clr>
@@ -288,7 +293,7 @@
           <a:p>
             <a:fld id="{40AC6573-0F6A-409A-81A3-E5A359E080D0}" type="datetimeFigureOut">
               <a:rPr lang="en-US" smtClean="0"/>
-              <a:t>1/20/2021</a:t>
+              <a:t>2/4/2021</a:t>
             </a:fld>
             <a:endParaRPr lang="en-US"/>
           </a:p>
@@ -458,7 +463,7 @@
           <a:p>
             <a:fld id="{40AC6573-0F6A-409A-81A3-E5A359E080D0}" type="datetimeFigureOut">
               <a:rPr lang="en-US" smtClean="0"/>
-              <a:t>1/20/2021</a:t>
+              <a:t>2/4/2021</a:t>
             </a:fld>
             <a:endParaRPr lang="en-US"/>
           </a:p>
@@ -638,7 +643,7 @@
           <a:p>
             <a:fld id="{40AC6573-0F6A-409A-81A3-E5A359E080D0}" type="datetimeFigureOut">
               <a:rPr lang="en-US" smtClean="0"/>
-              <a:t>1/20/2021</a:t>
+              <a:t>2/4/2021</a:t>
             </a:fld>
             <a:endParaRPr lang="en-US"/>
           </a:p>
@@ -808,7 +813,7 @@
           <a:p>
             <a:fld id="{40AC6573-0F6A-409A-81A3-E5A359E080D0}" type="datetimeFigureOut">
               <a:rPr lang="en-US" smtClean="0"/>
-              <a:t>1/20/2021</a:t>
+              <a:t>2/4/2021</a:t>
             </a:fld>
             <a:endParaRPr lang="en-US"/>
           </a:p>
@@ -1054,7 +1059,7 @@
           <a:p>
             <a:fld id="{40AC6573-0F6A-409A-81A3-E5A359E080D0}" type="datetimeFigureOut">
               <a:rPr lang="en-US" smtClean="0"/>
-              <a:t>1/20/2021</a:t>
+              <a:t>2/4/2021</a:t>
             </a:fld>
             <a:endParaRPr lang="en-US"/>
           </a:p>
@@ -1286,7 +1291,7 @@
           <a:p>
             <a:fld id="{40AC6573-0F6A-409A-81A3-E5A359E080D0}" type="datetimeFigureOut">
               <a:rPr lang="en-US" smtClean="0"/>
-              <a:t>1/20/2021</a:t>
+              <a:t>2/4/2021</a:t>
             </a:fld>
             <a:endParaRPr lang="en-US"/>
           </a:p>
@@ -1653,7 +1658,7 @@
           <a:p>
             <a:fld id="{40AC6573-0F6A-409A-81A3-E5A359E080D0}" type="datetimeFigureOut">
               <a:rPr lang="en-US" smtClean="0"/>
-              <a:t>1/20/2021</a:t>
+              <a:t>2/4/2021</a:t>
             </a:fld>
             <a:endParaRPr lang="en-US"/>
           </a:p>
@@ -1771,7 +1776,7 @@
           <a:p>
             <a:fld id="{40AC6573-0F6A-409A-81A3-E5A359E080D0}" type="datetimeFigureOut">
               <a:rPr lang="en-US" smtClean="0"/>
-              <a:t>1/20/2021</a:t>
+              <a:t>2/4/2021</a:t>
             </a:fld>
             <a:endParaRPr lang="en-US"/>
           </a:p>
@@ -1866,7 +1871,7 @@
           <a:p>
             <a:fld id="{40AC6573-0F6A-409A-81A3-E5A359E080D0}" type="datetimeFigureOut">
               <a:rPr lang="en-US" smtClean="0"/>
-              <a:t>1/20/2021</a:t>
+              <a:t>2/4/2021</a:t>
             </a:fld>
             <a:endParaRPr lang="en-US"/>
           </a:p>
@@ -2143,7 +2148,7 @@
           <a:p>
             <a:fld id="{40AC6573-0F6A-409A-81A3-E5A359E080D0}" type="datetimeFigureOut">
               <a:rPr lang="en-US" smtClean="0"/>
-              <a:t>1/20/2021</a:t>
+              <a:t>2/4/2021</a:t>
             </a:fld>
             <a:endParaRPr lang="en-US"/>
           </a:p>
@@ -2400,7 +2405,7 @@
           <a:p>
             <a:fld id="{40AC6573-0F6A-409A-81A3-E5A359E080D0}" type="datetimeFigureOut">
               <a:rPr lang="en-US" smtClean="0"/>
-              <a:t>1/20/2021</a:t>
+              <a:t>2/4/2021</a:t>
             </a:fld>
             <a:endParaRPr lang="en-US"/>
           </a:p>
@@ -2613,7 +2618,7 @@
           <a:p>
             <a:fld id="{40AC6573-0F6A-409A-81A3-E5A359E080D0}" type="datetimeFigureOut">
               <a:rPr lang="en-US" smtClean="0"/>
-              <a:t>1/20/2021</a:t>
+              <a:t>2/4/2021</a:t>
             </a:fld>
             <a:endParaRPr lang="en-US"/>
           </a:p>
@@ -3097,6 +3102,124 @@
 </file>
 
 <file path=ppt/slides/slide10.xml><?xml version="1.0" encoding="utf-8"?>
+<p:sld xmlns:a="http://schemas.openxmlformats.org/drawingml/2006/main" xmlns:r="http://schemas.openxmlformats.org/officeDocument/2006/relationships" xmlns:p="http://schemas.openxmlformats.org/presentationml/2006/main">
+  <p:cSld>
+    <p:spTree>
+      <p:nvGrpSpPr>
+        <p:cNvPr id="1" name=""/>
+        <p:cNvGrpSpPr/>
+        <p:nvPr/>
+      </p:nvGrpSpPr>
+      <p:grpSpPr>
+        <a:xfrm>
+          <a:off x="0" y="0"/>
+          <a:ext cx="0" cy="0"/>
+          <a:chOff x="0" y="0"/>
+          <a:chExt cx="0" cy="0"/>
+        </a:xfrm>
+      </p:grpSpPr>
+      <p:sp>
+        <p:nvSpPr>
+          <p:cNvPr id="2" name="Titel 1"/>
+          <p:cNvSpPr>
+            <a:spLocks noGrp="1"/>
+          </p:cNvSpPr>
+          <p:nvPr>
+            <p:ph type="title"/>
+          </p:nvPr>
+        </p:nvSpPr>
+        <p:spPr>
+          <a:xfrm>
+            <a:off x="628650" y="291571"/>
+            <a:ext cx="7886700" cy="1104636"/>
+          </a:xfrm>
+        </p:spPr>
+        <p:txBody>
+          <a:bodyPr/>
+          <a:lstStyle/>
+          <a:p>
+            <a:r>
+              <a:rPr lang="en-US" b="1" dirty="0" smtClean="0"/>
+              <a:t>Multi Criteria Decision Analysis</a:t>
+            </a:r>
+            <a:endParaRPr lang="en-US" b="1" dirty="0"/>
+          </a:p>
+        </p:txBody>
+      </p:sp>
+      <p:sp>
+        <p:nvSpPr>
+          <p:cNvPr id="3" name="Inhaltsplatzhalter 2"/>
+          <p:cNvSpPr>
+            <a:spLocks noGrp="1"/>
+          </p:cNvSpPr>
+          <p:nvPr>
+            <p:ph idx="1"/>
+          </p:nvPr>
+        </p:nvSpPr>
+        <p:spPr/>
+        <p:txBody>
+          <a:bodyPr/>
+          <a:lstStyle/>
+          <a:p>
+            <a:pPr marL="0" indent="0">
+              <a:buNone/>
+            </a:pPr>
+            <a:r>
+              <a:rPr lang="en-US" dirty="0"/>
+              <a:t>Which combination of Resource Skills can execute all </a:t>
+            </a:r>
+            <a:r>
+              <a:rPr lang="en-US" dirty="0" smtClean="0"/>
+              <a:t/>
+            </a:r>
+            <a:br>
+              <a:rPr lang="en-US" dirty="0" smtClean="0"/>
+            </a:br>
+            <a:r>
+              <a:rPr lang="en-US" dirty="0" smtClean="0"/>
+              <a:t>Part Manufacturing </a:t>
+            </a:r>
+            <a:r>
+              <a:rPr lang="en-US" dirty="0"/>
+              <a:t>Process </a:t>
+            </a:r>
+            <a:r>
+              <a:rPr lang="en-US" dirty="0" smtClean="0"/>
+              <a:t>Steps with </a:t>
+            </a:r>
+            <a:r>
+              <a:rPr lang="en-US" dirty="0"/>
+              <a:t>the defined Constraints and has the “best” evaluation criteria (price, time, CO2-e, </a:t>
+            </a:r>
+            <a:r>
+              <a:rPr lang="en-US" dirty="0" smtClean="0"/>
+              <a:t>…)?</a:t>
+            </a:r>
+            <a:endParaRPr lang="en-US" dirty="0"/>
+          </a:p>
+        </p:txBody>
+      </p:sp>
+    </p:spTree>
+    <p:extLst>
+      <p:ext uri="{BB962C8B-B14F-4D97-AF65-F5344CB8AC3E}">
+        <p14:creationId xmlns:p14="http://schemas.microsoft.com/office/powerpoint/2010/main" val="161296006"/>
+      </p:ext>
+    </p:extLst>
+  </p:cSld>
+  <p:clrMapOvr>
+    <a:masterClrMapping/>
+  </p:clrMapOvr>
+  <p:timing>
+    <p:tnLst>
+      <p:par>
+        <p:cTn id="1" dur="indefinite" restart="never" nodeType="tmRoot"/>
+      </p:par>
+    </p:tnLst>
+  </p:timing>
+</p:sld>
+</file>
+
+<file path=ppt/slides/slide11.xml><?xml version="1.0" encoding="utf-8"?>
 <p:sld xmlns:a="http://schemas.openxmlformats.org/drawingml/2006/main" xmlns:r="http://schemas.openxmlformats.org/officeDocument/2006/relationships" xmlns:p="http://schemas.openxmlformats.org/presentationml/2006/main">
   <p:cSld>
     <p:spTree>
@@ -4299,36 +4422,6 @@
       </p:par>
     </p:tnLst>
   </p:timing>
-</p:sld>
-</file>
-
-<file path=ppt/slides/slide11.xml><?xml version="1.0" encoding="utf-8"?>
-<p:sld xmlns:a="http://schemas.openxmlformats.org/drawingml/2006/main" xmlns:r="http://schemas.openxmlformats.org/officeDocument/2006/relationships" xmlns:p="http://schemas.openxmlformats.org/presentationml/2006/main">
-  <p:cSld>
-    <p:spTree>
-      <p:nvGrpSpPr>
-        <p:cNvPr id="1" name=""/>
-        <p:cNvGrpSpPr/>
-        <p:nvPr/>
-      </p:nvGrpSpPr>
-      <p:grpSpPr>
-        <a:xfrm>
-          <a:off x="0" y="0"/>
-          <a:ext cx="0" cy="0"/>
-          <a:chOff x="0" y="0"/>
-          <a:chExt cx="0" cy="0"/>
-        </a:xfrm>
-      </p:grpSpPr>
-    </p:spTree>
-    <p:extLst>
-      <p:ext uri="{BB962C8B-B14F-4D97-AF65-F5344CB8AC3E}">
-        <p14:creationId xmlns:p14="http://schemas.microsoft.com/office/powerpoint/2010/main" val="1514780008"/>
-      </p:ext>
-    </p:extLst>
-  </p:cSld>
-  <p:clrMapOvr>
-    <a:masterClrMapping/>
-  </p:clrMapOvr>
 </p:sld>
 </file>
 
@@ -7310,10 +7403,6 @@
                         </a:rPr>
                         <a:t>: Float</a:t>
                       </a:r>
-                      <a:endParaRPr lang="en-US" sz="800" b="0" dirty="0" smtClean="0">
-                        <a:latin typeface="Arial" panose="020B0604020202020204" pitchFamily="34" charset="0"/>
-                        <a:cs typeface="Arial" panose="020B0604020202020204" pitchFamily="34" charset="0"/>
-                      </a:endParaRPr>
                     </a:p>
                   </a:txBody>
                   <a:tcPr marR="0" marT="0" marB="0" anchor="ctr">
@@ -7367,10 +7456,6 @@
                         </a:rPr>
                         <a:t>: Float</a:t>
                       </a:r>
-                      <a:endParaRPr lang="en-US" sz="800" b="0" dirty="0" smtClean="0">
-                        <a:latin typeface="Arial" panose="020B0604020202020204" pitchFamily="34" charset="0"/>
-                        <a:cs typeface="Arial" panose="020B0604020202020204" pitchFamily="34" charset="0"/>
-                      </a:endParaRPr>
                     </a:p>
                   </a:txBody>
                   <a:tcPr marR="0" marT="0" marB="0" anchor="ctr">
@@ -7417,10 +7502,6 @@
                         </a:rPr>
                         <a:t>variable_co2: Float</a:t>
                       </a:r>
-                      <a:endParaRPr lang="en-US" sz="800" b="0" dirty="0" smtClean="0">
-                        <a:latin typeface="Arial" panose="020B0604020202020204" pitchFamily="34" charset="0"/>
-                        <a:cs typeface="Arial" panose="020B0604020202020204" pitchFamily="34" charset="0"/>
-                      </a:endParaRPr>
                     </a:p>
                   </a:txBody>
                   <a:tcPr marR="0" marT="0" marB="0" anchor="ctr">
@@ -7474,10 +7555,6 @@
                         </a:rPr>
                         <a:t>: Float</a:t>
                       </a:r>
-                      <a:endParaRPr lang="en-US" sz="800" b="0" dirty="0" smtClean="0">
-                        <a:latin typeface="Arial" panose="020B0604020202020204" pitchFamily="34" charset="0"/>
-                        <a:cs typeface="Arial" panose="020B0604020202020204" pitchFamily="34" charset="0"/>
-                      </a:endParaRPr>
                     </a:p>
                   </a:txBody>
                   <a:tcPr marR="0" marT="0" marB="0" anchor="ctr">
@@ -7531,10 +7608,6 @@
                         </a:rPr>
                         <a:t>: Float</a:t>
                       </a:r>
-                      <a:endParaRPr lang="en-US" sz="800" b="0" dirty="0" smtClean="0">
-                        <a:latin typeface="Arial" panose="020B0604020202020204" pitchFamily="34" charset="0"/>
-                        <a:cs typeface="Arial" panose="020B0604020202020204" pitchFamily="34" charset="0"/>
-                      </a:endParaRPr>
                     </a:p>
                   </a:txBody>
                   <a:tcPr marR="0" marT="0" marB="0" anchor="ctr">
@@ -7863,10 +7936,6 @@
                         </a:rPr>
                         <a:t>: Float</a:t>
                       </a:r>
-                      <a:endParaRPr lang="en-US" sz="800" b="0" dirty="0" smtClean="0">
-                        <a:latin typeface="Arial" panose="020B0604020202020204" pitchFamily="34" charset="0"/>
-                        <a:cs typeface="Arial" panose="020B0604020202020204" pitchFamily="34" charset="0"/>
-                      </a:endParaRPr>
                     </a:p>
                   </a:txBody>
                   <a:tcPr marR="0" marT="0" marB="0" anchor="ctr">
@@ -7913,10 +7982,6 @@
                         </a:rPr>
                         <a:t>variable_co2: Float</a:t>
                       </a:r>
-                      <a:endParaRPr lang="en-US" sz="800" b="0" dirty="0" smtClean="0">
-                        <a:latin typeface="Arial" panose="020B0604020202020204" pitchFamily="34" charset="0"/>
-                        <a:cs typeface="Arial" panose="020B0604020202020204" pitchFamily="34" charset="0"/>
-                      </a:endParaRPr>
                     </a:p>
                   </a:txBody>
                   <a:tcPr marR="0" marT="0" marB="0" anchor="ctr">
@@ -7970,10 +8035,6 @@
                         </a:rPr>
                         <a:t>: Float</a:t>
                       </a:r>
-                      <a:endParaRPr lang="en-US" sz="800" b="0" dirty="0" smtClean="0">
-                        <a:latin typeface="Arial" panose="020B0604020202020204" pitchFamily="34" charset="0"/>
-                        <a:cs typeface="Arial" panose="020B0604020202020204" pitchFamily="34" charset="0"/>
-                      </a:endParaRPr>
                     </a:p>
                   </a:txBody>
                   <a:tcPr marR="0" marT="0" marB="0" anchor="ctr">
@@ -8027,10 +8088,6 @@
                         </a:rPr>
                         <a:t>: Float</a:t>
                       </a:r>
-                      <a:endParaRPr lang="en-US" sz="800" b="0" dirty="0" smtClean="0">
-                        <a:latin typeface="Arial" panose="020B0604020202020204" pitchFamily="34" charset="0"/>
-                        <a:cs typeface="Arial" panose="020B0604020202020204" pitchFamily="34" charset="0"/>
-                      </a:endParaRPr>
                     </a:p>
                   </a:txBody>
                   <a:tcPr marR="0" marT="0" marB="0" anchor="ctr">
@@ -8524,10 +8581,6 @@
                         </a:rPr>
                         <a:t>: String</a:t>
                       </a:r>
-                      <a:endParaRPr lang="en-US" sz="800" b="0" i="0" dirty="0" smtClean="0">
-                        <a:latin typeface="Arial" panose="020B0604020202020204" pitchFamily="34" charset="0"/>
-                        <a:cs typeface="Arial" panose="020B0604020202020204" pitchFamily="34" charset="0"/>
-                      </a:endParaRPr>
                     </a:p>
                   </a:txBody>
                   <a:tcPr marR="0" marT="0" marB="0" anchor="ctr">
@@ -8791,10 +8844,6 @@
                         </a:rPr>
                         <a:t>name: String</a:t>
                       </a:r>
-                      <a:endParaRPr lang="en-US" sz="800" b="0" i="0" dirty="0" smtClean="0">
-                        <a:latin typeface="Arial" panose="020B0604020202020204" pitchFamily="34" charset="0"/>
-                        <a:cs typeface="Arial" panose="020B0604020202020204" pitchFamily="34" charset="0"/>
-                      </a:endParaRPr>
                     </a:p>
                   </a:txBody>
                   <a:tcPr marR="0" marT="0" marB="0" anchor="ctr">
@@ -8994,10 +9043,6 @@
                         </a:rPr>
                         <a:t>optional: Boolean</a:t>
                       </a:r>
-                      <a:endParaRPr lang="en-US" sz="800" b="0" i="0" dirty="0" smtClean="0">
-                        <a:latin typeface="Arial" panose="020B0604020202020204" pitchFamily="34" charset="0"/>
-                        <a:cs typeface="Arial" panose="020B0604020202020204" pitchFamily="34" charset="0"/>
-                      </a:endParaRPr>
                     </a:p>
                   </a:txBody>
                   <a:tcPr marR="0" marT="0" marB="0" anchor="ctr">
@@ -9309,10 +9354,6 @@
                         </a:rPr>
                         <a:t>: Integer</a:t>
                       </a:r>
-                      <a:endParaRPr lang="en-US" sz="800" b="0" i="0" dirty="0" smtClean="0">
-                        <a:latin typeface="Arial" panose="020B0604020202020204" pitchFamily="34" charset="0"/>
-                        <a:cs typeface="Arial" panose="020B0604020202020204" pitchFamily="34" charset="0"/>
-                      </a:endParaRPr>
                     </a:p>
                   </a:txBody>
                   <a:tcPr marR="0" marT="0" marB="0" anchor="ctr">
@@ -9366,10 +9407,6 @@
                         </a:rPr>
                         <a:t>: Integer</a:t>
                       </a:r>
-                      <a:endParaRPr lang="en-US" sz="800" b="0" i="0" dirty="0" smtClean="0">
-                        <a:latin typeface="Arial" panose="020B0604020202020204" pitchFamily="34" charset="0"/>
-                        <a:cs typeface="Arial" panose="020B0604020202020204" pitchFamily="34" charset="0"/>
-                      </a:endParaRPr>
                     </a:p>
                   </a:txBody>
                   <a:tcPr marR="0" marT="0" marB="0" anchor="ctr">
@@ -9512,10 +9549,6 @@
                         </a:rPr>
                         <a:t>constraints</a:t>
                       </a:r>
-                      <a:endParaRPr lang="en-US" sz="800" b="1" i="0" dirty="0" smtClean="0">
-                        <a:latin typeface="Arial" panose="020B0604020202020204" pitchFamily="34" charset="0"/>
-                        <a:cs typeface="Arial" panose="020B0604020202020204" pitchFamily="34" charset="0"/>
-                      </a:endParaRPr>
                     </a:p>
                   </a:txBody>
                   <a:tcPr marR="0" marT="0" marB="0" anchor="ctr">
@@ -10167,10 +10200,6 @@
               </a:rPr>
               <a:t>1</a:t>
             </a:r>
-            <a:endParaRPr lang="en-US" sz="800" dirty="0" smtClean="0">
-              <a:latin typeface="Arial" panose="020B0604020202020204" pitchFamily="34" charset="0"/>
-              <a:cs typeface="Arial" panose="020B0604020202020204" pitchFamily="34" charset="0"/>
-            </a:endParaRPr>
           </a:p>
         </p:txBody>
       </p:sp>
@@ -10204,10 +10233,6 @@
               </a:rPr>
               <a:t>1</a:t>
             </a:r>
-            <a:endParaRPr lang="en-US" sz="800" dirty="0" smtClean="0">
-              <a:latin typeface="Arial" panose="020B0604020202020204" pitchFamily="34" charset="0"/>
-              <a:cs typeface="Arial" panose="020B0604020202020204" pitchFamily="34" charset="0"/>
-            </a:endParaRPr>
           </a:p>
         </p:txBody>
       </p:sp>
@@ -10241,10 +10266,6 @@
               </a:rPr>
               <a:t>0..*</a:t>
             </a:r>
-            <a:endParaRPr lang="en-US" sz="800" dirty="0" smtClean="0">
-              <a:latin typeface="Arial" panose="020B0604020202020204" pitchFamily="34" charset="0"/>
-              <a:cs typeface="Arial" panose="020B0604020202020204" pitchFamily="34" charset="0"/>
-            </a:endParaRPr>
           </a:p>
         </p:txBody>
       </p:sp>
@@ -10278,10 +10299,6 @@
               </a:rPr>
               <a:t>0..*</a:t>
             </a:r>
-            <a:endParaRPr lang="en-US" sz="800" dirty="0" smtClean="0">
-              <a:latin typeface="Arial" panose="020B0604020202020204" pitchFamily="34" charset="0"/>
-              <a:cs typeface="Arial" panose="020B0604020202020204" pitchFamily="34" charset="0"/>
-            </a:endParaRPr>
           </a:p>
         </p:txBody>
       </p:sp>
@@ -10315,10 +10332,6 @@
               </a:rPr>
               <a:t>1</a:t>
             </a:r>
-            <a:endParaRPr lang="en-US" sz="800" dirty="0" smtClean="0">
-              <a:latin typeface="Arial" panose="020B0604020202020204" pitchFamily="34" charset="0"/>
-              <a:cs typeface="Arial" panose="020B0604020202020204" pitchFamily="34" charset="0"/>
-            </a:endParaRPr>
           </a:p>
         </p:txBody>
       </p:sp>
@@ -10352,10 +10365,6 @@
               </a:rPr>
               <a:t>1</a:t>
             </a:r>
-            <a:endParaRPr lang="en-US" sz="800" dirty="0" smtClean="0">
-              <a:latin typeface="Arial" panose="020B0604020202020204" pitchFamily="34" charset="0"/>
-              <a:cs typeface="Arial" panose="020B0604020202020204" pitchFamily="34" charset="0"/>
-            </a:endParaRPr>
           </a:p>
         </p:txBody>
       </p:sp>
@@ -10389,10 +10398,6 @@
               </a:rPr>
               <a:t>0..*</a:t>
             </a:r>
-            <a:endParaRPr lang="en-US" sz="800" dirty="0" smtClean="0">
-              <a:latin typeface="Arial" panose="020B0604020202020204" pitchFamily="34" charset="0"/>
-              <a:cs typeface="Arial" panose="020B0604020202020204" pitchFamily="34" charset="0"/>
-            </a:endParaRPr>
           </a:p>
         </p:txBody>
       </p:sp>
@@ -10426,10 +10431,6 @@
               </a:rPr>
               <a:t>0..*</a:t>
             </a:r>
-            <a:endParaRPr lang="en-US" sz="800" dirty="0" smtClean="0">
-              <a:latin typeface="Arial" panose="020B0604020202020204" pitchFamily="34" charset="0"/>
-              <a:cs typeface="Arial" panose="020B0604020202020204" pitchFamily="34" charset="0"/>
-            </a:endParaRPr>
           </a:p>
         </p:txBody>
       </p:sp>
@@ -10463,10 +10464,6 @@
               </a:rPr>
               <a:t>0..*</a:t>
             </a:r>
-            <a:endParaRPr lang="en-US" sz="800" dirty="0" smtClean="0">
-              <a:latin typeface="Arial" panose="020B0604020202020204" pitchFamily="34" charset="0"/>
-              <a:cs typeface="Arial" panose="020B0604020202020204" pitchFamily="34" charset="0"/>
-            </a:endParaRPr>
           </a:p>
         </p:txBody>
       </p:sp>
@@ -10500,10 +10497,6 @@
               </a:rPr>
               <a:t>1</a:t>
             </a:r>
-            <a:endParaRPr lang="en-US" sz="800" dirty="0" smtClean="0">
-              <a:latin typeface="Arial" panose="020B0604020202020204" pitchFamily="34" charset="0"/>
-              <a:cs typeface="Arial" panose="020B0604020202020204" pitchFamily="34" charset="0"/>
-            </a:endParaRPr>
           </a:p>
         </p:txBody>
       </p:sp>
@@ -10537,10 +10530,6 @@
               </a:rPr>
               <a:t>1</a:t>
             </a:r>
-            <a:endParaRPr lang="en-US" sz="800" dirty="0" smtClean="0">
-              <a:latin typeface="Arial" panose="020B0604020202020204" pitchFamily="34" charset="0"/>
-              <a:cs typeface="Arial" panose="020B0604020202020204" pitchFamily="34" charset="0"/>
-            </a:endParaRPr>
           </a:p>
         </p:txBody>
       </p:sp>
@@ -10574,10 +10563,6 @@
               </a:rPr>
               <a:t>0..*</a:t>
             </a:r>
-            <a:endParaRPr lang="en-US" sz="800" dirty="0" smtClean="0">
-              <a:latin typeface="Arial" panose="020B0604020202020204" pitchFamily="34" charset="0"/>
-              <a:cs typeface="Arial" panose="020B0604020202020204" pitchFamily="34" charset="0"/>
-            </a:endParaRPr>
           </a:p>
         </p:txBody>
       </p:sp>
@@ -10611,10 +10596,6 @@
               </a:rPr>
               <a:t>1</a:t>
             </a:r>
-            <a:endParaRPr lang="en-US" sz="800" dirty="0" smtClean="0">
-              <a:latin typeface="Arial" panose="020B0604020202020204" pitchFamily="34" charset="0"/>
-              <a:cs typeface="Arial" panose="020B0604020202020204" pitchFamily="34" charset="0"/>
-            </a:endParaRPr>
           </a:p>
         </p:txBody>
       </p:sp>
@@ -10648,10 +10629,6 @@
               </a:rPr>
               <a:t>0..*</a:t>
             </a:r>
-            <a:endParaRPr lang="en-US" sz="800" dirty="0" smtClean="0">
-              <a:latin typeface="Arial" panose="020B0604020202020204" pitchFamily="34" charset="0"/>
-              <a:cs typeface="Arial" panose="020B0604020202020204" pitchFamily="34" charset="0"/>
-            </a:endParaRPr>
           </a:p>
         </p:txBody>
       </p:sp>
@@ -10685,10 +10662,6 @@
               </a:rPr>
               <a:t>0..*</a:t>
             </a:r>
-            <a:endParaRPr lang="en-US" sz="800" dirty="0" smtClean="0">
-              <a:latin typeface="Arial" panose="020B0604020202020204" pitchFamily="34" charset="0"/>
-              <a:cs typeface="Arial" panose="020B0604020202020204" pitchFamily="34" charset="0"/>
-            </a:endParaRPr>
           </a:p>
         </p:txBody>
       </p:sp>
@@ -10722,10 +10695,6 @@
               </a:rPr>
               <a:t>0..*</a:t>
             </a:r>
-            <a:endParaRPr lang="en-US" sz="800" dirty="0" smtClean="0">
-              <a:latin typeface="Arial" panose="020B0604020202020204" pitchFamily="34" charset="0"/>
-              <a:cs typeface="Arial" panose="020B0604020202020204" pitchFamily="34" charset="0"/>
-            </a:endParaRPr>
           </a:p>
         </p:txBody>
       </p:sp>
@@ -10759,10 +10728,6 @@
               </a:rPr>
               <a:t>0..*</a:t>
             </a:r>
-            <a:endParaRPr lang="en-US" sz="800" dirty="0" smtClean="0">
-              <a:latin typeface="Arial" panose="020B0604020202020204" pitchFamily="34" charset="0"/>
-              <a:cs typeface="Arial" panose="020B0604020202020204" pitchFamily="34" charset="0"/>
-            </a:endParaRPr>
           </a:p>
         </p:txBody>
       </p:sp>
@@ -10796,10 +10761,6 @@
               </a:rPr>
               <a:t>0..*</a:t>
             </a:r>
-            <a:endParaRPr lang="en-US" sz="800" dirty="0" smtClean="0">
-              <a:latin typeface="Arial" panose="020B0604020202020204" pitchFamily="34" charset="0"/>
-              <a:cs typeface="Arial" panose="020B0604020202020204" pitchFamily="34" charset="0"/>
-            </a:endParaRPr>
           </a:p>
         </p:txBody>
       </p:sp>
@@ -10833,10 +10794,6 @@
               </a:rPr>
               <a:t>1</a:t>
             </a:r>
-            <a:endParaRPr lang="en-US" sz="800" dirty="0" smtClean="0">
-              <a:latin typeface="Arial" panose="020B0604020202020204" pitchFamily="34" charset="0"/>
-              <a:cs typeface="Arial" panose="020B0604020202020204" pitchFamily="34" charset="0"/>
-            </a:endParaRPr>
           </a:p>
         </p:txBody>
       </p:sp>
@@ -10870,10 +10827,6 @@
               </a:rPr>
               <a:t>1</a:t>
             </a:r>
-            <a:endParaRPr lang="en-US" sz="800" dirty="0" smtClean="0">
-              <a:latin typeface="Arial" panose="020B0604020202020204" pitchFamily="34" charset="0"/>
-              <a:cs typeface="Arial" panose="020B0604020202020204" pitchFamily="34" charset="0"/>
-            </a:endParaRPr>
           </a:p>
         </p:txBody>
       </p:sp>
@@ -10907,10 +10860,6 @@
               </a:rPr>
               <a:t>1</a:t>
             </a:r>
-            <a:endParaRPr lang="en-US" sz="800" dirty="0" smtClean="0">
-              <a:latin typeface="Arial" panose="020B0604020202020204" pitchFamily="34" charset="0"/>
-              <a:cs typeface="Arial" panose="020B0604020202020204" pitchFamily="34" charset="0"/>
-            </a:endParaRPr>
           </a:p>
         </p:txBody>
       </p:sp>
@@ -10944,10 +10893,6 @@
               </a:rPr>
               <a:t>1</a:t>
             </a:r>
-            <a:endParaRPr lang="en-US" sz="800" dirty="0" smtClean="0">
-              <a:latin typeface="Arial" panose="020B0604020202020204" pitchFamily="34" charset="0"/>
-              <a:cs typeface="Arial" panose="020B0604020202020204" pitchFamily="34" charset="0"/>
-            </a:endParaRPr>
           </a:p>
         </p:txBody>
       </p:sp>
@@ -10981,10 +10926,6 @@
               </a:rPr>
               <a:t>0..*</a:t>
             </a:r>
-            <a:endParaRPr lang="en-US" sz="800" dirty="0" smtClean="0">
-              <a:latin typeface="Arial" panose="020B0604020202020204" pitchFamily="34" charset="0"/>
-              <a:cs typeface="Arial" panose="020B0604020202020204" pitchFamily="34" charset="0"/>
-            </a:endParaRPr>
           </a:p>
         </p:txBody>
       </p:sp>
@@ -11018,10 +10959,6 @@
               </a:rPr>
               <a:t>0..*</a:t>
             </a:r>
-            <a:endParaRPr lang="en-US" sz="800" dirty="0" smtClean="0">
-              <a:latin typeface="Arial" panose="020B0604020202020204" pitchFamily="34" charset="0"/>
-              <a:cs typeface="Arial" panose="020B0604020202020204" pitchFamily="34" charset="0"/>
-            </a:endParaRPr>
           </a:p>
         </p:txBody>
       </p:sp>
@@ -11055,10 +10992,6 @@
               </a:rPr>
               <a:t>0..*</a:t>
             </a:r>
-            <a:endParaRPr lang="en-US" sz="800" dirty="0" smtClean="0">
-              <a:latin typeface="Arial" panose="020B0604020202020204" pitchFamily="34" charset="0"/>
-              <a:cs typeface="Arial" panose="020B0604020202020204" pitchFamily="34" charset="0"/>
-            </a:endParaRPr>
           </a:p>
         </p:txBody>
       </p:sp>
@@ -11092,10 +11025,6 @@
               </a:rPr>
               <a:t>1</a:t>
             </a:r>
-            <a:endParaRPr lang="en-US" sz="800" dirty="0" smtClean="0">
-              <a:latin typeface="Arial" panose="020B0604020202020204" pitchFamily="34" charset="0"/>
-              <a:cs typeface="Arial" panose="020B0604020202020204" pitchFamily="34" charset="0"/>
-            </a:endParaRPr>
           </a:p>
         </p:txBody>
       </p:sp>
@@ -11129,10 +11058,6 @@
               </a:rPr>
               <a:t>1</a:t>
             </a:r>
-            <a:endParaRPr lang="en-US" sz="800" dirty="0" smtClean="0">
-              <a:latin typeface="Arial" panose="020B0604020202020204" pitchFamily="34" charset="0"/>
-              <a:cs typeface="Arial" panose="020B0604020202020204" pitchFamily="34" charset="0"/>
-            </a:endParaRPr>
           </a:p>
         </p:txBody>
       </p:sp>
@@ -11166,10 +11091,6 @@
               </a:rPr>
               <a:t>1</a:t>
             </a:r>
-            <a:endParaRPr lang="en-US" sz="800" dirty="0" smtClean="0">
-              <a:latin typeface="Arial" panose="020B0604020202020204" pitchFamily="34" charset="0"/>
-              <a:cs typeface="Arial" panose="020B0604020202020204" pitchFamily="34" charset="0"/>
-            </a:endParaRPr>
           </a:p>
         </p:txBody>
       </p:sp>
@@ -11203,10 +11124,6 @@
               </a:rPr>
               <a:t>0..*</a:t>
             </a:r>
-            <a:endParaRPr lang="en-US" sz="800" dirty="0" smtClean="0">
-              <a:latin typeface="Arial" panose="020B0604020202020204" pitchFamily="34" charset="0"/>
-              <a:cs typeface="Arial" panose="020B0604020202020204" pitchFamily="34" charset="0"/>
-            </a:endParaRPr>
           </a:p>
         </p:txBody>
       </p:sp>
@@ -11240,10 +11157,6 @@
               </a:rPr>
               <a:t>1</a:t>
             </a:r>
-            <a:endParaRPr lang="en-US" sz="800" dirty="0" smtClean="0">
-              <a:latin typeface="Arial" panose="020B0604020202020204" pitchFamily="34" charset="0"/>
-              <a:cs typeface="Arial" panose="020B0604020202020204" pitchFamily="34" charset="0"/>
-            </a:endParaRPr>
           </a:p>
         </p:txBody>
       </p:sp>
@@ -12145,13 +12058,13 @@
           <p:nvPr>
             <p:extLst>
               <p:ext uri="{D42A27DB-BD31-4B8C-83A1-F6EECF244321}">
-                <p14:modId xmlns:p14="http://schemas.microsoft.com/office/powerpoint/2010/main" val="3613513028"/>
+                <p14:modId xmlns:p14="http://schemas.microsoft.com/office/powerpoint/2010/main" val="3881602973"/>
               </p:ext>
             </p:extLst>
           </p:nvPr>
         </p:nvGraphicFramePr>
         <p:xfrm>
-          <a:off x="6510305" y="182179"/>
+          <a:off x="6510305" y="-20797"/>
           <a:ext cx="1872000" cy="360000"/>
         </p:xfrm>
         <a:graphic>
@@ -12678,10 +12591,6 @@
                         </a:rPr>
                         <a:t>: Float</a:t>
                       </a:r>
-                      <a:endParaRPr lang="en-US" sz="800" b="0" dirty="0" smtClean="0">
-                        <a:latin typeface="Arial" panose="020B0604020202020204" pitchFamily="34" charset="0"/>
-                        <a:cs typeface="Arial" panose="020B0604020202020204" pitchFamily="34" charset="0"/>
-                      </a:endParaRPr>
                     </a:p>
                   </a:txBody>
                   <a:tcPr marR="0" marT="0" marB="0" anchor="ctr">
@@ -12735,10 +12644,6 @@
                         </a:rPr>
                         <a:t>: Float</a:t>
                       </a:r>
-                      <a:endParaRPr lang="en-US" sz="800" b="0" dirty="0" smtClean="0">
-                        <a:latin typeface="Arial" panose="020B0604020202020204" pitchFamily="34" charset="0"/>
-                        <a:cs typeface="Arial" panose="020B0604020202020204" pitchFamily="34" charset="0"/>
-                      </a:endParaRPr>
                     </a:p>
                   </a:txBody>
                   <a:tcPr marR="0" marT="0" marB="0" anchor="ctr">
@@ -12785,10 +12690,6 @@
                         </a:rPr>
                         <a:t>variable_co2: Float</a:t>
                       </a:r>
-                      <a:endParaRPr lang="en-US" sz="800" b="0" dirty="0" smtClean="0">
-                        <a:latin typeface="Arial" panose="020B0604020202020204" pitchFamily="34" charset="0"/>
-                        <a:cs typeface="Arial" panose="020B0604020202020204" pitchFamily="34" charset="0"/>
-                      </a:endParaRPr>
                     </a:p>
                   </a:txBody>
                   <a:tcPr marR="0" marT="0" marB="0" anchor="ctr">
@@ -12842,10 +12743,6 @@
                         </a:rPr>
                         <a:t>: Float</a:t>
                       </a:r>
-                      <a:endParaRPr lang="en-US" sz="800" b="0" dirty="0" smtClean="0">
-                        <a:latin typeface="Arial" panose="020B0604020202020204" pitchFamily="34" charset="0"/>
-                        <a:cs typeface="Arial" panose="020B0604020202020204" pitchFamily="34" charset="0"/>
-                      </a:endParaRPr>
                     </a:p>
                   </a:txBody>
                   <a:tcPr marR="0" marT="0" marB="0" anchor="ctr">
@@ -12899,10 +12796,6 @@
                         </a:rPr>
                         <a:t>: Float</a:t>
                       </a:r>
-                      <a:endParaRPr lang="en-US" sz="800" b="0" dirty="0" smtClean="0">
-                        <a:latin typeface="Arial" panose="020B0604020202020204" pitchFamily="34" charset="0"/>
-                        <a:cs typeface="Arial" panose="020B0604020202020204" pitchFamily="34" charset="0"/>
-                      </a:endParaRPr>
                     </a:p>
                   </a:txBody>
                   <a:tcPr marR="0" marT="0" marB="0" anchor="ctr">
@@ -12982,10 +12875,6 @@
                         </a:rPr>
                         <a:t>skill: Skill</a:t>
                       </a:r>
-                      <a:endParaRPr lang="en-US" sz="800" b="0" dirty="0" smtClean="0">
-                        <a:latin typeface="Arial" panose="020B0604020202020204" pitchFamily="34" charset="0"/>
-                        <a:cs typeface="Arial" panose="020B0604020202020204" pitchFamily="34" charset="0"/>
-                      </a:endParaRPr>
                     </a:p>
                   </a:txBody>
                   <a:tcPr marR="0" marT="0" marB="0" anchor="ctr">
@@ -13169,10 +13058,6 @@
                         </a:rPr>
                         <a:t>: Float</a:t>
                       </a:r>
-                      <a:endParaRPr lang="en-US" sz="800" b="0" dirty="0" smtClean="0">
-                        <a:latin typeface="Arial" panose="020B0604020202020204" pitchFamily="34" charset="0"/>
-                        <a:cs typeface="Arial" panose="020B0604020202020204" pitchFamily="34" charset="0"/>
-                      </a:endParaRPr>
                     </a:p>
                   </a:txBody>
                   <a:tcPr marR="0" marT="0" marB="0" anchor="ctr">
@@ -13219,10 +13104,6 @@
                         </a:rPr>
                         <a:t>variable_co2: Float</a:t>
                       </a:r>
-                      <a:endParaRPr lang="en-US" sz="800" b="0" dirty="0" smtClean="0">
-                        <a:latin typeface="Arial" panose="020B0604020202020204" pitchFamily="34" charset="0"/>
-                        <a:cs typeface="Arial" panose="020B0604020202020204" pitchFamily="34" charset="0"/>
-                      </a:endParaRPr>
                     </a:p>
                   </a:txBody>
                   <a:tcPr marR="0" marT="0" marB="0" anchor="ctr">
@@ -13276,10 +13157,6 @@
                         </a:rPr>
                         <a:t>: Float</a:t>
                       </a:r>
-                      <a:endParaRPr lang="en-US" sz="800" b="0" dirty="0" smtClean="0">
-                        <a:latin typeface="Arial" panose="020B0604020202020204" pitchFamily="34" charset="0"/>
-                        <a:cs typeface="Arial" panose="020B0604020202020204" pitchFamily="34" charset="0"/>
-                      </a:endParaRPr>
                     </a:p>
                   </a:txBody>
                   <a:tcPr marR="0" marT="0" marB="0" anchor="ctr">
@@ -13333,10 +13210,6 @@
                         </a:rPr>
                         <a:t>: Float</a:t>
                       </a:r>
-                      <a:endParaRPr lang="en-US" sz="800" b="0" dirty="0" smtClean="0">
-                        <a:latin typeface="Arial" panose="020B0604020202020204" pitchFamily="34" charset="0"/>
-                        <a:cs typeface="Arial" panose="020B0604020202020204" pitchFamily="34" charset="0"/>
-                      </a:endParaRPr>
                     </a:p>
                   </a:txBody>
                   <a:tcPr marR="0" marT="0" marB="0" anchor="ctr">
@@ -13772,10 +13645,6 @@
                         </a:rPr>
                         <a:t>: String</a:t>
                       </a:r>
-                      <a:endParaRPr lang="en-US" sz="800" b="0" i="0" dirty="0" smtClean="0">
-                        <a:latin typeface="Arial" panose="020B0604020202020204" pitchFamily="34" charset="0"/>
-                        <a:cs typeface="Arial" panose="020B0604020202020204" pitchFamily="34" charset="0"/>
-                      </a:endParaRPr>
                     </a:p>
                   </a:txBody>
                   <a:tcPr marR="0" marT="0" marB="0" anchor="ctr">
@@ -14002,10 +13871,6 @@
                         </a:rPr>
                         <a:t>name: String</a:t>
                       </a:r>
-                      <a:endParaRPr lang="en-US" sz="800" b="0" i="0" dirty="0" smtClean="0">
-                        <a:latin typeface="Arial" panose="020B0604020202020204" pitchFamily="34" charset="0"/>
-                        <a:cs typeface="Arial" panose="020B0604020202020204" pitchFamily="34" charset="0"/>
-                      </a:endParaRPr>
                     </a:p>
                   </a:txBody>
                   <a:tcPr marR="0" marT="0" marB="0" anchor="ctr">
@@ -14164,10 +14029,6 @@
                         </a:rPr>
                         <a:t>optional: Boolean</a:t>
                       </a:r>
-                      <a:endParaRPr lang="en-US" sz="800" b="0" i="0" dirty="0" smtClean="0">
-                        <a:latin typeface="Arial" panose="020B0604020202020204" pitchFamily="34" charset="0"/>
-                        <a:cs typeface="Arial" panose="020B0604020202020204" pitchFamily="34" charset="0"/>
-                      </a:endParaRPr>
                     </a:p>
                   </a:txBody>
                   <a:tcPr marR="0" marT="0" marB="0" anchor="ctr">
@@ -14335,10 +14196,6 @@
                         </a:rPr>
                         <a:t>requirement: Requirement</a:t>
                       </a:r>
-                      <a:endParaRPr lang="en-US" sz="800" b="0" i="0" dirty="0" smtClean="0">
-                        <a:latin typeface="Arial" panose="020B0604020202020204" pitchFamily="34" charset="0"/>
-                        <a:cs typeface="Arial" panose="020B0604020202020204" pitchFamily="34" charset="0"/>
-                      </a:endParaRPr>
                     </a:p>
                   </a:txBody>
                   <a:tcPr marR="0" marT="0" marB="0" anchor="ctr">
@@ -14493,10 +14350,6 @@
                         </a:rPr>
                         <a:t>: Integer</a:t>
                       </a:r>
-                      <a:endParaRPr lang="en-US" sz="800" b="0" i="0" dirty="0" smtClean="0">
-                        <a:latin typeface="Arial" panose="020B0604020202020204" pitchFamily="34" charset="0"/>
-                        <a:cs typeface="Arial" panose="020B0604020202020204" pitchFamily="34" charset="0"/>
-                      </a:endParaRPr>
                     </a:p>
                   </a:txBody>
                   <a:tcPr marR="0" marT="0" marB="0" anchor="ctr">
@@ -14550,10 +14403,6 @@
                         </a:rPr>
                         <a:t>: Integer</a:t>
                       </a:r>
-                      <a:endParaRPr lang="en-US" sz="800" b="0" i="0" dirty="0" smtClean="0">
-                        <a:latin typeface="Arial" panose="020B0604020202020204" pitchFamily="34" charset="0"/>
-                        <a:cs typeface="Arial" panose="020B0604020202020204" pitchFamily="34" charset="0"/>
-                      </a:endParaRPr>
                     </a:p>
                   </a:txBody>
                   <a:tcPr marR="0" marT="0" marB="0" anchor="ctr">
@@ -14600,10 +14449,6 @@
                         </a:rPr>
                         <a:t>part: Part</a:t>
                       </a:r>
-                      <a:endParaRPr lang="en-US" sz="800" b="0" i="0" dirty="0" smtClean="0">
-                        <a:latin typeface="Arial" panose="020B0604020202020204" pitchFamily="34" charset="0"/>
-                        <a:cs typeface="Arial" panose="020B0604020202020204" pitchFamily="34" charset="0"/>
-                      </a:endParaRPr>
                     </a:p>
                   </a:txBody>
                   <a:tcPr marR="0" marT="0" marB="0" anchor="ctr">
@@ -14712,8 +14557,8 @@
         </p:nvCxnSpPr>
         <p:spPr>
           <a:xfrm>
-            <a:off x="7446305" y="542179"/>
-            <a:ext cx="56" cy="234338"/>
+            <a:off x="7446305" y="339203"/>
+            <a:ext cx="56" cy="437314"/>
           </a:xfrm>
           <a:prstGeom prst="line">
             <a:avLst/>
@@ -15210,10 +15055,6 @@
               </a:rPr>
               <a:t>1</a:t>
             </a:r>
-            <a:endParaRPr lang="en-US" sz="800" dirty="0" smtClean="0">
-              <a:latin typeface="Arial" panose="020B0604020202020204" pitchFamily="34" charset="0"/>
-              <a:cs typeface="Arial" panose="020B0604020202020204" pitchFamily="34" charset="0"/>
-            </a:endParaRPr>
           </a:p>
         </p:txBody>
       </p:sp>
@@ -15225,7 +15066,7 @@
         </p:nvSpPr>
         <p:spPr>
           <a:xfrm>
-            <a:off x="7348040" y="546590"/>
+            <a:off x="7348040" y="343614"/>
             <a:ext cx="57708" cy="123111"/>
           </a:xfrm>
           <a:prstGeom prst="rect">
@@ -15247,10 +15088,6 @@
               </a:rPr>
               <a:t>1</a:t>
             </a:r>
-            <a:endParaRPr lang="en-US" sz="800" dirty="0" smtClean="0">
-              <a:latin typeface="Arial" panose="020B0604020202020204" pitchFamily="34" charset="0"/>
-              <a:cs typeface="Arial" panose="020B0604020202020204" pitchFamily="34" charset="0"/>
-            </a:endParaRPr>
           </a:p>
         </p:txBody>
       </p:sp>
@@ -15284,10 +15121,6 @@
               </a:rPr>
               <a:t>0..*</a:t>
             </a:r>
-            <a:endParaRPr lang="en-US" sz="800" dirty="0" smtClean="0">
-              <a:latin typeface="Arial" panose="020B0604020202020204" pitchFamily="34" charset="0"/>
-              <a:cs typeface="Arial" panose="020B0604020202020204" pitchFamily="34" charset="0"/>
-            </a:endParaRPr>
           </a:p>
         </p:txBody>
       </p:sp>
@@ -15321,10 +15154,6 @@
               </a:rPr>
               <a:t>1</a:t>
             </a:r>
-            <a:endParaRPr lang="en-US" sz="800" dirty="0" smtClean="0">
-              <a:latin typeface="Arial" panose="020B0604020202020204" pitchFamily="34" charset="0"/>
-              <a:cs typeface="Arial" panose="020B0604020202020204" pitchFamily="34" charset="0"/>
-            </a:endParaRPr>
           </a:p>
         </p:txBody>
       </p:sp>
@@ -15358,10 +15187,6 @@
               </a:rPr>
               <a:t>1</a:t>
             </a:r>
-            <a:endParaRPr lang="en-US" sz="800" dirty="0" smtClean="0">
-              <a:latin typeface="Arial" panose="020B0604020202020204" pitchFamily="34" charset="0"/>
-              <a:cs typeface="Arial" panose="020B0604020202020204" pitchFamily="34" charset="0"/>
-            </a:endParaRPr>
           </a:p>
         </p:txBody>
       </p:sp>
@@ -15395,10 +15220,6 @@
               </a:rPr>
               <a:t>0..*</a:t>
             </a:r>
-            <a:endParaRPr lang="en-US" sz="800" dirty="0" smtClean="0">
-              <a:latin typeface="Arial" panose="020B0604020202020204" pitchFamily="34" charset="0"/>
-              <a:cs typeface="Arial" panose="020B0604020202020204" pitchFamily="34" charset="0"/>
-            </a:endParaRPr>
           </a:p>
         </p:txBody>
       </p:sp>
@@ -15432,10 +15253,6 @@
               </a:rPr>
               <a:t>0..*</a:t>
             </a:r>
-            <a:endParaRPr lang="en-US" sz="800" dirty="0" smtClean="0">
-              <a:latin typeface="Arial" panose="020B0604020202020204" pitchFamily="34" charset="0"/>
-              <a:cs typeface="Arial" panose="020B0604020202020204" pitchFamily="34" charset="0"/>
-            </a:endParaRPr>
           </a:p>
         </p:txBody>
       </p:sp>
@@ -15469,10 +15286,6 @@
               </a:rPr>
               <a:t>0..*</a:t>
             </a:r>
-            <a:endParaRPr lang="en-US" sz="800" dirty="0" smtClean="0">
-              <a:latin typeface="Arial" panose="020B0604020202020204" pitchFamily="34" charset="0"/>
-              <a:cs typeface="Arial" panose="020B0604020202020204" pitchFamily="34" charset="0"/>
-            </a:endParaRPr>
           </a:p>
         </p:txBody>
       </p:sp>
@@ -15506,10 +15319,6 @@
               </a:rPr>
               <a:t>1</a:t>
             </a:r>
-            <a:endParaRPr lang="en-US" sz="800" dirty="0" smtClean="0">
-              <a:latin typeface="Arial" panose="020B0604020202020204" pitchFamily="34" charset="0"/>
-              <a:cs typeface="Arial" panose="020B0604020202020204" pitchFamily="34" charset="0"/>
-            </a:endParaRPr>
           </a:p>
         </p:txBody>
       </p:sp>
@@ -15543,10 +15352,6 @@
               </a:rPr>
               <a:t>1</a:t>
             </a:r>
-            <a:endParaRPr lang="en-US" sz="800" dirty="0" smtClean="0">
-              <a:latin typeface="Arial" panose="020B0604020202020204" pitchFamily="34" charset="0"/>
-              <a:cs typeface="Arial" panose="020B0604020202020204" pitchFamily="34" charset="0"/>
-            </a:endParaRPr>
           </a:p>
         </p:txBody>
       </p:sp>
@@ -15580,10 +15385,6 @@
               </a:rPr>
               <a:t>0..*</a:t>
             </a:r>
-            <a:endParaRPr lang="en-US" sz="800" dirty="0" smtClean="0">
-              <a:latin typeface="Arial" panose="020B0604020202020204" pitchFamily="34" charset="0"/>
-              <a:cs typeface="Arial" panose="020B0604020202020204" pitchFamily="34" charset="0"/>
-            </a:endParaRPr>
           </a:p>
         </p:txBody>
       </p:sp>
@@ -15617,10 +15418,6 @@
               </a:rPr>
               <a:t>1</a:t>
             </a:r>
-            <a:endParaRPr lang="en-US" sz="800" dirty="0" smtClean="0">
-              <a:latin typeface="Arial" panose="020B0604020202020204" pitchFamily="34" charset="0"/>
-              <a:cs typeface="Arial" panose="020B0604020202020204" pitchFamily="34" charset="0"/>
-            </a:endParaRPr>
           </a:p>
         </p:txBody>
       </p:sp>
@@ -15654,10 +15451,6 @@
               </a:rPr>
               <a:t>0..*</a:t>
             </a:r>
-            <a:endParaRPr lang="en-US" sz="800" dirty="0" smtClean="0">
-              <a:latin typeface="Arial" panose="020B0604020202020204" pitchFamily="34" charset="0"/>
-              <a:cs typeface="Arial" panose="020B0604020202020204" pitchFamily="34" charset="0"/>
-            </a:endParaRPr>
           </a:p>
         </p:txBody>
       </p:sp>
@@ -15691,10 +15484,6 @@
               </a:rPr>
               <a:t>0..*</a:t>
             </a:r>
-            <a:endParaRPr lang="en-US" sz="800" dirty="0" smtClean="0">
-              <a:latin typeface="Arial" panose="020B0604020202020204" pitchFamily="34" charset="0"/>
-              <a:cs typeface="Arial" panose="020B0604020202020204" pitchFamily="34" charset="0"/>
-            </a:endParaRPr>
           </a:p>
         </p:txBody>
       </p:sp>
@@ -15728,10 +15517,6 @@
               </a:rPr>
               <a:t>0..*</a:t>
             </a:r>
-            <a:endParaRPr lang="en-US" sz="800" dirty="0" smtClean="0">
-              <a:latin typeface="Arial" panose="020B0604020202020204" pitchFamily="34" charset="0"/>
-              <a:cs typeface="Arial" panose="020B0604020202020204" pitchFamily="34" charset="0"/>
-            </a:endParaRPr>
           </a:p>
         </p:txBody>
       </p:sp>
@@ -15765,10 +15550,6 @@
               </a:rPr>
               <a:t>0..*</a:t>
             </a:r>
-            <a:endParaRPr lang="en-US" sz="800" dirty="0" smtClean="0">
-              <a:latin typeface="Arial" panose="020B0604020202020204" pitchFamily="34" charset="0"/>
-              <a:cs typeface="Arial" panose="020B0604020202020204" pitchFamily="34" charset="0"/>
-            </a:endParaRPr>
           </a:p>
         </p:txBody>
       </p:sp>
@@ -15802,10 +15583,6 @@
               </a:rPr>
               <a:t>1</a:t>
             </a:r>
-            <a:endParaRPr lang="en-US" sz="800" dirty="0" smtClean="0">
-              <a:latin typeface="Arial" panose="020B0604020202020204" pitchFamily="34" charset="0"/>
-              <a:cs typeface="Arial" panose="020B0604020202020204" pitchFamily="34" charset="0"/>
-            </a:endParaRPr>
           </a:p>
         </p:txBody>
       </p:sp>
@@ -15839,10 +15616,6 @@
               </a:rPr>
               <a:t>1</a:t>
             </a:r>
-            <a:endParaRPr lang="en-US" sz="800" dirty="0" smtClean="0">
-              <a:latin typeface="Arial" panose="020B0604020202020204" pitchFamily="34" charset="0"/>
-              <a:cs typeface="Arial" panose="020B0604020202020204" pitchFamily="34" charset="0"/>
-            </a:endParaRPr>
           </a:p>
         </p:txBody>
       </p:sp>
@@ -15876,10 +15649,6 @@
               </a:rPr>
               <a:t>1</a:t>
             </a:r>
-            <a:endParaRPr lang="en-US" sz="800" dirty="0" smtClean="0">
-              <a:latin typeface="Arial" panose="020B0604020202020204" pitchFamily="34" charset="0"/>
-              <a:cs typeface="Arial" panose="020B0604020202020204" pitchFamily="34" charset="0"/>
-            </a:endParaRPr>
           </a:p>
         </p:txBody>
       </p:sp>
@@ -15913,10 +15682,6 @@
               </a:rPr>
               <a:t>0..*</a:t>
             </a:r>
-            <a:endParaRPr lang="en-US" sz="800" dirty="0" smtClean="0">
-              <a:latin typeface="Arial" panose="020B0604020202020204" pitchFamily="34" charset="0"/>
-              <a:cs typeface="Arial" panose="020B0604020202020204" pitchFamily="34" charset="0"/>
-            </a:endParaRPr>
           </a:p>
         </p:txBody>
       </p:sp>
@@ -15950,10 +15715,6 @@
               </a:rPr>
               <a:t>0..*</a:t>
             </a:r>
-            <a:endParaRPr lang="en-US" sz="800" dirty="0" smtClean="0">
-              <a:latin typeface="Arial" panose="020B0604020202020204" pitchFamily="34" charset="0"/>
-              <a:cs typeface="Arial" panose="020B0604020202020204" pitchFamily="34" charset="0"/>
-            </a:endParaRPr>
           </a:p>
         </p:txBody>
       </p:sp>
@@ -15987,10 +15748,6 @@
               </a:rPr>
               <a:t>0..*</a:t>
             </a:r>
-            <a:endParaRPr lang="en-US" sz="800" dirty="0" smtClean="0">
-              <a:latin typeface="Arial" panose="020B0604020202020204" pitchFamily="34" charset="0"/>
-              <a:cs typeface="Arial" panose="020B0604020202020204" pitchFamily="34" charset="0"/>
-            </a:endParaRPr>
           </a:p>
         </p:txBody>
       </p:sp>
@@ -16024,10 +15781,6 @@
               </a:rPr>
               <a:t>1</a:t>
             </a:r>
-            <a:endParaRPr lang="en-US" sz="800" dirty="0" smtClean="0">
-              <a:latin typeface="Arial" panose="020B0604020202020204" pitchFamily="34" charset="0"/>
-              <a:cs typeface="Arial" panose="020B0604020202020204" pitchFamily="34" charset="0"/>
-            </a:endParaRPr>
           </a:p>
         </p:txBody>
       </p:sp>
@@ -16061,10 +15814,6 @@
               </a:rPr>
               <a:t>1</a:t>
             </a:r>
-            <a:endParaRPr lang="en-US" sz="800" dirty="0" smtClean="0">
-              <a:latin typeface="Arial" panose="020B0604020202020204" pitchFamily="34" charset="0"/>
-              <a:cs typeface="Arial" panose="020B0604020202020204" pitchFamily="34" charset="0"/>
-            </a:endParaRPr>
           </a:p>
         </p:txBody>
       </p:sp>
@@ -17186,6 +16935,2081 @@
 </file>
 
 <file path=ppt/slides/slide4.xml><?xml version="1.0" encoding="utf-8"?>
+<p:sld xmlns:a="http://schemas.openxmlformats.org/drawingml/2006/main" xmlns:r="http://schemas.openxmlformats.org/officeDocument/2006/relationships" xmlns:p="http://schemas.openxmlformats.org/presentationml/2006/main">
+  <p:cSld>
+    <p:spTree>
+      <p:nvGrpSpPr>
+        <p:cNvPr id="1" name=""/>
+        <p:cNvGrpSpPr/>
+        <p:nvPr/>
+      </p:nvGrpSpPr>
+      <p:grpSpPr>
+        <a:xfrm>
+          <a:off x="0" y="0"/>
+          <a:ext cx="0" cy="0"/>
+          <a:chOff x="0" y="0"/>
+          <a:chExt cx="0" cy="0"/>
+        </a:xfrm>
+      </p:grpSpPr>
+      <p:grpSp>
+        <p:nvGrpSpPr>
+          <p:cNvPr id="4" name="Gruppieren 3"/>
+          <p:cNvGrpSpPr/>
+          <p:nvPr/>
+        </p:nvGrpSpPr>
+        <p:grpSpPr>
+          <a:xfrm>
+            <a:off x="349032" y="237525"/>
+            <a:ext cx="445636" cy="673508"/>
+            <a:chOff x="349032" y="641385"/>
+            <a:chExt cx="445636" cy="673508"/>
+          </a:xfrm>
+        </p:grpSpPr>
+        <p:sp>
+          <p:nvSpPr>
+            <p:cNvPr id="2" name="Freeform 390">
+              <a:extLst>
+                <a:ext uri="{FF2B5EF4-FFF2-40B4-BE49-F238E27FC236}">
+                  <a16:creationId xmlns:a16="http://schemas.microsoft.com/office/drawing/2014/main" xmlns="" id="{DC225B88-4404-4AFD-8BCC-F7DEF4947EA2}"/>
+                </a:ext>
+              </a:extLst>
+            </p:cNvPr>
+            <p:cNvSpPr>
+              <a:spLocks noEditPoints="1"/>
+            </p:cNvSpPr>
+            <p:nvPr/>
+          </p:nvSpPr>
+          <p:spPr bwMode="auto">
+            <a:xfrm>
+              <a:off x="410829" y="641385"/>
+              <a:ext cx="322041" cy="550397"/>
+            </a:xfrm>
+            <a:custGeom>
+              <a:avLst/>
+              <a:gdLst>
+                <a:gd name="T0" fmla="*/ 0 w 322"/>
+                <a:gd name="T1" fmla="*/ 343 h 555"/>
+                <a:gd name="T2" fmla="*/ 0 w 322"/>
+                <a:gd name="T3" fmla="*/ 212 h 555"/>
+                <a:gd name="T4" fmla="*/ 17 w 322"/>
+                <a:gd name="T5" fmla="*/ 169 h 555"/>
+                <a:gd name="T6" fmla="*/ 60 w 322"/>
+                <a:gd name="T7" fmla="*/ 151 h 555"/>
+                <a:gd name="T8" fmla="*/ 262 w 322"/>
+                <a:gd name="T9" fmla="*/ 151 h 555"/>
+                <a:gd name="T10" fmla="*/ 305 w 322"/>
+                <a:gd name="T11" fmla="*/ 169 h 555"/>
+                <a:gd name="T12" fmla="*/ 322 w 322"/>
+                <a:gd name="T13" fmla="*/ 212 h 555"/>
+                <a:gd name="T14" fmla="*/ 322 w 322"/>
+                <a:gd name="T15" fmla="*/ 343 h 555"/>
+                <a:gd name="T16" fmla="*/ 313 w 322"/>
+                <a:gd name="T17" fmla="*/ 364 h 555"/>
+                <a:gd name="T18" fmla="*/ 292 w 322"/>
+                <a:gd name="T19" fmla="*/ 373 h 555"/>
+                <a:gd name="T20" fmla="*/ 271 w 322"/>
+                <a:gd name="T21" fmla="*/ 364 h 555"/>
+                <a:gd name="T22" fmla="*/ 262 w 322"/>
+                <a:gd name="T23" fmla="*/ 343 h 555"/>
+                <a:gd name="T24" fmla="*/ 262 w 322"/>
+                <a:gd name="T25" fmla="*/ 232 h 555"/>
+                <a:gd name="T26" fmla="*/ 242 w 322"/>
+                <a:gd name="T27" fmla="*/ 232 h 555"/>
+                <a:gd name="T28" fmla="*/ 242 w 322"/>
+                <a:gd name="T29" fmla="*/ 519 h 555"/>
+                <a:gd name="T30" fmla="*/ 231 w 322"/>
+                <a:gd name="T31" fmla="*/ 544 h 555"/>
+                <a:gd name="T32" fmla="*/ 206 w 322"/>
+                <a:gd name="T33" fmla="*/ 555 h 555"/>
+                <a:gd name="T34" fmla="*/ 181 w 322"/>
+                <a:gd name="T35" fmla="*/ 544 h 555"/>
+                <a:gd name="T36" fmla="*/ 171 w 322"/>
+                <a:gd name="T37" fmla="*/ 519 h 555"/>
+                <a:gd name="T38" fmla="*/ 171 w 322"/>
+                <a:gd name="T39" fmla="*/ 373 h 555"/>
+                <a:gd name="T40" fmla="*/ 151 w 322"/>
+                <a:gd name="T41" fmla="*/ 373 h 555"/>
+                <a:gd name="T42" fmla="*/ 151 w 322"/>
+                <a:gd name="T43" fmla="*/ 519 h 555"/>
+                <a:gd name="T44" fmla="*/ 140 w 322"/>
+                <a:gd name="T45" fmla="*/ 544 h 555"/>
+                <a:gd name="T46" fmla="*/ 116 w 322"/>
+                <a:gd name="T47" fmla="*/ 555 h 555"/>
+                <a:gd name="T48" fmla="*/ 91 w 322"/>
+                <a:gd name="T49" fmla="*/ 544 h 555"/>
+                <a:gd name="T50" fmla="*/ 80 w 322"/>
+                <a:gd name="T51" fmla="*/ 519 h 555"/>
+                <a:gd name="T52" fmla="*/ 80 w 322"/>
+                <a:gd name="T53" fmla="*/ 232 h 555"/>
+                <a:gd name="T54" fmla="*/ 60 w 322"/>
+                <a:gd name="T55" fmla="*/ 232 h 555"/>
+                <a:gd name="T56" fmla="*/ 60 w 322"/>
+                <a:gd name="T57" fmla="*/ 343 h 555"/>
+                <a:gd name="T58" fmla="*/ 51 w 322"/>
+                <a:gd name="T59" fmla="*/ 364 h 555"/>
+                <a:gd name="T60" fmla="*/ 30 w 322"/>
+                <a:gd name="T61" fmla="*/ 373 h 555"/>
+                <a:gd name="T62" fmla="*/ 8 w 322"/>
+                <a:gd name="T63" fmla="*/ 364 h 555"/>
+                <a:gd name="T64" fmla="*/ 0 w 322"/>
+                <a:gd name="T65" fmla="*/ 343 h 555"/>
+                <a:gd name="T66" fmla="*/ 111 w 322"/>
+                <a:gd name="T67" fmla="*/ 121 h 555"/>
+                <a:gd name="T68" fmla="*/ 90 w 322"/>
+                <a:gd name="T69" fmla="*/ 71 h 555"/>
+                <a:gd name="T70" fmla="*/ 111 w 322"/>
+                <a:gd name="T71" fmla="*/ 21 h 555"/>
+                <a:gd name="T72" fmla="*/ 161 w 322"/>
+                <a:gd name="T73" fmla="*/ 0 h 555"/>
+                <a:gd name="T74" fmla="*/ 211 w 322"/>
+                <a:gd name="T75" fmla="*/ 21 h 555"/>
+                <a:gd name="T76" fmla="*/ 231 w 322"/>
+                <a:gd name="T77" fmla="*/ 71 h 555"/>
+                <a:gd name="T78" fmla="*/ 211 w 322"/>
+                <a:gd name="T79" fmla="*/ 121 h 555"/>
+                <a:gd name="T80" fmla="*/ 161 w 322"/>
+                <a:gd name="T81" fmla="*/ 141 h 555"/>
+                <a:gd name="T82" fmla="*/ 111 w 322"/>
+                <a:gd name="T83" fmla="*/ 121 h 555"/>
+              </a:gdLst>
+              <a:ahLst/>
+              <a:cxnLst>
+                <a:cxn ang="0">
+                  <a:pos x="T0" y="T1"/>
+                </a:cxn>
+                <a:cxn ang="0">
+                  <a:pos x="T2" y="T3"/>
+                </a:cxn>
+                <a:cxn ang="0">
+                  <a:pos x="T4" y="T5"/>
+                </a:cxn>
+                <a:cxn ang="0">
+                  <a:pos x="T6" y="T7"/>
+                </a:cxn>
+                <a:cxn ang="0">
+                  <a:pos x="T8" y="T9"/>
+                </a:cxn>
+                <a:cxn ang="0">
+                  <a:pos x="T10" y="T11"/>
+                </a:cxn>
+                <a:cxn ang="0">
+                  <a:pos x="T12" y="T13"/>
+                </a:cxn>
+                <a:cxn ang="0">
+                  <a:pos x="T14" y="T15"/>
+                </a:cxn>
+                <a:cxn ang="0">
+                  <a:pos x="T16" y="T17"/>
+                </a:cxn>
+                <a:cxn ang="0">
+                  <a:pos x="T18" y="T19"/>
+                </a:cxn>
+                <a:cxn ang="0">
+                  <a:pos x="T20" y="T21"/>
+                </a:cxn>
+                <a:cxn ang="0">
+                  <a:pos x="T22" y="T23"/>
+                </a:cxn>
+                <a:cxn ang="0">
+                  <a:pos x="T24" y="T25"/>
+                </a:cxn>
+                <a:cxn ang="0">
+                  <a:pos x="T26" y="T27"/>
+                </a:cxn>
+                <a:cxn ang="0">
+                  <a:pos x="T28" y="T29"/>
+                </a:cxn>
+                <a:cxn ang="0">
+                  <a:pos x="T30" y="T31"/>
+                </a:cxn>
+                <a:cxn ang="0">
+                  <a:pos x="T32" y="T33"/>
+                </a:cxn>
+                <a:cxn ang="0">
+                  <a:pos x="T34" y="T35"/>
+                </a:cxn>
+                <a:cxn ang="0">
+                  <a:pos x="T36" y="T37"/>
+                </a:cxn>
+                <a:cxn ang="0">
+                  <a:pos x="T38" y="T39"/>
+                </a:cxn>
+                <a:cxn ang="0">
+                  <a:pos x="T40" y="T41"/>
+                </a:cxn>
+                <a:cxn ang="0">
+                  <a:pos x="T42" y="T43"/>
+                </a:cxn>
+                <a:cxn ang="0">
+                  <a:pos x="T44" y="T45"/>
+                </a:cxn>
+                <a:cxn ang="0">
+                  <a:pos x="T46" y="T47"/>
+                </a:cxn>
+                <a:cxn ang="0">
+                  <a:pos x="T48" y="T49"/>
+                </a:cxn>
+                <a:cxn ang="0">
+                  <a:pos x="T50" y="T51"/>
+                </a:cxn>
+                <a:cxn ang="0">
+                  <a:pos x="T52" y="T53"/>
+                </a:cxn>
+                <a:cxn ang="0">
+                  <a:pos x="T54" y="T55"/>
+                </a:cxn>
+                <a:cxn ang="0">
+                  <a:pos x="T56" y="T57"/>
+                </a:cxn>
+                <a:cxn ang="0">
+                  <a:pos x="T58" y="T59"/>
+                </a:cxn>
+                <a:cxn ang="0">
+                  <a:pos x="T60" y="T61"/>
+                </a:cxn>
+                <a:cxn ang="0">
+                  <a:pos x="T62" y="T63"/>
+                </a:cxn>
+                <a:cxn ang="0">
+                  <a:pos x="T64" y="T65"/>
+                </a:cxn>
+                <a:cxn ang="0">
+                  <a:pos x="T66" y="T67"/>
+                </a:cxn>
+                <a:cxn ang="0">
+                  <a:pos x="T68" y="T69"/>
+                </a:cxn>
+                <a:cxn ang="0">
+                  <a:pos x="T70" y="T71"/>
+                </a:cxn>
+                <a:cxn ang="0">
+                  <a:pos x="T72" y="T73"/>
+                </a:cxn>
+                <a:cxn ang="0">
+                  <a:pos x="T74" y="T75"/>
+                </a:cxn>
+                <a:cxn ang="0">
+                  <a:pos x="T76" y="T77"/>
+                </a:cxn>
+                <a:cxn ang="0">
+                  <a:pos x="T78" y="T79"/>
+                </a:cxn>
+                <a:cxn ang="0">
+                  <a:pos x="T80" y="T81"/>
+                </a:cxn>
+                <a:cxn ang="0">
+                  <a:pos x="T82" y="T83"/>
+                </a:cxn>
+              </a:cxnLst>
+              <a:rect l="0" t="0" r="r" b="b"/>
+              <a:pathLst>
+                <a:path w="322" h="555">
+                  <a:moveTo>
+                    <a:pt x="0" y="343"/>
+                  </a:moveTo>
+                  <a:lnTo>
+                    <a:pt x="0" y="212"/>
+                  </a:lnTo>
+                  <a:cubicBezTo>
+                    <a:pt x="0" y="195"/>
+                    <a:pt x="5" y="181"/>
+                    <a:pt x="17" y="169"/>
+                  </a:cubicBezTo>
+                  <a:cubicBezTo>
+                    <a:pt x="29" y="157"/>
+                    <a:pt x="43" y="151"/>
+                    <a:pt x="60" y="151"/>
+                  </a:cubicBezTo>
+                  <a:lnTo>
+                    <a:pt x="262" y="151"/>
+                  </a:lnTo>
+                  <a:cubicBezTo>
+                    <a:pt x="278" y="151"/>
+                    <a:pt x="293" y="157"/>
+                    <a:pt x="305" y="169"/>
+                  </a:cubicBezTo>
+                  <a:cubicBezTo>
+                    <a:pt x="316" y="181"/>
+                    <a:pt x="322" y="195"/>
+                    <a:pt x="322" y="212"/>
+                  </a:cubicBezTo>
+                  <a:lnTo>
+                    <a:pt x="322" y="343"/>
+                  </a:lnTo>
+                  <a:cubicBezTo>
+                    <a:pt x="322" y="351"/>
+                    <a:pt x="319" y="358"/>
+                    <a:pt x="313" y="364"/>
+                  </a:cubicBezTo>
+                  <a:cubicBezTo>
+                    <a:pt x="307" y="370"/>
+                    <a:pt x="300" y="373"/>
+                    <a:pt x="292" y="373"/>
+                  </a:cubicBezTo>
+                  <a:cubicBezTo>
+                    <a:pt x="284" y="373"/>
+                    <a:pt x="276" y="370"/>
+                    <a:pt x="271" y="364"/>
+                  </a:cubicBezTo>
+                  <a:cubicBezTo>
+                    <a:pt x="265" y="358"/>
+                    <a:pt x="262" y="351"/>
+                    <a:pt x="262" y="343"/>
+                  </a:cubicBezTo>
+                  <a:lnTo>
+                    <a:pt x="262" y="232"/>
+                  </a:lnTo>
+                  <a:lnTo>
+                    <a:pt x="242" y="232"/>
+                  </a:lnTo>
+                  <a:lnTo>
+                    <a:pt x="242" y="519"/>
+                  </a:lnTo>
+                  <a:cubicBezTo>
+                    <a:pt x="242" y="529"/>
+                    <a:pt x="238" y="537"/>
+                    <a:pt x="231" y="544"/>
+                  </a:cubicBezTo>
+                  <a:cubicBezTo>
+                    <a:pt x="224" y="551"/>
+                    <a:pt x="216" y="555"/>
+                    <a:pt x="206" y="555"/>
+                  </a:cubicBezTo>
+                  <a:cubicBezTo>
+                    <a:pt x="197" y="555"/>
+                    <a:pt x="188" y="551"/>
+                    <a:pt x="181" y="544"/>
+                  </a:cubicBezTo>
+                  <a:cubicBezTo>
+                    <a:pt x="174" y="537"/>
+                    <a:pt x="171" y="529"/>
+                    <a:pt x="171" y="519"/>
+                  </a:cubicBezTo>
+                  <a:lnTo>
+                    <a:pt x="171" y="373"/>
+                  </a:lnTo>
+                  <a:lnTo>
+                    <a:pt x="151" y="373"/>
+                  </a:lnTo>
+                  <a:lnTo>
+                    <a:pt x="151" y="519"/>
+                  </a:lnTo>
+                  <a:cubicBezTo>
+                    <a:pt x="151" y="529"/>
+                    <a:pt x="147" y="537"/>
+                    <a:pt x="140" y="544"/>
+                  </a:cubicBezTo>
+                  <a:cubicBezTo>
+                    <a:pt x="133" y="551"/>
+                    <a:pt x="125" y="555"/>
+                    <a:pt x="116" y="555"/>
+                  </a:cubicBezTo>
+                  <a:cubicBezTo>
+                    <a:pt x="106" y="555"/>
+                    <a:pt x="98" y="551"/>
+                    <a:pt x="91" y="544"/>
+                  </a:cubicBezTo>
+                  <a:cubicBezTo>
+                    <a:pt x="84" y="537"/>
+                    <a:pt x="80" y="529"/>
+                    <a:pt x="80" y="519"/>
+                  </a:cubicBezTo>
+                  <a:lnTo>
+                    <a:pt x="80" y="232"/>
+                  </a:lnTo>
+                  <a:lnTo>
+                    <a:pt x="60" y="232"/>
+                  </a:lnTo>
+                  <a:lnTo>
+                    <a:pt x="60" y="343"/>
+                  </a:lnTo>
+                  <a:cubicBezTo>
+                    <a:pt x="60" y="351"/>
+                    <a:pt x="57" y="358"/>
+                    <a:pt x="51" y="364"/>
+                  </a:cubicBezTo>
+                  <a:cubicBezTo>
+                    <a:pt x="45" y="370"/>
+                    <a:pt x="38" y="373"/>
+                    <a:pt x="30" y="373"/>
+                  </a:cubicBezTo>
+                  <a:cubicBezTo>
+                    <a:pt x="21" y="373"/>
+                    <a:pt x="14" y="370"/>
+                    <a:pt x="8" y="364"/>
+                  </a:cubicBezTo>
+                  <a:cubicBezTo>
+                    <a:pt x="3" y="358"/>
+                    <a:pt x="0" y="351"/>
+                    <a:pt x="0" y="343"/>
+                  </a:cubicBezTo>
+                  <a:close/>
+                  <a:moveTo>
+                    <a:pt x="111" y="121"/>
+                  </a:moveTo>
+                  <a:cubicBezTo>
+                    <a:pt x="97" y="107"/>
+                    <a:pt x="90" y="90"/>
+                    <a:pt x="90" y="71"/>
+                  </a:cubicBezTo>
+                  <a:cubicBezTo>
+                    <a:pt x="90" y="51"/>
+                    <a:pt x="97" y="35"/>
+                    <a:pt x="111" y="21"/>
+                  </a:cubicBezTo>
+                  <a:cubicBezTo>
+                    <a:pt x="125" y="7"/>
+                    <a:pt x="141" y="0"/>
+                    <a:pt x="161" y="0"/>
+                  </a:cubicBezTo>
+                  <a:cubicBezTo>
+                    <a:pt x="180" y="0"/>
+                    <a:pt x="197" y="7"/>
+                    <a:pt x="211" y="21"/>
+                  </a:cubicBezTo>
+                  <a:cubicBezTo>
+                    <a:pt x="225" y="35"/>
+                    <a:pt x="231" y="51"/>
+                    <a:pt x="231" y="71"/>
+                  </a:cubicBezTo>
+                  <a:cubicBezTo>
+                    <a:pt x="231" y="90"/>
+                    <a:pt x="225" y="107"/>
+                    <a:pt x="211" y="121"/>
+                  </a:cubicBezTo>
+                  <a:cubicBezTo>
+                    <a:pt x="197" y="134"/>
+                    <a:pt x="180" y="141"/>
+                    <a:pt x="161" y="141"/>
+                  </a:cubicBezTo>
+                  <a:cubicBezTo>
+                    <a:pt x="141" y="141"/>
+                    <a:pt x="125" y="134"/>
+                    <a:pt x="111" y="121"/>
+                  </a:cubicBezTo>
+                  <a:close/>
+                </a:path>
+              </a:pathLst>
+            </a:custGeom>
+            <a:solidFill>
+              <a:srgbClr val="272D34"/>
+            </a:solidFill>
+            <a:ln w="0">
+              <a:noFill/>
+              <a:prstDash val="solid"/>
+              <a:round/>
+              <a:headEnd/>
+              <a:tailEnd/>
+            </a:ln>
+          </p:spPr>
+          <p:txBody>
+            <a:bodyPr vert="horz" wrap="square" lIns="91440" tIns="45720" rIns="91440" bIns="45720" numCol="1" anchor="t" anchorCtr="0" compatLnSpc="1">
+              <a:prstTxWarp prst="textNoShape">
+                <a:avLst/>
+              </a:prstTxWarp>
+            </a:bodyPr>
+            <a:lstStyle/>
+            <a:p>
+              <a:endParaRPr lang="de-DE" dirty="0"/>
+            </a:p>
+          </p:txBody>
+        </p:sp>
+        <p:sp>
+          <p:nvSpPr>
+            <p:cNvPr id="3" name="Textfeld 2"/>
+            <p:cNvSpPr txBox="1"/>
+            <p:nvPr/>
+          </p:nvSpPr>
+          <p:spPr>
+            <a:xfrm>
+              <a:off x="349032" y="1191782"/>
+              <a:ext cx="445636" cy="123111"/>
+            </a:xfrm>
+            <a:prstGeom prst="rect">
+              <a:avLst/>
+            </a:prstGeom>
+            <a:noFill/>
+          </p:spPr>
+          <p:txBody>
+            <a:bodyPr wrap="none" lIns="0" tIns="0" rIns="0" bIns="0" rtlCol="0" anchor="ctr">
+              <a:spAutoFit/>
+            </a:bodyPr>
+            <a:lstStyle/>
+            <a:p>
+              <a:pPr algn="ctr"/>
+              <a:r>
+                <a:rPr lang="en-US" sz="800" dirty="0" smtClean="0">
+                  <a:latin typeface="Arial" panose="020B0604020202020204" pitchFamily="34" charset="0"/>
+                  <a:cs typeface="Arial" panose="020B0604020202020204" pitchFamily="34" charset="0"/>
+                </a:rPr>
+                <a:t>Customer</a:t>
+              </a:r>
+            </a:p>
+          </p:txBody>
+        </p:sp>
+      </p:grpSp>
+      <p:sp>
+        <p:nvSpPr>
+          <p:cNvPr id="5" name="Rechteck 4"/>
+          <p:cNvSpPr/>
+          <p:nvPr/>
+        </p:nvSpPr>
+        <p:spPr>
+          <a:xfrm>
+            <a:off x="325659" y="74787"/>
+            <a:ext cx="3168000" cy="45719"/>
+          </a:xfrm>
+          <a:prstGeom prst="rect">
+            <a:avLst/>
+          </a:prstGeom>
+        </p:spPr>
+        <p:style>
+          <a:lnRef idx="2">
+            <a:schemeClr val="accent1">
+              <a:shade val="50000"/>
+            </a:schemeClr>
+          </a:lnRef>
+          <a:fillRef idx="1">
+            <a:schemeClr val="accent1"/>
+          </a:fillRef>
+          <a:effectRef idx="0">
+            <a:schemeClr val="accent1"/>
+          </a:effectRef>
+          <a:fontRef idx="minor">
+            <a:schemeClr val="lt1"/>
+          </a:fontRef>
+        </p:style>
+        <p:txBody>
+          <a:bodyPr rtlCol="0" anchor="ctr"/>
+          <a:lstStyle/>
+          <a:p>
+            <a:pPr algn="ctr"/>
+            <a:endParaRPr lang="en-US"/>
+          </a:p>
+        </p:txBody>
+      </p:sp>
+      <p:grpSp>
+        <p:nvGrpSpPr>
+          <p:cNvPr id="6" name="Gruppieren 5"/>
+          <p:cNvGrpSpPr/>
+          <p:nvPr/>
+        </p:nvGrpSpPr>
+        <p:grpSpPr>
+          <a:xfrm>
+            <a:off x="2839634" y="237525"/>
+            <a:ext cx="654025" cy="826878"/>
+            <a:chOff x="244838" y="641385"/>
+            <a:chExt cx="654025" cy="826878"/>
+          </a:xfrm>
+        </p:grpSpPr>
+        <p:sp>
+          <p:nvSpPr>
+            <p:cNvPr id="7" name="Freeform 390">
+              <a:extLst>
+                <a:ext uri="{FF2B5EF4-FFF2-40B4-BE49-F238E27FC236}">
+                  <a16:creationId xmlns:a16="http://schemas.microsoft.com/office/drawing/2014/main" xmlns="" id="{DC225B88-4404-4AFD-8BCC-F7DEF4947EA2}"/>
+                </a:ext>
+              </a:extLst>
+            </p:cNvPr>
+            <p:cNvSpPr>
+              <a:spLocks noEditPoints="1"/>
+            </p:cNvSpPr>
+            <p:nvPr/>
+          </p:nvSpPr>
+          <p:spPr bwMode="auto">
+            <a:xfrm>
+              <a:off x="410829" y="641385"/>
+              <a:ext cx="322041" cy="550397"/>
+            </a:xfrm>
+            <a:custGeom>
+              <a:avLst/>
+              <a:gdLst>
+                <a:gd name="T0" fmla="*/ 0 w 322"/>
+                <a:gd name="T1" fmla="*/ 343 h 555"/>
+                <a:gd name="T2" fmla="*/ 0 w 322"/>
+                <a:gd name="T3" fmla="*/ 212 h 555"/>
+                <a:gd name="T4" fmla="*/ 17 w 322"/>
+                <a:gd name="T5" fmla="*/ 169 h 555"/>
+                <a:gd name="T6" fmla="*/ 60 w 322"/>
+                <a:gd name="T7" fmla="*/ 151 h 555"/>
+                <a:gd name="T8" fmla="*/ 262 w 322"/>
+                <a:gd name="T9" fmla="*/ 151 h 555"/>
+                <a:gd name="T10" fmla="*/ 305 w 322"/>
+                <a:gd name="T11" fmla="*/ 169 h 555"/>
+                <a:gd name="T12" fmla="*/ 322 w 322"/>
+                <a:gd name="T13" fmla="*/ 212 h 555"/>
+                <a:gd name="T14" fmla="*/ 322 w 322"/>
+                <a:gd name="T15" fmla="*/ 343 h 555"/>
+                <a:gd name="T16" fmla="*/ 313 w 322"/>
+                <a:gd name="T17" fmla="*/ 364 h 555"/>
+                <a:gd name="T18" fmla="*/ 292 w 322"/>
+                <a:gd name="T19" fmla="*/ 373 h 555"/>
+                <a:gd name="T20" fmla="*/ 271 w 322"/>
+                <a:gd name="T21" fmla="*/ 364 h 555"/>
+                <a:gd name="T22" fmla="*/ 262 w 322"/>
+                <a:gd name="T23" fmla="*/ 343 h 555"/>
+                <a:gd name="T24" fmla="*/ 262 w 322"/>
+                <a:gd name="T25" fmla="*/ 232 h 555"/>
+                <a:gd name="T26" fmla="*/ 242 w 322"/>
+                <a:gd name="T27" fmla="*/ 232 h 555"/>
+                <a:gd name="T28" fmla="*/ 242 w 322"/>
+                <a:gd name="T29" fmla="*/ 519 h 555"/>
+                <a:gd name="T30" fmla="*/ 231 w 322"/>
+                <a:gd name="T31" fmla="*/ 544 h 555"/>
+                <a:gd name="T32" fmla="*/ 206 w 322"/>
+                <a:gd name="T33" fmla="*/ 555 h 555"/>
+                <a:gd name="T34" fmla="*/ 181 w 322"/>
+                <a:gd name="T35" fmla="*/ 544 h 555"/>
+                <a:gd name="T36" fmla="*/ 171 w 322"/>
+                <a:gd name="T37" fmla="*/ 519 h 555"/>
+                <a:gd name="T38" fmla="*/ 171 w 322"/>
+                <a:gd name="T39" fmla="*/ 373 h 555"/>
+                <a:gd name="T40" fmla="*/ 151 w 322"/>
+                <a:gd name="T41" fmla="*/ 373 h 555"/>
+                <a:gd name="T42" fmla="*/ 151 w 322"/>
+                <a:gd name="T43" fmla="*/ 519 h 555"/>
+                <a:gd name="T44" fmla="*/ 140 w 322"/>
+                <a:gd name="T45" fmla="*/ 544 h 555"/>
+                <a:gd name="T46" fmla="*/ 116 w 322"/>
+                <a:gd name="T47" fmla="*/ 555 h 555"/>
+                <a:gd name="T48" fmla="*/ 91 w 322"/>
+                <a:gd name="T49" fmla="*/ 544 h 555"/>
+                <a:gd name="T50" fmla="*/ 80 w 322"/>
+                <a:gd name="T51" fmla="*/ 519 h 555"/>
+                <a:gd name="T52" fmla="*/ 80 w 322"/>
+                <a:gd name="T53" fmla="*/ 232 h 555"/>
+                <a:gd name="T54" fmla="*/ 60 w 322"/>
+                <a:gd name="T55" fmla="*/ 232 h 555"/>
+                <a:gd name="T56" fmla="*/ 60 w 322"/>
+                <a:gd name="T57" fmla="*/ 343 h 555"/>
+                <a:gd name="T58" fmla="*/ 51 w 322"/>
+                <a:gd name="T59" fmla="*/ 364 h 555"/>
+                <a:gd name="T60" fmla="*/ 30 w 322"/>
+                <a:gd name="T61" fmla="*/ 373 h 555"/>
+                <a:gd name="T62" fmla="*/ 8 w 322"/>
+                <a:gd name="T63" fmla="*/ 364 h 555"/>
+                <a:gd name="T64" fmla="*/ 0 w 322"/>
+                <a:gd name="T65" fmla="*/ 343 h 555"/>
+                <a:gd name="T66" fmla="*/ 111 w 322"/>
+                <a:gd name="T67" fmla="*/ 121 h 555"/>
+                <a:gd name="T68" fmla="*/ 90 w 322"/>
+                <a:gd name="T69" fmla="*/ 71 h 555"/>
+                <a:gd name="T70" fmla="*/ 111 w 322"/>
+                <a:gd name="T71" fmla="*/ 21 h 555"/>
+                <a:gd name="T72" fmla="*/ 161 w 322"/>
+                <a:gd name="T73" fmla="*/ 0 h 555"/>
+                <a:gd name="T74" fmla="*/ 211 w 322"/>
+                <a:gd name="T75" fmla="*/ 21 h 555"/>
+                <a:gd name="T76" fmla="*/ 231 w 322"/>
+                <a:gd name="T77" fmla="*/ 71 h 555"/>
+                <a:gd name="T78" fmla="*/ 211 w 322"/>
+                <a:gd name="T79" fmla="*/ 121 h 555"/>
+                <a:gd name="T80" fmla="*/ 161 w 322"/>
+                <a:gd name="T81" fmla="*/ 141 h 555"/>
+                <a:gd name="T82" fmla="*/ 111 w 322"/>
+                <a:gd name="T83" fmla="*/ 121 h 555"/>
+              </a:gdLst>
+              <a:ahLst/>
+              <a:cxnLst>
+                <a:cxn ang="0">
+                  <a:pos x="T0" y="T1"/>
+                </a:cxn>
+                <a:cxn ang="0">
+                  <a:pos x="T2" y="T3"/>
+                </a:cxn>
+                <a:cxn ang="0">
+                  <a:pos x="T4" y="T5"/>
+                </a:cxn>
+                <a:cxn ang="0">
+                  <a:pos x="T6" y="T7"/>
+                </a:cxn>
+                <a:cxn ang="0">
+                  <a:pos x="T8" y="T9"/>
+                </a:cxn>
+                <a:cxn ang="0">
+                  <a:pos x="T10" y="T11"/>
+                </a:cxn>
+                <a:cxn ang="0">
+                  <a:pos x="T12" y="T13"/>
+                </a:cxn>
+                <a:cxn ang="0">
+                  <a:pos x="T14" y="T15"/>
+                </a:cxn>
+                <a:cxn ang="0">
+                  <a:pos x="T16" y="T17"/>
+                </a:cxn>
+                <a:cxn ang="0">
+                  <a:pos x="T18" y="T19"/>
+                </a:cxn>
+                <a:cxn ang="0">
+                  <a:pos x="T20" y="T21"/>
+                </a:cxn>
+                <a:cxn ang="0">
+                  <a:pos x="T22" y="T23"/>
+                </a:cxn>
+                <a:cxn ang="0">
+                  <a:pos x="T24" y="T25"/>
+                </a:cxn>
+                <a:cxn ang="0">
+                  <a:pos x="T26" y="T27"/>
+                </a:cxn>
+                <a:cxn ang="0">
+                  <a:pos x="T28" y="T29"/>
+                </a:cxn>
+                <a:cxn ang="0">
+                  <a:pos x="T30" y="T31"/>
+                </a:cxn>
+                <a:cxn ang="0">
+                  <a:pos x="T32" y="T33"/>
+                </a:cxn>
+                <a:cxn ang="0">
+                  <a:pos x="T34" y="T35"/>
+                </a:cxn>
+                <a:cxn ang="0">
+                  <a:pos x="T36" y="T37"/>
+                </a:cxn>
+                <a:cxn ang="0">
+                  <a:pos x="T38" y="T39"/>
+                </a:cxn>
+                <a:cxn ang="0">
+                  <a:pos x="T40" y="T41"/>
+                </a:cxn>
+                <a:cxn ang="0">
+                  <a:pos x="T42" y="T43"/>
+                </a:cxn>
+                <a:cxn ang="0">
+                  <a:pos x="T44" y="T45"/>
+                </a:cxn>
+                <a:cxn ang="0">
+                  <a:pos x="T46" y="T47"/>
+                </a:cxn>
+                <a:cxn ang="0">
+                  <a:pos x="T48" y="T49"/>
+                </a:cxn>
+                <a:cxn ang="0">
+                  <a:pos x="T50" y="T51"/>
+                </a:cxn>
+                <a:cxn ang="0">
+                  <a:pos x="T52" y="T53"/>
+                </a:cxn>
+                <a:cxn ang="0">
+                  <a:pos x="T54" y="T55"/>
+                </a:cxn>
+                <a:cxn ang="0">
+                  <a:pos x="T56" y="T57"/>
+                </a:cxn>
+                <a:cxn ang="0">
+                  <a:pos x="T58" y="T59"/>
+                </a:cxn>
+                <a:cxn ang="0">
+                  <a:pos x="T60" y="T61"/>
+                </a:cxn>
+                <a:cxn ang="0">
+                  <a:pos x="T62" y="T63"/>
+                </a:cxn>
+                <a:cxn ang="0">
+                  <a:pos x="T64" y="T65"/>
+                </a:cxn>
+                <a:cxn ang="0">
+                  <a:pos x="T66" y="T67"/>
+                </a:cxn>
+                <a:cxn ang="0">
+                  <a:pos x="T68" y="T69"/>
+                </a:cxn>
+                <a:cxn ang="0">
+                  <a:pos x="T70" y="T71"/>
+                </a:cxn>
+                <a:cxn ang="0">
+                  <a:pos x="T72" y="T73"/>
+                </a:cxn>
+                <a:cxn ang="0">
+                  <a:pos x="T74" y="T75"/>
+                </a:cxn>
+                <a:cxn ang="0">
+                  <a:pos x="T76" y="T77"/>
+                </a:cxn>
+                <a:cxn ang="0">
+                  <a:pos x="T78" y="T79"/>
+                </a:cxn>
+                <a:cxn ang="0">
+                  <a:pos x="T80" y="T81"/>
+                </a:cxn>
+                <a:cxn ang="0">
+                  <a:pos x="T82" y="T83"/>
+                </a:cxn>
+              </a:cxnLst>
+              <a:rect l="0" t="0" r="r" b="b"/>
+              <a:pathLst>
+                <a:path w="322" h="555">
+                  <a:moveTo>
+                    <a:pt x="0" y="343"/>
+                  </a:moveTo>
+                  <a:lnTo>
+                    <a:pt x="0" y="212"/>
+                  </a:lnTo>
+                  <a:cubicBezTo>
+                    <a:pt x="0" y="195"/>
+                    <a:pt x="5" y="181"/>
+                    <a:pt x="17" y="169"/>
+                  </a:cubicBezTo>
+                  <a:cubicBezTo>
+                    <a:pt x="29" y="157"/>
+                    <a:pt x="43" y="151"/>
+                    <a:pt x="60" y="151"/>
+                  </a:cubicBezTo>
+                  <a:lnTo>
+                    <a:pt x="262" y="151"/>
+                  </a:lnTo>
+                  <a:cubicBezTo>
+                    <a:pt x="278" y="151"/>
+                    <a:pt x="293" y="157"/>
+                    <a:pt x="305" y="169"/>
+                  </a:cubicBezTo>
+                  <a:cubicBezTo>
+                    <a:pt x="316" y="181"/>
+                    <a:pt x="322" y="195"/>
+                    <a:pt x="322" y="212"/>
+                  </a:cubicBezTo>
+                  <a:lnTo>
+                    <a:pt x="322" y="343"/>
+                  </a:lnTo>
+                  <a:cubicBezTo>
+                    <a:pt x="322" y="351"/>
+                    <a:pt x="319" y="358"/>
+                    <a:pt x="313" y="364"/>
+                  </a:cubicBezTo>
+                  <a:cubicBezTo>
+                    <a:pt x="307" y="370"/>
+                    <a:pt x="300" y="373"/>
+                    <a:pt x="292" y="373"/>
+                  </a:cubicBezTo>
+                  <a:cubicBezTo>
+                    <a:pt x="284" y="373"/>
+                    <a:pt x="276" y="370"/>
+                    <a:pt x="271" y="364"/>
+                  </a:cubicBezTo>
+                  <a:cubicBezTo>
+                    <a:pt x="265" y="358"/>
+                    <a:pt x="262" y="351"/>
+                    <a:pt x="262" y="343"/>
+                  </a:cubicBezTo>
+                  <a:lnTo>
+                    <a:pt x="262" y="232"/>
+                  </a:lnTo>
+                  <a:lnTo>
+                    <a:pt x="242" y="232"/>
+                  </a:lnTo>
+                  <a:lnTo>
+                    <a:pt x="242" y="519"/>
+                  </a:lnTo>
+                  <a:cubicBezTo>
+                    <a:pt x="242" y="529"/>
+                    <a:pt x="238" y="537"/>
+                    <a:pt x="231" y="544"/>
+                  </a:cubicBezTo>
+                  <a:cubicBezTo>
+                    <a:pt x="224" y="551"/>
+                    <a:pt x="216" y="555"/>
+                    <a:pt x="206" y="555"/>
+                  </a:cubicBezTo>
+                  <a:cubicBezTo>
+                    <a:pt x="197" y="555"/>
+                    <a:pt x="188" y="551"/>
+                    <a:pt x="181" y="544"/>
+                  </a:cubicBezTo>
+                  <a:cubicBezTo>
+                    <a:pt x="174" y="537"/>
+                    <a:pt x="171" y="529"/>
+                    <a:pt x="171" y="519"/>
+                  </a:cubicBezTo>
+                  <a:lnTo>
+                    <a:pt x="171" y="373"/>
+                  </a:lnTo>
+                  <a:lnTo>
+                    <a:pt x="151" y="373"/>
+                  </a:lnTo>
+                  <a:lnTo>
+                    <a:pt x="151" y="519"/>
+                  </a:lnTo>
+                  <a:cubicBezTo>
+                    <a:pt x="151" y="529"/>
+                    <a:pt x="147" y="537"/>
+                    <a:pt x="140" y="544"/>
+                  </a:cubicBezTo>
+                  <a:cubicBezTo>
+                    <a:pt x="133" y="551"/>
+                    <a:pt x="125" y="555"/>
+                    <a:pt x="116" y="555"/>
+                  </a:cubicBezTo>
+                  <a:cubicBezTo>
+                    <a:pt x="106" y="555"/>
+                    <a:pt x="98" y="551"/>
+                    <a:pt x="91" y="544"/>
+                  </a:cubicBezTo>
+                  <a:cubicBezTo>
+                    <a:pt x="84" y="537"/>
+                    <a:pt x="80" y="529"/>
+                    <a:pt x="80" y="519"/>
+                  </a:cubicBezTo>
+                  <a:lnTo>
+                    <a:pt x="80" y="232"/>
+                  </a:lnTo>
+                  <a:lnTo>
+                    <a:pt x="60" y="232"/>
+                  </a:lnTo>
+                  <a:lnTo>
+                    <a:pt x="60" y="343"/>
+                  </a:lnTo>
+                  <a:cubicBezTo>
+                    <a:pt x="60" y="351"/>
+                    <a:pt x="57" y="358"/>
+                    <a:pt x="51" y="364"/>
+                  </a:cubicBezTo>
+                  <a:cubicBezTo>
+                    <a:pt x="45" y="370"/>
+                    <a:pt x="38" y="373"/>
+                    <a:pt x="30" y="373"/>
+                  </a:cubicBezTo>
+                  <a:cubicBezTo>
+                    <a:pt x="21" y="373"/>
+                    <a:pt x="14" y="370"/>
+                    <a:pt x="8" y="364"/>
+                  </a:cubicBezTo>
+                  <a:cubicBezTo>
+                    <a:pt x="3" y="358"/>
+                    <a:pt x="0" y="351"/>
+                    <a:pt x="0" y="343"/>
+                  </a:cubicBezTo>
+                  <a:close/>
+                  <a:moveTo>
+                    <a:pt x="111" y="121"/>
+                  </a:moveTo>
+                  <a:cubicBezTo>
+                    <a:pt x="97" y="107"/>
+                    <a:pt x="90" y="90"/>
+                    <a:pt x="90" y="71"/>
+                  </a:cubicBezTo>
+                  <a:cubicBezTo>
+                    <a:pt x="90" y="51"/>
+                    <a:pt x="97" y="35"/>
+                    <a:pt x="111" y="21"/>
+                  </a:cubicBezTo>
+                  <a:cubicBezTo>
+                    <a:pt x="125" y="7"/>
+                    <a:pt x="141" y="0"/>
+                    <a:pt x="161" y="0"/>
+                  </a:cubicBezTo>
+                  <a:cubicBezTo>
+                    <a:pt x="180" y="0"/>
+                    <a:pt x="197" y="7"/>
+                    <a:pt x="211" y="21"/>
+                  </a:cubicBezTo>
+                  <a:cubicBezTo>
+                    <a:pt x="225" y="35"/>
+                    <a:pt x="231" y="51"/>
+                    <a:pt x="231" y="71"/>
+                  </a:cubicBezTo>
+                  <a:cubicBezTo>
+                    <a:pt x="231" y="90"/>
+                    <a:pt x="225" y="107"/>
+                    <a:pt x="211" y="121"/>
+                  </a:cubicBezTo>
+                  <a:cubicBezTo>
+                    <a:pt x="197" y="134"/>
+                    <a:pt x="180" y="141"/>
+                    <a:pt x="161" y="141"/>
+                  </a:cubicBezTo>
+                  <a:cubicBezTo>
+                    <a:pt x="141" y="141"/>
+                    <a:pt x="125" y="134"/>
+                    <a:pt x="111" y="121"/>
+                  </a:cubicBezTo>
+                  <a:close/>
+                </a:path>
+              </a:pathLst>
+            </a:custGeom>
+            <a:solidFill>
+              <a:srgbClr val="272D34"/>
+            </a:solidFill>
+            <a:ln w="0">
+              <a:noFill/>
+              <a:prstDash val="solid"/>
+              <a:round/>
+              <a:headEnd/>
+              <a:tailEnd/>
+            </a:ln>
+          </p:spPr>
+          <p:txBody>
+            <a:bodyPr vert="horz" wrap="square" lIns="91440" tIns="45720" rIns="91440" bIns="45720" numCol="1" anchor="t" anchorCtr="0" compatLnSpc="1">
+              <a:prstTxWarp prst="textNoShape">
+                <a:avLst/>
+              </a:prstTxWarp>
+            </a:bodyPr>
+            <a:lstStyle/>
+            <a:p>
+              <a:endParaRPr lang="de-DE" dirty="0"/>
+            </a:p>
+          </p:txBody>
+        </p:sp>
+        <p:sp>
+          <p:nvSpPr>
+            <p:cNvPr id="8" name="Textfeld 7"/>
+            <p:cNvSpPr txBox="1"/>
+            <p:nvPr/>
+          </p:nvSpPr>
+          <p:spPr>
+            <a:xfrm>
+              <a:off x="244838" y="1149339"/>
+              <a:ext cx="654025" cy="318924"/>
+            </a:xfrm>
+            <a:prstGeom prst="rect">
+              <a:avLst/>
+            </a:prstGeom>
+            <a:noFill/>
+          </p:spPr>
+          <p:txBody>
+            <a:bodyPr wrap="none" lIns="0" tIns="36000" rIns="0" bIns="36000" rtlCol="0" anchor="ctr">
+              <a:spAutoFit/>
+            </a:bodyPr>
+            <a:lstStyle/>
+            <a:p>
+              <a:pPr algn="ctr"/>
+              <a:r>
+                <a:rPr lang="en-US" sz="800" dirty="0" smtClean="0">
+                  <a:latin typeface="Arial" panose="020B0604020202020204" pitchFamily="34" charset="0"/>
+                  <a:cs typeface="Arial" panose="020B0604020202020204" pitchFamily="34" charset="0"/>
+                </a:rPr>
+                <a:t>Manufacturing</a:t>
+              </a:r>
+              <a:br>
+                <a:rPr lang="en-US" sz="800" dirty="0" smtClean="0">
+                  <a:latin typeface="Arial" panose="020B0604020202020204" pitchFamily="34" charset="0"/>
+                  <a:cs typeface="Arial" panose="020B0604020202020204" pitchFamily="34" charset="0"/>
+                </a:rPr>
+              </a:br>
+              <a:r>
+                <a:rPr lang="en-US" sz="800" dirty="0" smtClean="0">
+                  <a:latin typeface="Arial" panose="020B0604020202020204" pitchFamily="34" charset="0"/>
+                  <a:cs typeface="Arial" panose="020B0604020202020204" pitchFamily="34" charset="0"/>
+                </a:rPr>
+                <a:t>Expert</a:t>
+              </a:r>
+            </a:p>
+          </p:txBody>
+        </p:sp>
+      </p:grpSp>
+      <p:grpSp>
+        <p:nvGrpSpPr>
+          <p:cNvPr id="9" name="Gruppieren 8"/>
+          <p:cNvGrpSpPr/>
+          <p:nvPr/>
+        </p:nvGrpSpPr>
+        <p:grpSpPr>
+          <a:xfrm>
+            <a:off x="2975086" y="1954008"/>
+            <a:ext cx="383118" cy="796618"/>
+            <a:chOff x="380291" y="641385"/>
+            <a:chExt cx="383118" cy="796618"/>
+          </a:xfrm>
+        </p:grpSpPr>
+        <p:sp>
+          <p:nvSpPr>
+            <p:cNvPr id="10" name="Freeform 390">
+              <a:extLst>
+                <a:ext uri="{FF2B5EF4-FFF2-40B4-BE49-F238E27FC236}">
+                  <a16:creationId xmlns:a16="http://schemas.microsoft.com/office/drawing/2014/main" xmlns="" id="{DC225B88-4404-4AFD-8BCC-F7DEF4947EA2}"/>
+                </a:ext>
+              </a:extLst>
+            </p:cNvPr>
+            <p:cNvSpPr>
+              <a:spLocks noEditPoints="1"/>
+            </p:cNvSpPr>
+            <p:nvPr/>
+          </p:nvSpPr>
+          <p:spPr bwMode="auto">
+            <a:xfrm>
+              <a:off x="410829" y="641385"/>
+              <a:ext cx="322041" cy="550397"/>
+            </a:xfrm>
+            <a:custGeom>
+              <a:avLst/>
+              <a:gdLst>
+                <a:gd name="T0" fmla="*/ 0 w 322"/>
+                <a:gd name="T1" fmla="*/ 343 h 555"/>
+                <a:gd name="T2" fmla="*/ 0 w 322"/>
+                <a:gd name="T3" fmla="*/ 212 h 555"/>
+                <a:gd name="T4" fmla="*/ 17 w 322"/>
+                <a:gd name="T5" fmla="*/ 169 h 555"/>
+                <a:gd name="T6" fmla="*/ 60 w 322"/>
+                <a:gd name="T7" fmla="*/ 151 h 555"/>
+                <a:gd name="T8" fmla="*/ 262 w 322"/>
+                <a:gd name="T9" fmla="*/ 151 h 555"/>
+                <a:gd name="T10" fmla="*/ 305 w 322"/>
+                <a:gd name="T11" fmla="*/ 169 h 555"/>
+                <a:gd name="T12" fmla="*/ 322 w 322"/>
+                <a:gd name="T13" fmla="*/ 212 h 555"/>
+                <a:gd name="T14" fmla="*/ 322 w 322"/>
+                <a:gd name="T15" fmla="*/ 343 h 555"/>
+                <a:gd name="T16" fmla="*/ 313 w 322"/>
+                <a:gd name="T17" fmla="*/ 364 h 555"/>
+                <a:gd name="T18" fmla="*/ 292 w 322"/>
+                <a:gd name="T19" fmla="*/ 373 h 555"/>
+                <a:gd name="T20" fmla="*/ 271 w 322"/>
+                <a:gd name="T21" fmla="*/ 364 h 555"/>
+                <a:gd name="T22" fmla="*/ 262 w 322"/>
+                <a:gd name="T23" fmla="*/ 343 h 555"/>
+                <a:gd name="T24" fmla="*/ 262 w 322"/>
+                <a:gd name="T25" fmla="*/ 232 h 555"/>
+                <a:gd name="T26" fmla="*/ 242 w 322"/>
+                <a:gd name="T27" fmla="*/ 232 h 555"/>
+                <a:gd name="T28" fmla="*/ 242 w 322"/>
+                <a:gd name="T29" fmla="*/ 519 h 555"/>
+                <a:gd name="T30" fmla="*/ 231 w 322"/>
+                <a:gd name="T31" fmla="*/ 544 h 555"/>
+                <a:gd name="T32" fmla="*/ 206 w 322"/>
+                <a:gd name="T33" fmla="*/ 555 h 555"/>
+                <a:gd name="T34" fmla="*/ 181 w 322"/>
+                <a:gd name="T35" fmla="*/ 544 h 555"/>
+                <a:gd name="T36" fmla="*/ 171 w 322"/>
+                <a:gd name="T37" fmla="*/ 519 h 555"/>
+                <a:gd name="T38" fmla="*/ 171 w 322"/>
+                <a:gd name="T39" fmla="*/ 373 h 555"/>
+                <a:gd name="T40" fmla="*/ 151 w 322"/>
+                <a:gd name="T41" fmla="*/ 373 h 555"/>
+                <a:gd name="T42" fmla="*/ 151 w 322"/>
+                <a:gd name="T43" fmla="*/ 519 h 555"/>
+                <a:gd name="T44" fmla="*/ 140 w 322"/>
+                <a:gd name="T45" fmla="*/ 544 h 555"/>
+                <a:gd name="T46" fmla="*/ 116 w 322"/>
+                <a:gd name="T47" fmla="*/ 555 h 555"/>
+                <a:gd name="T48" fmla="*/ 91 w 322"/>
+                <a:gd name="T49" fmla="*/ 544 h 555"/>
+                <a:gd name="T50" fmla="*/ 80 w 322"/>
+                <a:gd name="T51" fmla="*/ 519 h 555"/>
+                <a:gd name="T52" fmla="*/ 80 w 322"/>
+                <a:gd name="T53" fmla="*/ 232 h 555"/>
+                <a:gd name="T54" fmla="*/ 60 w 322"/>
+                <a:gd name="T55" fmla="*/ 232 h 555"/>
+                <a:gd name="T56" fmla="*/ 60 w 322"/>
+                <a:gd name="T57" fmla="*/ 343 h 555"/>
+                <a:gd name="T58" fmla="*/ 51 w 322"/>
+                <a:gd name="T59" fmla="*/ 364 h 555"/>
+                <a:gd name="T60" fmla="*/ 30 w 322"/>
+                <a:gd name="T61" fmla="*/ 373 h 555"/>
+                <a:gd name="T62" fmla="*/ 8 w 322"/>
+                <a:gd name="T63" fmla="*/ 364 h 555"/>
+                <a:gd name="T64" fmla="*/ 0 w 322"/>
+                <a:gd name="T65" fmla="*/ 343 h 555"/>
+                <a:gd name="T66" fmla="*/ 111 w 322"/>
+                <a:gd name="T67" fmla="*/ 121 h 555"/>
+                <a:gd name="T68" fmla="*/ 90 w 322"/>
+                <a:gd name="T69" fmla="*/ 71 h 555"/>
+                <a:gd name="T70" fmla="*/ 111 w 322"/>
+                <a:gd name="T71" fmla="*/ 21 h 555"/>
+                <a:gd name="T72" fmla="*/ 161 w 322"/>
+                <a:gd name="T73" fmla="*/ 0 h 555"/>
+                <a:gd name="T74" fmla="*/ 211 w 322"/>
+                <a:gd name="T75" fmla="*/ 21 h 555"/>
+                <a:gd name="T76" fmla="*/ 231 w 322"/>
+                <a:gd name="T77" fmla="*/ 71 h 555"/>
+                <a:gd name="T78" fmla="*/ 211 w 322"/>
+                <a:gd name="T79" fmla="*/ 121 h 555"/>
+                <a:gd name="T80" fmla="*/ 161 w 322"/>
+                <a:gd name="T81" fmla="*/ 141 h 555"/>
+                <a:gd name="T82" fmla="*/ 111 w 322"/>
+                <a:gd name="T83" fmla="*/ 121 h 555"/>
+              </a:gdLst>
+              <a:ahLst/>
+              <a:cxnLst>
+                <a:cxn ang="0">
+                  <a:pos x="T0" y="T1"/>
+                </a:cxn>
+                <a:cxn ang="0">
+                  <a:pos x="T2" y="T3"/>
+                </a:cxn>
+                <a:cxn ang="0">
+                  <a:pos x="T4" y="T5"/>
+                </a:cxn>
+                <a:cxn ang="0">
+                  <a:pos x="T6" y="T7"/>
+                </a:cxn>
+                <a:cxn ang="0">
+                  <a:pos x="T8" y="T9"/>
+                </a:cxn>
+                <a:cxn ang="0">
+                  <a:pos x="T10" y="T11"/>
+                </a:cxn>
+                <a:cxn ang="0">
+                  <a:pos x="T12" y="T13"/>
+                </a:cxn>
+                <a:cxn ang="0">
+                  <a:pos x="T14" y="T15"/>
+                </a:cxn>
+                <a:cxn ang="0">
+                  <a:pos x="T16" y="T17"/>
+                </a:cxn>
+                <a:cxn ang="0">
+                  <a:pos x="T18" y="T19"/>
+                </a:cxn>
+                <a:cxn ang="0">
+                  <a:pos x="T20" y="T21"/>
+                </a:cxn>
+                <a:cxn ang="0">
+                  <a:pos x="T22" y="T23"/>
+                </a:cxn>
+                <a:cxn ang="0">
+                  <a:pos x="T24" y="T25"/>
+                </a:cxn>
+                <a:cxn ang="0">
+                  <a:pos x="T26" y="T27"/>
+                </a:cxn>
+                <a:cxn ang="0">
+                  <a:pos x="T28" y="T29"/>
+                </a:cxn>
+                <a:cxn ang="0">
+                  <a:pos x="T30" y="T31"/>
+                </a:cxn>
+                <a:cxn ang="0">
+                  <a:pos x="T32" y="T33"/>
+                </a:cxn>
+                <a:cxn ang="0">
+                  <a:pos x="T34" y="T35"/>
+                </a:cxn>
+                <a:cxn ang="0">
+                  <a:pos x="T36" y="T37"/>
+                </a:cxn>
+                <a:cxn ang="0">
+                  <a:pos x="T38" y="T39"/>
+                </a:cxn>
+                <a:cxn ang="0">
+                  <a:pos x="T40" y="T41"/>
+                </a:cxn>
+                <a:cxn ang="0">
+                  <a:pos x="T42" y="T43"/>
+                </a:cxn>
+                <a:cxn ang="0">
+                  <a:pos x="T44" y="T45"/>
+                </a:cxn>
+                <a:cxn ang="0">
+                  <a:pos x="T46" y="T47"/>
+                </a:cxn>
+                <a:cxn ang="0">
+                  <a:pos x="T48" y="T49"/>
+                </a:cxn>
+                <a:cxn ang="0">
+                  <a:pos x="T50" y="T51"/>
+                </a:cxn>
+                <a:cxn ang="0">
+                  <a:pos x="T52" y="T53"/>
+                </a:cxn>
+                <a:cxn ang="0">
+                  <a:pos x="T54" y="T55"/>
+                </a:cxn>
+                <a:cxn ang="0">
+                  <a:pos x="T56" y="T57"/>
+                </a:cxn>
+                <a:cxn ang="0">
+                  <a:pos x="T58" y="T59"/>
+                </a:cxn>
+                <a:cxn ang="0">
+                  <a:pos x="T60" y="T61"/>
+                </a:cxn>
+                <a:cxn ang="0">
+                  <a:pos x="T62" y="T63"/>
+                </a:cxn>
+                <a:cxn ang="0">
+                  <a:pos x="T64" y="T65"/>
+                </a:cxn>
+                <a:cxn ang="0">
+                  <a:pos x="T66" y="T67"/>
+                </a:cxn>
+                <a:cxn ang="0">
+                  <a:pos x="T68" y="T69"/>
+                </a:cxn>
+                <a:cxn ang="0">
+                  <a:pos x="T70" y="T71"/>
+                </a:cxn>
+                <a:cxn ang="0">
+                  <a:pos x="T72" y="T73"/>
+                </a:cxn>
+                <a:cxn ang="0">
+                  <a:pos x="T74" y="T75"/>
+                </a:cxn>
+                <a:cxn ang="0">
+                  <a:pos x="T76" y="T77"/>
+                </a:cxn>
+                <a:cxn ang="0">
+                  <a:pos x="T78" y="T79"/>
+                </a:cxn>
+                <a:cxn ang="0">
+                  <a:pos x="T80" y="T81"/>
+                </a:cxn>
+                <a:cxn ang="0">
+                  <a:pos x="T82" y="T83"/>
+                </a:cxn>
+              </a:cxnLst>
+              <a:rect l="0" t="0" r="r" b="b"/>
+              <a:pathLst>
+                <a:path w="322" h="555">
+                  <a:moveTo>
+                    <a:pt x="0" y="343"/>
+                  </a:moveTo>
+                  <a:lnTo>
+                    <a:pt x="0" y="212"/>
+                  </a:lnTo>
+                  <a:cubicBezTo>
+                    <a:pt x="0" y="195"/>
+                    <a:pt x="5" y="181"/>
+                    <a:pt x="17" y="169"/>
+                  </a:cubicBezTo>
+                  <a:cubicBezTo>
+                    <a:pt x="29" y="157"/>
+                    <a:pt x="43" y="151"/>
+                    <a:pt x="60" y="151"/>
+                  </a:cubicBezTo>
+                  <a:lnTo>
+                    <a:pt x="262" y="151"/>
+                  </a:lnTo>
+                  <a:cubicBezTo>
+                    <a:pt x="278" y="151"/>
+                    <a:pt x="293" y="157"/>
+                    <a:pt x="305" y="169"/>
+                  </a:cubicBezTo>
+                  <a:cubicBezTo>
+                    <a:pt x="316" y="181"/>
+                    <a:pt x="322" y="195"/>
+                    <a:pt x="322" y="212"/>
+                  </a:cubicBezTo>
+                  <a:lnTo>
+                    <a:pt x="322" y="343"/>
+                  </a:lnTo>
+                  <a:cubicBezTo>
+                    <a:pt x="322" y="351"/>
+                    <a:pt x="319" y="358"/>
+                    <a:pt x="313" y="364"/>
+                  </a:cubicBezTo>
+                  <a:cubicBezTo>
+                    <a:pt x="307" y="370"/>
+                    <a:pt x="300" y="373"/>
+                    <a:pt x="292" y="373"/>
+                  </a:cubicBezTo>
+                  <a:cubicBezTo>
+                    <a:pt x="284" y="373"/>
+                    <a:pt x="276" y="370"/>
+                    <a:pt x="271" y="364"/>
+                  </a:cubicBezTo>
+                  <a:cubicBezTo>
+                    <a:pt x="265" y="358"/>
+                    <a:pt x="262" y="351"/>
+                    <a:pt x="262" y="343"/>
+                  </a:cubicBezTo>
+                  <a:lnTo>
+                    <a:pt x="262" y="232"/>
+                  </a:lnTo>
+                  <a:lnTo>
+                    <a:pt x="242" y="232"/>
+                  </a:lnTo>
+                  <a:lnTo>
+                    <a:pt x="242" y="519"/>
+                  </a:lnTo>
+                  <a:cubicBezTo>
+                    <a:pt x="242" y="529"/>
+                    <a:pt x="238" y="537"/>
+                    <a:pt x="231" y="544"/>
+                  </a:cubicBezTo>
+                  <a:cubicBezTo>
+                    <a:pt x="224" y="551"/>
+                    <a:pt x="216" y="555"/>
+                    <a:pt x="206" y="555"/>
+                  </a:cubicBezTo>
+                  <a:cubicBezTo>
+                    <a:pt x="197" y="555"/>
+                    <a:pt x="188" y="551"/>
+                    <a:pt x="181" y="544"/>
+                  </a:cubicBezTo>
+                  <a:cubicBezTo>
+                    <a:pt x="174" y="537"/>
+                    <a:pt x="171" y="529"/>
+                    <a:pt x="171" y="519"/>
+                  </a:cubicBezTo>
+                  <a:lnTo>
+                    <a:pt x="171" y="373"/>
+                  </a:lnTo>
+                  <a:lnTo>
+                    <a:pt x="151" y="373"/>
+                  </a:lnTo>
+                  <a:lnTo>
+                    <a:pt x="151" y="519"/>
+                  </a:lnTo>
+                  <a:cubicBezTo>
+                    <a:pt x="151" y="529"/>
+                    <a:pt x="147" y="537"/>
+                    <a:pt x="140" y="544"/>
+                  </a:cubicBezTo>
+                  <a:cubicBezTo>
+                    <a:pt x="133" y="551"/>
+                    <a:pt x="125" y="555"/>
+                    <a:pt x="116" y="555"/>
+                  </a:cubicBezTo>
+                  <a:cubicBezTo>
+                    <a:pt x="106" y="555"/>
+                    <a:pt x="98" y="551"/>
+                    <a:pt x="91" y="544"/>
+                  </a:cubicBezTo>
+                  <a:cubicBezTo>
+                    <a:pt x="84" y="537"/>
+                    <a:pt x="80" y="529"/>
+                    <a:pt x="80" y="519"/>
+                  </a:cubicBezTo>
+                  <a:lnTo>
+                    <a:pt x="80" y="232"/>
+                  </a:lnTo>
+                  <a:lnTo>
+                    <a:pt x="60" y="232"/>
+                  </a:lnTo>
+                  <a:lnTo>
+                    <a:pt x="60" y="343"/>
+                  </a:lnTo>
+                  <a:cubicBezTo>
+                    <a:pt x="60" y="351"/>
+                    <a:pt x="57" y="358"/>
+                    <a:pt x="51" y="364"/>
+                  </a:cubicBezTo>
+                  <a:cubicBezTo>
+                    <a:pt x="45" y="370"/>
+                    <a:pt x="38" y="373"/>
+                    <a:pt x="30" y="373"/>
+                  </a:cubicBezTo>
+                  <a:cubicBezTo>
+                    <a:pt x="21" y="373"/>
+                    <a:pt x="14" y="370"/>
+                    <a:pt x="8" y="364"/>
+                  </a:cubicBezTo>
+                  <a:cubicBezTo>
+                    <a:pt x="3" y="358"/>
+                    <a:pt x="0" y="351"/>
+                    <a:pt x="0" y="343"/>
+                  </a:cubicBezTo>
+                  <a:close/>
+                  <a:moveTo>
+                    <a:pt x="111" y="121"/>
+                  </a:moveTo>
+                  <a:cubicBezTo>
+                    <a:pt x="97" y="107"/>
+                    <a:pt x="90" y="90"/>
+                    <a:pt x="90" y="71"/>
+                  </a:cubicBezTo>
+                  <a:cubicBezTo>
+                    <a:pt x="90" y="51"/>
+                    <a:pt x="97" y="35"/>
+                    <a:pt x="111" y="21"/>
+                  </a:cubicBezTo>
+                  <a:cubicBezTo>
+                    <a:pt x="125" y="7"/>
+                    <a:pt x="141" y="0"/>
+                    <a:pt x="161" y="0"/>
+                  </a:cubicBezTo>
+                  <a:cubicBezTo>
+                    <a:pt x="180" y="0"/>
+                    <a:pt x="197" y="7"/>
+                    <a:pt x="211" y="21"/>
+                  </a:cubicBezTo>
+                  <a:cubicBezTo>
+                    <a:pt x="225" y="35"/>
+                    <a:pt x="231" y="51"/>
+                    <a:pt x="231" y="71"/>
+                  </a:cubicBezTo>
+                  <a:cubicBezTo>
+                    <a:pt x="231" y="90"/>
+                    <a:pt x="225" y="107"/>
+                    <a:pt x="211" y="121"/>
+                  </a:cubicBezTo>
+                  <a:cubicBezTo>
+                    <a:pt x="197" y="134"/>
+                    <a:pt x="180" y="141"/>
+                    <a:pt x="161" y="141"/>
+                  </a:cubicBezTo>
+                  <a:cubicBezTo>
+                    <a:pt x="141" y="141"/>
+                    <a:pt x="125" y="134"/>
+                    <a:pt x="111" y="121"/>
+                  </a:cubicBezTo>
+                  <a:close/>
+                </a:path>
+              </a:pathLst>
+            </a:custGeom>
+            <a:solidFill>
+              <a:srgbClr val="272D34"/>
+            </a:solidFill>
+            <a:ln w="0">
+              <a:noFill/>
+              <a:prstDash val="solid"/>
+              <a:round/>
+              <a:headEnd/>
+              <a:tailEnd/>
+            </a:ln>
+          </p:spPr>
+          <p:txBody>
+            <a:bodyPr vert="horz" wrap="square" lIns="91440" tIns="45720" rIns="91440" bIns="45720" numCol="1" anchor="t" anchorCtr="0" compatLnSpc="1">
+              <a:prstTxWarp prst="textNoShape">
+                <a:avLst/>
+              </a:prstTxWarp>
+            </a:bodyPr>
+            <a:lstStyle/>
+            <a:p>
+              <a:endParaRPr lang="de-DE" dirty="0"/>
+            </a:p>
+          </p:txBody>
+        </p:sp>
+        <p:sp>
+          <p:nvSpPr>
+            <p:cNvPr id="11" name="Textfeld 10"/>
+            <p:cNvSpPr txBox="1"/>
+            <p:nvPr/>
+          </p:nvSpPr>
+          <p:spPr>
+            <a:xfrm>
+              <a:off x="380291" y="1191782"/>
+              <a:ext cx="383118" cy="246221"/>
+            </a:xfrm>
+            <a:prstGeom prst="rect">
+              <a:avLst/>
+            </a:prstGeom>
+            <a:noFill/>
+          </p:spPr>
+          <p:txBody>
+            <a:bodyPr wrap="none" lIns="0" tIns="0" rIns="0" bIns="0" rtlCol="0" anchor="ctr">
+              <a:spAutoFit/>
+            </a:bodyPr>
+            <a:lstStyle/>
+            <a:p>
+              <a:pPr algn="ctr"/>
+              <a:r>
+                <a:rPr lang="en-US" sz="800" dirty="0" smtClean="0">
+                  <a:latin typeface="Arial" panose="020B0604020202020204" pitchFamily="34" charset="0"/>
+                  <a:cs typeface="Arial" panose="020B0604020202020204" pitchFamily="34" charset="0"/>
+                </a:rPr>
+                <a:t>Service</a:t>
+              </a:r>
+              <a:br>
+                <a:rPr lang="en-US" sz="800" dirty="0" smtClean="0">
+                  <a:latin typeface="Arial" panose="020B0604020202020204" pitchFamily="34" charset="0"/>
+                  <a:cs typeface="Arial" panose="020B0604020202020204" pitchFamily="34" charset="0"/>
+                </a:rPr>
+              </a:br>
+              <a:r>
+                <a:rPr lang="en-US" sz="800" dirty="0" smtClean="0">
+                  <a:latin typeface="Arial" panose="020B0604020202020204" pitchFamily="34" charset="0"/>
+                  <a:cs typeface="Arial" panose="020B0604020202020204" pitchFamily="34" charset="0"/>
+                </a:rPr>
+                <a:t>Provider</a:t>
+              </a:r>
+            </a:p>
+          </p:txBody>
+        </p:sp>
+      </p:grpSp>
+      <p:sp>
+        <p:nvSpPr>
+          <p:cNvPr id="14" name="Textfeld 13"/>
+          <p:cNvSpPr txBox="1"/>
+          <p:nvPr/>
+        </p:nvSpPr>
+        <p:spPr>
+          <a:xfrm>
+            <a:off x="1130644" y="414816"/>
+            <a:ext cx="1472125" cy="195814"/>
+          </a:xfrm>
+          <a:prstGeom prst="rect">
+            <a:avLst/>
+          </a:prstGeom>
+          <a:noFill/>
+          <a:ln>
+            <a:solidFill>
+              <a:schemeClr val="tx1"/>
+            </a:solidFill>
+          </a:ln>
+        </p:spPr>
+        <p:txBody>
+          <a:bodyPr wrap="none" lIns="36000" tIns="36000" rIns="36000" bIns="36000" rtlCol="0" anchor="ctr">
+            <a:spAutoFit/>
+          </a:bodyPr>
+          <a:lstStyle/>
+          <a:p>
+            <a:pPr algn="ctr"/>
+            <a:r>
+              <a:rPr lang="en-US" sz="800" dirty="0" smtClean="0">
+                <a:latin typeface="Arial" panose="020B0604020202020204" pitchFamily="34" charset="0"/>
+                <a:cs typeface="Arial" panose="020B0604020202020204" pitchFamily="34" charset="0"/>
+              </a:rPr>
+              <a:t>Part Definition and Constraints</a:t>
+            </a:r>
+          </a:p>
+        </p:txBody>
+      </p:sp>
+      <p:sp>
+        <p:nvSpPr>
+          <p:cNvPr id="16" name="Textfeld 15"/>
+          <p:cNvSpPr txBox="1"/>
+          <p:nvPr/>
+        </p:nvSpPr>
+        <p:spPr>
+          <a:xfrm>
+            <a:off x="933474" y="953839"/>
+            <a:ext cx="1866463" cy="318924"/>
+          </a:xfrm>
+          <a:prstGeom prst="rect">
+            <a:avLst/>
+          </a:prstGeom>
+          <a:noFill/>
+          <a:ln>
+            <a:solidFill>
+              <a:schemeClr val="tx1"/>
+            </a:solidFill>
+          </a:ln>
+        </p:spPr>
+        <p:txBody>
+          <a:bodyPr wrap="none" lIns="36000" tIns="36000" rIns="36000" bIns="36000" rtlCol="0" anchor="ctr">
+            <a:spAutoFit/>
+          </a:bodyPr>
+          <a:lstStyle/>
+          <a:p>
+            <a:pPr algn="ctr"/>
+            <a:r>
+              <a:rPr lang="en-US" sz="800" dirty="0" smtClean="0">
+                <a:latin typeface="Arial" panose="020B0604020202020204" pitchFamily="34" charset="0"/>
+                <a:cs typeface="Arial" panose="020B0604020202020204" pitchFamily="34" charset="0"/>
+              </a:rPr>
+              <a:t>Definition of Manufacturing Possibilities</a:t>
+            </a:r>
+            <a:br>
+              <a:rPr lang="en-US" sz="800" dirty="0" smtClean="0">
+                <a:latin typeface="Arial" panose="020B0604020202020204" pitchFamily="34" charset="0"/>
+                <a:cs typeface="Arial" panose="020B0604020202020204" pitchFamily="34" charset="0"/>
+              </a:rPr>
+            </a:br>
+            <a:r>
+              <a:rPr lang="en-US" sz="800" dirty="0" smtClean="0">
+                <a:latin typeface="Arial" panose="020B0604020202020204" pitchFamily="34" charset="0"/>
+                <a:cs typeface="Arial" panose="020B0604020202020204" pitchFamily="34" charset="0"/>
+              </a:rPr>
+              <a:t>and the underlying Part Process Steps</a:t>
+            </a:r>
+          </a:p>
+        </p:txBody>
+      </p:sp>
+      <p:sp>
+        <p:nvSpPr>
+          <p:cNvPr id="17" name="Textfeld 16"/>
+          <p:cNvSpPr txBox="1"/>
+          <p:nvPr/>
+        </p:nvSpPr>
+        <p:spPr>
+          <a:xfrm>
+            <a:off x="1264497" y="1615971"/>
+            <a:ext cx="1204424" cy="195814"/>
+          </a:xfrm>
+          <a:prstGeom prst="rect">
+            <a:avLst/>
+          </a:prstGeom>
+          <a:noFill/>
+          <a:ln>
+            <a:solidFill>
+              <a:schemeClr val="tx1"/>
+            </a:solidFill>
+          </a:ln>
+        </p:spPr>
+        <p:txBody>
+          <a:bodyPr wrap="none" lIns="36000" tIns="36000" rIns="36000" bIns="36000" rtlCol="0" anchor="ctr">
+            <a:spAutoFit/>
+          </a:bodyPr>
+          <a:lstStyle/>
+          <a:p>
+            <a:pPr algn="ctr"/>
+            <a:r>
+              <a:rPr lang="en-US" sz="800" dirty="0" smtClean="0">
+                <a:latin typeface="Arial" panose="020B0604020202020204" pitchFamily="34" charset="0"/>
+                <a:cs typeface="Arial" panose="020B0604020202020204" pitchFamily="34" charset="0"/>
+              </a:rPr>
+              <a:t>Matching and Evaluation</a:t>
+            </a:r>
+          </a:p>
+        </p:txBody>
+      </p:sp>
+      <p:sp>
+        <p:nvSpPr>
+          <p:cNvPr id="18" name="Textfeld 17"/>
+          <p:cNvSpPr txBox="1"/>
+          <p:nvPr/>
+        </p:nvSpPr>
+        <p:spPr>
+          <a:xfrm>
+            <a:off x="1036072" y="2192855"/>
+            <a:ext cx="1661280" cy="318924"/>
+          </a:xfrm>
+          <a:prstGeom prst="rect">
+            <a:avLst/>
+          </a:prstGeom>
+          <a:noFill/>
+          <a:ln>
+            <a:solidFill>
+              <a:schemeClr val="tx1"/>
+            </a:solidFill>
+          </a:ln>
+        </p:spPr>
+        <p:txBody>
+          <a:bodyPr wrap="none" lIns="36000" tIns="36000" rIns="36000" bIns="36000" rtlCol="0" anchor="ctr">
+            <a:spAutoFit/>
+          </a:bodyPr>
+          <a:lstStyle/>
+          <a:p>
+            <a:pPr algn="ctr"/>
+            <a:r>
+              <a:rPr lang="en-US" sz="800" dirty="0" smtClean="0">
+                <a:latin typeface="Arial" panose="020B0604020202020204" pitchFamily="34" charset="0"/>
+                <a:cs typeface="Arial" panose="020B0604020202020204" pitchFamily="34" charset="0"/>
+              </a:rPr>
+              <a:t>Definition of Resources</a:t>
+            </a:r>
+            <a:br>
+              <a:rPr lang="en-US" sz="800" dirty="0" smtClean="0">
+                <a:latin typeface="Arial" panose="020B0604020202020204" pitchFamily="34" charset="0"/>
+                <a:cs typeface="Arial" panose="020B0604020202020204" pitchFamily="34" charset="0"/>
+              </a:rPr>
+            </a:br>
+            <a:r>
+              <a:rPr lang="en-US" sz="800" dirty="0" smtClean="0">
+                <a:latin typeface="Arial" panose="020B0604020202020204" pitchFamily="34" charset="0"/>
+                <a:cs typeface="Arial" panose="020B0604020202020204" pitchFamily="34" charset="0"/>
+              </a:rPr>
+              <a:t>and the underlying Resource Skills</a:t>
+            </a:r>
+          </a:p>
+        </p:txBody>
+      </p:sp>
+      <p:cxnSp>
+        <p:nvCxnSpPr>
+          <p:cNvPr id="19" name="Gerader Verbinder 18"/>
+          <p:cNvCxnSpPr>
+            <a:endCxn id="14" idx="1"/>
+          </p:cNvCxnSpPr>
+          <p:nvPr/>
+        </p:nvCxnSpPr>
+        <p:spPr>
+          <a:xfrm>
+            <a:off x="856465" y="512723"/>
+            <a:ext cx="274179" cy="0"/>
+          </a:xfrm>
+          <a:prstGeom prst="line">
+            <a:avLst/>
+          </a:prstGeom>
+          <a:ln w="12700">
+            <a:solidFill>
+              <a:schemeClr val="tx1"/>
+            </a:solidFill>
+            <a:headEnd type="none" w="med" len="med"/>
+            <a:tailEnd type="triangle" w="med" len="med"/>
+          </a:ln>
+        </p:spPr>
+        <p:style>
+          <a:lnRef idx="1">
+            <a:schemeClr val="accent1"/>
+          </a:lnRef>
+          <a:fillRef idx="0">
+            <a:schemeClr val="accent1"/>
+          </a:fillRef>
+          <a:effectRef idx="0">
+            <a:schemeClr val="accent1"/>
+          </a:effectRef>
+          <a:fontRef idx="minor">
+            <a:schemeClr val="tx1"/>
+          </a:fontRef>
+        </p:style>
+      </p:cxnSp>
+      <p:cxnSp>
+        <p:nvCxnSpPr>
+          <p:cNvPr id="23" name="Gerader Verbinder 22"/>
+          <p:cNvCxnSpPr>
+            <a:stCxn id="14" idx="3"/>
+          </p:cNvCxnSpPr>
+          <p:nvPr/>
+        </p:nvCxnSpPr>
+        <p:spPr>
+          <a:xfrm>
+            <a:off x="2602769" y="512723"/>
+            <a:ext cx="274179" cy="0"/>
+          </a:xfrm>
+          <a:prstGeom prst="line">
+            <a:avLst/>
+          </a:prstGeom>
+          <a:ln w="12700">
+            <a:solidFill>
+              <a:schemeClr val="tx1"/>
+            </a:solidFill>
+            <a:headEnd type="none" w="med" len="med"/>
+            <a:tailEnd type="triangle" w="med" len="med"/>
+          </a:ln>
+        </p:spPr>
+        <p:style>
+          <a:lnRef idx="1">
+            <a:schemeClr val="accent1"/>
+          </a:lnRef>
+          <a:fillRef idx="0">
+            <a:schemeClr val="accent1"/>
+          </a:fillRef>
+          <a:effectRef idx="0">
+            <a:schemeClr val="accent1"/>
+          </a:effectRef>
+          <a:fontRef idx="minor">
+            <a:schemeClr val="tx1"/>
+          </a:fontRef>
+        </p:style>
+      </p:cxnSp>
+      <p:cxnSp>
+        <p:nvCxnSpPr>
+          <p:cNvPr id="26" name="Gewinkelte Verbindung 25"/>
+          <p:cNvCxnSpPr>
+            <a:stCxn id="17" idx="1"/>
+            <a:endCxn id="3" idx="2"/>
+          </p:cNvCxnSpPr>
+          <p:nvPr/>
+        </p:nvCxnSpPr>
+        <p:spPr>
+          <a:xfrm rot="10800000">
+            <a:off x="571851" y="911034"/>
+            <a:ext cx="692647" cy="802845"/>
+          </a:xfrm>
+          <a:prstGeom prst="bentConnector2">
+            <a:avLst/>
+          </a:prstGeom>
+          <a:ln w="12700">
+            <a:solidFill>
+              <a:schemeClr val="tx1"/>
+            </a:solidFill>
+            <a:headEnd type="none" w="med" len="med"/>
+            <a:tailEnd type="triangle" w="med" len="med"/>
+          </a:ln>
+        </p:spPr>
+        <p:style>
+          <a:lnRef idx="1">
+            <a:schemeClr val="accent1"/>
+          </a:lnRef>
+          <a:fillRef idx="0">
+            <a:schemeClr val="accent1"/>
+          </a:fillRef>
+          <a:effectRef idx="0">
+            <a:schemeClr val="accent1"/>
+          </a:effectRef>
+          <a:fontRef idx="minor">
+            <a:schemeClr val="tx1"/>
+          </a:fontRef>
+        </p:style>
+      </p:cxnSp>
+      <p:cxnSp>
+        <p:nvCxnSpPr>
+          <p:cNvPr id="28" name="Gerader Verbinder 27"/>
+          <p:cNvCxnSpPr>
+            <a:stCxn id="16" idx="2"/>
+            <a:endCxn id="17" idx="0"/>
+          </p:cNvCxnSpPr>
+          <p:nvPr/>
+        </p:nvCxnSpPr>
+        <p:spPr>
+          <a:xfrm>
+            <a:off x="1866706" y="1272763"/>
+            <a:ext cx="3" cy="343208"/>
+          </a:xfrm>
+          <a:prstGeom prst="line">
+            <a:avLst/>
+          </a:prstGeom>
+          <a:ln w="12700">
+            <a:solidFill>
+              <a:schemeClr val="tx1"/>
+            </a:solidFill>
+            <a:headEnd type="none" w="med" len="med"/>
+            <a:tailEnd type="triangle" w="med" len="med"/>
+          </a:ln>
+        </p:spPr>
+        <p:style>
+          <a:lnRef idx="1">
+            <a:schemeClr val="accent1"/>
+          </a:lnRef>
+          <a:fillRef idx="0">
+            <a:schemeClr val="accent1"/>
+          </a:fillRef>
+          <a:effectRef idx="0">
+            <a:schemeClr val="accent1"/>
+          </a:effectRef>
+          <a:fontRef idx="minor">
+            <a:schemeClr val="tx1"/>
+          </a:fontRef>
+        </p:style>
+      </p:cxnSp>
+      <p:cxnSp>
+        <p:nvCxnSpPr>
+          <p:cNvPr id="31" name="Gerader Verbinder 30"/>
+          <p:cNvCxnSpPr>
+            <a:stCxn id="18" idx="0"/>
+            <a:endCxn id="17" idx="2"/>
+          </p:cNvCxnSpPr>
+          <p:nvPr/>
+        </p:nvCxnSpPr>
+        <p:spPr>
+          <a:xfrm flipH="1" flipV="1">
+            <a:off x="1866709" y="1811785"/>
+            <a:ext cx="3" cy="381070"/>
+          </a:xfrm>
+          <a:prstGeom prst="line">
+            <a:avLst/>
+          </a:prstGeom>
+          <a:ln w="12700">
+            <a:solidFill>
+              <a:schemeClr val="tx1"/>
+            </a:solidFill>
+            <a:headEnd type="none" w="med" len="med"/>
+            <a:tailEnd type="triangle" w="med" len="med"/>
+          </a:ln>
+        </p:spPr>
+        <p:style>
+          <a:lnRef idx="1">
+            <a:schemeClr val="accent1"/>
+          </a:lnRef>
+          <a:fillRef idx="0">
+            <a:schemeClr val="accent1"/>
+          </a:fillRef>
+          <a:effectRef idx="0">
+            <a:schemeClr val="accent1"/>
+          </a:effectRef>
+          <a:fontRef idx="minor">
+            <a:schemeClr val="tx1"/>
+          </a:fontRef>
+        </p:style>
+      </p:cxnSp>
+      <p:cxnSp>
+        <p:nvCxnSpPr>
+          <p:cNvPr id="34" name="Gerader Verbinder 33"/>
+          <p:cNvCxnSpPr>
+            <a:endCxn id="18" idx="3"/>
+          </p:cNvCxnSpPr>
+          <p:nvPr/>
+        </p:nvCxnSpPr>
+        <p:spPr>
+          <a:xfrm flipH="1">
+            <a:off x="2697352" y="2352317"/>
+            <a:ext cx="230333" cy="0"/>
+          </a:xfrm>
+          <a:prstGeom prst="line">
+            <a:avLst/>
+          </a:prstGeom>
+          <a:ln w="12700">
+            <a:solidFill>
+              <a:schemeClr val="tx1"/>
+            </a:solidFill>
+            <a:headEnd type="none" w="med" len="med"/>
+            <a:tailEnd type="triangle" w="med" len="med"/>
+          </a:ln>
+        </p:spPr>
+        <p:style>
+          <a:lnRef idx="1">
+            <a:schemeClr val="accent1"/>
+          </a:lnRef>
+          <a:fillRef idx="0">
+            <a:schemeClr val="accent1"/>
+          </a:fillRef>
+          <a:effectRef idx="0">
+            <a:schemeClr val="accent1"/>
+          </a:effectRef>
+          <a:fontRef idx="minor">
+            <a:schemeClr val="tx1"/>
+          </a:fontRef>
+        </p:style>
+      </p:cxnSp>
+      <p:cxnSp>
+        <p:nvCxnSpPr>
+          <p:cNvPr id="37" name="Gewinkelte Verbindung 36"/>
+          <p:cNvCxnSpPr>
+            <a:stCxn id="8" idx="2"/>
+            <a:endCxn id="16" idx="3"/>
+          </p:cNvCxnSpPr>
+          <p:nvPr/>
+        </p:nvCxnSpPr>
+        <p:spPr>
+          <a:xfrm rot="5400000">
+            <a:off x="2958843" y="905497"/>
+            <a:ext cx="48898" cy="366710"/>
+          </a:xfrm>
+          <a:prstGeom prst="bentConnector2">
+            <a:avLst/>
+          </a:prstGeom>
+          <a:ln w="12700">
+            <a:solidFill>
+              <a:schemeClr val="tx1"/>
+            </a:solidFill>
+            <a:headEnd type="none" w="med" len="med"/>
+            <a:tailEnd type="triangle" w="med" len="med"/>
+          </a:ln>
+        </p:spPr>
+        <p:style>
+          <a:lnRef idx="1">
+            <a:schemeClr val="accent1"/>
+          </a:lnRef>
+          <a:fillRef idx="0">
+            <a:schemeClr val="accent1"/>
+          </a:fillRef>
+          <a:effectRef idx="0">
+            <a:schemeClr val="accent1"/>
+          </a:effectRef>
+          <a:fontRef idx="minor">
+            <a:schemeClr val="tx1"/>
+          </a:fontRef>
+        </p:style>
+      </p:cxnSp>
+      <p:sp>
+        <p:nvSpPr>
+          <p:cNvPr id="47" name="Textfeld 46"/>
+          <p:cNvSpPr txBox="1"/>
+          <p:nvPr/>
+        </p:nvSpPr>
+        <p:spPr>
+          <a:xfrm>
+            <a:off x="758750" y="1554415"/>
+            <a:ext cx="343044" cy="123111"/>
+          </a:xfrm>
+          <a:prstGeom prst="rect">
+            <a:avLst/>
+          </a:prstGeom>
+          <a:noFill/>
+        </p:spPr>
+        <p:txBody>
+          <a:bodyPr wrap="none" lIns="0" tIns="0" rIns="0" bIns="0" rtlCol="0" anchor="ctr">
+            <a:spAutoFit/>
+          </a:bodyPr>
+          <a:lstStyle/>
+          <a:p>
+            <a:pPr algn="ctr"/>
+            <a:r>
+              <a:rPr lang="en-US" sz="800" dirty="0" smtClean="0">
+                <a:latin typeface="Arial" panose="020B0604020202020204" pitchFamily="34" charset="0"/>
+                <a:cs typeface="Arial" panose="020B0604020202020204" pitchFamily="34" charset="0"/>
+              </a:rPr>
+              <a:t>Results</a:t>
+            </a:r>
+          </a:p>
+        </p:txBody>
+      </p:sp>
+    </p:spTree>
+    <p:extLst>
+      <p:ext uri="{BB962C8B-B14F-4D97-AF65-F5344CB8AC3E}">
+        <p14:creationId xmlns:p14="http://schemas.microsoft.com/office/powerpoint/2010/main" val="1514780008"/>
+      </p:ext>
+    </p:extLst>
+  </p:cSld>
+  <p:clrMapOvr>
+    <a:masterClrMapping/>
+  </p:clrMapOvr>
+</p:sld>
+</file>
+
+<file path=ppt/slides/slide5.xml><?xml version="1.0" encoding="utf-8"?>
 <p:sld xmlns:a="http://schemas.openxmlformats.org/drawingml/2006/main" xmlns:r="http://schemas.openxmlformats.org/officeDocument/2006/relationships" xmlns:p="http://schemas.openxmlformats.org/presentationml/2006/main">
   <p:cSld>
     <p:spTree>
@@ -22932,7 +24756,7 @@
 </p:sld>
 </file>
 
-<file path=ppt/slides/slide5.xml><?xml version="1.0" encoding="utf-8"?>
+<file path=ppt/slides/slide6.xml><?xml version="1.0" encoding="utf-8"?>
 <p:sld xmlns:a="http://schemas.openxmlformats.org/drawingml/2006/main" xmlns:r="http://schemas.openxmlformats.org/officeDocument/2006/relationships" xmlns:p="http://schemas.openxmlformats.org/presentationml/2006/main">
   <p:cSld>
     <p:spTree>
@@ -23105,7 +24929,7 @@
 </p:sld>
 </file>
 
-<file path=ppt/slides/slide6.xml><?xml version="1.0" encoding="utf-8"?>
+<file path=ppt/slides/slide7.xml><?xml version="1.0" encoding="utf-8"?>
 <p:sld xmlns:a="http://schemas.openxmlformats.org/drawingml/2006/main" xmlns:r="http://schemas.openxmlformats.org/officeDocument/2006/relationships" xmlns:p="http://schemas.openxmlformats.org/presentationml/2006/main">
   <p:cSld>
     <p:spTree>
@@ -23270,7 +25094,7 @@
 </p:sld>
 </file>
 
-<file path=ppt/slides/slide7.xml><?xml version="1.0" encoding="utf-8"?>
+<file path=ppt/slides/slide8.xml><?xml version="1.0" encoding="utf-8"?>
 <p:sld xmlns:a="http://schemas.openxmlformats.org/drawingml/2006/main" xmlns:r="http://schemas.openxmlformats.org/officeDocument/2006/relationships" xmlns:p="http://schemas.openxmlformats.org/presentationml/2006/main">
   <p:cSld>
     <p:spTree>
@@ -23436,7 +25260,7 @@
 </p:sld>
 </file>
 
-<file path=ppt/slides/slide8.xml><?xml version="1.0" encoding="utf-8"?>
+<file path=ppt/slides/slide9.xml><?xml version="1.0" encoding="utf-8"?>
 <p:sld xmlns:a="http://schemas.openxmlformats.org/drawingml/2006/main" xmlns:r="http://schemas.openxmlformats.org/officeDocument/2006/relationships" xmlns:p="http://schemas.openxmlformats.org/presentationml/2006/main">
   <p:cSld>
     <p:spTree>
@@ -24451,124 +26275,6 @@
 </p:sld>
 </file>
 
-<file path=ppt/slides/slide9.xml><?xml version="1.0" encoding="utf-8"?>
-<p:sld xmlns:a="http://schemas.openxmlformats.org/drawingml/2006/main" xmlns:r="http://schemas.openxmlformats.org/officeDocument/2006/relationships" xmlns:p="http://schemas.openxmlformats.org/presentationml/2006/main">
-  <p:cSld>
-    <p:spTree>
-      <p:nvGrpSpPr>
-        <p:cNvPr id="1" name=""/>
-        <p:cNvGrpSpPr/>
-        <p:nvPr/>
-      </p:nvGrpSpPr>
-      <p:grpSpPr>
-        <a:xfrm>
-          <a:off x="0" y="0"/>
-          <a:ext cx="0" cy="0"/>
-          <a:chOff x="0" y="0"/>
-          <a:chExt cx="0" cy="0"/>
-        </a:xfrm>
-      </p:grpSpPr>
-      <p:sp>
-        <p:nvSpPr>
-          <p:cNvPr id="2" name="Titel 1"/>
-          <p:cNvSpPr>
-            <a:spLocks noGrp="1"/>
-          </p:cNvSpPr>
-          <p:nvPr>
-            <p:ph type="title"/>
-          </p:nvPr>
-        </p:nvSpPr>
-        <p:spPr>
-          <a:xfrm>
-            <a:off x="628650" y="291571"/>
-            <a:ext cx="7886700" cy="1104636"/>
-          </a:xfrm>
-        </p:spPr>
-        <p:txBody>
-          <a:bodyPr/>
-          <a:lstStyle/>
-          <a:p>
-            <a:r>
-              <a:rPr lang="en-US" b="1" dirty="0" smtClean="0"/>
-              <a:t>Multi Criteria Decision Analysis</a:t>
-            </a:r>
-            <a:endParaRPr lang="en-US" b="1" dirty="0"/>
-          </a:p>
-        </p:txBody>
-      </p:sp>
-      <p:sp>
-        <p:nvSpPr>
-          <p:cNvPr id="3" name="Inhaltsplatzhalter 2"/>
-          <p:cNvSpPr>
-            <a:spLocks noGrp="1"/>
-          </p:cNvSpPr>
-          <p:nvPr>
-            <p:ph idx="1"/>
-          </p:nvPr>
-        </p:nvSpPr>
-        <p:spPr/>
-        <p:txBody>
-          <a:bodyPr/>
-          <a:lstStyle/>
-          <a:p>
-            <a:pPr marL="0" indent="0">
-              <a:buNone/>
-            </a:pPr>
-            <a:r>
-              <a:rPr lang="en-US" dirty="0"/>
-              <a:t>Which combination of Resource Skills can execute all </a:t>
-            </a:r>
-            <a:r>
-              <a:rPr lang="en-US" dirty="0" smtClean="0"/>
-              <a:t/>
-            </a:r>
-            <a:br>
-              <a:rPr lang="en-US" dirty="0" smtClean="0"/>
-            </a:br>
-            <a:r>
-              <a:rPr lang="en-US" dirty="0" smtClean="0"/>
-              <a:t>Part Manufacturing </a:t>
-            </a:r>
-            <a:r>
-              <a:rPr lang="en-US" dirty="0"/>
-              <a:t>Process </a:t>
-            </a:r>
-            <a:r>
-              <a:rPr lang="en-US" dirty="0" smtClean="0"/>
-              <a:t>Steps with </a:t>
-            </a:r>
-            <a:r>
-              <a:rPr lang="en-US" dirty="0"/>
-              <a:t>the defined Constraints and has the “best” evaluation criteria (price, time, CO2-e, </a:t>
-            </a:r>
-            <a:r>
-              <a:rPr lang="en-US" dirty="0" smtClean="0"/>
-              <a:t>…)?</a:t>
-            </a:r>
-            <a:endParaRPr lang="en-US" dirty="0"/>
-          </a:p>
-        </p:txBody>
-      </p:sp>
-    </p:spTree>
-    <p:extLst>
-      <p:ext uri="{BB962C8B-B14F-4D97-AF65-F5344CB8AC3E}">
-        <p14:creationId xmlns:p14="http://schemas.microsoft.com/office/powerpoint/2010/main" val="161296006"/>
-      </p:ext>
-    </p:extLst>
-  </p:cSld>
-  <p:clrMapOvr>
-    <a:masterClrMapping/>
-  </p:clrMapOvr>
-  <p:timing>
-    <p:tnLst>
-      <p:par>
-        <p:cTn id="1" dur="indefinite" restart="never" nodeType="tmRoot"/>
-      </p:par>
-    </p:tnLst>
-  </p:timing>
-</p:sld>
-</file>
-
 <file path=ppt/theme/theme1.xml><?xml version="1.0" encoding="utf-8"?>
 <a:theme xmlns:a="http://schemas.openxmlformats.org/drawingml/2006/main" name="Office Theme">
   <a:themeElements>

</xml_diff>

<commit_message>
price can now be negative and renamed Part Manufacturing Process Step to Part Process Step
</commit_message>
<xml_diff>
--- a/docs/docu_v1.pptx
+++ b/docs/docu_v1.pptx
@@ -9,16 +9,18 @@
     <p:sldId id="269" r:id="rId3"/>
     <p:sldId id="270" r:id="rId4"/>
     <p:sldId id="268" r:id="rId5"/>
-    <p:sldId id="259" r:id="rId6"/>
-    <p:sldId id="262" r:id="rId7"/>
-    <p:sldId id="265" r:id="rId8"/>
-    <p:sldId id="261" r:id="rId9"/>
-    <p:sldId id="257" r:id="rId10"/>
-    <p:sldId id="267" r:id="rId11"/>
-    <p:sldId id="260" r:id="rId12"/>
-    <p:sldId id="264" r:id="rId13"/>
-    <p:sldId id="256" r:id="rId14"/>
-    <p:sldId id="258" r:id="rId15"/>
+    <p:sldId id="271" r:id="rId6"/>
+    <p:sldId id="272" r:id="rId7"/>
+    <p:sldId id="259" r:id="rId8"/>
+    <p:sldId id="262" r:id="rId9"/>
+    <p:sldId id="265" r:id="rId10"/>
+    <p:sldId id="261" r:id="rId11"/>
+    <p:sldId id="257" r:id="rId12"/>
+    <p:sldId id="267" r:id="rId13"/>
+    <p:sldId id="260" r:id="rId14"/>
+    <p:sldId id="264" r:id="rId15"/>
+    <p:sldId id="256" r:id="rId16"/>
+    <p:sldId id="258" r:id="rId17"/>
   </p:sldIdLst>
   <p:sldSz cx="9144000" cy="5715000" type="screen16x10"/>
   <p:notesSz cx="6858000" cy="9144000"/>
@@ -126,6 +128,8 @@
             <p14:sldId id="269"/>
             <p14:sldId id="270"/>
             <p14:sldId id="268"/>
+            <p14:sldId id="271"/>
+            <p14:sldId id="272"/>
             <p14:sldId id="259"/>
             <p14:sldId id="262"/>
             <p14:sldId id="265"/>
@@ -293,7 +297,7 @@
           <a:p>
             <a:fld id="{40AC6573-0F6A-409A-81A3-E5A359E080D0}" type="datetimeFigureOut">
               <a:rPr lang="en-US" smtClean="0"/>
-              <a:t>2/4/2021</a:t>
+              <a:t>3/11/2021</a:t>
             </a:fld>
             <a:endParaRPr lang="en-US"/>
           </a:p>
@@ -463,7 +467,7 @@
           <a:p>
             <a:fld id="{40AC6573-0F6A-409A-81A3-E5A359E080D0}" type="datetimeFigureOut">
               <a:rPr lang="en-US" smtClean="0"/>
-              <a:t>2/4/2021</a:t>
+              <a:t>3/11/2021</a:t>
             </a:fld>
             <a:endParaRPr lang="en-US"/>
           </a:p>
@@ -643,7 +647,7 @@
           <a:p>
             <a:fld id="{40AC6573-0F6A-409A-81A3-E5A359E080D0}" type="datetimeFigureOut">
               <a:rPr lang="en-US" smtClean="0"/>
-              <a:t>2/4/2021</a:t>
+              <a:t>3/11/2021</a:t>
             </a:fld>
             <a:endParaRPr lang="en-US"/>
           </a:p>
@@ -813,7 +817,7 @@
           <a:p>
             <a:fld id="{40AC6573-0F6A-409A-81A3-E5A359E080D0}" type="datetimeFigureOut">
               <a:rPr lang="en-US" smtClean="0"/>
-              <a:t>2/4/2021</a:t>
+              <a:t>3/11/2021</a:t>
             </a:fld>
             <a:endParaRPr lang="en-US"/>
           </a:p>
@@ -1059,7 +1063,7 @@
           <a:p>
             <a:fld id="{40AC6573-0F6A-409A-81A3-E5A359E080D0}" type="datetimeFigureOut">
               <a:rPr lang="en-US" smtClean="0"/>
-              <a:t>2/4/2021</a:t>
+              <a:t>3/11/2021</a:t>
             </a:fld>
             <a:endParaRPr lang="en-US"/>
           </a:p>
@@ -1291,7 +1295,7 @@
           <a:p>
             <a:fld id="{40AC6573-0F6A-409A-81A3-E5A359E080D0}" type="datetimeFigureOut">
               <a:rPr lang="en-US" smtClean="0"/>
-              <a:t>2/4/2021</a:t>
+              <a:t>3/11/2021</a:t>
             </a:fld>
             <a:endParaRPr lang="en-US"/>
           </a:p>
@@ -1658,7 +1662,7 @@
           <a:p>
             <a:fld id="{40AC6573-0F6A-409A-81A3-E5A359E080D0}" type="datetimeFigureOut">
               <a:rPr lang="en-US" smtClean="0"/>
-              <a:t>2/4/2021</a:t>
+              <a:t>3/11/2021</a:t>
             </a:fld>
             <a:endParaRPr lang="en-US"/>
           </a:p>
@@ -1776,7 +1780,7 @@
           <a:p>
             <a:fld id="{40AC6573-0F6A-409A-81A3-E5A359E080D0}" type="datetimeFigureOut">
               <a:rPr lang="en-US" smtClean="0"/>
-              <a:t>2/4/2021</a:t>
+              <a:t>3/11/2021</a:t>
             </a:fld>
             <a:endParaRPr lang="en-US"/>
           </a:p>
@@ -1871,7 +1875,7 @@
           <a:p>
             <a:fld id="{40AC6573-0F6A-409A-81A3-E5A359E080D0}" type="datetimeFigureOut">
               <a:rPr lang="en-US" smtClean="0"/>
-              <a:t>2/4/2021</a:t>
+              <a:t>3/11/2021</a:t>
             </a:fld>
             <a:endParaRPr lang="en-US"/>
           </a:p>
@@ -2148,7 +2152,7 @@
           <a:p>
             <a:fld id="{40AC6573-0F6A-409A-81A3-E5A359E080D0}" type="datetimeFigureOut">
               <a:rPr lang="en-US" smtClean="0"/>
-              <a:t>2/4/2021</a:t>
+              <a:t>3/11/2021</a:t>
             </a:fld>
             <a:endParaRPr lang="en-US"/>
           </a:p>
@@ -2405,7 +2409,7 @@
           <a:p>
             <a:fld id="{40AC6573-0F6A-409A-81A3-E5A359E080D0}" type="datetimeFigureOut">
               <a:rPr lang="en-US" smtClean="0"/>
-              <a:t>2/4/2021</a:t>
+              <a:t>3/11/2021</a:t>
             </a:fld>
             <a:endParaRPr lang="en-US"/>
           </a:p>
@@ -2618,7 +2622,7 @@
           <a:p>
             <a:fld id="{40AC6573-0F6A-409A-81A3-E5A359E080D0}" type="datetimeFigureOut">
               <a:rPr lang="en-US" smtClean="0"/>
-              <a:t>2/4/2021</a:t>
+              <a:t>3/11/2021</a:t>
             </a:fld>
             <a:endParaRPr lang="en-US"/>
           </a:p>
@@ -3098,10 +3102,1198 @@
   <p:clrMapOvr>
     <a:masterClrMapping/>
   </p:clrMapOvr>
+  <p:timing>
+    <p:tnLst>
+      <p:par>
+        <p:cTn id="1" dur="indefinite" restart="never" nodeType="tmRoot"/>
+      </p:par>
+    </p:tnLst>
+  </p:timing>
 </p:sld>
 </file>
 
 <file path=ppt/slides/slide10.xml><?xml version="1.0" encoding="utf-8"?>
+<p:sld xmlns:a="http://schemas.openxmlformats.org/drawingml/2006/main" xmlns:r="http://schemas.openxmlformats.org/officeDocument/2006/relationships" xmlns:p="http://schemas.openxmlformats.org/presentationml/2006/main">
+  <p:cSld>
+    <p:spTree>
+      <p:nvGrpSpPr>
+        <p:cNvPr id="1" name=""/>
+        <p:cNvGrpSpPr/>
+        <p:nvPr/>
+      </p:nvGrpSpPr>
+      <p:grpSpPr>
+        <a:xfrm>
+          <a:off x="0" y="0"/>
+          <a:ext cx="0" cy="0"/>
+          <a:chOff x="0" y="0"/>
+          <a:chExt cx="0" cy="0"/>
+        </a:xfrm>
+      </p:grpSpPr>
+      <p:pic>
+        <p:nvPicPr>
+          <p:cNvPr id="2" name="Grafik 1"/>
+          <p:cNvPicPr>
+            <a:picLocks noChangeAspect="1"/>
+          </p:cNvPicPr>
+          <p:nvPr/>
+        </p:nvPicPr>
+        <p:blipFill>
+          <a:blip r:embed="rId2"/>
+          <a:stretch>
+            <a:fillRect/>
+          </a:stretch>
+        </p:blipFill>
+        <p:spPr>
+          <a:xfrm>
+            <a:off x="0" y="1112058"/>
+            <a:ext cx="4287998" cy="1821642"/>
+          </a:xfrm>
+          <a:prstGeom prst="rect">
+            <a:avLst/>
+          </a:prstGeom>
+          <a:ln>
+            <a:solidFill>
+              <a:schemeClr val="tx1">
+                <a:lumMod val="75000"/>
+                <a:lumOff val="25000"/>
+              </a:schemeClr>
+            </a:solidFill>
+          </a:ln>
+        </p:spPr>
+      </p:pic>
+      <p:pic>
+        <p:nvPicPr>
+          <p:cNvPr id="3" name="Grafik 2"/>
+          <p:cNvPicPr>
+            <a:picLocks noChangeAspect="1"/>
+          </p:cNvPicPr>
+          <p:nvPr/>
+        </p:nvPicPr>
+        <p:blipFill>
+          <a:blip r:embed="rId3"/>
+          <a:stretch>
+            <a:fillRect/>
+          </a:stretch>
+        </p:blipFill>
+        <p:spPr>
+          <a:xfrm>
+            <a:off x="4455791" y="66413"/>
+            <a:ext cx="4688209" cy="4654550"/>
+          </a:xfrm>
+          <a:prstGeom prst="rect">
+            <a:avLst/>
+          </a:prstGeom>
+          <a:ln>
+            <a:solidFill>
+              <a:schemeClr val="tx1">
+                <a:lumMod val="75000"/>
+                <a:lumOff val="25000"/>
+              </a:schemeClr>
+            </a:solidFill>
+          </a:ln>
+        </p:spPr>
+      </p:pic>
+      <p:sp>
+        <p:nvSpPr>
+          <p:cNvPr id="4" name="Textfeld 3"/>
+          <p:cNvSpPr txBox="1"/>
+          <p:nvPr/>
+        </p:nvSpPr>
+        <p:spPr>
+          <a:xfrm>
+            <a:off x="63165" y="59961"/>
+            <a:ext cx="1965332" cy="276999"/>
+          </a:xfrm>
+          <a:prstGeom prst="rect">
+            <a:avLst/>
+          </a:prstGeom>
+          <a:noFill/>
+        </p:spPr>
+        <p:txBody>
+          <a:bodyPr wrap="square" rtlCol="0">
+            <a:spAutoFit/>
+          </a:bodyPr>
+          <a:lstStyle/>
+          <a:p>
+            <a:r>
+              <a:rPr lang="en-US" sz="1200" b="1" dirty="0" smtClean="0">
+                <a:latin typeface="Arial" panose="020B0604020202020204" pitchFamily="34" charset="0"/>
+                <a:cs typeface="Arial" panose="020B0604020202020204" pitchFamily="34" charset="0"/>
+              </a:rPr>
+              <a:t>Solution Space</a:t>
+            </a:r>
+            <a:endParaRPr lang="en-US" sz="1200" b="1" dirty="0">
+              <a:latin typeface="Arial" panose="020B0604020202020204" pitchFamily="34" charset="0"/>
+              <a:cs typeface="Arial" panose="020B0604020202020204" pitchFamily="34" charset="0"/>
+            </a:endParaRPr>
+          </a:p>
+        </p:txBody>
+      </p:sp>
+      <p:cxnSp>
+        <p:nvCxnSpPr>
+          <p:cNvPr id="6" name="Gerade Verbindung mit Pfeil 5"/>
+          <p:cNvCxnSpPr/>
+          <p:nvPr/>
+        </p:nvCxnSpPr>
+        <p:spPr>
+          <a:xfrm>
+            <a:off x="3886200" y="2525195"/>
+            <a:ext cx="569591" cy="0"/>
+          </a:xfrm>
+          <a:prstGeom prst="straightConnector1">
+            <a:avLst/>
+          </a:prstGeom>
+          <a:ln>
+            <a:solidFill>
+              <a:srgbClr val="FF0000"/>
+            </a:solidFill>
+            <a:tailEnd type="triangle"/>
+          </a:ln>
+        </p:spPr>
+        <p:style>
+          <a:lnRef idx="1">
+            <a:schemeClr val="accent1"/>
+          </a:lnRef>
+          <a:fillRef idx="0">
+            <a:schemeClr val="accent1"/>
+          </a:fillRef>
+          <a:effectRef idx="0">
+            <a:schemeClr val="accent1"/>
+          </a:effectRef>
+          <a:fontRef idx="minor">
+            <a:schemeClr val="tx1"/>
+          </a:fontRef>
+        </p:style>
+      </p:cxnSp>
+    </p:spTree>
+    <p:extLst>
+      <p:ext uri="{BB962C8B-B14F-4D97-AF65-F5344CB8AC3E}">
+        <p14:creationId xmlns:p14="http://schemas.microsoft.com/office/powerpoint/2010/main" val="3704921997"/>
+      </p:ext>
+    </p:extLst>
+  </p:cSld>
+  <p:clrMapOvr>
+    <a:masterClrMapping/>
+  </p:clrMapOvr>
+</p:sld>
+</file>
+
+<file path=ppt/slides/slide11.xml><?xml version="1.0" encoding="utf-8"?>
+<p:sld xmlns:a="http://schemas.openxmlformats.org/drawingml/2006/main" xmlns:r="http://schemas.openxmlformats.org/officeDocument/2006/relationships" xmlns:p="http://schemas.openxmlformats.org/presentationml/2006/main">
+  <p:cSld>
+    <p:spTree>
+      <p:nvGrpSpPr>
+        <p:cNvPr id="1" name=""/>
+        <p:cNvGrpSpPr/>
+        <p:nvPr/>
+      </p:nvGrpSpPr>
+      <p:grpSpPr>
+        <a:xfrm>
+          <a:off x="0" y="0"/>
+          <a:ext cx="0" cy="0"/>
+          <a:chOff x="0" y="0"/>
+          <a:chExt cx="0" cy="0"/>
+        </a:xfrm>
+      </p:grpSpPr>
+      <p:sp>
+        <p:nvSpPr>
+          <p:cNvPr id="3" name="Textfeld 2"/>
+          <p:cNvSpPr txBox="1"/>
+          <p:nvPr/>
+        </p:nvSpPr>
+        <p:spPr>
+          <a:xfrm>
+            <a:off x="63165" y="59961"/>
+            <a:ext cx="1696453" cy="276999"/>
+          </a:xfrm>
+          <a:prstGeom prst="rect">
+            <a:avLst/>
+          </a:prstGeom>
+          <a:noFill/>
+        </p:spPr>
+        <p:txBody>
+          <a:bodyPr wrap="square" rtlCol="0">
+            <a:spAutoFit/>
+          </a:bodyPr>
+          <a:lstStyle/>
+          <a:p>
+            <a:r>
+              <a:rPr lang="en-US" sz="1200" b="1" dirty="0">
+                <a:latin typeface="Arial" panose="020B0604020202020204" pitchFamily="34" charset="0"/>
+                <a:cs typeface="Arial" panose="020B0604020202020204" pitchFamily="34" charset="0"/>
+              </a:rPr>
+              <a:t>Overview</a:t>
+            </a:r>
+          </a:p>
+        </p:txBody>
+      </p:sp>
+      <p:sp>
+        <p:nvSpPr>
+          <p:cNvPr id="10" name="Rechteck 9"/>
+          <p:cNvSpPr/>
+          <p:nvPr/>
+        </p:nvSpPr>
+        <p:spPr>
+          <a:xfrm>
+            <a:off x="7686675" y="135552"/>
+            <a:ext cx="1309688" cy="223838"/>
+          </a:xfrm>
+          <a:prstGeom prst="rect">
+            <a:avLst/>
+          </a:prstGeom>
+          <a:noFill/>
+          <a:ln>
+            <a:solidFill>
+              <a:srgbClr val="FF0000"/>
+            </a:solidFill>
+          </a:ln>
+        </p:spPr>
+        <p:style>
+          <a:lnRef idx="2">
+            <a:schemeClr val="accent1">
+              <a:shade val="50000"/>
+            </a:schemeClr>
+          </a:lnRef>
+          <a:fillRef idx="1">
+            <a:schemeClr val="accent1"/>
+          </a:fillRef>
+          <a:effectRef idx="0">
+            <a:schemeClr val="accent1"/>
+          </a:effectRef>
+          <a:fontRef idx="minor">
+            <a:schemeClr val="lt1"/>
+          </a:fontRef>
+        </p:style>
+        <p:txBody>
+          <a:bodyPr rot="0" spcFirstLastPara="0" vertOverflow="overflow" horzOverflow="overflow" vert="horz" wrap="square" lIns="68580" tIns="34290" rIns="68580" bIns="34290" numCol="1" spcCol="0" rtlCol="0" fromWordArt="0" anchor="ctr" anchorCtr="0" forceAA="0" compatLnSpc="1">
+            <a:prstTxWarp prst="textNoShape">
+              <a:avLst/>
+            </a:prstTxWarp>
+            <a:noAutofit/>
+          </a:bodyPr>
+          <a:lstStyle/>
+          <a:p>
+            <a:pPr algn="ctr"/>
+            <a:r>
+              <a:rPr lang="en-US" sz="800" dirty="0">
+                <a:solidFill>
+                  <a:schemeClr val="tx1"/>
+                </a:solidFill>
+                <a:latin typeface="Arial" panose="020B0604020202020204" pitchFamily="34" charset="0"/>
+                <a:cs typeface="Arial" panose="020B0604020202020204" pitchFamily="34" charset="0"/>
+              </a:rPr>
+              <a:t>Starting Points</a:t>
+            </a:r>
+          </a:p>
+        </p:txBody>
+      </p:sp>
+      <p:sp>
+        <p:nvSpPr>
+          <p:cNvPr id="11" name="Rechteck 10"/>
+          <p:cNvSpPr/>
+          <p:nvPr/>
+        </p:nvSpPr>
+        <p:spPr>
+          <a:xfrm>
+            <a:off x="7686675" y="438620"/>
+            <a:ext cx="1309688" cy="223838"/>
+          </a:xfrm>
+          <a:prstGeom prst="rect">
+            <a:avLst/>
+          </a:prstGeom>
+          <a:solidFill>
+            <a:schemeClr val="accent6">
+              <a:lumMod val="40000"/>
+              <a:lumOff val="60000"/>
+            </a:schemeClr>
+          </a:solidFill>
+          <a:ln>
+            <a:solidFill>
+              <a:schemeClr val="accent6"/>
+            </a:solidFill>
+          </a:ln>
+        </p:spPr>
+        <p:style>
+          <a:lnRef idx="2">
+            <a:schemeClr val="accent1">
+              <a:shade val="50000"/>
+            </a:schemeClr>
+          </a:lnRef>
+          <a:fillRef idx="1">
+            <a:schemeClr val="accent1"/>
+          </a:fillRef>
+          <a:effectRef idx="0">
+            <a:schemeClr val="accent1"/>
+          </a:effectRef>
+          <a:fontRef idx="minor">
+            <a:schemeClr val="lt1"/>
+          </a:fontRef>
+        </p:style>
+        <p:txBody>
+          <a:bodyPr rot="0" spcFirstLastPara="0" vertOverflow="overflow" horzOverflow="overflow" vert="horz" wrap="square" lIns="68580" tIns="34290" rIns="68580" bIns="34290" numCol="1" spcCol="0" rtlCol="0" fromWordArt="0" anchor="ctr" anchorCtr="0" forceAA="0" compatLnSpc="1">
+            <a:prstTxWarp prst="textNoShape">
+              <a:avLst/>
+            </a:prstTxWarp>
+            <a:noAutofit/>
+          </a:bodyPr>
+          <a:lstStyle/>
+          <a:p>
+            <a:pPr algn="ctr"/>
+            <a:r>
+              <a:rPr lang="en-US" sz="800" dirty="0">
+                <a:solidFill>
+                  <a:schemeClr val="tx1"/>
+                </a:solidFill>
+                <a:latin typeface="Arial" panose="020B0604020202020204" pitchFamily="34" charset="0"/>
+                <a:cs typeface="Arial" panose="020B0604020202020204" pitchFamily="34" charset="0"/>
+              </a:rPr>
+              <a:t>TBD by Customer</a:t>
+            </a:r>
+          </a:p>
+        </p:txBody>
+      </p:sp>
+      <p:sp>
+        <p:nvSpPr>
+          <p:cNvPr id="15" name="Rechteck 14"/>
+          <p:cNvSpPr/>
+          <p:nvPr/>
+        </p:nvSpPr>
+        <p:spPr>
+          <a:xfrm>
+            <a:off x="7686675" y="741688"/>
+            <a:ext cx="1309688" cy="223838"/>
+          </a:xfrm>
+          <a:prstGeom prst="rect">
+            <a:avLst/>
+          </a:prstGeom>
+          <a:solidFill>
+            <a:schemeClr val="accent1">
+              <a:lumMod val="40000"/>
+              <a:lumOff val="60000"/>
+            </a:schemeClr>
+          </a:solidFill>
+          <a:ln>
+            <a:solidFill>
+              <a:schemeClr val="accent1"/>
+            </a:solidFill>
+          </a:ln>
+        </p:spPr>
+        <p:style>
+          <a:lnRef idx="2">
+            <a:schemeClr val="accent1">
+              <a:shade val="50000"/>
+            </a:schemeClr>
+          </a:lnRef>
+          <a:fillRef idx="1">
+            <a:schemeClr val="accent1"/>
+          </a:fillRef>
+          <a:effectRef idx="0">
+            <a:schemeClr val="accent1"/>
+          </a:effectRef>
+          <a:fontRef idx="minor">
+            <a:schemeClr val="lt1"/>
+          </a:fontRef>
+        </p:style>
+        <p:txBody>
+          <a:bodyPr rot="0" spcFirstLastPara="0" vertOverflow="overflow" horzOverflow="overflow" vert="horz" wrap="square" lIns="68580" tIns="34290" rIns="68580" bIns="34290" numCol="1" spcCol="0" rtlCol="0" fromWordArt="0" anchor="ctr" anchorCtr="0" forceAA="0" compatLnSpc="1">
+            <a:prstTxWarp prst="textNoShape">
+              <a:avLst/>
+            </a:prstTxWarp>
+            <a:noAutofit/>
+          </a:bodyPr>
+          <a:lstStyle/>
+          <a:p>
+            <a:pPr algn="ctr"/>
+            <a:r>
+              <a:rPr lang="en-US" sz="800" dirty="0">
+                <a:solidFill>
+                  <a:schemeClr val="tx1"/>
+                </a:solidFill>
+                <a:latin typeface="Arial" panose="020B0604020202020204" pitchFamily="34" charset="0"/>
+                <a:cs typeface="Arial" panose="020B0604020202020204" pitchFamily="34" charset="0"/>
+              </a:rPr>
+              <a:t>TBD by Service Provider</a:t>
+            </a:r>
+          </a:p>
+        </p:txBody>
+      </p:sp>
+      <p:sp>
+        <p:nvSpPr>
+          <p:cNvPr id="19" name="Rechteck 18"/>
+          <p:cNvSpPr/>
+          <p:nvPr/>
+        </p:nvSpPr>
+        <p:spPr>
+          <a:xfrm>
+            <a:off x="2365666" y="91059"/>
+            <a:ext cx="570111" cy="505325"/>
+          </a:xfrm>
+          <a:prstGeom prst="rect">
+            <a:avLst/>
+          </a:prstGeom>
+          <a:solidFill>
+            <a:schemeClr val="accent1">
+              <a:lumMod val="40000"/>
+              <a:lumOff val="60000"/>
+            </a:schemeClr>
+          </a:solidFill>
+          <a:ln>
+            <a:solidFill>
+              <a:schemeClr val="accent1"/>
+            </a:solidFill>
+          </a:ln>
+        </p:spPr>
+        <p:style>
+          <a:lnRef idx="2">
+            <a:schemeClr val="accent1">
+              <a:shade val="50000"/>
+            </a:schemeClr>
+          </a:lnRef>
+          <a:fillRef idx="1">
+            <a:schemeClr val="accent1"/>
+          </a:fillRef>
+          <a:effectRef idx="0">
+            <a:schemeClr val="accent1"/>
+          </a:effectRef>
+          <a:fontRef idx="minor">
+            <a:schemeClr val="lt1"/>
+          </a:fontRef>
+        </p:style>
+        <p:txBody>
+          <a:bodyPr rot="0" spcFirstLastPara="0" vertOverflow="overflow" horzOverflow="overflow" vert="horz" wrap="square" lIns="68580" tIns="34290" rIns="68580" bIns="34290" numCol="1" spcCol="0" rtlCol="0" fromWordArt="0" anchor="ctr" anchorCtr="0" forceAA="0" compatLnSpc="1">
+            <a:prstTxWarp prst="textNoShape">
+              <a:avLst/>
+            </a:prstTxWarp>
+            <a:noAutofit/>
+          </a:bodyPr>
+          <a:lstStyle/>
+          <a:p>
+            <a:pPr algn="ctr"/>
+            <a:endParaRPr lang="en-US" sz="1053">
+              <a:latin typeface="Arial" panose="020B0604020202020204" pitchFamily="34" charset="0"/>
+              <a:cs typeface="Arial" panose="020B0604020202020204" pitchFamily="34" charset="0"/>
+            </a:endParaRPr>
+          </a:p>
+        </p:txBody>
+      </p:sp>
+      <p:sp>
+        <p:nvSpPr>
+          <p:cNvPr id="6" name="Freihandform 5"/>
+          <p:cNvSpPr/>
+          <p:nvPr/>
+        </p:nvSpPr>
+        <p:spPr>
+          <a:xfrm>
+            <a:off x="4243899" y="1265783"/>
+            <a:ext cx="4414132" cy="4115812"/>
+          </a:xfrm>
+          <a:custGeom>
+            <a:avLst/>
+            <a:gdLst>
+              <a:gd name="connsiteX0" fmla="*/ 1770647 w 5708984"/>
+              <a:gd name="connsiteY0" fmla="*/ 0 h 5183938"/>
+              <a:gd name="connsiteX1" fmla="*/ 5708984 w 5708984"/>
+              <a:gd name="connsiteY1" fmla="*/ 0 h 5183938"/>
+              <a:gd name="connsiteX2" fmla="*/ 5708984 w 5708984"/>
+              <a:gd name="connsiteY2" fmla="*/ 2891923 h 5183938"/>
+              <a:gd name="connsiteX3" fmla="*/ 5708984 w 5708984"/>
+              <a:gd name="connsiteY3" fmla="*/ 2891924 h 5183938"/>
+              <a:gd name="connsiteX4" fmla="*/ 5708984 w 5708984"/>
+              <a:gd name="connsiteY4" fmla="*/ 5183938 h 5183938"/>
+              <a:gd name="connsiteX5" fmla="*/ 0 w 5708984"/>
+              <a:gd name="connsiteY5" fmla="*/ 5183938 h 5183938"/>
+              <a:gd name="connsiteX6" fmla="*/ 0 w 5708984"/>
+              <a:gd name="connsiteY6" fmla="*/ 2891923 h 5183938"/>
+              <a:gd name="connsiteX7" fmla="*/ 1770647 w 5708984"/>
+              <a:gd name="connsiteY7" fmla="*/ 2891923 h 5183938"/>
+            </a:gdLst>
+            <a:ahLst/>
+            <a:cxnLst>
+              <a:cxn ang="0">
+                <a:pos x="connsiteX0" y="connsiteY0"/>
+              </a:cxn>
+              <a:cxn ang="0">
+                <a:pos x="connsiteX1" y="connsiteY1"/>
+              </a:cxn>
+              <a:cxn ang="0">
+                <a:pos x="connsiteX2" y="connsiteY2"/>
+              </a:cxn>
+              <a:cxn ang="0">
+                <a:pos x="connsiteX3" y="connsiteY3"/>
+              </a:cxn>
+              <a:cxn ang="0">
+                <a:pos x="connsiteX4" y="connsiteY4"/>
+              </a:cxn>
+              <a:cxn ang="0">
+                <a:pos x="connsiteX5" y="connsiteY5"/>
+              </a:cxn>
+              <a:cxn ang="0">
+                <a:pos x="connsiteX6" y="connsiteY6"/>
+              </a:cxn>
+              <a:cxn ang="0">
+                <a:pos x="connsiteX7" y="connsiteY7"/>
+              </a:cxn>
+            </a:cxnLst>
+            <a:rect l="l" t="t" r="r" b="b"/>
+            <a:pathLst>
+              <a:path w="5708984" h="5183938">
+                <a:moveTo>
+                  <a:pt x="1770647" y="0"/>
+                </a:moveTo>
+                <a:lnTo>
+                  <a:pt x="5708984" y="0"/>
+                </a:lnTo>
+                <a:lnTo>
+                  <a:pt x="5708984" y="2891923"/>
+                </a:lnTo>
+                <a:lnTo>
+                  <a:pt x="5708984" y="2891924"/>
+                </a:lnTo>
+                <a:lnTo>
+                  <a:pt x="5708984" y="5183938"/>
+                </a:lnTo>
+                <a:lnTo>
+                  <a:pt x="0" y="5183938"/>
+                </a:lnTo>
+                <a:lnTo>
+                  <a:pt x="0" y="2891923"/>
+                </a:lnTo>
+                <a:lnTo>
+                  <a:pt x="1770647" y="2891923"/>
+                </a:lnTo>
+                <a:close/>
+              </a:path>
+            </a:pathLst>
+          </a:custGeom>
+          <a:solidFill>
+            <a:schemeClr val="accent2">
+              <a:lumMod val="20000"/>
+              <a:lumOff val="80000"/>
+            </a:schemeClr>
+          </a:solidFill>
+          <a:ln>
+            <a:solidFill>
+              <a:schemeClr val="accent2"/>
+            </a:solidFill>
+            <a:prstDash val="dash"/>
+          </a:ln>
+        </p:spPr>
+        <p:style>
+          <a:lnRef idx="2">
+            <a:schemeClr val="accent1">
+              <a:shade val="50000"/>
+            </a:schemeClr>
+          </a:lnRef>
+          <a:fillRef idx="1">
+            <a:schemeClr val="accent1"/>
+          </a:fillRef>
+          <a:effectRef idx="0">
+            <a:schemeClr val="accent1"/>
+          </a:effectRef>
+          <a:fontRef idx="minor">
+            <a:schemeClr val="lt1"/>
+          </a:fontRef>
+        </p:style>
+        <p:txBody>
+          <a:bodyPr rot="0" spcFirstLastPara="0" vertOverflow="overflow" horzOverflow="overflow" vert="horz" wrap="square" lIns="68580" tIns="34290" rIns="68580" bIns="34290" numCol="1" spcCol="0" rtlCol="0" fromWordArt="0" anchor="t" anchorCtr="0" forceAA="0" compatLnSpc="1">
+            <a:prstTxWarp prst="textNoShape">
+              <a:avLst/>
+            </a:prstTxWarp>
+            <a:noAutofit/>
+          </a:bodyPr>
+          <a:lstStyle/>
+          <a:p>
+            <a:pPr algn="r"/>
+            <a:r>
+              <a:rPr lang="en-US" sz="1053" dirty="0">
+                <a:solidFill>
+                  <a:schemeClr val="tx1"/>
+                </a:solidFill>
+                <a:latin typeface="Arial" panose="020B0604020202020204" pitchFamily="34" charset="0"/>
+                <a:cs typeface="Arial" panose="020B0604020202020204" pitchFamily="34" charset="0"/>
+              </a:rPr>
+              <a:t>Solution</a:t>
+            </a:r>
+          </a:p>
+        </p:txBody>
+      </p:sp>
+      <p:sp>
+        <p:nvSpPr>
+          <p:cNvPr id="18" name="Rechteck 17"/>
+          <p:cNvSpPr/>
+          <p:nvPr/>
+        </p:nvSpPr>
+        <p:spPr>
+          <a:xfrm>
+            <a:off x="1215727" y="4685634"/>
+            <a:ext cx="649149" cy="952344"/>
+          </a:xfrm>
+          <a:prstGeom prst="rect">
+            <a:avLst/>
+          </a:prstGeom>
+          <a:solidFill>
+            <a:schemeClr val="accent6">
+              <a:lumMod val="40000"/>
+              <a:lumOff val="60000"/>
+            </a:schemeClr>
+          </a:solidFill>
+          <a:ln>
+            <a:solidFill>
+              <a:schemeClr val="accent6"/>
+            </a:solidFill>
+          </a:ln>
+        </p:spPr>
+        <p:style>
+          <a:lnRef idx="2">
+            <a:schemeClr val="accent1">
+              <a:shade val="50000"/>
+            </a:schemeClr>
+          </a:lnRef>
+          <a:fillRef idx="1">
+            <a:schemeClr val="accent1"/>
+          </a:fillRef>
+          <a:effectRef idx="0">
+            <a:schemeClr val="accent1"/>
+          </a:effectRef>
+          <a:fontRef idx="minor">
+            <a:schemeClr val="lt1"/>
+          </a:fontRef>
+        </p:style>
+        <p:txBody>
+          <a:bodyPr rot="0" spcFirstLastPara="0" vertOverflow="overflow" horzOverflow="overflow" vert="horz" wrap="square" lIns="68580" tIns="34290" rIns="68580" bIns="34290" numCol="1" spcCol="0" rtlCol="0" fromWordArt="0" anchor="ctr" anchorCtr="0" forceAA="0" compatLnSpc="1">
+            <a:prstTxWarp prst="textNoShape">
+              <a:avLst/>
+            </a:prstTxWarp>
+            <a:noAutofit/>
+          </a:bodyPr>
+          <a:lstStyle/>
+          <a:p>
+            <a:pPr algn="ctr"/>
+            <a:endParaRPr lang="en-US" sz="1053">
+              <a:latin typeface="Arial" panose="020B0604020202020204" pitchFamily="34" charset="0"/>
+              <a:cs typeface="Arial" panose="020B0604020202020204" pitchFamily="34" charset="0"/>
+            </a:endParaRPr>
+          </a:p>
+        </p:txBody>
+      </p:sp>
+      <p:sp>
+        <p:nvSpPr>
+          <p:cNvPr id="17" name="Rechteck 16"/>
+          <p:cNvSpPr/>
+          <p:nvPr/>
+        </p:nvSpPr>
+        <p:spPr>
+          <a:xfrm>
+            <a:off x="4532089" y="1918004"/>
+            <a:ext cx="691907" cy="812409"/>
+          </a:xfrm>
+          <a:prstGeom prst="rect">
+            <a:avLst/>
+          </a:prstGeom>
+          <a:solidFill>
+            <a:schemeClr val="accent1">
+              <a:lumMod val="40000"/>
+              <a:lumOff val="60000"/>
+            </a:schemeClr>
+          </a:solidFill>
+          <a:ln>
+            <a:solidFill>
+              <a:schemeClr val="accent1"/>
+            </a:solidFill>
+          </a:ln>
+        </p:spPr>
+        <p:style>
+          <a:lnRef idx="2">
+            <a:schemeClr val="accent1">
+              <a:shade val="50000"/>
+            </a:schemeClr>
+          </a:lnRef>
+          <a:fillRef idx="1">
+            <a:schemeClr val="accent1"/>
+          </a:fillRef>
+          <a:effectRef idx="0">
+            <a:schemeClr val="accent1"/>
+          </a:effectRef>
+          <a:fontRef idx="minor">
+            <a:schemeClr val="lt1"/>
+          </a:fontRef>
+        </p:style>
+        <p:txBody>
+          <a:bodyPr rot="0" spcFirstLastPara="0" vertOverflow="overflow" horzOverflow="overflow" vert="horz" wrap="square" lIns="68580" tIns="34290" rIns="68580" bIns="34290" numCol="1" spcCol="0" rtlCol="0" fromWordArt="0" anchor="ctr" anchorCtr="0" forceAA="0" compatLnSpc="1">
+            <a:prstTxWarp prst="textNoShape">
+              <a:avLst/>
+            </a:prstTxWarp>
+            <a:noAutofit/>
+          </a:bodyPr>
+          <a:lstStyle/>
+          <a:p>
+            <a:pPr algn="ctr"/>
+            <a:endParaRPr lang="en-US" sz="1053">
+              <a:latin typeface="Arial" panose="020B0604020202020204" pitchFamily="34" charset="0"/>
+              <a:cs typeface="Arial" panose="020B0604020202020204" pitchFamily="34" charset="0"/>
+            </a:endParaRPr>
+          </a:p>
+        </p:txBody>
+      </p:sp>
+      <p:sp>
+        <p:nvSpPr>
+          <p:cNvPr id="12" name="Rechteck 11"/>
+          <p:cNvSpPr/>
+          <p:nvPr/>
+        </p:nvSpPr>
+        <p:spPr>
+          <a:xfrm>
+            <a:off x="3645960" y="2006113"/>
+            <a:ext cx="746445" cy="645262"/>
+          </a:xfrm>
+          <a:prstGeom prst="rect">
+            <a:avLst/>
+          </a:prstGeom>
+          <a:solidFill>
+            <a:schemeClr val="accent1">
+              <a:lumMod val="40000"/>
+              <a:lumOff val="60000"/>
+            </a:schemeClr>
+          </a:solidFill>
+          <a:ln>
+            <a:solidFill>
+              <a:schemeClr val="accent1"/>
+            </a:solidFill>
+          </a:ln>
+        </p:spPr>
+        <p:style>
+          <a:lnRef idx="2">
+            <a:schemeClr val="accent1">
+              <a:shade val="50000"/>
+            </a:schemeClr>
+          </a:lnRef>
+          <a:fillRef idx="1">
+            <a:schemeClr val="accent1"/>
+          </a:fillRef>
+          <a:effectRef idx="0">
+            <a:schemeClr val="accent1"/>
+          </a:effectRef>
+          <a:fontRef idx="minor">
+            <a:schemeClr val="lt1"/>
+          </a:fontRef>
+        </p:style>
+        <p:txBody>
+          <a:bodyPr rot="0" spcFirstLastPara="0" vertOverflow="overflow" horzOverflow="overflow" vert="horz" wrap="square" lIns="68580" tIns="34290" rIns="68580" bIns="34290" numCol="1" spcCol="0" rtlCol="0" fromWordArt="0" anchor="ctr" anchorCtr="0" forceAA="0" compatLnSpc="1">
+            <a:prstTxWarp prst="textNoShape">
+              <a:avLst/>
+            </a:prstTxWarp>
+            <a:noAutofit/>
+          </a:bodyPr>
+          <a:lstStyle/>
+          <a:p>
+            <a:pPr algn="ctr"/>
+            <a:endParaRPr lang="en-US" sz="1053">
+              <a:latin typeface="Arial" panose="020B0604020202020204" pitchFamily="34" charset="0"/>
+              <a:cs typeface="Arial" panose="020B0604020202020204" pitchFamily="34" charset="0"/>
+            </a:endParaRPr>
+          </a:p>
+        </p:txBody>
+      </p:sp>
+      <p:sp>
+        <p:nvSpPr>
+          <p:cNvPr id="13" name="Rechteck 12"/>
+          <p:cNvSpPr/>
+          <p:nvPr/>
+        </p:nvSpPr>
+        <p:spPr>
+          <a:xfrm>
+            <a:off x="990600" y="3667210"/>
+            <a:ext cx="1092602" cy="777423"/>
+          </a:xfrm>
+          <a:prstGeom prst="rect">
+            <a:avLst/>
+          </a:prstGeom>
+          <a:solidFill>
+            <a:schemeClr val="accent6">
+              <a:lumMod val="40000"/>
+              <a:lumOff val="60000"/>
+            </a:schemeClr>
+          </a:solidFill>
+          <a:ln>
+            <a:solidFill>
+              <a:schemeClr val="accent6"/>
+            </a:solidFill>
+          </a:ln>
+        </p:spPr>
+        <p:style>
+          <a:lnRef idx="2">
+            <a:schemeClr val="accent1">
+              <a:shade val="50000"/>
+            </a:schemeClr>
+          </a:lnRef>
+          <a:fillRef idx="1">
+            <a:schemeClr val="accent1"/>
+          </a:fillRef>
+          <a:effectRef idx="0">
+            <a:schemeClr val="accent1"/>
+          </a:effectRef>
+          <a:fontRef idx="minor">
+            <a:schemeClr val="lt1"/>
+          </a:fontRef>
+        </p:style>
+        <p:txBody>
+          <a:bodyPr rot="0" spcFirstLastPara="0" vertOverflow="overflow" horzOverflow="overflow" vert="horz" wrap="square" lIns="68580" tIns="34290" rIns="68580" bIns="34290" numCol="1" spcCol="0" rtlCol="0" fromWordArt="0" anchor="ctr" anchorCtr="0" forceAA="0" compatLnSpc="1">
+            <a:prstTxWarp prst="textNoShape">
+              <a:avLst/>
+            </a:prstTxWarp>
+            <a:noAutofit/>
+          </a:bodyPr>
+          <a:lstStyle/>
+          <a:p>
+            <a:pPr algn="ctr"/>
+            <a:endParaRPr lang="en-US" sz="1053">
+              <a:latin typeface="Arial" panose="020B0604020202020204" pitchFamily="34" charset="0"/>
+              <a:cs typeface="Arial" panose="020B0604020202020204" pitchFamily="34" charset="0"/>
+            </a:endParaRPr>
+          </a:p>
+        </p:txBody>
+      </p:sp>
+      <p:sp>
+        <p:nvSpPr>
+          <p:cNvPr id="14" name="Rechteck 13"/>
+          <p:cNvSpPr/>
+          <p:nvPr/>
+        </p:nvSpPr>
+        <p:spPr>
+          <a:xfrm>
+            <a:off x="1072550" y="635254"/>
+            <a:ext cx="932909" cy="658220"/>
+          </a:xfrm>
+          <a:prstGeom prst="rect">
+            <a:avLst/>
+          </a:prstGeom>
+          <a:solidFill>
+            <a:schemeClr val="accent6">
+              <a:lumMod val="40000"/>
+              <a:lumOff val="60000"/>
+            </a:schemeClr>
+          </a:solidFill>
+          <a:ln>
+            <a:solidFill>
+              <a:schemeClr val="accent6"/>
+            </a:solidFill>
+          </a:ln>
+        </p:spPr>
+        <p:style>
+          <a:lnRef idx="2">
+            <a:schemeClr val="accent1">
+              <a:shade val="50000"/>
+            </a:schemeClr>
+          </a:lnRef>
+          <a:fillRef idx="1">
+            <a:schemeClr val="accent1"/>
+          </a:fillRef>
+          <a:effectRef idx="0">
+            <a:schemeClr val="accent1"/>
+          </a:effectRef>
+          <a:fontRef idx="minor">
+            <a:schemeClr val="lt1"/>
+          </a:fontRef>
+        </p:style>
+        <p:txBody>
+          <a:bodyPr rot="0" spcFirstLastPara="0" vertOverflow="overflow" horzOverflow="overflow" vert="horz" wrap="square" lIns="68580" tIns="34290" rIns="68580" bIns="34290" numCol="1" spcCol="0" rtlCol="0" fromWordArt="0" anchor="ctr" anchorCtr="0" forceAA="0" compatLnSpc="1">
+            <a:prstTxWarp prst="textNoShape">
+              <a:avLst/>
+            </a:prstTxWarp>
+            <a:noAutofit/>
+          </a:bodyPr>
+          <a:lstStyle/>
+          <a:p>
+            <a:pPr algn="ctr"/>
+            <a:endParaRPr lang="en-US" sz="1053">
+              <a:latin typeface="Arial" panose="020B0604020202020204" pitchFamily="34" charset="0"/>
+              <a:cs typeface="Arial" panose="020B0604020202020204" pitchFamily="34" charset="0"/>
+            </a:endParaRPr>
+          </a:p>
+        </p:txBody>
+      </p:sp>
+      <p:sp>
+        <p:nvSpPr>
+          <p:cNvPr id="16" name="Rechteck 15"/>
+          <p:cNvSpPr/>
+          <p:nvPr/>
+        </p:nvSpPr>
+        <p:spPr>
+          <a:xfrm>
+            <a:off x="4511297" y="2835365"/>
+            <a:ext cx="746445" cy="693794"/>
+          </a:xfrm>
+          <a:prstGeom prst="rect">
+            <a:avLst/>
+          </a:prstGeom>
+          <a:solidFill>
+            <a:schemeClr val="accent1">
+              <a:lumMod val="40000"/>
+              <a:lumOff val="60000"/>
+            </a:schemeClr>
+          </a:solidFill>
+          <a:ln>
+            <a:solidFill>
+              <a:schemeClr val="accent1"/>
+            </a:solidFill>
+          </a:ln>
+        </p:spPr>
+        <p:style>
+          <a:lnRef idx="2">
+            <a:schemeClr val="accent1">
+              <a:shade val="50000"/>
+            </a:schemeClr>
+          </a:lnRef>
+          <a:fillRef idx="1">
+            <a:schemeClr val="accent1"/>
+          </a:fillRef>
+          <a:effectRef idx="0">
+            <a:schemeClr val="accent1"/>
+          </a:effectRef>
+          <a:fontRef idx="minor">
+            <a:schemeClr val="lt1"/>
+          </a:fontRef>
+        </p:style>
+        <p:txBody>
+          <a:bodyPr rot="0" spcFirstLastPara="0" vertOverflow="overflow" horzOverflow="overflow" vert="horz" wrap="square" lIns="68580" tIns="34290" rIns="68580" bIns="34290" numCol="1" spcCol="0" rtlCol="0" fromWordArt="0" anchor="ctr" anchorCtr="0" forceAA="0" compatLnSpc="1">
+            <a:prstTxWarp prst="textNoShape">
+              <a:avLst/>
+            </a:prstTxWarp>
+            <a:noAutofit/>
+          </a:bodyPr>
+          <a:lstStyle/>
+          <a:p>
+            <a:pPr algn="ctr"/>
+            <a:endParaRPr lang="en-US" sz="1053">
+              <a:latin typeface="Arial" panose="020B0604020202020204" pitchFamily="34" charset="0"/>
+              <a:cs typeface="Arial" panose="020B0604020202020204" pitchFamily="34" charset="0"/>
+            </a:endParaRPr>
+          </a:p>
+        </p:txBody>
+      </p:sp>
+      <p:pic>
+        <p:nvPicPr>
+          <p:cNvPr id="4" name="Grafik 3"/>
+          <p:cNvPicPr>
+            <a:picLocks noChangeAspect="1"/>
+          </p:cNvPicPr>
+          <p:nvPr/>
+        </p:nvPicPr>
+        <p:blipFill>
+          <a:blip r:embed="rId2" cstate="print">
+            <a:clrChange>
+              <a:clrFrom>
+                <a:srgbClr val="FFFFFF"/>
+              </a:clrFrom>
+              <a:clrTo>
+                <a:srgbClr val="FFFFFF">
+                  <a:alpha val="0"/>
+                </a:srgbClr>
+              </a:clrTo>
+            </a:clrChange>
+            <a:extLst>
+              <a:ext uri="{28A0092B-C50C-407E-A947-70E740481C1C}">
+                <a14:useLocalDpi xmlns:a14="http://schemas.microsoft.com/office/drawing/2010/main" val="0"/>
+              </a:ext>
+            </a:extLst>
+          </a:blip>
+          <a:stretch>
+            <a:fillRect/>
+          </a:stretch>
+        </p:blipFill>
+        <p:spPr>
+          <a:xfrm>
+            <a:off x="990600" y="59961"/>
+            <a:ext cx="7668635" cy="5597453"/>
+          </a:xfrm>
+          <a:prstGeom prst="rect">
+            <a:avLst/>
+          </a:prstGeom>
+        </p:spPr>
+      </p:pic>
+      <p:sp>
+        <p:nvSpPr>
+          <p:cNvPr id="7" name="Rechteck 6"/>
+          <p:cNvSpPr/>
+          <p:nvPr/>
+        </p:nvSpPr>
+        <p:spPr>
+          <a:xfrm>
+            <a:off x="4585858" y="1966594"/>
+            <a:ext cx="586956" cy="709400"/>
+          </a:xfrm>
+          <a:prstGeom prst="rect">
+            <a:avLst/>
+          </a:prstGeom>
+          <a:noFill/>
+          <a:ln>
+            <a:solidFill>
+              <a:srgbClr val="FF0000"/>
+            </a:solidFill>
+          </a:ln>
+        </p:spPr>
+        <p:style>
+          <a:lnRef idx="2">
+            <a:schemeClr val="accent1">
+              <a:shade val="50000"/>
+            </a:schemeClr>
+          </a:lnRef>
+          <a:fillRef idx="1">
+            <a:schemeClr val="accent1"/>
+          </a:fillRef>
+          <a:effectRef idx="0">
+            <a:schemeClr val="accent1"/>
+          </a:effectRef>
+          <a:fontRef idx="minor">
+            <a:schemeClr val="lt1"/>
+          </a:fontRef>
+        </p:style>
+        <p:txBody>
+          <a:bodyPr rot="0" spcFirstLastPara="0" vertOverflow="overflow" horzOverflow="overflow" vert="horz" wrap="square" lIns="68580" tIns="34290" rIns="68580" bIns="34290" numCol="1" spcCol="0" rtlCol="0" fromWordArt="0" anchor="ctr" anchorCtr="0" forceAA="0" compatLnSpc="1">
+            <a:prstTxWarp prst="textNoShape">
+              <a:avLst/>
+            </a:prstTxWarp>
+            <a:noAutofit/>
+          </a:bodyPr>
+          <a:lstStyle/>
+          <a:p>
+            <a:pPr algn="ctr"/>
+            <a:endParaRPr lang="en-US" sz="1053">
+              <a:latin typeface="Arial" panose="020B0604020202020204" pitchFamily="34" charset="0"/>
+              <a:cs typeface="Arial" panose="020B0604020202020204" pitchFamily="34" charset="0"/>
+            </a:endParaRPr>
+          </a:p>
+        </p:txBody>
+      </p:sp>
+      <p:sp>
+        <p:nvSpPr>
+          <p:cNvPr id="8" name="Rechteck 7"/>
+          <p:cNvSpPr/>
+          <p:nvPr/>
+        </p:nvSpPr>
+        <p:spPr>
+          <a:xfrm>
+            <a:off x="7769411" y="5019926"/>
+            <a:ext cx="664697" cy="301253"/>
+          </a:xfrm>
+          <a:prstGeom prst="rect">
+            <a:avLst/>
+          </a:prstGeom>
+          <a:noFill/>
+          <a:ln>
+            <a:solidFill>
+              <a:srgbClr val="FF0000"/>
+            </a:solidFill>
+          </a:ln>
+        </p:spPr>
+        <p:style>
+          <a:lnRef idx="2">
+            <a:schemeClr val="accent1">
+              <a:shade val="50000"/>
+            </a:schemeClr>
+          </a:lnRef>
+          <a:fillRef idx="1">
+            <a:schemeClr val="accent1"/>
+          </a:fillRef>
+          <a:effectRef idx="0">
+            <a:schemeClr val="accent1"/>
+          </a:effectRef>
+          <a:fontRef idx="minor">
+            <a:schemeClr val="lt1"/>
+          </a:fontRef>
+        </p:style>
+        <p:txBody>
+          <a:bodyPr rot="0" spcFirstLastPara="0" vertOverflow="overflow" horzOverflow="overflow" vert="horz" wrap="square" lIns="68580" tIns="34290" rIns="68580" bIns="34290" numCol="1" spcCol="0" rtlCol="0" fromWordArt="0" anchor="ctr" anchorCtr="0" forceAA="0" compatLnSpc="1">
+            <a:prstTxWarp prst="textNoShape">
+              <a:avLst/>
+            </a:prstTxWarp>
+            <a:noAutofit/>
+          </a:bodyPr>
+          <a:lstStyle/>
+          <a:p>
+            <a:pPr algn="ctr"/>
+            <a:endParaRPr lang="en-US" sz="1053">
+              <a:latin typeface="Arial" panose="020B0604020202020204" pitchFamily="34" charset="0"/>
+              <a:cs typeface="Arial" panose="020B0604020202020204" pitchFamily="34" charset="0"/>
+            </a:endParaRPr>
+          </a:p>
+        </p:txBody>
+      </p:sp>
+      <p:sp>
+        <p:nvSpPr>
+          <p:cNvPr id="9" name="Rechteck 8"/>
+          <p:cNvSpPr/>
+          <p:nvPr/>
+        </p:nvSpPr>
+        <p:spPr>
+          <a:xfrm>
+            <a:off x="1275977" y="4747828"/>
+            <a:ext cx="520874" cy="841563"/>
+          </a:xfrm>
+          <a:prstGeom prst="rect">
+            <a:avLst/>
+          </a:prstGeom>
+          <a:noFill/>
+          <a:ln>
+            <a:solidFill>
+              <a:srgbClr val="FF0000"/>
+            </a:solidFill>
+          </a:ln>
+        </p:spPr>
+        <p:style>
+          <a:lnRef idx="2">
+            <a:schemeClr val="accent1">
+              <a:shade val="50000"/>
+            </a:schemeClr>
+          </a:lnRef>
+          <a:fillRef idx="1">
+            <a:schemeClr val="accent1"/>
+          </a:fillRef>
+          <a:effectRef idx="0">
+            <a:schemeClr val="accent1"/>
+          </a:effectRef>
+          <a:fontRef idx="minor">
+            <a:schemeClr val="lt1"/>
+          </a:fontRef>
+        </p:style>
+        <p:txBody>
+          <a:bodyPr rot="0" spcFirstLastPara="0" vertOverflow="overflow" horzOverflow="overflow" vert="horz" wrap="square" lIns="68580" tIns="34290" rIns="68580" bIns="34290" numCol="1" spcCol="0" rtlCol="0" fromWordArt="0" anchor="ctr" anchorCtr="0" forceAA="0" compatLnSpc="1">
+            <a:prstTxWarp prst="textNoShape">
+              <a:avLst/>
+            </a:prstTxWarp>
+            <a:noAutofit/>
+          </a:bodyPr>
+          <a:lstStyle/>
+          <a:p>
+            <a:pPr algn="ctr"/>
+            <a:endParaRPr lang="en-US" sz="1053">
+              <a:latin typeface="Arial" panose="020B0604020202020204" pitchFamily="34" charset="0"/>
+              <a:cs typeface="Arial" panose="020B0604020202020204" pitchFamily="34" charset="0"/>
+            </a:endParaRPr>
+          </a:p>
+        </p:txBody>
+      </p:sp>
+    </p:spTree>
+    <p:extLst>
+      <p:ext uri="{BB962C8B-B14F-4D97-AF65-F5344CB8AC3E}">
+        <p14:creationId xmlns:p14="http://schemas.microsoft.com/office/powerpoint/2010/main" val="3494355585"/>
+      </p:ext>
+    </p:extLst>
+  </p:cSld>
+  <p:clrMapOvr>
+    <a:masterClrMapping/>
+  </p:clrMapOvr>
+  <p:timing>
+    <p:tnLst>
+      <p:par>
+        <p:cTn id="1" dur="indefinite" restart="never" nodeType="tmRoot"/>
+      </p:par>
+    </p:tnLst>
+  </p:timing>
+</p:sld>
+</file>
+
+<file path=ppt/slides/slide12.xml><?xml version="1.0" encoding="utf-8"?>
 <p:sld xmlns:a="http://schemas.openxmlformats.org/drawingml/2006/main" xmlns:r="http://schemas.openxmlformats.org/officeDocument/2006/relationships" xmlns:p="http://schemas.openxmlformats.org/presentationml/2006/main">
   <p:cSld>
     <p:spTree>
@@ -3219,7 +4411,7 @@
 </p:sld>
 </file>
 
-<file path=ppt/slides/slide11.xml><?xml version="1.0" encoding="utf-8"?>
+<file path=ppt/slides/slide13.xml><?xml version="1.0" encoding="utf-8"?>
 <p:sld xmlns:a="http://schemas.openxmlformats.org/drawingml/2006/main" xmlns:r="http://schemas.openxmlformats.org/officeDocument/2006/relationships" xmlns:p="http://schemas.openxmlformats.org/presentationml/2006/main">
   <p:cSld>
     <p:spTree>
@@ -4425,7 +5617,7 @@
 </p:sld>
 </file>
 
-<file path=ppt/slides/slide12.xml><?xml version="1.0" encoding="utf-8"?>
+<file path=ppt/slides/slide14.xml><?xml version="1.0" encoding="utf-8"?>
 <p:sld xmlns:a="http://schemas.openxmlformats.org/drawingml/2006/main" xmlns:r="http://schemas.openxmlformats.org/officeDocument/2006/relationships" xmlns:p="http://schemas.openxmlformats.org/presentationml/2006/main">
   <p:cSld>
     <p:spTree>
@@ -6709,7 +7901,7 @@
 </p:sld>
 </file>
 
-<file path=ppt/slides/slide13.xml><?xml version="1.0" encoding="utf-8"?>
+<file path=ppt/slides/slide15.xml><?xml version="1.0" encoding="utf-8"?>
 <p:sld xmlns:a="http://schemas.openxmlformats.org/drawingml/2006/main" xmlns:r="http://schemas.openxmlformats.org/officeDocument/2006/relationships" xmlns:p="http://schemas.openxmlformats.org/presentationml/2006/main">
   <p:cSld>
     <p:spTree>
@@ -6805,7 +7997,7 @@
 </p:sld>
 </file>
 
-<file path=ppt/slides/slide14.xml><?xml version="1.0" encoding="utf-8"?>
+<file path=ppt/slides/slide16.xml><?xml version="1.0" encoding="utf-8"?>
 <p:sld xmlns:a="http://schemas.openxmlformats.org/drawingml/2006/main" xmlns:r="http://schemas.openxmlformats.org/officeDocument/2006/relationships" xmlns:p="http://schemas.openxmlformats.org/presentationml/2006/main">
   <p:cSld>
     <p:spTree>
@@ -19028,6 +20220,608 @@
       </p:grpSpPr>
       <p:sp>
         <p:nvSpPr>
+          <p:cNvPr id="5" name="Würfel 4"/>
+          <p:cNvSpPr/>
+          <p:nvPr/>
+        </p:nvSpPr>
+        <p:spPr>
+          <a:xfrm>
+            <a:off x="427383" y="1674741"/>
+            <a:ext cx="1262270" cy="1128093"/>
+          </a:xfrm>
+          <a:prstGeom prst="cube">
+            <a:avLst/>
+          </a:prstGeom>
+        </p:spPr>
+        <p:style>
+          <a:lnRef idx="1">
+            <a:schemeClr val="accent3"/>
+          </a:lnRef>
+          <a:fillRef idx="3">
+            <a:schemeClr val="accent3"/>
+          </a:fillRef>
+          <a:effectRef idx="2">
+            <a:schemeClr val="accent3"/>
+          </a:effectRef>
+          <a:fontRef idx="minor">
+            <a:schemeClr val="lt1"/>
+          </a:fontRef>
+        </p:style>
+        <p:txBody>
+          <a:bodyPr rtlCol="0" anchor="ctr"/>
+          <a:lstStyle/>
+          <a:p>
+            <a:pPr algn="ctr"/>
+            <a:endParaRPr lang="en-US"/>
+          </a:p>
+        </p:txBody>
+      </p:sp>
+      <p:sp>
+        <p:nvSpPr>
+          <p:cNvPr id="7" name="Würfel 6"/>
+          <p:cNvSpPr/>
+          <p:nvPr/>
+        </p:nvSpPr>
+        <p:spPr>
+          <a:xfrm>
+            <a:off x="923512" y="266697"/>
+            <a:ext cx="270012" cy="1606828"/>
+          </a:xfrm>
+          <a:prstGeom prst="cube">
+            <a:avLst/>
+          </a:prstGeom>
+        </p:spPr>
+        <p:style>
+          <a:lnRef idx="1">
+            <a:schemeClr val="accent3"/>
+          </a:lnRef>
+          <a:fillRef idx="3">
+            <a:schemeClr val="accent3"/>
+          </a:fillRef>
+          <a:effectRef idx="2">
+            <a:schemeClr val="accent3"/>
+          </a:effectRef>
+          <a:fontRef idx="minor">
+            <a:schemeClr val="lt1"/>
+          </a:fontRef>
+        </p:style>
+        <p:txBody>
+          <a:bodyPr rtlCol="0" anchor="ctr"/>
+          <a:lstStyle/>
+          <a:p>
+            <a:pPr algn="ctr"/>
+            <a:endParaRPr lang="en-US"/>
+          </a:p>
+        </p:txBody>
+      </p:sp>
+      <p:sp>
+        <p:nvSpPr>
+          <p:cNvPr id="8" name="Rechteck 7"/>
+          <p:cNvSpPr/>
+          <p:nvPr/>
+        </p:nvSpPr>
+        <p:spPr>
+          <a:xfrm>
+            <a:off x="325659" y="74787"/>
+            <a:ext cx="3168000" cy="45719"/>
+          </a:xfrm>
+          <a:prstGeom prst="rect">
+            <a:avLst/>
+          </a:prstGeom>
+        </p:spPr>
+        <p:style>
+          <a:lnRef idx="2">
+            <a:schemeClr val="accent1">
+              <a:shade val="50000"/>
+            </a:schemeClr>
+          </a:lnRef>
+          <a:fillRef idx="1">
+            <a:schemeClr val="accent1"/>
+          </a:fillRef>
+          <a:effectRef idx="0">
+            <a:schemeClr val="accent1"/>
+          </a:effectRef>
+          <a:fontRef idx="minor">
+            <a:schemeClr val="lt1"/>
+          </a:fontRef>
+        </p:style>
+        <p:txBody>
+          <a:bodyPr rtlCol="0" anchor="ctr"/>
+          <a:lstStyle/>
+          <a:p>
+            <a:pPr algn="ctr"/>
+            <a:endParaRPr lang="en-US"/>
+          </a:p>
+        </p:txBody>
+      </p:sp>
+      <p:pic>
+        <p:nvPicPr>
+          <p:cNvPr id="12" name="Grafik 11"/>
+          <p:cNvPicPr>
+            <a:picLocks noChangeAspect="1"/>
+          </p:cNvPicPr>
+          <p:nvPr/>
+        </p:nvPicPr>
+        <p:blipFill rotWithShape="1">
+          <a:blip r:embed="rId2"/>
+          <a:srcRect l="72656" t="27486" r="2031" b="6553"/>
+          <a:stretch/>
+        </p:blipFill>
+        <p:spPr>
+          <a:xfrm>
+            <a:off x="3143251" y="714375"/>
+            <a:ext cx="2314575" cy="3181350"/>
+          </a:xfrm>
+          <a:prstGeom prst="rect">
+            <a:avLst/>
+          </a:prstGeom>
+        </p:spPr>
+      </p:pic>
+    </p:spTree>
+    <p:extLst>
+      <p:ext uri="{BB962C8B-B14F-4D97-AF65-F5344CB8AC3E}">
+        <p14:creationId xmlns:p14="http://schemas.microsoft.com/office/powerpoint/2010/main" val="3156223870"/>
+      </p:ext>
+    </p:extLst>
+  </p:cSld>
+  <p:clrMapOvr>
+    <a:masterClrMapping/>
+  </p:clrMapOvr>
+</p:sld>
+</file>
+
+<file path=ppt/slides/slide6.xml><?xml version="1.0" encoding="utf-8"?>
+<p:sld xmlns:a="http://schemas.openxmlformats.org/drawingml/2006/main" xmlns:r="http://schemas.openxmlformats.org/officeDocument/2006/relationships" xmlns:p="http://schemas.openxmlformats.org/presentationml/2006/main">
+  <p:cSld>
+    <p:spTree>
+      <p:nvGrpSpPr>
+        <p:cNvPr id="1" name=""/>
+        <p:cNvGrpSpPr/>
+        <p:nvPr/>
+      </p:nvGrpSpPr>
+      <p:grpSpPr>
+        <a:xfrm>
+          <a:off x="0" y="0"/>
+          <a:ext cx="0" cy="0"/>
+          <a:chOff x="0" y="0"/>
+          <a:chExt cx="0" cy="0"/>
+        </a:xfrm>
+      </p:grpSpPr>
+      <p:pic>
+        <p:nvPicPr>
+          <p:cNvPr id="4" name="Grafik 3"/>
+          <p:cNvPicPr>
+            <a:picLocks noChangeAspect="1"/>
+          </p:cNvPicPr>
+          <p:nvPr/>
+        </p:nvPicPr>
+        <p:blipFill>
+          <a:blip r:embed="rId2">
+            <a:extLst>
+              <a:ext uri="{28A0092B-C50C-407E-A947-70E740481C1C}">
+                <a14:useLocalDpi xmlns:a14="http://schemas.microsoft.com/office/drawing/2010/main" val="0"/>
+              </a:ext>
+            </a:extLst>
+          </a:blip>
+          <a:stretch>
+            <a:fillRect/>
+          </a:stretch>
+        </p:blipFill>
+        <p:spPr>
+          <a:xfrm>
+            <a:off x="0" y="827290"/>
+            <a:ext cx="9144000" cy="4060419"/>
+          </a:xfrm>
+          <a:prstGeom prst="rect">
+            <a:avLst/>
+          </a:prstGeom>
+        </p:spPr>
+      </p:pic>
+      <p:sp>
+        <p:nvSpPr>
+          <p:cNvPr id="6" name="Rechteck 5"/>
+          <p:cNvSpPr/>
+          <p:nvPr/>
+        </p:nvSpPr>
+        <p:spPr>
+          <a:xfrm>
+            <a:off x="-274320" y="1569720"/>
+            <a:ext cx="9433560" cy="1287780"/>
+          </a:xfrm>
+          <a:prstGeom prst="rect">
+            <a:avLst/>
+          </a:prstGeom>
+          <a:noFill/>
+          <a:ln>
+            <a:solidFill>
+              <a:schemeClr val="tx1"/>
+            </a:solidFill>
+          </a:ln>
+        </p:spPr>
+        <p:style>
+          <a:lnRef idx="2">
+            <a:schemeClr val="accent1">
+              <a:shade val="50000"/>
+            </a:schemeClr>
+          </a:lnRef>
+          <a:fillRef idx="1">
+            <a:schemeClr val="accent1"/>
+          </a:fillRef>
+          <a:effectRef idx="0">
+            <a:schemeClr val="accent1"/>
+          </a:effectRef>
+          <a:fontRef idx="minor">
+            <a:schemeClr val="lt1"/>
+          </a:fontRef>
+        </p:style>
+        <p:txBody>
+          <a:bodyPr vert="vert270" rtlCol="0" anchor="t"/>
+          <a:lstStyle/>
+          <a:p>
+            <a:pPr algn="ctr"/>
+            <a:r>
+              <a:rPr lang="en-US" dirty="0" smtClean="0">
+                <a:solidFill>
+                  <a:schemeClr val="tx1"/>
+                </a:solidFill>
+              </a:rPr>
+              <a:t>Possibility 2</a:t>
+            </a:r>
+            <a:endParaRPr lang="en-US" dirty="0">
+              <a:solidFill>
+                <a:schemeClr val="tx1"/>
+              </a:solidFill>
+            </a:endParaRPr>
+          </a:p>
+        </p:txBody>
+      </p:sp>
+      <p:sp>
+        <p:nvSpPr>
+          <p:cNvPr id="7" name="Rechteck 6"/>
+          <p:cNvSpPr/>
+          <p:nvPr/>
+        </p:nvSpPr>
+        <p:spPr>
+          <a:xfrm>
+            <a:off x="-274320" y="2933179"/>
+            <a:ext cx="9433560" cy="1931669"/>
+          </a:xfrm>
+          <a:prstGeom prst="rect">
+            <a:avLst/>
+          </a:prstGeom>
+          <a:noFill/>
+          <a:ln>
+            <a:solidFill>
+              <a:schemeClr val="tx1"/>
+            </a:solidFill>
+          </a:ln>
+        </p:spPr>
+        <p:style>
+          <a:lnRef idx="2">
+            <a:schemeClr val="accent1">
+              <a:shade val="50000"/>
+            </a:schemeClr>
+          </a:lnRef>
+          <a:fillRef idx="1">
+            <a:schemeClr val="accent1"/>
+          </a:fillRef>
+          <a:effectRef idx="0">
+            <a:schemeClr val="accent1"/>
+          </a:effectRef>
+          <a:fontRef idx="minor">
+            <a:schemeClr val="lt1"/>
+          </a:fontRef>
+        </p:style>
+        <p:txBody>
+          <a:bodyPr vert="vert270" rtlCol="0" anchor="t"/>
+          <a:lstStyle/>
+          <a:p>
+            <a:pPr algn="ctr"/>
+            <a:r>
+              <a:rPr lang="en-US" dirty="0" smtClean="0">
+                <a:solidFill>
+                  <a:schemeClr val="tx1"/>
+                </a:solidFill>
+              </a:rPr>
+              <a:t>Possibility 1</a:t>
+            </a:r>
+            <a:endParaRPr lang="en-US" dirty="0">
+              <a:solidFill>
+                <a:schemeClr val="tx1"/>
+              </a:solidFill>
+            </a:endParaRPr>
+          </a:p>
+        </p:txBody>
+      </p:sp>
+      <p:pic>
+        <p:nvPicPr>
+          <p:cNvPr id="8" name="Grafik 7"/>
+          <p:cNvPicPr>
+            <a:picLocks noChangeAspect="1"/>
+          </p:cNvPicPr>
+          <p:nvPr/>
+        </p:nvPicPr>
+        <p:blipFill>
+          <a:blip r:embed="rId3">
+            <a:extLst>
+              <a:ext uri="{28A0092B-C50C-407E-A947-70E740481C1C}">
+                <a14:useLocalDpi xmlns:a14="http://schemas.microsoft.com/office/drawing/2010/main" val="0"/>
+              </a:ext>
+            </a:extLst>
+          </a:blip>
+          <a:stretch>
+            <a:fillRect/>
+          </a:stretch>
+        </p:blipFill>
+        <p:spPr>
+          <a:xfrm>
+            <a:off x="0" y="4963388"/>
+            <a:ext cx="9159240" cy="1280146"/>
+          </a:xfrm>
+          <a:prstGeom prst="rect">
+            <a:avLst/>
+          </a:prstGeom>
+          <a:ln w="12700">
+            <a:noFill/>
+          </a:ln>
+        </p:spPr>
+      </p:pic>
+      <p:sp>
+        <p:nvSpPr>
+          <p:cNvPr id="10" name="Ellipse 9"/>
+          <p:cNvSpPr/>
+          <p:nvPr/>
+        </p:nvSpPr>
+        <p:spPr>
+          <a:xfrm>
+            <a:off x="8382000" y="3124200"/>
+            <a:ext cx="180000" cy="180000"/>
+          </a:xfrm>
+          <a:prstGeom prst="ellipse">
+            <a:avLst/>
+          </a:prstGeom>
+          <a:noFill/>
+          <a:ln>
+            <a:solidFill>
+              <a:schemeClr val="tx1"/>
+            </a:solidFill>
+          </a:ln>
+        </p:spPr>
+        <p:style>
+          <a:lnRef idx="2">
+            <a:schemeClr val="accent1">
+              <a:shade val="50000"/>
+            </a:schemeClr>
+          </a:lnRef>
+          <a:fillRef idx="1">
+            <a:schemeClr val="accent1"/>
+          </a:fillRef>
+          <a:effectRef idx="0">
+            <a:schemeClr val="accent1"/>
+          </a:effectRef>
+          <a:fontRef idx="minor">
+            <a:schemeClr val="lt1"/>
+          </a:fontRef>
+        </p:style>
+        <p:txBody>
+          <a:bodyPr rtlCol="0" anchor="ctr"/>
+          <a:lstStyle/>
+          <a:p>
+            <a:pPr algn="ctr"/>
+            <a:r>
+              <a:rPr lang="en-US" dirty="0" smtClean="0">
+                <a:solidFill>
+                  <a:schemeClr val="tx1"/>
+                </a:solidFill>
+              </a:rPr>
+              <a:t>1</a:t>
+            </a:r>
+            <a:endParaRPr lang="en-US" dirty="0">
+              <a:solidFill>
+                <a:schemeClr val="tx1"/>
+              </a:solidFill>
+            </a:endParaRPr>
+          </a:p>
+        </p:txBody>
+      </p:sp>
+      <p:sp>
+        <p:nvSpPr>
+          <p:cNvPr id="13" name="Ellipse 12"/>
+          <p:cNvSpPr/>
+          <p:nvPr/>
+        </p:nvSpPr>
+        <p:spPr>
+          <a:xfrm>
+            <a:off x="8382000" y="1790700"/>
+            <a:ext cx="180000" cy="180000"/>
+          </a:xfrm>
+          <a:prstGeom prst="ellipse">
+            <a:avLst/>
+          </a:prstGeom>
+          <a:noFill/>
+          <a:ln>
+            <a:solidFill>
+              <a:schemeClr val="tx1"/>
+            </a:solidFill>
+          </a:ln>
+        </p:spPr>
+        <p:style>
+          <a:lnRef idx="2">
+            <a:schemeClr val="accent1">
+              <a:shade val="50000"/>
+            </a:schemeClr>
+          </a:lnRef>
+          <a:fillRef idx="1">
+            <a:schemeClr val="accent1"/>
+          </a:fillRef>
+          <a:effectRef idx="0">
+            <a:schemeClr val="accent1"/>
+          </a:effectRef>
+          <a:fontRef idx="minor">
+            <a:schemeClr val="lt1"/>
+          </a:fontRef>
+        </p:style>
+        <p:txBody>
+          <a:bodyPr rtlCol="0" anchor="ctr"/>
+          <a:lstStyle/>
+          <a:p>
+            <a:pPr algn="ctr"/>
+            <a:r>
+              <a:rPr lang="en-US" dirty="0" smtClean="0">
+                <a:solidFill>
+                  <a:schemeClr val="tx1"/>
+                </a:solidFill>
+              </a:rPr>
+              <a:t>1</a:t>
+            </a:r>
+            <a:endParaRPr lang="en-US" dirty="0">
+              <a:solidFill>
+                <a:schemeClr val="tx1"/>
+              </a:solidFill>
+            </a:endParaRPr>
+          </a:p>
+        </p:txBody>
+      </p:sp>
+      <p:sp>
+        <p:nvSpPr>
+          <p:cNvPr id="14" name="Ellipse 13"/>
+          <p:cNvSpPr/>
+          <p:nvPr/>
+        </p:nvSpPr>
+        <p:spPr>
+          <a:xfrm>
+            <a:off x="-227160" y="5513461"/>
+            <a:ext cx="180000" cy="180000"/>
+          </a:xfrm>
+          <a:prstGeom prst="ellipse">
+            <a:avLst/>
+          </a:prstGeom>
+          <a:noFill/>
+          <a:ln>
+            <a:solidFill>
+              <a:schemeClr val="tx1"/>
+            </a:solidFill>
+          </a:ln>
+        </p:spPr>
+        <p:style>
+          <a:lnRef idx="2">
+            <a:schemeClr val="accent1">
+              <a:shade val="50000"/>
+            </a:schemeClr>
+          </a:lnRef>
+          <a:fillRef idx="1">
+            <a:schemeClr val="accent1"/>
+          </a:fillRef>
+          <a:effectRef idx="0">
+            <a:schemeClr val="accent1"/>
+          </a:effectRef>
+          <a:fontRef idx="minor">
+            <a:schemeClr val="lt1"/>
+          </a:fontRef>
+        </p:style>
+        <p:txBody>
+          <a:bodyPr rtlCol="0" anchor="ctr"/>
+          <a:lstStyle/>
+          <a:p>
+            <a:pPr algn="ctr"/>
+            <a:r>
+              <a:rPr lang="en-US" dirty="0" smtClean="0">
+                <a:solidFill>
+                  <a:schemeClr val="tx1"/>
+                </a:solidFill>
+              </a:rPr>
+              <a:t>1</a:t>
+            </a:r>
+            <a:endParaRPr lang="en-US" dirty="0">
+              <a:solidFill>
+                <a:schemeClr val="tx1"/>
+              </a:solidFill>
+            </a:endParaRPr>
+          </a:p>
+        </p:txBody>
+      </p:sp>
+      <p:sp>
+        <p:nvSpPr>
+          <p:cNvPr id="15" name="Rechteck 14"/>
+          <p:cNvSpPr/>
+          <p:nvPr/>
+        </p:nvSpPr>
+        <p:spPr>
+          <a:xfrm>
+            <a:off x="-274320" y="4963389"/>
+            <a:ext cx="9433560" cy="1280146"/>
+          </a:xfrm>
+          <a:prstGeom prst="rect">
+            <a:avLst/>
+          </a:prstGeom>
+          <a:noFill/>
+          <a:ln>
+            <a:solidFill>
+              <a:schemeClr val="tx1"/>
+            </a:solidFill>
+          </a:ln>
+        </p:spPr>
+        <p:style>
+          <a:lnRef idx="2">
+            <a:schemeClr val="accent1">
+              <a:shade val="50000"/>
+            </a:schemeClr>
+          </a:lnRef>
+          <a:fillRef idx="1">
+            <a:schemeClr val="accent1"/>
+          </a:fillRef>
+          <a:effectRef idx="0">
+            <a:schemeClr val="accent1"/>
+          </a:effectRef>
+          <a:fontRef idx="minor">
+            <a:schemeClr val="lt1"/>
+          </a:fontRef>
+        </p:style>
+        <p:txBody>
+          <a:bodyPr vert="vert270" rtlCol="0" anchor="t"/>
+          <a:lstStyle/>
+          <a:p>
+            <a:pPr algn="ctr"/>
+            <a:endParaRPr lang="en-US" dirty="0">
+              <a:solidFill>
+                <a:schemeClr val="tx1"/>
+              </a:solidFill>
+            </a:endParaRPr>
+          </a:p>
+        </p:txBody>
+      </p:sp>
+    </p:spTree>
+    <p:extLst>
+      <p:ext uri="{BB962C8B-B14F-4D97-AF65-F5344CB8AC3E}">
+        <p14:creationId xmlns:p14="http://schemas.microsoft.com/office/powerpoint/2010/main" val="313896261"/>
+      </p:ext>
+    </p:extLst>
+  </p:cSld>
+  <p:clrMapOvr>
+    <a:masterClrMapping/>
+  </p:clrMapOvr>
+</p:sld>
+</file>
+
+<file path=ppt/slides/slide7.xml><?xml version="1.0" encoding="utf-8"?>
+<p:sld xmlns:a="http://schemas.openxmlformats.org/drawingml/2006/main" xmlns:r="http://schemas.openxmlformats.org/officeDocument/2006/relationships" xmlns:p="http://schemas.openxmlformats.org/presentationml/2006/main">
+  <p:cSld>
+    <p:spTree>
+      <p:nvGrpSpPr>
+        <p:cNvPr id="1" name=""/>
+        <p:cNvGrpSpPr/>
+        <p:nvPr/>
+      </p:nvGrpSpPr>
+      <p:grpSpPr>
+        <a:xfrm>
+          <a:off x="0" y="0"/>
+          <a:ext cx="0" cy="0"/>
+          <a:chOff x="0" y="0"/>
+          <a:chExt cx="0" cy="0"/>
+        </a:xfrm>
+      </p:grpSpPr>
+      <p:sp>
+        <p:nvSpPr>
           <p:cNvPr id="193" name="Textfeld 192"/>
           <p:cNvSpPr txBox="1"/>
           <p:nvPr/>
@@ -24756,7 +26550,7 @@
 </p:sld>
 </file>
 
-<file path=ppt/slides/slide6.xml><?xml version="1.0" encoding="utf-8"?>
+<file path=ppt/slides/slide8.xml><?xml version="1.0" encoding="utf-8"?>
 <p:sld xmlns:a="http://schemas.openxmlformats.org/drawingml/2006/main" xmlns:r="http://schemas.openxmlformats.org/officeDocument/2006/relationships" xmlns:p="http://schemas.openxmlformats.org/presentationml/2006/main">
   <p:cSld>
     <p:spTree>
@@ -24929,7 +26723,7 @@
 </p:sld>
 </file>
 
-<file path=ppt/slides/slide7.xml><?xml version="1.0" encoding="utf-8"?>
+<file path=ppt/slides/slide9.xml><?xml version="1.0" encoding="utf-8"?>
 <p:sld xmlns:a="http://schemas.openxmlformats.org/drawingml/2006/main" xmlns:r="http://schemas.openxmlformats.org/officeDocument/2006/relationships" xmlns:p="http://schemas.openxmlformats.org/presentationml/2006/main">
   <p:cSld>
     <p:spTree>
@@ -25091,1187 +26885,6 @@
   <p:clrMapOvr>
     <a:masterClrMapping/>
   </p:clrMapOvr>
-</p:sld>
-</file>
-
-<file path=ppt/slides/slide8.xml><?xml version="1.0" encoding="utf-8"?>
-<p:sld xmlns:a="http://schemas.openxmlformats.org/drawingml/2006/main" xmlns:r="http://schemas.openxmlformats.org/officeDocument/2006/relationships" xmlns:p="http://schemas.openxmlformats.org/presentationml/2006/main">
-  <p:cSld>
-    <p:spTree>
-      <p:nvGrpSpPr>
-        <p:cNvPr id="1" name=""/>
-        <p:cNvGrpSpPr/>
-        <p:nvPr/>
-      </p:nvGrpSpPr>
-      <p:grpSpPr>
-        <a:xfrm>
-          <a:off x="0" y="0"/>
-          <a:ext cx="0" cy="0"/>
-          <a:chOff x="0" y="0"/>
-          <a:chExt cx="0" cy="0"/>
-        </a:xfrm>
-      </p:grpSpPr>
-      <p:pic>
-        <p:nvPicPr>
-          <p:cNvPr id="2" name="Grafik 1"/>
-          <p:cNvPicPr>
-            <a:picLocks noChangeAspect="1"/>
-          </p:cNvPicPr>
-          <p:nvPr/>
-        </p:nvPicPr>
-        <p:blipFill>
-          <a:blip r:embed="rId2"/>
-          <a:stretch>
-            <a:fillRect/>
-          </a:stretch>
-        </p:blipFill>
-        <p:spPr>
-          <a:xfrm>
-            <a:off x="0" y="1112058"/>
-            <a:ext cx="4287998" cy="1821642"/>
-          </a:xfrm>
-          <a:prstGeom prst="rect">
-            <a:avLst/>
-          </a:prstGeom>
-          <a:ln>
-            <a:solidFill>
-              <a:schemeClr val="tx1">
-                <a:lumMod val="75000"/>
-                <a:lumOff val="25000"/>
-              </a:schemeClr>
-            </a:solidFill>
-          </a:ln>
-        </p:spPr>
-      </p:pic>
-      <p:pic>
-        <p:nvPicPr>
-          <p:cNvPr id="3" name="Grafik 2"/>
-          <p:cNvPicPr>
-            <a:picLocks noChangeAspect="1"/>
-          </p:cNvPicPr>
-          <p:nvPr/>
-        </p:nvPicPr>
-        <p:blipFill>
-          <a:blip r:embed="rId3"/>
-          <a:stretch>
-            <a:fillRect/>
-          </a:stretch>
-        </p:blipFill>
-        <p:spPr>
-          <a:xfrm>
-            <a:off x="4455791" y="66413"/>
-            <a:ext cx="4688209" cy="4654550"/>
-          </a:xfrm>
-          <a:prstGeom prst="rect">
-            <a:avLst/>
-          </a:prstGeom>
-          <a:ln>
-            <a:solidFill>
-              <a:schemeClr val="tx1">
-                <a:lumMod val="75000"/>
-                <a:lumOff val="25000"/>
-              </a:schemeClr>
-            </a:solidFill>
-          </a:ln>
-        </p:spPr>
-      </p:pic>
-      <p:sp>
-        <p:nvSpPr>
-          <p:cNvPr id="4" name="Textfeld 3"/>
-          <p:cNvSpPr txBox="1"/>
-          <p:nvPr/>
-        </p:nvSpPr>
-        <p:spPr>
-          <a:xfrm>
-            <a:off x="63165" y="59961"/>
-            <a:ext cx="1965332" cy="276999"/>
-          </a:xfrm>
-          <a:prstGeom prst="rect">
-            <a:avLst/>
-          </a:prstGeom>
-          <a:noFill/>
-        </p:spPr>
-        <p:txBody>
-          <a:bodyPr wrap="square" rtlCol="0">
-            <a:spAutoFit/>
-          </a:bodyPr>
-          <a:lstStyle/>
-          <a:p>
-            <a:r>
-              <a:rPr lang="en-US" sz="1200" b="1" dirty="0" smtClean="0">
-                <a:latin typeface="Arial" panose="020B0604020202020204" pitchFamily="34" charset="0"/>
-                <a:cs typeface="Arial" panose="020B0604020202020204" pitchFamily="34" charset="0"/>
-              </a:rPr>
-              <a:t>Solution Space</a:t>
-            </a:r>
-            <a:endParaRPr lang="en-US" sz="1200" b="1" dirty="0">
-              <a:latin typeface="Arial" panose="020B0604020202020204" pitchFamily="34" charset="0"/>
-              <a:cs typeface="Arial" panose="020B0604020202020204" pitchFamily="34" charset="0"/>
-            </a:endParaRPr>
-          </a:p>
-        </p:txBody>
-      </p:sp>
-      <p:cxnSp>
-        <p:nvCxnSpPr>
-          <p:cNvPr id="6" name="Gerade Verbindung mit Pfeil 5"/>
-          <p:cNvCxnSpPr/>
-          <p:nvPr/>
-        </p:nvCxnSpPr>
-        <p:spPr>
-          <a:xfrm>
-            <a:off x="3886200" y="2525195"/>
-            <a:ext cx="569591" cy="0"/>
-          </a:xfrm>
-          <a:prstGeom prst="straightConnector1">
-            <a:avLst/>
-          </a:prstGeom>
-          <a:ln>
-            <a:solidFill>
-              <a:srgbClr val="FF0000"/>
-            </a:solidFill>
-            <a:tailEnd type="triangle"/>
-          </a:ln>
-        </p:spPr>
-        <p:style>
-          <a:lnRef idx="1">
-            <a:schemeClr val="accent1"/>
-          </a:lnRef>
-          <a:fillRef idx="0">
-            <a:schemeClr val="accent1"/>
-          </a:fillRef>
-          <a:effectRef idx="0">
-            <a:schemeClr val="accent1"/>
-          </a:effectRef>
-          <a:fontRef idx="minor">
-            <a:schemeClr val="tx1"/>
-          </a:fontRef>
-        </p:style>
-      </p:cxnSp>
-    </p:spTree>
-    <p:extLst>
-      <p:ext uri="{BB962C8B-B14F-4D97-AF65-F5344CB8AC3E}">
-        <p14:creationId xmlns:p14="http://schemas.microsoft.com/office/powerpoint/2010/main" val="3704921997"/>
-      </p:ext>
-    </p:extLst>
-  </p:cSld>
-  <p:clrMapOvr>
-    <a:masterClrMapping/>
-  </p:clrMapOvr>
-</p:sld>
-</file>
-
-<file path=ppt/slides/slide9.xml><?xml version="1.0" encoding="utf-8"?>
-<p:sld xmlns:a="http://schemas.openxmlformats.org/drawingml/2006/main" xmlns:r="http://schemas.openxmlformats.org/officeDocument/2006/relationships" xmlns:p="http://schemas.openxmlformats.org/presentationml/2006/main">
-  <p:cSld>
-    <p:spTree>
-      <p:nvGrpSpPr>
-        <p:cNvPr id="1" name=""/>
-        <p:cNvGrpSpPr/>
-        <p:nvPr/>
-      </p:nvGrpSpPr>
-      <p:grpSpPr>
-        <a:xfrm>
-          <a:off x="0" y="0"/>
-          <a:ext cx="0" cy="0"/>
-          <a:chOff x="0" y="0"/>
-          <a:chExt cx="0" cy="0"/>
-        </a:xfrm>
-      </p:grpSpPr>
-      <p:sp>
-        <p:nvSpPr>
-          <p:cNvPr id="3" name="Textfeld 2"/>
-          <p:cNvSpPr txBox="1"/>
-          <p:nvPr/>
-        </p:nvSpPr>
-        <p:spPr>
-          <a:xfrm>
-            <a:off x="63165" y="59961"/>
-            <a:ext cx="1696453" cy="276999"/>
-          </a:xfrm>
-          <a:prstGeom prst="rect">
-            <a:avLst/>
-          </a:prstGeom>
-          <a:noFill/>
-        </p:spPr>
-        <p:txBody>
-          <a:bodyPr wrap="square" rtlCol="0">
-            <a:spAutoFit/>
-          </a:bodyPr>
-          <a:lstStyle/>
-          <a:p>
-            <a:r>
-              <a:rPr lang="en-US" sz="1200" b="1" dirty="0">
-                <a:latin typeface="Arial" panose="020B0604020202020204" pitchFamily="34" charset="0"/>
-                <a:cs typeface="Arial" panose="020B0604020202020204" pitchFamily="34" charset="0"/>
-              </a:rPr>
-              <a:t>Overview</a:t>
-            </a:r>
-          </a:p>
-        </p:txBody>
-      </p:sp>
-      <p:sp>
-        <p:nvSpPr>
-          <p:cNvPr id="10" name="Rechteck 9"/>
-          <p:cNvSpPr/>
-          <p:nvPr/>
-        </p:nvSpPr>
-        <p:spPr>
-          <a:xfrm>
-            <a:off x="7686675" y="135552"/>
-            <a:ext cx="1309688" cy="223838"/>
-          </a:xfrm>
-          <a:prstGeom prst="rect">
-            <a:avLst/>
-          </a:prstGeom>
-          <a:noFill/>
-          <a:ln>
-            <a:solidFill>
-              <a:srgbClr val="FF0000"/>
-            </a:solidFill>
-          </a:ln>
-        </p:spPr>
-        <p:style>
-          <a:lnRef idx="2">
-            <a:schemeClr val="accent1">
-              <a:shade val="50000"/>
-            </a:schemeClr>
-          </a:lnRef>
-          <a:fillRef idx="1">
-            <a:schemeClr val="accent1"/>
-          </a:fillRef>
-          <a:effectRef idx="0">
-            <a:schemeClr val="accent1"/>
-          </a:effectRef>
-          <a:fontRef idx="minor">
-            <a:schemeClr val="lt1"/>
-          </a:fontRef>
-        </p:style>
-        <p:txBody>
-          <a:bodyPr rot="0" spcFirstLastPara="0" vertOverflow="overflow" horzOverflow="overflow" vert="horz" wrap="square" lIns="68580" tIns="34290" rIns="68580" bIns="34290" numCol="1" spcCol="0" rtlCol="0" fromWordArt="0" anchor="ctr" anchorCtr="0" forceAA="0" compatLnSpc="1">
-            <a:prstTxWarp prst="textNoShape">
-              <a:avLst/>
-            </a:prstTxWarp>
-            <a:noAutofit/>
-          </a:bodyPr>
-          <a:lstStyle/>
-          <a:p>
-            <a:pPr algn="ctr"/>
-            <a:r>
-              <a:rPr lang="en-US" sz="800" dirty="0">
-                <a:solidFill>
-                  <a:schemeClr val="tx1"/>
-                </a:solidFill>
-                <a:latin typeface="Arial" panose="020B0604020202020204" pitchFamily="34" charset="0"/>
-                <a:cs typeface="Arial" panose="020B0604020202020204" pitchFamily="34" charset="0"/>
-              </a:rPr>
-              <a:t>Starting Points</a:t>
-            </a:r>
-          </a:p>
-        </p:txBody>
-      </p:sp>
-      <p:sp>
-        <p:nvSpPr>
-          <p:cNvPr id="11" name="Rechteck 10"/>
-          <p:cNvSpPr/>
-          <p:nvPr/>
-        </p:nvSpPr>
-        <p:spPr>
-          <a:xfrm>
-            <a:off x="7686675" y="438620"/>
-            <a:ext cx="1309688" cy="223838"/>
-          </a:xfrm>
-          <a:prstGeom prst="rect">
-            <a:avLst/>
-          </a:prstGeom>
-          <a:solidFill>
-            <a:schemeClr val="accent6">
-              <a:lumMod val="40000"/>
-              <a:lumOff val="60000"/>
-            </a:schemeClr>
-          </a:solidFill>
-          <a:ln>
-            <a:solidFill>
-              <a:schemeClr val="accent6"/>
-            </a:solidFill>
-          </a:ln>
-        </p:spPr>
-        <p:style>
-          <a:lnRef idx="2">
-            <a:schemeClr val="accent1">
-              <a:shade val="50000"/>
-            </a:schemeClr>
-          </a:lnRef>
-          <a:fillRef idx="1">
-            <a:schemeClr val="accent1"/>
-          </a:fillRef>
-          <a:effectRef idx="0">
-            <a:schemeClr val="accent1"/>
-          </a:effectRef>
-          <a:fontRef idx="minor">
-            <a:schemeClr val="lt1"/>
-          </a:fontRef>
-        </p:style>
-        <p:txBody>
-          <a:bodyPr rot="0" spcFirstLastPara="0" vertOverflow="overflow" horzOverflow="overflow" vert="horz" wrap="square" lIns="68580" tIns="34290" rIns="68580" bIns="34290" numCol="1" spcCol="0" rtlCol="0" fromWordArt="0" anchor="ctr" anchorCtr="0" forceAA="0" compatLnSpc="1">
-            <a:prstTxWarp prst="textNoShape">
-              <a:avLst/>
-            </a:prstTxWarp>
-            <a:noAutofit/>
-          </a:bodyPr>
-          <a:lstStyle/>
-          <a:p>
-            <a:pPr algn="ctr"/>
-            <a:r>
-              <a:rPr lang="en-US" sz="800" dirty="0">
-                <a:solidFill>
-                  <a:schemeClr val="tx1"/>
-                </a:solidFill>
-                <a:latin typeface="Arial" panose="020B0604020202020204" pitchFamily="34" charset="0"/>
-                <a:cs typeface="Arial" panose="020B0604020202020204" pitchFamily="34" charset="0"/>
-              </a:rPr>
-              <a:t>TBD by Customer</a:t>
-            </a:r>
-          </a:p>
-        </p:txBody>
-      </p:sp>
-      <p:sp>
-        <p:nvSpPr>
-          <p:cNvPr id="15" name="Rechteck 14"/>
-          <p:cNvSpPr/>
-          <p:nvPr/>
-        </p:nvSpPr>
-        <p:spPr>
-          <a:xfrm>
-            <a:off x="7686675" y="741688"/>
-            <a:ext cx="1309688" cy="223838"/>
-          </a:xfrm>
-          <a:prstGeom prst="rect">
-            <a:avLst/>
-          </a:prstGeom>
-          <a:solidFill>
-            <a:schemeClr val="accent1">
-              <a:lumMod val="40000"/>
-              <a:lumOff val="60000"/>
-            </a:schemeClr>
-          </a:solidFill>
-          <a:ln>
-            <a:solidFill>
-              <a:schemeClr val="accent1"/>
-            </a:solidFill>
-          </a:ln>
-        </p:spPr>
-        <p:style>
-          <a:lnRef idx="2">
-            <a:schemeClr val="accent1">
-              <a:shade val="50000"/>
-            </a:schemeClr>
-          </a:lnRef>
-          <a:fillRef idx="1">
-            <a:schemeClr val="accent1"/>
-          </a:fillRef>
-          <a:effectRef idx="0">
-            <a:schemeClr val="accent1"/>
-          </a:effectRef>
-          <a:fontRef idx="minor">
-            <a:schemeClr val="lt1"/>
-          </a:fontRef>
-        </p:style>
-        <p:txBody>
-          <a:bodyPr rot="0" spcFirstLastPara="0" vertOverflow="overflow" horzOverflow="overflow" vert="horz" wrap="square" lIns="68580" tIns="34290" rIns="68580" bIns="34290" numCol="1" spcCol="0" rtlCol="0" fromWordArt="0" anchor="ctr" anchorCtr="0" forceAA="0" compatLnSpc="1">
-            <a:prstTxWarp prst="textNoShape">
-              <a:avLst/>
-            </a:prstTxWarp>
-            <a:noAutofit/>
-          </a:bodyPr>
-          <a:lstStyle/>
-          <a:p>
-            <a:pPr algn="ctr"/>
-            <a:r>
-              <a:rPr lang="en-US" sz="800" dirty="0">
-                <a:solidFill>
-                  <a:schemeClr val="tx1"/>
-                </a:solidFill>
-                <a:latin typeface="Arial" panose="020B0604020202020204" pitchFamily="34" charset="0"/>
-                <a:cs typeface="Arial" panose="020B0604020202020204" pitchFamily="34" charset="0"/>
-              </a:rPr>
-              <a:t>TBD by Service Provider</a:t>
-            </a:r>
-          </a:p>
-        </p:txBody>
-      </p:sp>
-      <p:sp>
-        <p:nvSpPr>
-          <p:cNvPr id="19" name="Rechteck 18"/>
-          <p:cNvSpPr/>
-          <p:nvPr/>
-        </p:nvSpPr>
-        <p:spPr>
-          <a:xfrm>
-            <a:off x="2365666" y="91059"/>
-            <a:ext cx="570111" cy="505325"/>
-          </a:xfrm>
-          <a:prstGeom prst="rect">
-            <a:avLst/>
-          </a:prstGeom>
-          <a:solidFill>
-            <a:schemeClr val="accent1">
-              <a:lumMod val="40000"/>
-              <a:lumOff val="60000"/>
-            </a:schemeClr>
-          </a:solidFill>
-          <a:ln>
-            <a:solidFill>
-              <a:schemeClr val="accent1"/>
-            </a:solidFill>
-          </a:ln>
-        </p:spPr>
-        <p:style>
-          <a:lnRef idx="2">
-            <a:schemeClr val="accent1">
-              <a:shade val="50000"/>
-            </a:schemeClr>
-          </a:lnRef>
-          <a:fillRef idx="1">
-            <a:schemeClr val="accent1"/>
-          </a:fillRef>
-          <a:effectRef idx="0">
-            <a:schemeClr val="accent1"/>
-          </a:effectRef>
-          <a:fontRef idx="minor">
-            <a:schemeClr val="lt1"/>
-          </a:fontRef>
-        </p:style>
-        <p:txBody>
-          <a:bodyPr rot="0" spcFirstLastPara="0" vertOverflow="overflow" horzOverflow="overflow" vert="horz" wrap="square" lIns="68580" tIns="34290" rIns="68580" bIns="34290" numCol="1" spcCol="0" rtlCol="0" fromWordArt="0" anchor="ctr" anchorCtr="0" forceAA="0" compatLnSpc="1">
-            <a:prstTxWarp prst="textNoShape">
-              <a:avLst/>
-            </a:prstTxWarp>
-            <a:noAutofit/>
-          </a:bodyPr>
-          <a:lstStyle/>
-          <a:p>
-            <a:pPr algn="ctr"/>
-            <a:endParaRPr lang="en-US" sz="1053">
-              <a:latin typeface="Arial" panose="020B0604020202020204" pitchFamily="34" charset="0"/>
-              <a:cs typeface="Arial" panose="020B0604020202020204" pitchFamily="34" charset="0"/>
-            </a:endParaRPr>
-          </a:p>
-        </p:txBody>
-      </p:sp>
-      <p:sp>
-        <p:nvSpPr>
-          <p:cNvPr id="6" name="Freihandform 5"/>
-          <p:cNvSpPr/>
-          <p:nvPr/>
-        </p:nvSpPr>
-        <p:spPr>
-          <a:xfrm>
-            <a:off x="4243899" y="1265783"/>
-            <a:ext cx="4414132" cy="4115812"/>
-          </a:xfrm>
-          <a:custGeom>
-            <a:avLst/>
-            <a:gdLst>
-              <a:gd name="connsiteX0" fmla="*/ 1770647 w 5708984"/>
-              <a:gd name="connsiteY0" fmla="*/ 0 h 5183938"/>
-              <a:gd name="connsiteX1" fmla="*/ 5708984 w 5708984"/>
-              <a:gd name="connsiteY1" fmla="*/ 0 h 5183938"/>
-              <a:gd name="connsiteX2" fmla="*/ 5708984 w 5708984"/>
-              <a:gd name="connsiteY2" fmla="*/ 2891923 h 5183938"/>
-              <a:gd name="connsiteX3" fmla="*/ 5708984 w 5708984"/>
-              <a:gd name="connsiteY3" fmla="*/ 2891924 h 5183938"/>
-              <a:gd name="connsiteX4" fmla="*/ 5708984 w 5708984"/>
-              <a:gd name="connsiteY4" fmla="*/ 5183938 h 5183938"/>
-              <a:gd name="connsiteX5" fmla="*/ 0 w 5708984"/>
-              <a:gd name="connsiteY5" fmla="*/ 5183938 h 5183938"/>
-              <a:gd name="connsiteX6" fmla="*/ 0 w 5708984"/>
-              <a:gd name="connsiteY6" fmla="*/ 2891923 h 5183938"/>
-              <a:gd name="connsiteX7" fmla="*/ 1770647 w 5708984"/>
-              <a:gd name="connsiteY7" fmla="*/ 2891923 h 5183938"/>
-            </a:gdLst>
-            <a:ahLst/>
-            <a:cxnLst>
-              <a:cxn ang="0">
-                <a:pos x="connsiteX0" y="connsiteY0"/>
-              </a:cxn>
-              <a:cxn ang="0">
-                <a:pos x="connsiteX1" y="connsiteY1"/>
-              </a:cxn>
-              <a:cxn ang="0">
-                <a:pos x="connsiteX2" y="connsiteY2"/>
-              </a:cxn>
-              <a:cxn ang="0">
-                <a:pos x="connsiteX3" y="connsiteY3"/>
-              </a:cxn>
-              <a:cxn ang="0">
-                <a:pos x="connsiteX4" y="connsiteY4"/>
-              </a:cxn>
-              <a:cxn ang="0">
-                <a:pos x="connsiteX5" y="connsiteY5"/>
-              </a:cxn>
-              <a:cxn ang="0">
-                <a:pos x="connsiteX6" y="connsiteY6"/>
-              </a:cxn>
-              <a:cxn ang="0">
-                <a:pos x="connsiteX7" y="connsiteY7"/>
-              </a:cxn>
-            </a:cxnLst>
-            <a:rect l="l" t="t" r="r" b="b"/>
-            <a:pathLst>
-              <a:path w="5708984" h="5183938">
-                <a:moveTo>
-                  <a:pt x="1770647" y="0"/>
-                </a:moveTo>
-                <a:lnTo>
-                  <a:pt x="5708984" y="0"/>
-                </a:lnTo>
-                <a:lnTo>
-                  <a:pt x="5708984" y="2891923"/>
-                </a:lnTo>
-                <a:lnTo>
-                  <a:pt x="5708984" y="2891924"/>
-                </a:lnTo>
-                <a:lnTo>
-                  <a:pt x="5708984" y="5183938"/>
-                </a:lnTo>
-                <a:lnTo>
-                  <a:pt x="0" y="5183938"/>
-                </a:lnTo>
-                <a:lnTo>
-                  <a:pt x="0" y="2891923"/>
-                </a:lnTo>
-                <a:lnTo>
-                  <a:pt x="1770647" y="2891923"/>
-                </a:lnTo>
-                <a:close/>
-              </a:path>
-            </a:pathLst>
-          </a:custGeom>
-          <a:solidFill>
-            <a:schemeClr val="accent2">
-              <a:lumMod val="20000"/>
-              <a:lumOff val="80000"/>
-            </a:schemeClr>
-          </a:solidFill>
-          <a:ln>
-            <a:solidFill>
-              <a:schemeClr val="accent2"/>
-            </a:solidFill>
-            <a:prstDash val="dash"/>
-          </a:ln>
-        </p:spPr>
-        <p:style>
-          <a:lnRef idx="2">
-            <a:schemeClr val="accent1">
-              <a:shade val="50000"/>
-            </a:schemeClr>
-          </a:lnRef>
-          <a:fillRef idx="1">
-            <a:schemeClr val="accent1"/>
-          </a:fillRef>
-          <a:effectRef idx="0">
-            <a:schemeClr val="accent1"/>
-          </a:effectRef>
-          <a:fontRef idx="minor">
-            <a:schemeClr val="lt1"/>
-          </a:fontRef>
-        </p:style>
-        <p:txBody>
-          <a:bodyPr rot="0" spcFirstLastPara="0" vertOverflow="overflow" horzOverflow="overflow" vert="horz" wrap="square" lIns="68580" tIns="34290" rIns="68580" bIns="34290" numCol="1" spcCol="0" rtlCol="0" fromWordArt="0" anchor="t" anchorCtr="0" forceAA="0" compatLnSpc="1">
-            <a:prstTxWarp prst="textNoShape">
-              <a:avLst/>
-            </a:prstTxWarp>
-            <a:noAutofit/>
-          </a:bodyPr>
-          <a:lstStyle/>
-          <a:p>
-            <a:pPr algn="r"/>
-            <a:r>
-              <a:rPr lang="en-US" sz="1053" dirty="0">
-                <a:solidFill>
-                  <a:schemeClr val="tx1"/>
-                </a:solidFill>
-                <a:latin typeface="Arial" panose="020B0604020202020204" pitchFamily="34" charset="0"/>
-                <a:cs typeface="Arial" panose="020B0604020202020204" pitchFamily="34" charset="0"/>
-              </a:rPr>
-              <a:t>Solution</a:t>
-            </a:r>
-          </a:p>
-        </p:txBody>
-      </p:sp>
-      <p:sp>
-        <p:nvSpPr>
-          <p:cNvPr id="18" name="Rechteck 17"/>
-          <p:cNvSpPr/>
-          <p:nvPr/>
-        </p:nvSpPr>
-        <p:spPr>
-          <a:xfrm>
-            <a:off x="1215727" y="4685634"/>
-            <a:ext cx="649149" cy="952344"/>
-          </a:xfrm>
-          <a:prstGeom prst="rect">
-            <a:avLst/>
-          </a:prstGeom>
-          <a:solidFill>
-            <a:schemeClr val="accent6">
-              <a:lumMod val="40000"/>
-              <a:lumOff val="60000"/>
-            </a:schemeClr>
-          </a:solidFill>
-          <a:ln>
-            <a:solidFill>
-              <a:schemeClr val="accent6"/>
-            </a:solidFill>
-          </a:ln>
-        </p:spPr>
-        <p:style>
-          <a:lnRef idx="2">
-            <a:schemeClr val="accent1">
-              <a:shade val="50000"/>
-            </a:schemeClr>
-          </a:lnRef>
-          <a:fillRef idx="1">
-            <a:schemeClr val="accent1"/>
-          </a:fillRef>
-          <a:effectRef idx="0">
-            <a:schemeClr val="accent1"/>
-          </a:effectRef>
-          <a:fontRef idx="minor">
-            <a:schemeClr val="lt1"/>
-          </a:fontRef>
-        </p:style>
-        <p:txBody>
-          <a:bodyPr rot="0" spcFirstLastPara="0" vertOverflow="overflow" horzOverflow="overflow" vert="horz" wrap="square" lIns="68580" tIns="34290" rIns="68580" bIns="34290" numCol="1" spcCol="0" rtlCol="0" fromWordArt="0" anchor="ctr" anchorCtr="0" forceAA="0" compatLnSpc="1">
-            <a:prstTxWarp prst="textNoShape">
-              <a:avLst/>
-            </a:prstTxWarp>
-            <a:noAutofit/>
-          </a:bodyPr>
-          <a:lstStyle/>
-          <a:p>
-            <a:pPr algn="ctr"/>
-            <a:endParaRPr lang="en-US" sz="1053">
-              <a:latin typeface="Arial" panose="020B0604020202020204" pitchFamily="34" charset="0"/>
-              <a:cs typeface="Arial" panose="020B0604020202020204" pitchFamily="34" charset="0"/>
-            </a:endParaRPr>
-          </a:p>
-        </p:txBody>
-      </p:sp>
-      <p:sp>
-        <p:nvSpPr>
-          <p:cNvPr id="17" name="Rechteck 16"/>
-          <p:cNvSpPr/>
-          <p:nvPr/>
-        </p:nvSpPr>
-        <p:spPr>
-          <a:xfrm>
-            <a:off x="4532089" y="1918004"/>
-            <a:ext cx="691907" cy="812409"/>
-          </a:xfrm>
-          <a:prstGeom prst="rect">
-            <a:avLst/>
-          </a:prstGeom>
-          <a:solidFill>
-            <a:schemeClr val="accent1">
-              <a:lumMod val="40000"/>
-              <a:lumOff val="60000"/>
-            </a:schemeClr>
-          </a:solidFill>
-          <a:ln>
-            <a:solidFill>
-              <a:schemeClr val="accent1"/>
-            </a:solidFill>
-          </a:ln>
-        </p:spPr>
-        <p:style>
-          <a:lnRef idx="2">
-            <a:schemeClr val="accent1">
-              <a:shade val="50000"/>
-            </a:schemeClr>
-          </a:lnRef>
-          <a:fillRef idx="1">
-            <a:schemeClr val="accent1"/>
-          </a:fillRef>
-          <a:effectRef idx="0">
-            <a:schemeClr val="accent1"/>
-          </a:effectRef>
-          <a:fontRef idx="minor">
-            <a:schemeClr val="lt1"/>
-          </a:fontRef>
-        </p:style>
-        <p:txBody>
-          <a:bodyPr rot="0" spcFirstLastPara="0" vertOverflow="overflow" horzOverflow="overflow" vert="horz" wrap="square" lIns="68580" tIns="34290" rIns="68580" bIns="34290" numCol="1" spcCol="0" rtlCol="0" fromWordArt="0" anchor="ctr" anchorCtr="0" forceAA="0" compatLnSpc="1">
-            <a:prstTxWarp prst="textNoShape">
-              <a:avLst/>
-            </a:prstTxWarp>
-            <a:noAutofit/>
-          </a:bodyPr>
-          <a:lstStyle/>
-          <a:p>
-            <a:pPr algn="ctr"/>
-            <a:endParaRPr lang="en-US" sz="1053">
-              <a:latin typeface="Arial" panose="020B0604020202020204" pitchFamily="34" charset="0"/>
-              <a:cs typeface="Arial" panose="020B0604020202020204" pitchFamily="34" charset="0"/>
-            </a:endParaRPr>
-          </a:p>
-        </p:txBody>
-      </p:sp>
-      <p:sp>
-        <p:nvSpPr>
-          <p:cNvPr id="12" name="Rechteck 11"/>
-          <p:cNvSpPr/>
-          <p:nvPr/>
-        </p:nvSpPr>
-        <p:spPr>
-          <a:xfrm>
-            <a:off x="3645960" y="2006113"/>
-            <a:ext cx="746445" cy="645262"/>
-          </a:xfrm>
-          <a:prstGeom prst="rect">
-            <a:avLst/>
-          </a:prstGeom>
-          <a:solidFill>
-            <a:schemeClr val="accent1">
-              <a:lumMod val="40000"/>
-              <a:lumOff val="60000"/>
-            </a:schemeClr>
-          </a:solidFill>
-          <a:ln>
-            <a:solidFill>
-              <a:schemeClr val="accent1"/>
-            </a:solidFill>
-          </a:ln>
-        </p:spPr>
-        <p:style>
-          <a:lnRef idx="2">
-            <a:schemeClr val="accent1">
-              <a:shade val="50000"/>
-            </a:schemeClr>
-          </a:lnRef>
-          <a:fillRef idx="1">
-            <a:schemeClr val="accent1"/>
-          </a:fillRef>
-          <a:effectRef idx="0">
-            <a:schemeClr val="accent1"/>
-          </a:effectRef>
-          <a:fontRef idx="minor">
-            <a:schemeClr val="lt1"/>
-          </a:fontRef>
-        </p:style>
-        <p:txBody>
-          <a:bodyPr rot="0" spcFirstLastPara="0" vertOverflow="overflow" horzOverflow="overflow" vert="horz" wrap="square" lIns="68580" tIns="34290" rIns="68580" bIns="34290" numCol="1" spcCol="0" rtlCol="0" fromWordArt="0" anchor="ctr" anchorCtr="0" forceAA="0" compatLnSpc="1">
-            <a:prstTxWarp prst="textNoShape">
-              <a:avLst/>
-            </a:prstTxWarp>
-            <a:noAutofit/>
-          </a:bodyPr>
-          <a:lstStyle/>
-          <a:p>
-            <a:pPr algn="ctr"/>
-            <a:endParaRPr lang="en-US" sz="1053">
-              <a:latin typeface="Arial" panose="020B0604020202020204" pitchFamily="34" charset="0"/>
-              <a:cs typeface="Arial" panose="020B0604020202020204" pitchFamily="34" charset="0"/>
-            </a:endParaRPr>
-          </a:p>
-        </p:txBody>
-      </p:sp>
-      <p:sp>
-        <p:nvSpPr>
-          <p:cNvPr id="13" name="Rechteck 12"/>
-          <p:cNvSpPr/>
-          <p:nvPr/>
-        </p:nvSpPr>
-        <p:spPr>
-          <a:xfrm>
-            <a:off x="990600" y="3667210"/>
-            <a:ext cx="1092602" cy="777423"/>
-          </a:xfrm>
-          <a:prstGeom prst="rect">
-            <a:avLst/>
-          </a:prstGeom>
-          <a:solidFill>
-            <a:schemeClr val="accent6">
-              <a:lumMod val="40000"/>
-              <a:lumOff val="60000"/>
-            </a:schemeClr>
-          </a:solidFill>
-          <a:ln>
-            <a:solidFill>
-              <a:schemeClr val="accent6"/>
-            </a:solidFill>
-          </a:ln>
-        </p:spPr>
-        <p:style>
-          <a:lnRef idx="2">
-            <a:schemeClr val="accent1">
-              <a:shade val="50000"/>
-            </a:schemeClr>
-          </a:lnRef>
-          <a:fillRef idx="1">
-            <a:schemeClr val="accent1"/>
-          </a:fillRef>
-          <a:effectRef idx="0">
-            <a:schemeClr val="accent1"/>
-          </a:effectRef>
-          <a:fontRef idx="minor">
-            <a:schemeClr val="lt1"/>
-          </a:fontRef>
-        </p:style>
-        <p:txBody>
-          <a:bodyPr rot="0" spcFirstLastPara="0" vertOverflow="overflow" horzOverflow="overflow" vert="horz" wrap="square" lIns="68580" tIns="34290" rIns="68580" bIns="34290" numCol="1" spcCol="0" rtlCol="0" fromWordArt="0" anchor="ctr" anchorCtr="0" forceAA="0" compatLnSpc="1">
-            <a:prstTxWarp prst="textNoShape">
-              <a:avLst/>
-            </a:prstTxWarp>
-            <a:noAutofit/>
-          </a:bodyPr>
-          <a:lstStyle/>
-          <a:p>
-            <a:pPr algn="ctr"/>
-            <a:endParaRPr lang="en-US" sz="1053">
-              <a:latin typeface="Arial" panose="020B0604020202020204" pitchFamily="34" charset="0"/>
-              <a:cs typeface="Arial" panose="020B0604020202020204" pitchFamily="34" charset="0"/>
-            </a:endParaRPr>
-          </a:p>
-        </p:txBody>
-      </p:sp>
-      <p:sp>
-        <p:nvSpPr>
-          <p:cNvPr id="14" name="Rechteck 13"/>
-          <p:cNvSpPr/>
-          <p:nvPr/>
-        </p:nvSpPr>
-        <p:spPr>
-          <a:xfrm>
-            <a:off x="1072550" y="635254"/>
-            <a:ext cx="932909" cy="658220"/>
-          </a:xfrm>
-          <a:prstGeom prst="rect">
-            <a:avLst/>
-          </a:prstGeom>
-          <a:solidFill>
-            <a:schemeClr val="accent6">
-              <a:lumMod val="40000"/>
-              <a:lumOff val="60000"/>
-            </a:schemeClr>
-          </a:solidFill>
-          <a:ln>
-            <a:solidFill>
-              <a:schemeClr val="accent6"/>
-            </a:solidFill>
-          </a:ln>
-        </p:spPr>
-        <p:style>
-          <a:lnRef idx="2">
-            <a:schemeClr val="accent1">
-              <a:shade val="50000"/>
-            </a:schemeClr>
-          </a:lnRef>
-          <a:fillRef idx="1">
-            <a:schemeClr val="accent1"/>
-          </a:fillRef>
-          <a:effectRef idx="0">
-            <a:schemeClr val="accent1"/>
-          </a:effectRef>
-          <a:fontRef idx="minor">
-            <a:schemeClr val="lt1"/>
-          </a:fontRef>
-        </p:style>
-        <p:txBody>
-          <a:bodyPr rot="0" spcFirstLastPara="0" vertOverflow="overflow" horzOverflow="overflow" vert="horz" wrap="square" lIns="68580" tIns="34290" rIns="68580" bIns="34290" numCol="1" spcCol="0" rtlCol="0" fromWordArt="0" anchor="ctr" anchorCtr="0" forceAA="0" compatLnSpc="1">
-            <a:prstTxWarp prst="textNoShape">
-              <a:avLst/>
-            </a:prstTxWarp>
-            <a:noAutofit/>
-          </a:bodyPr>
-          <a:lstStyle/>
-          <a:p>
-            <a:pPr algn="ctr"/>
-            <a:endParaRPr lang="en-US" sz="1053">
-              <a:latin typeface="Arial" panose="020B0604020202020204" pitchFamily="34" charset="0"/>
-              <a:cs typeface="Arial" panose="020B0604020202020204" pitchFamily="34" charset="0"/>
-            </a:endParaRPr>
-          </a:p>
-        </p:txBody>
-      </p:sp>
-      <p:sp>
-        <p:nvSpPr>
-          <p:cNvPr id="16" name="Rechteck 15"/>
-          <p:cNvSpPr/>
-          <p:nvPr/>
-        </p:nvSpPr>
-        <p:spPr>
-          <a:xfrm>
-            <a:off x="4511297" y="2835365"/>
-            <a:ext cx="746445" cy="693794"/>
-          </a:xfrm>
-          <a:prstGeom prst="rect">
-            <a:avLst/>
-          </a:prstGeom>
-          <a:solidFill>
-            <a:schemeClr val="accent1">
-              <a:lumMod val="40000"/>
-              <a:lumOff val="60000"/>
-            </a:schemeClr>
-          </a:solidFill>
-          <a:ln>
-            <a:solidFill>
-              <a:schemeClr val="accent1"/>
-            </a:solidFill>
-          </a:ln>
-        </p:spPr>
-        <p:style>
-          <a:lnRef idx="2">
-            <a:schemeClr val="accent1">
-              <a:shade val="50000"/>
-            </a:schemeClr>
-          </a:lnRef>
-          <a:fillRef idx="1">
-            <a:schemeClr val="accent1"/>
-          </a:fillRef>
-          <a:effectRef idx="0">
-            <a:schemeClr val="accent1"/>
-          </a:effectRef>
-          <a:fontRef idx="minor">
-            <a:schemeClr val="lt1"/>
-          </a:fontRef>
-        </p:style>
-        <p:txBody>
-          <a:bodyPr rot="0" spcFirstLastPara="0" vertOverflow="overflow" horzOverflow="overflow" vert="horz" wrap="square" lIns="68580" tIns="34290" rIns="68580" bIns="34290" numCol="1" spcCol="0" rtlCol="0" fromWordArt="0" anchor="ctr" anchorCtr="0" forceAA="0" compatLnSpc="1">
-            <a:prstTxWarp prst="textNoShape">
-              <a:avLst/>
-            </a:prstTxWarp>
-            <a:noAutofit/>
-          </a:bodyPr>
-          <a:lstStyle/>
-          <a:p>
-            <a:pPr algn="ctr"/>
-            <a:endParaRPr lang="en-US" sz="1053">
-              <a:latin typeface="Arial" panose="020B0604020202020204" pitchFamily="34" charset="0"/>
-              <a:cs typeface="Arial" panose="020B0604020202020204" pitchFamily="34" charset="0"/>
-            </a:endParaRPr>
-          </a:p>
-        </p:txBody>
-      </p:sp>
-      <p:pic>
-        <p:nvPicPr>
-          <p:cNvPr id="4" name="Grafik 3"/>
-          <p:cNvPicPr>
-            <a:picLocks noChangeAspect="1"/>
-          </p:cNvPicPr>
-          <p:nvPr/>
-        </p:nvPicPr>
-        <p:blipFill>
-          <a:blip r:embed="rId2" cstate="print">
-            <a:clrChange>
-              <a:clrFrom>
-                <a:srgbClr val="FFFFFF"/>
-              </a:clrFrom>
-              <a:clrTo>
-                <a:srgbClr val="FFFFFF">
-                  <a:alpha val="0"/>
-                </a:srgbClr>
-              </a:clrTo>
-            </a:clrChange>
-            <a:extLst>
-              <a:ext uri="{28A0092B-C50C-407E-A947-70E740481C1C}">
-                <a14:useLocalDpi xmlns:a14="http://schemas.microsoft.com/office/drawing/2010/main" val="0"/>
-              </a:ext>
-            </a:extLst>
-          </a:blip>
-          <a:stretch>
-            <a:fillRect/>
-          </a:stretch>
-        </p:blipFill>
-        <p:spPr>
-          <a:xfrm>
-            <a:off x="990600" y="59961"/>
-            <a:ext cx="7668635" cy="5597453"/>
-          </a:xfrm>
-          <a:prstGeom prst="rect">
-            <a:avLst/>
-          </a:prstGeom>
-        </p:spPr>
-      </p:pic>
-      <p:sp>
-        <p:nvSpPr>
-          <p:cNvPr id="7" name="Rechteck 6"/>
-          <p:cNvSpPr/>
-          <p:nvPr/>
-        </p:nvSpPr>
-        <p:spPr>
-          <a:xfrm>
-            <a:off x="4585858" y="1966594"/>
-            <a:ext cx="586956" cy="709400"/>
-          </a:xfrm>
-          <a:prstGeom prst="rect">
-            <a:avLst/>
-          </a:prstGeom>
-          <a:noFill/>
-          <a:ln>
-            <a:solidFill>
-              <a:srgbClr val="FF0000"/>
-            </a:solidFill>
-          </a:ln>
-        </p:spPr>
-        <p:style>
-          <a:lnRef idx="2">
-            <a:schemeClr val="accent1">
-              <a:shade val="50000"/>
-            </a:schemeClr>
-          </a:lnRef>
-          <a:fillRef idx="1">
-            <a:schemeClr val="accent1"/>
-          </a:fillRef>
-          <a:effectRef idx="0">
-            <a:schemeClr val="accent1"/>
-          </a:effectRef>
-          <a:fontRef idx="minor">
-            <a:schemeClr val="lt1"/>
-          </a:fontRef>
-        </p:style>
-        <p:txBody>
-          <a:bodyPr rot="0" spcFirstLastPara="0" vertOverflow="overflow" horzOverflow="overflow" vert="horz" wrap="square" lIns="68580" tIns="34290" rIns="68580" bIns="34290" numCol="1" spcCol="0" rtlCol="0" fromWordArt="0" anchor="ctr" anchorCtr="0" forceAA="0" compatLnSpc="1">
-            <a:prstTxWarp prst="textNoShape">
-              <a:avLst/>
-            </a:prstTxWarp>
-            <a:noAutofit/>
-          </a:bodyPr>
-          <a:lstStyle/>
-          <a:p>
-            <a:pPr algn="ctr"/>
-            <a:endParaRPr lang="en-US" sz="1053">
-              <a:latin typeface="Arial" panose="020B0604020202020204" pitchFamily="34" charset="0"/>
-              <a:cs typeface="Arial" panose="020B0604020202020204" pitchFamily="34" charset="0"/>
-            </a:endParaRPr>
-          </a:p>
-        </p:txBody>
-      </p:sp>
-      <p:sp>
-        <p:nvSpPr>
-          <p:cNvPr id="8" name="Rechteck 7"/>
-          <p:cNvSpPr/>
-          <p:nvPr/>
-        </p:nvSpPr>
-        <p:spPr>
-          <a:xfrm>
-            <a:off x="7769411" y="5019926"/>
-            <a:ext cx="664697" cy="301253"/>
-          </a:xfrm>
-          <a:prstGeom prst="rect">
-            <a:avLst/>
-          </a:prstGeom>
-          <a:noFill/>
-          <a:ln>
-            <a:solidFill>
-              <a:srgbClr val="FF0000"/>
-            </a:solidFill>
-          </a:ln>
-        </p:spPr>
-        <p:style>
-          <a:lnRef idx="2">
-            <a:schemeClr val="accent1">
-              <a:shade val="50000"/>
-            </a:schemeClr>
-          </a:lnRef>
-          <a:fillRef idx="1">
-            <a:schemeClr val="accent1"/>
-          </a:fillRef>
-          <a:effectRef idx="0">
-            <a:schemeClr val="accent1"/>
-          </a:effectRef>
-          <a:fontRef idx="minor">
-            <a:schemeClr val="lt1"/>
-          </a:fontRef>
-        </p:style>
-        <p:txBody>
-          <a:bodyPr rot="0" spcFirstLastPara="0" vertOverflow="overflow" horzOverflow="overflow" vert="horz" wrap="square" lIns="68580" tIns="34290" rIns="68580" bIns="34290" numCol="1" spcCol="0" rtlCol="0" fromWordArt="0" anchor="ctr" anchorCtr="0" forceAA="0" compatLnSpc="1">
-            <a:prstTxWarp prst="textNoShape">
-              <a:avLst/>
-            </a:prstTxWarp>
-            <a:noAutofit/>
-          </a:bodyPr>
-          <a:lstStyle/>
-          <a:p>
-            <a:pPr algn="ctr"/>
-            <a:endParaRPr lang="en-US" sz="1053">
-              <a:latin typeface="Arial" panose="020B0604020202020204" pitchFamily="34" charset="0"/>
-              <a:cs typeface="Arial" panose="020B0604020202020204" pitchFamily="34" charset="0"/>
-            </a:endParaRPr>
-          </a:p>
-        </p:txBody>
-      </p:sp>
-      <p:sp>
-        <p:nvSpPr>
-          <p:cNvPr id="9" name="Rechteck 8"/>
-          <p:cNvSpPr/>
-          <p:nvPr/>
-        </p:nvSpPr>
-        <p:spPr>
-          <a:xfrm>
-            <a:off x="1275977" y="4747828"/>
-            <a:ext cx="520874" cy="841563"/>
-          </a:xfrm>
-          <a:prstGeom prst="rect">
-            <a:avLst/>
-          </a:prstGeom>
-          <a:noFill/>
-          <a:ln>
-            <a:solidFill>
-              <a:srgbClr val="FF0000"/>
-            </a:solidFill>
-          </a:ln>
-        </p:spPr>
-        <p:style>
-          <a:lnRef idx="2">
-            <a:schemeClr val="accent1">
-              <a:shade val="50000"/>
-            </a:schemeClr>
-          </a:lnRef>
-          <a:fillRef idx="1">
-            <a:schemeClr val="accent1"/>
-          </a:fillRef>
-          <a:effectRef idx="0">
-            <a:schemeClr val="accent1"/>
-          </a:effectRef>
-          <a:fontRef idx="minor">
-            <a:schemeClr val="lt1"/>
-          </a:fontRef>
-        </p:style>
-        <p:txBody>
-          <a:bodyPr rot="0" spcFirstLastPara="0" vertOverflow="overflow" horzOverflow="overflow" vert="horz" wrap="square" lIns="68580" tIns="34290" rIns="68580" bIns="34290" numCol="1" spcCol="0" rtlCol="0" fromWordArt="0" anchor="ctr" anchorCtr="0" forceAA="0" compatLnSpc="1">
-            <a:prstTxWarp prst="textNoShape">
-              <a:avLst/>
-            </a:prstTxWarp>
-            <a:noAutofit/>
-          </a:bodyPr>
-          <a:lstStyle/>
-          <a:p>
-            <a:pPr algn="ctr"/>
-            <a:endParaRPr lang="en-US" sz="1053">
-              <a:latin typeface="Arial" panose="020B0604020202020204" pitchFamily="34" charset="0"/>
-              <a:cs typeface="Arial" panose="020B0604020202020204" pitchFamily="34" charset="0"/>
-            </a:endParaRPr>
-          </a:p>
-        </p:txBody>
-      </p:sp>
-    </p:spTree>
-    <p:extLst>
-      <p:ext uri="{BB962C8B-B14F-4D97-AF65-F5344CB8AC3E}">
-        <p14:creationId xmlns:p14="http://schemas.microsoft.com/office/powerpoint/2010/main" val="3494355585"/>
-      </p:ext>
-    </p:extLst>
-  </p:cSld>
-  <p:clrMapOvr>
-    <a:masterClrMapping/>
-  </p:clrMapOvr>
-  <p:timing>
-    <p:tnLst>
-      <p:par>
-        <p:cTn id="1" dur="indefinite" restart="never" nodeType="tmRoot"/>
-      </p:par>
-    </p:tnLst>
-  </p:timing>
 </p:sld>
 </file>
 

</xml_diff>

<commit_message>
Removed fixed and variable price/co2-eq. from skill consumables. They are now calculated during evaluation.
</commit_message>
<xml_diff>
--- a/docs/docu_v1.pptx
+++ b/docs/docu_v1.pptx
@@ -14,16 +14,17 @@
     <p:sldId id="272" r:id="rId8"/>
     <p:sldId id="274" r:id="rId9"/>
     <p:sldId id="275" r:id="rId10"/>
-    <p:sldId id="259" r:id="rId11"/>
-    <p:sldId id="262" r:id="rId12"/>
-    <p:sldId id="265" r:id="rId13"/>
-    <p:sldId id="261" r:id="rId14"/>
-    <p:sldId id="257" r:id="rId15"/>
-    <p:sldId id="267" r:id="rId16"/>
-    <p:sldId id="260" r:id="rId17"/>
-    <p:sldId id="264" r:id="rId18"/>
-    <p:sldId id="256" r:id="rId19"/>
-    <p:sldId id="258" r:id="rId20"/>
+    <p:sldId id="276" r:id="rId11"/>
+    <p:sldId id="259" r:id="rId12"/>
+    <p:sldId id="262" r:id="rId13"/>
+    <p:sldId id="265" r:id="rId14"/>
+    <p:sldId id="261" r:id="rId15"/>
+    <p:sldId id="257" r:id="rId16"/>
+    <p:sldId id="267" r:id="rId17"/>
+    <p:sldId id="260" r:id="rId18"/>
+    <p:sldId id="264" r:id="rId19"/>
+    <p:sldId id="256" r:id="rId20"/>
+    <p:sldId id="258" r:id="rId21"/>
   </p:sldIdLst>
   <p:sldSz cx="9144000" cy="5715000" type="screen16x10"/>
   <p:notesSz cx="6858000" cy="9144000"/>
@@ -136,6 +137,7 @@
             <p14:sldId id="272"/>
             <p14:sldId id="274"/>
             <p14:sldId id="275"/>
+            <p14:sldId id="276"/>
             <p14:sldId id="259"/>
             <p14:sldId id="262"/>
             <p14:sldId id="265"/>
@@ -303,7 +305,7 @@
           <a:p>
             <a:fld id="{40AC6573-0F6A-409A-81A3-E5A359E080D0}" type="datetimeFigureOut">
               <a:rPr lang="en-US" smtClean="0"/>
-              <a:t>3/18/2021</a:t>
+              <a:t>4/22/2021</a:t>
             </a:fld>
             <a:endParaRPr lang="en-US"/>
           </a:p>
@@ -473,7 +475,7 @@
           <a:p>
             <a:fld id="{40AC6573-0F6A-409A-81A3-E5A359E080D0}" type="datetimeFigureOut">
               <a:rPr lang="en-US" smtClean="0"/>
-              <a:t>3/18/2021</a:t>
+              <a:t>4/22/2021</a:t>
             </a:fld>
             <a:endParaRPr lang="en-US"/>
           </a:p>
@@ -653,7 +655,7 @@
           <a:p>
             <a:fld id="{40AC6573-0F6A-409A-81A3-E5A359E080D0}" type="datetimeFigureOut">
               <a:rPr lang="en-US" smtClean="0"/>
-              <a:t>3/18/2021</a:t>
+              <a:t>4/22/2021</a:t>
             </a:fld>
             <a:endParaRPr lang="en-US"/>
           </a:p>
@@ -823,7 +825,7 @@
           <a:p>
             <a:fld id="{40AC6573-0F6A-409A-81A3-E5A359E080D0}" type="datetimeFigureOut">
               <a:rPr lang="en-US" smtClean="0"/>
-              <a:t>3/18/2021</a:t>
+              <a:t>4/22/2021</a:t>
             </a:fld>
             <a:endParaRPr lang="en-US"/>
           </a:p>
@@ -1069,7 +1071,7 @@
           <a:p>
             <a:fld id="{40AC6573-0F6A-409A-81A3-E5A359E080D0}" type="datetimeFigureOut">
               <a:rPr lang="en-US" smtClean="0"/>
-              <a:t>3/18/2021</a:t>
+              <a:t>4/22/2021</a:t>
             </a:fld>
             <a:endParaRPr lang="en-US"/>
           </a:p>
@@ -1301,7 +1303,7 @@
           <a:p>
             <a:fld id="{40AC6573-0F6A-409A-81A3-E5A359E080D0}" type="datetimeFigureOut">
               <a:rPr lang="en-US" smtClean="0"/>
-              <a:t>3/18/2021</a:t>
+              <a:t>4/22/2021</a:t>
             </a:fld>
             <a:endParaRPr lang="en-US"/>
           </a:p>
@@ -1668,7 +1670,7 @@
           <a:p>
             <a:fld id="{40AC6573-0F6A-409A-81A3-E5A359E080D0}" type="datetimeFigureOut">
               <a:rPr lang="en-US" smtClean="0"/>
-              <a:t>3/18/2021</a:t>
+              <a:t>4/22/2021</a:t>
             </a:fld>
             <a:endParaRPr lang="en-US"/>
           </a:p>
@@ -1786,7 +1788,7 @@
           <a:p>
             <a:fld id="{40AC6573-0F6A-409A-81A3-E5A359E080D0}" type="datetimeFigureOut">
               <a:rPr lang="en-US" smtClean="0"/>
-              <a:t>3/18/2021</a:t>
+              <a:t>4/22/2021</a:t>
             </a:fld>
             <a:endParaRPr lang="en-US"/>
           </a:p>
@@ -1881,7 +1883,7 @@
           <a:p>
             <a:fld id="{40AC6573-0F6A-409A-81A3-E5A359E080D0}" type="datetimeFigureOut">
               <a:rPr lang="en-US" smtClean="0"/>
-              <a:t>3/18/2021</a:t>
+              <a:t>4/22/2021</a:t>
             </a:fld>
             <a:endParaRPr lang="en-US"/>
           </a:p>
@@ -2158,7 +2160,7 @@
           <a:p>
             <a:fld id="{40AC6573-0F6A-409A-81A3-E5A359E080D0}" type="datetimeFigureOut">
               <a:rPr lang="en-US" smtClean="0"/>
-              <a:t>3/18/2021</a:t>
+              <a:t>4/22/2021</a:t>
             </a:fld>
             <a:endParaRPr lang="en-US"/>
           </a:p>
@@ -2415,7 +2417,7 @@
           <a:p>
             <a:fld id="{40AC6573-0F6A-409A-81A3-E5A359E080D0}" type="datetimeFigureOut">
               <a:rPr lang="en-US" smtClean="0"/>
-              <a:t>3/18/2021</a:t>
+              <a:t>4/22/2021</a:t>
             </a:fld>
             <a:endParaRPr lang="en-US"/>
           </a:p>
@@ -2628,7 +2630,7 @@
           <a:p>
             <a:fld id="{40AC6573-0F6A-409A-81A3-E5A359E080D0}" type="datetimeFigureOut">
               <a:rPr lang="en-US" smtClean="0"/>
-              <a:t>3/18/2021</a:t>
+              <a:t>4/22/2021</a:t>
             </a:fld>
             <a:endParaRPr lang="en-US"/>
           </a:p>
@@ -3110,6 +3112,601 @@
 </file>
 
 <file path=ppt/slides/slide10.xml><?xml version="1.0" encoding="utf-8"?>
+<p:sld xmlns:a="http://schemas.openxmlformats.org/drawingml/2006/main" xmlns:r="http://schemas.openxmlformats.org/officeDocument/2006/relationships" xmlns:p="http://schemas.openxmlformats.org/presentationml/2006/main">
+  <p:cSld>
+    <p:spTree>
+      <p:nvGrpSpPr>
+        <p:cNvPr id="1" name=""/>
+        <p:cNvGrpSpPr/>
+        <p:nvPr/>
+      </p:nvGrpSpPr>
+      <p:grpSpPr>
+        <a:xfrm>
+          <a:off x="0" y="0"/>
+          <a:ext cx="0" cy="0"/>
+          <a:chOff x="0" y="0"/>
+          <a:chExt cx="0" cy="0"/>
+        </a:xfrm>
+      </p:grpSpPr>
+      <p:pic>
+        <p:nvPicPr>
+          <p:cNvPr id="4" name="Grafik 3"/>
+          <p:cNvPicPr>
+            <a:picLocks noChangeAspect="1"/>
+          </p:cNvPicPr>
+          <p:nvPr/>
+        </p:nvPicPr>
+        <p:blipFill rotWithShape="1">
+          <a:blip r:embed="rId2">
+            <a:extLst>
+              <a:ext uri="{28A0092B-C50C-407E-A947-70E740481C1C}">
+                <a14:useLocalDpi xmlns:a14="http://schemas.microsoft.com/office/drawing/2010/main" val="0"/>
+              </a:ext>
+            </a:extLst>
+          </a:blip>
+          <a:srcRect b="87315"/>
+          <a:stretch/>
+        </p:blipFill>
+        <p:spPr>
+          <a:xfrm>
+            <a:off x="774231" y="285750"/>
+            <a:ext cx="7647926" cy="652463"/>
+          </a:xfrm>
+          <a:prstGeom prst="rect">
+            <a:avLst/>
+          </a:prstGeom>
+        </p:spPr>
+      </p:pic>
+      <p:pic>
+        <p:nvPicPr>
+          <p:cNvPr id="5" name="Grafik 4"/>
+          <p:cNvPicPr>
+            <a:picLocks noChangeAspect="1"/>
+          </p:cNvPicPr>
+          <p:nvPr/>
+        </p:nvPicPr>
+        <p:blipFill rotWithShape="1">
+          <a:blip r:embed="rId2">
+            <a:extLst>
+              <a:ext uri="{28A0092B-C50C-407E-A947-70E740481C1C}">
+                <a14:useLocalDpi xmlns:a14="http://schemas.microsoft.com/office/drawing/2010/main" val="0"/>
+              </a:ext>
+            </a:extLst>
+          </a:blip>
+          <a:srcRect t="25370" b="69352"/>
+          <a:stretch/>
+        </p:blipFill>
+        <p:spPr>
+          <a:xfrm>
+            <a:off x="774231" y="1240631"/>
+            <a:ext cx="7647926" cy="271463"/>
+          </a:xfrm>
+          <a:prstGeom prst="rect">
+            <a:avLst/>
+          </a:prstGeom>
+        </p:spPr>
+      </p:pic>
+      <p:pic>
+        <p:nvPicPr>
+          <p:cNvPr id="6" name="Grafik 5"/>
+          <p:cNvPicPr>
+            <a:picLocks noChangeAspect="1"/>
+          </p:cNvPicPr>
+          <p:nvPr/>
+        </p:nvPicPr>
+        <p:blipFill rotWithShape="1">
+          <a:blip r:embed="rId2">
+            <a:extLst>
+              <a:ext uri="{28A0092B-C50C-407E-A947-70E740481C1C}">
+                <a14:useLocalDpi xmlns:a14="http://schemas.microsoft.com/office/drawing/2010/main" val="0"/>
+              </a:ext>
+            </a:extLst>
+          </a:blip>
+          <a:srcRect t="14352" b="80093"/>
+          <a:stretch/>
+        </p:blipFill>
+        <p:spPr>
+          <a:xfrm>
+            <a:off x="774231" y="938213"/>
+            <a:ext cx="7647926" cy="285750"/>
+          </a:xfrm>
+          <a:prstGeom prst="rect">
+            <a:avLst/>
+          </a:prstGeom>
+        </p:spPr>
+      </p:pic>
+      <p:pic>
+        <p:nvPicPr>
+          <p:cNvPr id="7" name="Grafik 6"/>
+          <p:cNvPicPr>
+            <a:picLocks noChangeAspect="1"/>
+          </p:cNvPicPr>
+          <p:nvPr/>
+        </p:nvPicPr>
+        <p:blipFill rotWithShape="1">
+          <a:blip r:embed="rId2">
+            <a:extLst>
+              <a:ext uri="{28A0092B-C50C-407E-A947-70E740481C1C}">
+                <a14:useLocalDpi xmlns:a14="http://schemas.microsoft.com/office/drawing/2010/main" val="0"/>
+              </a:ext>
+            </a:extLst>
+          </a:blip>
+          <a:srcRect t="36389" b="58518"/>
+          <a:stretch/>
+        </p:blipFill>
+        <p:spPr>
+          <a:xfrm>
+            <a:off x="774231" y="1581150"/>
+            <a:ext cx="7647926" cy="261938"/>
+          </a:xfrm>
+          <a:prstGeom prst="rect">
+            <a:avLst/>
+          </a:prstGeom>
+        </p:spPr>
+      </p:pic>
+      <p:pic>
+        <p:nvPicPr>
+          <p:cNvPr id="8" name="Grafik 7"/>
+          <p:cNvPicPr>
+            <a:picLocks noChangeAspect="1"/>
+          </p:cNvPicPr>
+          <p:nvPr/>
+        </p:nvPicPr>
+        <p:blipFill rotWithShape="1">
+          <a:blip r:embed="rId2">
+            <a:extLst>
+              <a:ext uri="{28A0092B-C50C-407E-A947-70E740481C1C}">
+                <a14:useLocalDpi xmlns:a14="http://schemas.microsoft.com/office/drawing/2010/main" val="0"/>
+              </a:ext>
+            </a:extLst>
+          </a:blip>
+          <a:srcRect t="47314" b="47408"/>
+          <a:stretch/>
+        </p:blipFill>
+        <p:spPr>
+          <a:xfrm>
+            <a:off x="774231" y="1902619"/>
+            <a:ext cx="7647926" cy="271463"/>
+          </a:xfrm>
+          <a:prstGeom prst="rect">
+            <a:avLst/>
+          </a:prstGeom>
+        </p:spPr>
+      </p:pic>
+      <p:pic>
+        <p:nvPicPr>
+          <p:cNvPr id="9" name="Grafik 8"/>
+          <p:cNvPicPr>
+            <a:picLocks noChangeAspect="1"/>
+          </p:cNvPicPr>
+          <p:nvPr/>
+        </p:nvPicPr>
+        <p:blipFill rotWithShape="1">
+          <a:blip r:embed="rId2">
+            <a:extLst>
+              <a:ext uri="{28A0092B-C50C-407E-A947-70E740481C1C}">
+                <a14:useLocalDpi xmlns:a14="http://schemas.microsoft.com/office/drawing/2010/main" val="0"/>
+              </a:ext>
+            </a:extLst>
+          </a:blip>
+          <a:srcRect t="58053" b="36576"/>
+          <a:stretch/>
+        </p:blipFill>
+        <p:spPr>
+          <a:xfrm>
+            <a:off x="774231" y="2219325"/>
+            <a:ext cx="7647926" cy="276225"/>
+          </a:xfrm>
+          <a:prstGeom prst="rect">
+            <a:avLst/>
+          </a:prstGeom>
+        </p:spPr>
+      </p:pic>
+      <p:pic>
+        <p:nvPicPr>
+          <p:cNvPr id="10" name="Grafik 9"/>
+          <p:cNvPicPr>
+            <a:picLocks noChangeAspect="1"/>
+          </p:cNvPicPr>
+          <p:nvPr/>
+        </p:nvPicPr>
+        <p:blipFill rotWithShape="1">
+          <a:blip r:embed="rId2">
+            <a:extLst>
+              <a:ext uri="{28A0092B-C50C-407E-A947-70E740481C1C}">
+                <a14:useLocalDpi xmlns:a14="http://schemas.microsoft.com/office/drawing/2010/main" val="0"/>
+              </a:ext>
+            </a:extLst>
+          </a:blip>
+          <a:srcRect t="90554" b="4168"/>
+          <a:stretch/>
+        </p:blipFill>
+        <p:spPr>
+          <a:xfrm>
+            <a:off x="774231" y="3176587"/>
+            <a:ext cx="7647926" cy="271463"/>
+          </a:xfrm>
+          <a:prstGeom prst="rect">
+            <a:avLst/>
+          </a:prstGeom>
+        </p:spPr>
+      </p:pic>
+      <p:pic>
+        <p:nvPicPr>
+          <p:cNvPr id="11" name="Grafik 10"/>
+          <p:cNvPicPr>
+            <a:picLocks noChangeAspect="1"/>
+          </p:cNvPicPr>
+          <p:nvPr/>
+        </p:nvPicPr>
+        <p:blipFill rotWithShape="1">
+          <a:blip r:embed="rId2">
+            <a:extLst>
+              <a:ext uri="{28A0092B-C50C-407E-A947-70E740481C1C}">
+                <a14:useLocalDpi xmlns:a14="http://schemas.microsoft.com/office/drawing/2010/main" val="0"/>
+              </a:ext>
+            </a:extLst>
+          </a:blip>
+          <a:srcRect t="79907" b="15000"/>
+          <a:stretch/>
+        </p:blipFill>
+        <p:spPr>
+          <a:xfrm>
+            <a:off x="774231" y="2867025"/>
+            <a:ext cx="7647926" cy="261938"/>
+          </a:xfrm>
+          <a:prstGeom prst="rect">
+            <a:avLst/>
+          </a:prstGeom>
+        </p:spPr>
+      </p:pic>
+      <p:pic>
+        <p:nvPicPr>
+          <p:cNvPr id="13" name="Grafik 12"/>
+          <p:cNvPicPr>
+            <a:picLocks noChangeAspect="1"/>
+          </p:cNvPicPr>
+          <p:nvPr/>
+        </p:nvPicPr>
+        <p:blipFill rotWithShape="1">
+          <a:blip r:embed="rId2">
+            <a:extLst>
+              <a:ext uri="{28A0092B-C50C-407E-A947-70E740481C1C}">
+                <a14:useLocalDpi xmlns:a14="http://schemas.microsoft.com/office/drawing/2010/main" val="0"/>
+              </a:ext>
+            </a:extLst>
+          </a:blip>
+          <a:srcRect t="69165" b="25742"/>
+          <a:stretch/>
+        </p:blipFill>
+        <p:spPr>
+          <a:xfrm>
+            <a:off x="774231" y="2557462"/>
+            <a:ext cx="7647926" cy="261938"/>
+          </a:xfrm>
+          <a:prstGeom prst="rect">
+            <a:avLst/>
+          </a:prstGeom>
+        </p:spPr>
+      </p:pic>
+      <p:sp>
+        <p:nvSpPr>
+          <p:cNvPr id="15" name="Rechteck 14"/>
+          <p:cNvSpPr/>
+          <p:nvPr/>
+        </p:nvSpPr>
+        <p:spPr>
+          <a:xfrm>
+            <a:off x="657225" y="966787"/>
+            <a:ext cx="7758113" cy="890588"/>
+          </a:xfrm>
+          <a:prstGeom prst="rect">
+            <a:avLst/>
+          </a:prstGeom>
+          <a:noFill/>
+          <a:ln>
+            <a:prstDash val="lgDash"/>
+          </a:ln>
+        </p:spPr>
+        <p:style>
+          <a:lnRef idx="2">
+            <a:schemeClr val="dk1"/>
+          </a:lnRef>
+          <a:fillRef idx="1">
+            <a:schemeClr val="lt1"/>
+          </a:fillRef>
+          <a:effectRef idx="0">
+            <a:schemeClr val="dk1"/>
+          </a:effectRef>
+          <a:fontRef idx="minor">
+            <a:schemeClr val="dk1"/>
+          </a:fontRef>
+        </p:style>
+        <p:txBody>
+          <a:bodyPr rot="0" spcFirstLastPara="0" vertOverflow="overflow" horzOverflow="overflow" vert="vert270" wrap="square" lIns="27000" tIns="27000" rIns="56700" bIns="27000" numCol="1" spcCol="0" rtlCol="0" fromWordArt="0" anchor="t" anchorCtr="0" forceAA="0" compatLnSpc="1">
+            <a:prstTxWarp prst="textNoShape">
+              <a:avLst/>
+            </a:prstTxWarp>
+            <a:noAutofit/>
+          </a:bodyPr>
+          <a:lstStyle/>
+          <a:p>
+            <a:pPr algn="ctr"/>
+            <a:r>
+              <a:rPr lang="en-US" sz="900" dirty="0">
+                <a:latin typeface="Arial" panose="020B0604020202020204" pitchFamily="34" charset="0"/>
+                <a:cs typeface="Arial" panose="020B0604020202020204" pitchFamily="34" charset="0"/>
+              </a:rPr>
+              <a:t>Possibility 2</a:t>
+            </a:r>
+          </a:p>
+        </p:txBody>
+      </p:sp>
+      <p:sp>
+        <p:nvSpPr>
+          <p:cNvPr id="16" name="Rechteck 15"/>
+          <p:cNvSpPr/>
+          <p:nvPr/>
+        </p:nvSpPr>
+        <p:spPr>
+          <a:xfrm>
+            <a:off x="657225" y="1902619"/>
+            <a:ext cx="7758113" cy="1564481"/>
+          </a:xfrm>
+          <a:prstGeom prst="rect">
+            <a:avLst/>
+          </a:prstGeom>
+          <a:noFill/>
+          <a:ln>
+            <a:prstDash val="lgDash"/>
+          </a:ln>
+        </p:spPr>
+        <p:style>
+          <a:lnRef idx="2">
+            <a:schemeClr val="dk1"/>
+          </a:lnRef>
+          <a:fillRef idx="1">
+            <a:schemeClr val="lt1"/>
+          </a:fillRef>
+          <a:effectRef idx="0">
+            <a:schemeClr val="dk1"/>
+          </a:effectRef>
+          <a:fontRef idx="minor">
+            <a:schemeClr val="dk1"/>
+          </a:fontRef>
+        </p:style>
+        <p:txBody>
+          <a:bodyPr rot="0" spcFirstLastPara="0" vertOverflow="overflow" horzOverflow="overflow" vert="vert270" wrap="square" lIns="27000" tIns="27000" rIns="56700" bIns="27000" numCol="1" spcCol="0" rtlCol="0" fromWordArt="0" anchor="t" anchorCtr="0" forceAA="0" compatLnSpc="1">
+            <a:prstTxWarp prst="textNoShape">
+              <a:avLst/>
+            </a:prstTxWarp>
+            <a:noAutofit/>
+          </a:bodyPr>
+          <a:lstStyle/>
+          <a:p>
+            <a:pPr algn="ctr"/>
+            <a:r>
+              <a:rPr lang="en-US" sz="900" dirty="0">
+                <a:latin typeface="Arial" panose="020B0604020202020204" pitchFamily="34" charset="0"/>
+                <a:cs typeface="Arial" panose="020B0604020202020204" pitchFamily="34" charset="0"/>
+              </a:rPr>
+              <a:t>Possibility 1</a:t>
+            </a:r>
+          </a:p>
+        </p:txBody>
+      </p:sp>
+      <p:sp>
+        <p:nvSpPr>
+          <p:cNvPr id="17" name="Ellipse 16"/>
+          <p:cNvSpPr/>
+          <p:nvPr/>
+        </p:nvSpPr>
+        <p:spPr>
+          <a:xfrm>
+            <a:off x="7772400" y="1000088"/>
+            <a:ext cx="162000" cy="162000"/>
+          </a:xfrm>
+          <a:prstGeom prst="ellipse">
+            <a:avLst/>
+          </a:prstGeom>
+          <a:noFill/>
+        </p:spPr>
+        <p:style>
+          <a:lnRef idx="2">
+            <a:schemeClr val="dk1"/>
+          </a:lnRef>
+          <a:fillRef idx="1">
+            <a:schemeClr val="lt1"/>
+          </a:fillRef>
+          <a:effectRef idx="0">
+            <a:schemeClr val="dk1"/>
+          </a:effectRef>
+          <a:fontRef idx="minor">
+            <a:schemeClr val="dk1"/>
+          </a:fontRef>
+        </p:style>
+        <p:txBody>
+          <a:bodyPr rot="0" spcFirstLastPara="0" vertOverflow="overflow" horzOverflow="overflow" vert="horz" wrap="square" lIns="0" tIns="0" rIns="0" bIns="0" numCol="1" spcCol="0" rtlCol="0" fromWordArt="0" anchor="ctr" anchorCtr="0" forceAA="0" compatLnSpc="1">
+            <a:prstTxWarp prst="textNoShape">
+              <a:avLst/>
+            </a:prstTxWarp>
+            <a:noAutofit/>
+          </a:bodyPr>
+          <a:lstStyle/>
+          <a:p>
+            <a:pPr algn="ctr"/>
+            <a:r>
+              <a:rPr lang="en-US" sz="750" dirty="0">
+                <a:latin typeface="Arial" panose="020B0604020202020204" pitchFamily="34" charset="0"/>
+                <a:cs typeface="Arial" panose="020B0604020202020204" pitchFamily="34" charset="0"/>
+              </a:rPr>
+              <a:t>a)</a:t>
+            </a:r>
+          </a:p>
+        </p:txBody>
+      </p:sp>
+      <p:sp>
+        <p:nvSpPr>
+          <p:cNvPr id="18" name="Ellipse 17"/>
+          <p:cNvSpPr/>
+          <p:nvPr/>
+        </p:nvSpPr>
+        <p:spPr>
+          <a:xfrm>
+            <a:off x="7772400" y="1952513"/>
+            <a:ext cx="162000" cy="162000"/>
+          </a:xfrm>
+          <a:prstGeom prst="ellipse">
+            <a:avLst/>
+          </a:prstGeom>
+          <a:noFill/>
+        </p:spPr>
+        <p:style>
+          <a:lnRef idx="2">
+            <a:schemeClr val="dk1"/>
+          </a:lnRef>
+          <a:fillRef idx="1">
+            <a:schemeClr val="lt1"/>
+          </a:fillRef>
+          <a:effectRef idx="0">
+            <a:schemeClr val="dk1"/>
+          </a:effectRef>
+          <a:fontRef idx="minor">
+            <a:schemeClr val="dk1"/>
+          </a:fontRef>
+        </p:style>
+        <p:txBody>
+          <a:bodyPr rot="0" spcFirstLastPara="0" vertOverflow="overflow" horzOverflow="overflow" vert="horz" wrap="square" lIns="0" tIns="0" rIns="0" bIns="0" numCol="1" spcCol="0" rtlCol="0" fromWordArt="0" anchor="ctr" anchorCtr="0" forceAA="0" compatLnSpc="1">
+            <a:prstTxWarp prst="textNoShape">
+              <a:avLst/>
+            </a:prstTxWarp>
+            <a:noAutofit/>
+          </a:bodyPr>
+          <a:lstStyle/>
+          <a:p>
+            <a:pPr algn="ctr"/>
+            <a:r>
+              <a:rPr lang="en-US" sz="750" dirty="0">
+                <a:latin typeface="Arial" panose="020B0604020202020204" pitchFamily="34" charset="0"/>
+                <a:cs typeface="Arial" panose="020B0604020202020204" pitchFamily="34" charset="0"/>
+              </a:rPr>
+              <a:t>a)</a:t>
+            </a:r>
+          </a:p>
+        </p:txBody>
+      </p:sp>
+      <p:pic>
+        <p:nvPicPr>
+          <p:cNvPr id="19" name="Grafik 18"/>
+          <p:cNvPicPr>
+            <a:picLocks noChangeAspect="1"/>
+          </p:cNvPicPr>
+          <p:nvPr/>
+        </p:nvPicPr>
+        <p:blipFill rotWithShape="1">
+          <a:blip r:embed="rId3"/>
+          <a:srcRect b="49279"/>
+          <a:stretch/>
+        </p:blipFill>
+        <p:spPr>
+          <a:xfrm>
+            <a:off x="778993" y="3526631"/>
+            <a:ext cx="7647926" cy="569118"/>
+          </a:xfrm>
+          <a:prstGeom prst="rect">
+            <a:avLst/>
+          </a:prstGeom>
+        </p:spPr>
+      </p:pic>
+      <p:pic>
+        <p:nvPicPr>
+          <p:cNvPr id="20" name="Grafik 19"/>
+          <p:cNvPicPr>
+            <a:picLocks noChangeAspect="1"/>
+          </p:cNvPicPr>
+          <p:nvPr/>
+        </p:nvPicPr>
+        <p:blipFill rotWithShape="1">
+          <a:blip r:embed="rId3"/>
+          <a:srcRect t="63243" b="15535"/>
+          <a:stretch/>
+        </p:blipFill>
+        <p:spPr>
+          <a:xfrm>
+            <a:off x="778993" y="4098131"/>
+            <a:ext cx="7647926" cy="238125"/>
+          </a:xfrm>
+          <a:prstGeom prst="rect">
+            <a:avLst/>
+          </a:prstGeom>
+        </p:spPr>
+      </p:pic>
+      <p:sp>
+        <p:nvSpPr>
+          <p:cNvPr id="21" name="Rechteck 20"/>
+          <p:cNvSpPr/>
+          <p:nvPr/>
+        </p:nvSpPr>
+        <p:spPr>
+          <a:xfrm>
+            <a:off x="657225" y="3529012"/>
+            <a:ext cx="7758113" cy="809626"/>
+          </a:xfrm>
+          <a:prstGeom prst="rect">
+            <a:avLst/>
+          </a:prstGeom>
+          <a:noFill/>
+          <a:ln>
+            <a:prstDash val="lgDash"/>
+          </a:ln>
+        </p:spPr>
+        <p:style>
+          <a:lnRef idx="2">
+            <a:schemeClr val="dk1"/>
+          </a:lnRef>
+          <a:fillRef idx="1">
+            <a:schemeClr val="lt1"/>
+          </a:fillRef>
+          <a:effectRef idx="0">
+            <a:schemeClr val="dk1"/>
+          </a:effectRef>
+          <a:fontRef idx="minor">
+            <a:schemeClr val="dk1"/>
+          </a:fontRef>
+        </p:style>
+        <p:txBody>
+          <a:bodyPr rot="0" spcFirstLastPara="0" vertOverflow="overflow" horzOverflow="overflow" vert="horz" wrap="square" lIns="27000" tIns="27000" rIns="56700" bIns="27000" numCol="1" spcCol="0" rtlCol="0" fromWordArt="0" anchor="ctr" anchorCtr="0" forceAA="0" compatLnSpc="1">
+            <a:prstTxWarp prst="textNoShape">
+              <a:avLst/>
+            </a:prstTxWarp>
+            <a:noAutofit/>
+          </a:bodyPr>
+          <a:lstStyle/>
+          <a:p>
+            <a:r>
+              <a:rPr lang="en-US" sz="900" dirty="0">
+                <a:latin typeface="Arial" panose="020B0604020202020204" pitchFamily="34" charset="0"/>
+                <a:cs typeface="Arial" panose="020B0604020202020204" pitchFamily="34" charset="0"/>
+              </a:rPr>
+              <a:t>a)</a:t>
+            </a:r>
+          </a:p>
+        </p:txBody>
+      </p:sp>
+    </p:spTree>
+    <p:extLst>
+      <p:ext uri="{BB962C8B-B14F-4D97-AF65-F5344CB8AC3E}">
+        <p14:creationId xmlns:p14="http://schemas.microsoft.com/office/powerpoint/2010/main" val="2096589062"/>
+      </p:ext>
+    </p:extLst>
+  </p:cSld>
+  <p:clrMapOvr>
+    <a:masterClrMapping/>
+  </p:clrMapOvr>
+</p:sld>
+</file>
+
+<file path=ppt/slides/slide11.xml><?xml version="1.0" encoding="utf-8"?>
 <p:sld xmlns:a="http://schemas.openxmlformats.org/drawingml/2006/main" xmlns:r="http://schemas.openxmlformats.org/officeDocument/2006/relationships" xmlns:p="http://schemas.openxmlformats.org/presentationml/2006/main">
   <p:cSld>
     <p:spTree>
@@ -8568,6 +9165,13 @@
               </a:rPr>
               <a:t>Part Manufacturing Process Steps</a:t>
             </a:r>
+            <a:r>
+              <a:rPr lang="en-US" sz="800" dirty="0">
+                <a:latin typeface="Arial" panose="020B0604020202020204" pitchFamily="34" charset="0"/>
+                <a:cs typeface="Arial" panose="020B0604020202020204" pitchFamily="34" charset="0"/>
+              </a:rPr>
+              <a:t/>
+            </a:r>
             <a:br>
               <a:rPr lang="en-US" sz="800" dirty="0">
                 <a:latin typeface="Arial" panose="020B0604020202020204" pitchFamily="34" charset="0"/>
@@ -8611,7 +9215,7 @@
 </p:sld>
 </file>
 
-<file path=ppt/slides/slide11.xml><?xml version="1.0" encoding="utf-8"?>
+<file path=ppt/slides/slide12.xml><?xml version="1.0" encoding="utf-8"?>
 <p:sld xmlns:a="http://schemas.openxmlformats.org/drawingml/2006/main" xmlns:r="http://schemas.openxmlformats.org/officeDocument/2006/relationships" xmlns:p="http://schemas.openxmlformats.org/presentationml/2006/main">
   <p:cSld>
     <p:spTree>
@@ -8773,7 +9377,7 @@
 </p:sld>
 </file>
 
-<file path=ppt/slides/slide12.xml><?xml version="1.0" encoding="utf-8"?>
+<file path=ppt/slides/slide13.xml><?xml version="1.0" encoding="utf-8"?>
 <p:sld xmlns:a="http://schemas.openxmlformats.org/drawingml/2006/main" xmlns:r="http://schemas.openxmlformats.org/officeDocument/2006/relationships" xmlns:p="http://schemas.openxmlformats.org/presentationml/2006/main">
   <p:cSld>
     <p:spTree>
@@ -8934,7 +9538,7 @@
 </p:sld>
 </file>
 
-<file path=ppt/slides/slide13.xml><?xml version="1.0" encoding="utf-8"?>
+<file path=ppt/slides/slide14.xml><?xml version="1.0" encoding="utf-8"?>
 <p:sld xmlns:a="http://schemas.openxmlformats.org/drawingml/2006/main" xmlns:r="http://schemas.openxmlformats.org/officeDocument/2006/relationships" xmlns:p="http://schemas.openxmlformats.org/presentationml/2006/main">
   <p:cSld>
     <p:spTree>
@@ -9096,7 +9700,7 @@
 </p:sld>
 </file>
 
-<file path=ppt/slides/slide14.xml><?xml version="1.0" encoding="utf-8"?>
+<file path=ppt/slides/slide15.xml><?xml version="1.0" encoding="utf-8"?>
 <p:sld xmlns:a="http://schemas.openxmlformats.org/drawingml/2006/main" xmlns:r="http://schemas.openxmlformats.org/officeDocument/2006/relationships" xmlns:p="http://schemas.openxmlformats.org/presentationml/2006/main">
   <p:cSld>
     <p:spTree>
@@ -10104,7 +10708,7 @@
 </p:sld>
 </file>
 
-<file path=ppt/slides/slide15.xml><?xml version="1.0" encoding="utf-8"?>
+<file path=ppt/slides/slide16.xml><?xml version="1.0" encoding="utf-8"?>
 <p:sld xmlns:a="http://schemas.openxmlformats.org/drawingml/2006/main" xmlns:r="http://schemas.openxmlformats.org/officeDocument/2006/relationships" xmlns:p="http://schemas.openxmlformats.org/presentationml/2006/main">
   <p:cSld>
     <p:spTree>
@@ -10193,7 +10797,7 @@
 </p:sld>
 </file>
 
-<file path=ppt/slides/slide16.xml><?xml version="1.0" encoding="utf-8"?>
+<file path=ppt/slides/slide17.xml><?xml version="1.0" encoding="utf-8"?>
 <p:sld xmlns:a="http://schemas.openxmlformats.org/drawingml/2006/main" xmlns:r="http://schemas.openxmlformats.org/officeDocument/2006/relationships" xmlns:p="http://schemas.openxmlformats.org/presentationml/2006/main">
   <p:cSld>
     <p:spTree>
@@ -10392,6 +10996,19 @@
                 <a:cs typeface="Arial" panose="020B0604020202020204" pitchFamily="34" charset="0"/>
               </a:rPr>
               <a:t>part_manufacturing_process_step.process_step</a:t>
+            </a:r>
+            <a:r>
+              <a:rPr lang="en-US" altLang="de-DE" sz="1000" dirty="0">
+                <a:solidFill>
+                  <a:schemeClr val="tx1">
+                    <a:lumMod val="50000"/>
+                    <a:lumOff val="50000"/>
+                  </a:schemeClr>
+                </a:solidFill>
+                <a:latin typeface="Arial" panose="020B0604020202020204" pitchFamily="34" charset="0"/>
+                <a:cs typeface="Arial" panose="020B0604020202020204" pitchFamily="34" charset="0"/>
+              </a:rPr>
+              <a:t/>
             </a:r>
             <a:br>
               <a:rPr lang="en-US" altLang="de-DE" sz="1000" dirty="0">
@@ -10670,6 +11287,13 @@
                 <a:cs typeface="Arial" panose="020B0604020202020204" pitchFamily="34" charset="0"/>
               </a:rPr>
               <a:t> …</a:t>
+            </a:r>
+            <a:r>
+              <a:rPr lang="en-US" altLang="de-DE" sz="1000" dirty="0">
+                <a:latin typeface="Arial" panose="020B0604020202020204" pitchFamily="34" charset="0"/>
+                <a:cs typeface="Arial" panose="020B0604020202020204" pitchFamily="34" charset="0"/>
+              </a:rPr>
+              <a:t/>
             </a:r>
             <a:br>
               <a:rPr lang="en-US" altLang="de-DE" sz="1000" dirty="0">
@@ -11122,7 +11746,7 @@
 </p:sld>
 </file>
 
-<file path=ppt/slides/slide17.xml><?xml version="1.0" encoding="utf-8"?>
+<file path=ppt/slides/slide18.xml><?xml version="1.0" encoding="utf-8"?>
 <p:sld xmlns:a="http://schemas.openxmlformats.org/drawingml/2006/main" xmlns:r="http://schemas.openxmlformats.org/officeDocument/2006/relationships" xmlns:p="http://schemas.openxmlformats.org/presentationml/2006/main">
   <p:cSld>
     <p:spTree>
@@ -13162,6 +13786,16 @@
                 <a:cs typeface="Arial" panose="020B0604020202020204" pitchFamily="34" charset="0"/>
               </a:rPr>
             </a:br>
+            <a:r>
+              <a:rPr lang="en-US" altLang="de-DE" sz="1000" dirty="0">
+                <a:solidFill>
+                  <a:prstClr val="black"/>
+                </a:solidFill>
+                <a:latin typeface="Arial" panose="020B0604020202020204" pitchFamily="34" charset="0"/>
+                <a:cs typeface="Arial" panose="020B0604020202020204" pitchFamily="34" charset="0"/>
+              </a:rPr>
+              <a:t/>
+            </a:r>
             <a:br>
               <a:rPr lang="en-US" altLang="de-DE" sz="1000" dirty="0">
                 <a:solidFill>
@@ -13254,7 +13888,7 @@
 </p:sld>
 </file>
 
-<file path=ppt/slides/slide18.xml><?xml version="1.0" encoding="utf-8"?>
+<file path=ppt/slides/slide19.xml><?xml version="1.0" encoding="utf-8"?>
 <p:sld xmlns:a="http://schemas.openxmlformats.org/drawingml/2006/main" xmlns:r="http://schemas.openxmlformats.org/officeDocument/2006/relationships" xmlns:p="http://schemas.openxmlformats.org/presentationml/2006/main">
   <p:cSld>
     <p:spTree>
@@ -13343,95 +13977,6 @@
 </p:sld>
 </file>
 
-<file path=ppt/slides/slide19.xml><?xml version="1.0" encoding="utf-8"?>
-<p:sld xmlns:a="http://schemas.openxmlformats.org/drawingml/2006/main" xmlns:r="http://schemas.openxmlformats.org/officeDocument/2006/relationships" xmlns:p="http://schemas.openxmlformats.org/presentationml/2006/main">
-  <p:cSld>
-    <p:spTree>
-      <p:nvGrpSpPr>
-        <p:cNvPr id="1" name=""/>
-        <p:cNvGrpSpPr/>
-        <p:nvPr/>
-      </p:nvGrpSpPr>
-      <p:grpSpPr>
-        <a:xfrm>
-          <a:off x="0" y="0"/>
-          <a:ext cx="0" cy="0"/>
-          <a:chOff x="0" y="0"/>
-          <a:chExt cx="0" cy="0"/>
-        </a:xfrm>
-      </p:grpSpPr>
-      <p:pic>
-        <p:nvPicPr>
-          <p:cNvPr id="4" name="Grafik 3"/>
-          <p:cNvPicPr>
-            <a:picLocks noChangeAspect="1"/>
-          </p:cNvPicPr>
-          <p:nvPr/>
-        </p:nvPicPr>
-        <p:blipFill>
-          <a:blip r:embed="rId2" cstate="print">
-            <a:extLst>
-              <a:ext uri="{28A0092B-C50C-407E-A947-70E740481C1C}">
-                <a14:useLocalDpi xmlns:a14="http://schemas.microsoft.com/office/drawing/2010/main" val="0"/>
-              </a:ext>
-            </a:extLst>
-          </a:blip>
-          <a:stretch>
-            <a:fillRect/>
-          </a:stretch>
-        </p:blipFill>
-        <p:spPr>
-          <a:xfrm>
-            <a:off x="1856309" y="285750"/>
-            <a:ext cx="5431382" cy="5143500"/>
-          </a:xfrm>
-          <a:prstGeom prst="rect">
-            <a:avLst/>
-          </a:prstGeom>
-        </p:spPr>
-      </p:pic>
-      <p:sp>
-        <p:nvSpPr>
-          <p:cNvPr id="2" name="Textfeld 1"/>
-          <p:cNvSpPr txBox="1"/>
-          <p:nvPr/>
-        </p:nvSpPr>
-        <p:spPr>
-          <a:xfrm>
-            <a:off x="63165" y="330869"/>
-            <a:ext cx="1696453" cy="254365"/>
-          </a:xfrm>
-          <a:prstGeom prst="rect">
-            <a:avLst/>
-          </a:prstGeom>
-          <a:noFill/>
-        </p:spPr>
-        <p:txBody>
-          <a:bodyPr wrap="square" rtlCol="0">
-            <a:spAutoFit/>
-          </a:bodyPr>
-          <a:lstStyle/>
-          <a:p>
-            <a:r>
-              <a:rPr lang="en-US" sz="1053" dirty="0"/>
-              <a:t>Solution</a:t>
-            </a:r>
-          </a:p>
-        </p:txBody>
-      </p:sp>
-    </p:spTree>
-    <p:extLst>
-      <p:ext uri="{BB962C8B-B14F-4D97-AF65-F5344CB8AC3E}">
-        <p14:creationId xmlns:p14="http://schemas.microsoft.com/office/powerpoint/2010/main" val="1619922475"/>
-      </p:ext>
-    </p:extLst>
-  </p:cSld>
-  <p:clrMapOvr>
-    <a:masterClrMapping/>
-  </p:clrMapOvr>
-</p:sld>
-</file>
-
 <file path=ppt/slides/slide2.xml><?xml version="1.0" encoding="utf-8"?>
 <p:sld xmlns:a="http://schemas.openxmlformats.org/drawingml/2006/main" xmlns:r="http://schemas.openxmlformats.org/officeDocument/2006/relationships" xmlns:p="http://schemas.openxmlformats.org/presentationml/2006/main">
   <p:cSld>
@@ -13477,7 +14022,7 @@
                 <a:gridCol w="1872000">
                   <a:extLst>
                     <a:ext uri="{9D8B030D-6E8A-4147-A177-3AD203B41FA5}">
-                      <a16:colId xmlns:a16="http://schemas.microsoft.com/office/drawing/2014/main" val="20000"/>
+                      <a16:colId xmlns:a16="http://schemas.microsoft.com/office/drawing/2014/main" xmlns="" val="20000"/>
                     </a:ext>
                   </a:extLst>
                 </a:gridCol>
@@ -13502,7 +14047,7 @@
                 </a:tc>
                 <a:extLst>
                   <a:ext uri="{0D108BD9-81ED-4DB2-BD59-A6C34878D82A}">
-                    <a16:rowId xmlns:a16="http://schemas.microsoft.com/office/drawing/2014/main" val="10000"/>
+                    <a16:rowId xmlns:a16="http://schemas.microsoft.com/office/drawing/2014/main" xmlns="" val="10000"/>
                   </a:ext>
                 </a:extLst>
               </a:tr>
@@ -13535,7 +14080,7 @@
                 </a:tc>
                 <a:extLst>
                   <a:ext uri="{0D108BD9-81ED-4DB2-BD59-A6C34878D82A}">
-                    <a16:rowId xmlns:a16="http://schemas.microsoft.com/office/drawing/2014/main" val="10001"/>
+                    <a16:rowId xmlns:a16="http://schemas.microsoft.com/office/drawing/2014/main" xmlns="" val="10001"/>
                   </a:ext>
                 </a:extLst>
               </a:tr>
@@ -13571,7 +14116,7 @@
                 <a:gridCol w="1872000">
                   <a:extLst>
                     <a:ext uri="{9D8B030D-6E8A-4147-A177-3AD203B41FA5}">
-                      <a16:colId xmlns:a16="http://schemas.microsoft.com/office/drawing/2014/main" val="20000"/>
+                      <a16:colId xmlns:a16="http://schemas.microsoft.com/office/drawing/2014/main" xmlns="" val="20000"/>
                     </a:ext>
                   </a:extLst>
                 </a:gridCol>
@@ -13596,7 +14141,7 @@
                 </a:tc>
                 <a:extLst>
                   <a:ext uri="{0D108BD9-81ED-4DB2-BD59-A6C34878D82A}">
-                    <a16:rowId xmlns:a16="http://schemas.microsoft.com/office/drawing/2014/main" val="10000"/>
+                    <a16:rowId xmlns:a16="http://schemas.microsoft.com/office/drawing/2014/main" xmlns="" val="10000"/>
                   </a:ext>
                 </a:extLst>
               </a:tr>
@@ -13623,7 +14168,7 @@
                 </a:tc>
                 <a:extLst>
                   <a:ext uri="{0D108BD9-81ED-4DB2-BD59-A6C34878D82A}">
-                    <a16:rowId xmlns:a16="http://schemas.microsoft.com/office/drawing/2014/main" val="10001"/>
+                    <a16:rowId xmlns:a16="http://schemas.microsoft.com/office/drawing/2014/main" xmlns="" val="10001"/>
                   </a:ext>
                 </a:extLst>
               </a:tr>
@@ -13657,7 +14202,7 @@
                 </a:tc>
                 <a:extLst>
                   <a:ext uri="{0D108BD9-81ED-4DB2-BD59-A6C34878D82A}">
-                    <a16:rowId xmlns:a16="http://schemas.microsoft.com/office/drawing/2014/main" val="10002"/>
+                    <a16:rowId xmlns:a16="http://schemas.microsoft.com/office/drawing/2014/main" xmlns="" val="10002"/>
                   </a:ext>
                 </a:extLst>
               </a:tr>
@@ -13692,7 +14237,7 @@
                 </a:tc>
                 <a:extLst>
                   <a:ext uri="{0D108BD9-81ED-4DB2-BD59-A6C34878D82A}">
-                    <a16:rowId xmlns:a16="http://schemas.microsoft.com/office/drawing/2014/main" val="10003"/>
+                    <a16:rowId xmlns:a16="http://schemas.microsoft.com/office/drawing/2014/main" xmlns="" val="10003"/>
                   </a:ext>
                 </a:extLst>
               </a:tr>
@@ -13728,7 +14273,7 @@
                 <a:gridCol w="1440000">
                   <a:extLst>
                     <a:ext uri="{9D8B030D-6E8A-4147-A177-3AD203B41FA5}">
-                      <a16:colId xmlns:a16="http://schemas.microsoft.com/office/drawing/2014/main" val="20000"/>
+                      <a16:colId xmlns:a16="http://schemas.microsoft.com/office/drawing/2014/main" xmlns="" val="20000"/>
                     </a:ext>
                   </a:extLst>
                 </a:gridCol>
@@ -13753,7 +14298,7 @@
                 </a:tc>
                 <a:extLst>
                   <a:ext uri="{0D108BD9-81ED-4DB2-BD59-A6C34878D82A}">
-                    <a16:rowId xmlns:a16="http://schemas.microsoft.com/office/drawing/2014/main" val="10000"/>
+                    <a16:rowId xmlns:a16="http://schemas.microsoft.com/office/drawing/2014/main" xmlns="" val="10000"/>
                   </a:ext>
                 </a:extLst>
               </a:tr>
@@ -13780,7 +14325,7 @@
                 </a:tc>
                 <a:extLst>
                   <a:ext uri="{0D108BD9-81ED-4DB2-BD59-A6C34878D82A}">
-                    <a16:rowId xmlns:a16="http://schemas.microsoft.com/office/drawing/2014/main" val="10001"/>
+                    <a16:rowId xmlns:a16="http://schemas.microsoft.com/office/drawing/2014/main" xmlns="" val="10001"/>
                   </a:ext>
                 </a:extLst>
               </a:tr>
@@ -13818,7 +14363,7 @@
                 </a:tc>
                 <a:extLst>
                   <a:ext uri="{0D108BD9-81ED-4DB2-BD59-A6C34878D82A}">
-                    <a16:rowId xmlns:a16="http://schemas.microsoft.com/office/drawing/2014/main" val="10002"/>
+                    <a16:rowId xmlns:a16="http://schemas.microsoft.com/office/drawing/2014/main" xmlns="" val="10002"/>
                   </a:ext>
                 </a:extLst>
               </a:tr>
@@ -13849,7 +14394,7 @@
                 </a:tc>
                 <a:extLst>
                   <a:ext uri="{0D108BD9-81ED-4DB2-BD59-A6C34878D82A}">
-                    <a16:rowId xmlns:a16="http://schemas.microsoft.com/office/drawing/2014/main" val="10003"/>
+                    <a16:rowId xmlns:a16="http://schemas.microsoft.com/office/drawing/2014/main" xmlns="" val="10003"/>
                   </a:ext>
                 </a:extLst>
               </a:tr>
@@ -13885,7 +14430,7 @@
                 <a:gridCol w="1440000">
                   <a:extLst>
                     <a:ext uri="{9D8B030D-6E8A-4147-A177-3AD203B41FA5}">
-                      <a16:colId xmlns:a16="http://schemas.microsoft.com/office/drawing/2014/main" val="20000"/>
+                      <a16:colId xmlns:a16="http://schemas.microsoft.com/office/drawing/2014/main" xmlns="" val="20000"/>
                     </a:ext>
                   </a:extLst>
                 </a:gridCol>
@@ -13914,7 +14459,7 @@
                 </a:tc>
                 <a:extLst>
                   <a:ext uri="{0D108BD9-81ED-4DB2-BD59-A6C34878D82A}">
-                    <a16:rowId xmlns:a16="http://schemas.microsoft.com/office/drawing/2014/main" val="10000"/>
+                    <a16:rowId xmlns:a16="http://schemas.microsoft.com/office/drawing/2014/main" xmlns="" val="10000"/>
                   </a:ext>
                 </a:extLst>
               </a:tr>
@@ -13941,7 +14486,7 @@
                 </a:tc>
                 <a:extLst>
                   <a:ext uri="{0D108BD9-81ED-4DB2-BD59-A6C34878D82A}">
-                    <a16:rowId xmlns:a16="http://schemas.microsoft.com/office/drawing/2014/main" val="10001"/>
+                    <a16:rowId xmlns:a16="http://schemas.microsoft.com/office/drawing/2014/main" xmlns="" val="10001"/>
                   </a:ext>
                 </a:extLst>
               </a:tr>
@@ -13999,7 +14544,7 @@
                 </a:tc>
                 <a:extLst>
                   <a:ext uri="{0D108BD9-81ED-4DB2-BD59-A6C34878D82A}">
-                    <a16:rowId xmlns:a16="http://schemas.microsoft.com/office/drawing/2014/main" val="10002"/>
+                    <a16:rowId xmlns:a16="http://schemas.microsoft.com/office/drawing/2014/main" xmlns="" val="10002"/>
                   </a:ext>
                 </a:extLst>
               </a:tr>
@@ -14057,7 +14602,7 @@
                 </a:tc>
                 <a:extLst>
                   <a:ext uri="{0D108BD9-81ED-4DB2-BD59-A6C34878D82A}">
-                    <a16:rowId xmlns:a16="http://schemas.microsoft.com/office/drawing/2014/main" val="10003"/>
+                    <a16:rowId xmlns:a16="http://schemas.microsoft.com/office/drawing/2014/main" xmlns="" val="10003"/>
                   </a:ext>
                 </a:extLst>
               </a:tr>
@@ -14108,7 +14653,7 @@
                 </a:tc>
                 <a:extLst>
                   <a:ext uri="{0D108BD9-81ED-4DB2-BD59-A6C34878D82A}">
-                    <a16:rowId xmlns:a16="http://schemas.microsoft.com/office/drawing/2014/main" val="10004"/>
+                    <a16:rowId xmlns:a16="http://schemas.microsoft.com/office/drawing/2014/main" xmlns="" val="10004"/>
                   </a:ext>
                 </a:extLst>
               </a:tr>
@@ -14166,7 +14711,7 @@
                 </a:tc>
                 <a:extLst>
                   <a:ext uri="{0D108BD9-81ED-4DB2-BD59-A6C34878D82A}">
-                    <a16:rowId xmlns:a16="http://schemas.microsoft.com/office/drawing/2014/main" val="10005"/>
+                    <a16:rowId xmlns:a16="http://schemas.microsoft.com/office/drawing/2014/main" xmlns="" val="10005"/>
                   </a:ext>
                 </a:extLst>
               </a:tr>
@@ -14224,7 +14769,7 @@
                 </a:tc>
                 <a:extLst>
                   <a:ext uri="{0D108BD9-81ED-4DB2-BD59-A6C34878D82A}">
-                    <a16:rowId xmlns:a16="http://schemas.microsoft.com/office/drawing/2014/main" val="10006"/>
+                    <a16:rowId xmlns:a16="http://schemas.microsoft.com/office/drawing/2014/main" xmlns="" val="10006"/>
                   </a:ext>
                 </a:extLst>
               </a:tr>
@@ -14258,7 +14803,7 @@
                 </a:tc>
                 <a:extLst>
                   <a:ext uri="{0D108BD9-81ED-4DB2-BD59-A6C34878D82A}">
-                    <a16:rowId xmlns:a16="http://schemas.microsoft.com/office/drawing/2014/main" val="10007"/>
+                    <a16:rowId xmlns:a16="http://schemas.microsoft.com/office/drawing/2014/main" xmlns="" val="10007"/>
                   </a:ext>
                 </a:extLst>
               </a:tr>
@@ -14296,7 +14841,7 @@
                 </a:tc>
                 <a:extLst>
                   <a:ext uri="{0D108BD9-81ED-4DB2-BD59-A6C34878D82A}">
-                    <a16:rowId xmlns:a16="http://schemas.microsoft.com/office/drawing/2014/main" val="10008"/>
+                    <a16:rowId xmlns:a16="http://schemas.microsoft.com/office/drawing/2014/main" xmlns="" val="10008"/>
                   </a:ext>
                 </a:extLst>
               </a:tr>
@@ -14330,7 +14875,7 @@
                 </a:tc>
                 <a:extLst>
                   <a:ext uri="{0D108BD9-81ED-4DB2-BD59-A6C34878D82A}">
-                    <a16:rowId xmlns:a16="http://schemas.microsoft.com/office/drawing/2014/main" val="10009"/>
+                    <a16:rowId xmlns:a16="http://schemas.microsoft.com/office/drawing/2014/main" xmlns="" val="10009"/>
                   </a:ext>
                 </a:extLst>
               </a:tr>
@@ -14378,7 +14923,7 @@
                 </a:tc>
                 <a:extLst>
                   <a:ext uri="{0D108BD9-81ED-4DB2-BD59-A6C34878D82A}">
-                    <a16:rowId xmlns:a16="http://schemas.microsoft.com/office/drawing/2014/main" val="10010"/>
+                    <a16:rowId xmlns:a16="http://schemas.microsoft.com/office/drawing/2014/main" xmlns="" val="10010"/>
                   </a:ext>
                 </a:extLst>
               </a:tr>
@@ -14414,7 +14959,7 @@
                 <a:gridCol w="1440000">
                   <a:extLst>
                     <a:ext uri="{9D8B030D-6E8A-4147-A177-3AD203B41FA5}">
-                      <a16:colId xmlns:a16="http://schemas.microsoft.com/office/drawing/2014/main" val="20000"/>
+                      <a16:colId xmlns:a16="http://schemas.microsoft.com/office/drawing/2014/main" xmlns="" val="20000"/>
                     </a:ext>
                   </a:extLst>
                 </a:gridCol>
@@ -14443,7 +14988,7 @@
                 </a:tc>
                 <a:extLst>
                   <a:ext uri="{0D108BD9-81ED-4DB2-BD59-A6C34878D82A}">
-                    <a16:rowId xmlns:a16="http://schemas.microsoft.com/office/drawing/2014/main" val="10000"/>
+                    <a16:rowId xmlns:a16="http://schemas.microsoft.com/office/drawing/2014/main" xmlns="" val="10000"/>
                   </a:ext>
                 </a:extLst>
               </a:tr>
@@ -14470,7 +15015,7 @@
                 </a:tc>
                 <a:extLst>
                   <a:ext uri="{0D108BD9-81ED-4DB2-BD59-A6C34878D82A}">
-                    <a16:rowId xmlns:a16="http://schemas.microsoft.com/office/drawing/2014/main" val="10001"/>
+                    <a16:rowId xmlns:a16="http://schemas.microsoft.com/office/drawing/2014/main" xmlns="" val="10001"/>
                   </a:ext>
                 </a:extLst>
               </a:tr>
@@ -14528,7 +15073,7 @@
                 </a:tc>
                 <a:extLst>
                   <a:ext uri="{0D108BD9-81ED-4DB2-BD59-A6C34878D82A}">
-                    <a16:rowId xmlns:a16="http://schemas.microsoft.com/office/drawing/2014/main" val="10002"/>
+                    <a16:rowId xmlns:a16="http://schemas.microsoft.com/office/drawing/2014/main" xmlns="" val="10002"/>
                   </a:ext>
                 </a:extLst>
               </a:tr>
@@ -14586,7 +15131,7 @@
                 </a:tc>
                 <a:extLst>
                   <a:ext uri="{0D108BD9-81ED-4DB2-BD59-A6C34878D82A}">
-                    <a16:rowId xmlns:a16="http://schemas.microsoft.com/office/drawing/2014/main" val="10003"/>
+                    <a16:rowId xmlns:a16="http://schemas.microsoft.com/office/drawing/2014/main" xmlns="" val="10003"/>
                   </a:ext>
                 </a:extLst>
               </a:tr>
@@ -14637,7 +15182,7 @@
                 </a:tc>
                 <a:extLst>
                   <a:ext uri="{0D108BD9-81ED-4DB2-BD59-A6C34878D82A}">
-                    <a16:rowId xmlns:a16="http://schemas.microsoft.com/office/drawing/2014/main" val="10004"/>
+                    <a16:rowId xmlns:a16="http://schemas.microsoft.com/office/drawing/2014/main" xmlns="" val="10004"/>
                   </a:ext>
                 </a:extLst>
               </a:tr>
@@ -14695,7 +15240,7 @@
                 </a:tc>
                 <a:extLst>
                   <a:ext uri="{0D108BD9-81ED-4DB2-BD59-A6C34878D82A}">
-                    <a16:rowId xmlns:a16="http://schemas.microsoft.com/office/drawing/2014/main" val="10005"/>
+                    <a16:rowId xmlns:a16="http://schemas.microsoft.com/office/drawing/2014/main" xmlns="" val="10005"/>
                   </a:ext>
                 </a:extLst>
               </a:tr>
@@ -14753,7 +15298,7 @@
                 </a:tc>
                 <a:extLst>
                   <a:ext uri="{0D108BD9-81ED-4DB2-BD59-A6C34878D82A}">
-                    <a16:rowId xmlns:a16="http://schemas.microsoft.com/office/drawing/2014/main" val="10006"/>
+                    <a16:rowId xmlns:a16="http://schemas.microsoft.com/office/drawing/2014/main" xmlns="" val="10006"/>
                   </a:ext>
                 </a:extLst>
               </a:tr>
@@ -14787,7 +15332,7 @@
                 </a:tc>
                 <a:extLst>
                   <a:ext uri="{0D108BD9-81ED-4DB2-BD59-A6C34878D82A}">
-                    <a16:rowId xmlns:a16="http://schemas.microsoft.com/office/drawing/2014/main" val="10007"/>
+                    <a16:rowId xmlns:a16="http://schemas.microsoft.com/office/drawing/2014/main" xmlns="" val="10007"/>
                   </a:ext>
                 </a:extLst>
               </a:tr>
@@ -14839,7 +15384,7 @@
                 </a:tc>
                 <a:extLst>
                   <a:ext uri="{0D108BD9-81ED-4DB2-BD59-A6C34878D82A}">
-                    <a16:rowId xmlns:a16="http://schemas.microsoft.com/office/drawing/2014/main" val="10008"/>
+                    <a16:rowId xmlns:a16="http://schemas.microsoft.com/office/drawing/2014/main" xmlns="" val="10008"/>
                   </a:ext>
                 </a:extLst>
               </a:tr>
@@ -14875,7 +15420,7 @@
                 <a:gridCol w="1440000">
                   <a:extLst>
                     <a:ext uri="{9D8B030D-6E8A-4147-A177-3AD203B41FA5}">
-                      <a16:colId xmlns:a16="http://schemas.microsoft.com/office/drawing/2014/main" val="20000"/>
+                      <a16:colId xmlns:a16="http://schemas.microsoft.com/office/drawing/2014/main" xmlns="" val="20000"/>
                     </a:ext>
                   </a:extLst>
                 </a:gridCol>
@@ -14900,7 +15445,7 @@
                 </a:tc>
                 <a:extLst>
                   <a:ext uri="{0D108BD9-81ED-4DB2-BD59-A6C34878D82A}">
-                    <a16:rowId xmlns:a16="http://schemas.microsoft.com/office/drawing/2014/main" val="10000"/>
+                    <a16:rowId xmlns:a16="http://schemas.microsoft.com/office/drawing/2014/main" xmlns="" val="10000"/>
                   </a:ext>
                 </a:extLst>
               </a:tr>
@@ -14927,7 +15472,7 @@
                 </a:tc>
                 <a:extLst>
                   <a:ext uri="{0D108BD9-81ED-4DB2-BD59-A6C34878D82A}">
-                    <a16:rowId xmlns:a16="http://schemas.microsoft.com/office/drawing/2014/main" val="10001"/>
+                    <a16:rowId xmlns:a16="http://schemas.microsoft.com/office/drawing/2014/main" xmlns="" val="10001"/>
                   </a:ext>
                 </a:extLst>
               </a:tr>
@@ -14962,7 +15507,7 @@
                 </a:tc>
                 <a:extLst>
                   <a:ext uri="{0D108BD9-81ED-4DB2-BD59-A6C34878D82A}">
-                    <a16:rowId xmlns:a16="http://schemas.microsoft.com/office/drawing/2014/main" val="10002"/>
+                    <a16:rowId xmlns:a16="http://schemas.microsoft.com/office/drawing/2014/main" xmlns="" val="10002"/>
                   </a:ext>
                 </a:extLst>
               </a:tr>
@@ -14998,7 +15543,7 @@
                 <a:gridCol w="1440000">
                   <a:extLst>
                     <a:ext uri="{9D8B030D-6E8A-4147-A177-3AD203B41FA5}">
-                      <a16:colId xmlns:a16="http://schemas.microsoft.com/office/drawing/2014/main" val="20000"/>
+                      <a16:colId xmlns:a16="http://schemas.microsoft.com/office/drawing/2014/main" xmlns="" val="20000"/>
                     </a:ext>
                   </a:extLst>
                 </a:gridCol>
@@ -15023,7 +15568,7 @@
                 </a:tc>
                 <a:extLst>
                   <a:ext uri="{0D108BD9-81ED-4DB2-BD59-A6C34878D82A}">
-                    <a16:rowId xmlns:a16="http://schemas.microsoft.com/office/drawing/2014/main" val="10000"/>
+                    <a16:rowId xmlns:a16="http://schemas.microsoft.com/office/drawing/2014/main" xmlns="" val="10000"/>
                   </a:ext>
                 </a:extLst>
               </a:tr>
@@ -15056,7 +15601,7 @@
                 </a:tc>
                 <a:extLst>
                   <a:ext uri="{0D108BD9-81ED-4DB2-BD59-A6C34878D82A}">
-                    <a16:rowId xmlns:a16="http://schemas.microsoft.com/office/drawing/2014/main" val="10001"/>
+                    <a16:rowId xmlns:a16="http://schemas.microsoft.com/office/drawing/2014/main" xmlns="" val="10001"/>
                   </a:ext>
                 </a:extLst>
               </a:tr>
@@ -15092,7 +15637,7 @@
                 <a:gridCol w="1872000">
                   <a:extLst>
                     <a:ext uri="{9D8B030D-6E8A-4147-A177-3AD203B41FA5}">
-                      <a16:colId xmlns:a16="http://schemas.microsoft.com/office/drawing/2014/main" val="20000"/>
+                      <a16:colId xmlns:a16="http://schemas.microsoft.com/office/drawing/2014/main" xmlns="" val="20000"/>
                     </a:ext>
                   </a:extLst>
                 </a:gridCol>
@@ -15117,7 +15662,7 @@
                 </a:tc>
                 <a:extLst>
                   <a:ext uri="{0D108BD9-81ED-4DB2-BD59-A6C34878D82A}">
-                    <a16:rowId xmlns:a16="http://schemas.microsoft.com/office/drawing/2014/main" val="10000"/>
+                    <a16:rowId xmlns:a16="http://schemas.microsoft.com/office/drawing/2014/main" xmlns="" val="10000"/>
                   </a:ext>
                 </a:extLst>
               </a:tr>
@@ -15144,7 +15689,7 @@
                 </a:tc>
                 <a:extLst>
                   <a:ext uri="{0D108BD9-81ED-4DB2-BD59-A6C34878D82A}">
-                    <a16:rowId xmlns:a16="http://schemas.microsoft.com/office/drawing/2014/main" val="10001"/>
+                    <a16:rowId xmlns:a16="http://schemas.microsoft.com/office/drawing/2014/main" xmlns="" val="10001"/>
                   </a:ext>
                 </a:extLst>
               </a:tr>
@@ -15179,7 +15724,7 @@
                 </a:tc>
                 <a:extLst>
                   <a:ext uri="{0D108BD9-81ED-4DB2-BD59-A6C34878D82A}">
-                    <a16:rowId xmlns:a16="http://schemas.microsoft.com/office/drawing/2014/main" val="10002"/>
+                    <a16:rowId xmlns:a16="http://schemas.microsoft.com/office/drawing/2014/main" xmlns="" val="10002"/>
                   </a:ext>
                 </a:extLst>
               </a:tr>
@@ -15215,7 +15760,7 @@
                 <a:gridCol w="1872000">
                   <a:extLst>
                     <a:ext uri="{9D8B030D-6E8A-4147-A177-3AD203B41FA5}">
-                      <a16:colId xmlns:a16="http://schemas.microsoft.com/office/drawing/2014/main" val="20000"/>
+                      <a16:colId xmlns:a16="http://schemas.microsoft.com/office/drawing/2014/main" xmlns="" val="20000"/>
                     </a:ext>
                   </a:extLst>
                 </a:gridCol>
@@ -15244,7 +15789,7 @@
                 </a:tc>
                 <a:extLst>
                   <a:ext uri="{0D108BD9-81ED-4DB2-BD59-A6C34878D82A}">
-                    <a16:rowId xmlns:a16="http://schemas.microsoft.com/office/drawing/2014/main" val="10000"/>
+                    <a16:rowId xmlns:a16="http://schemas.microsoft.com/office/drawing/2014/main" xmlns="" val="10000"/>
                   </a:ext>
                 </a:extLst>
               </a:tr>
@@ -15295,7 +15840,7 @@
                 </a:tc>
                 <a:extLst>
                   <a:ext uri="{0D108BD9-81ED-4DB2-BD59-A6C34878D82A}">
-                    <a16:rowId xmlns:a16="http://schemas.microsoft.com/office/drawing/2014/main" val="10001"/>
+                    <a16:rowId xmlns:a16="http://schemas.microsoft.com/office/drawing/2014/main" xmlns="" val="10001"/>
                   </a:ext>
                 </a:extLst>
               </a:tr>
@@ -15343,7 +15888,7 @@
                 </a:tc>
                 <a:extLst>
                   <a:ext uri="{0D108BD9-81ED-4DB2-BD59-A6C34878D82A}">
-                    <a16:rowId xmlns:a16="http://schemas.microsoft.com/office/drawing/2014/main" val="10002"/>
+                    <a16:rowId xmlns:a16="http://schemas.microsoft.com/office/drawing/2014/main" xmlns="" val="10002"/>
                   </a:ext>
                 </a:extLst>
               </a:tr>
@@ -15379,7 +15924,7 @@
                 <a:gridCol w="1872000">
                   <a:extLst>
                     <a:ext uri="{9D8B030D-6E8A-4147-A177-3AD203B41FA5}">
-                      <a16:colId xmlns:a16="http://schemas.microsoft.com/office/drawing/2014/main" val="20000"/>
+                      <a16:colId xmlns:a16="http://schemas.microsoft.com/office/drawing/2014/main" xmlns="" val="20000"/>
                     </a:ext>
                   </a:extLst>
                 </a:gridCol>
@@ -15404,7 +15949,7 @@
                 </a:tc>
                 <a:extLst>
                   <a:ext uri="{0D108BD9-81ED-4DB2-BD59-A6C34878D82A}">
-                    <a16:rowId xmlns:a16="http://schemas.microsoft.com/office/drawing/2014/main" val="10000"/>
+                    <a16:rowId xmlns:a16="http://schemas.microsoft.com/office/drawing/2014/main" xmlns="" val="10000"/>
                   </a:ext>
                 </a:extLst>
               </a:tr>
@@ -15431,7 +15976,7 @@
                 </a:tc>
                 <a:extLst>
                   <a:ext uri="{0D108BD9-81ED-4DB2-BD59-A6C34878D82A}">
-                    <a16:rowId xmlns:a16="http://schemas.microsoft.com/office/drawing/2014/main" val="10001"/>
+                    <a16:rowId xmlns:a16="http://schemas.microsoft.com/office/drawing/2014/main" xmlns="" val="10001"/>
                   </a:ext>
                 </a:extLst>
               </a:tr>
@@ -15483,7 +16028,7 @@
                 </a:tc>
                 <a:extLst>
                   <a:ext uri="{0D108BD9-81ED-4DB2-BD59-A6C34878D82A}">
-                    <a16:rowId xmlns:a16="http://schemas.microsoft.com/office/drawing/2014/main" val="10002"/>
+                    <a16:rowId xmlns:a16="http://schemas.microsoft.com/office/drawing/2014/main" xmlns="" val="10002"/>
                   </a:ext>
                 </a:extLst>
               </a:tr>
@@ -15519,7 +16064,7 @@
                 <a:gridCol w="1440000">
                   <a:extLst>
                     <a:ext uri="{9D8B030D-6E8A-4147-A177-3AD203B41FA5}">
-                      <a16:colId xmlns:a16="http://schemas.microsoft.com/office/drawing/2014/main" val="20000"/>
+                      <a16:colId xmlns:a16="http://schemas.microsoft.com/office/drawing/2014/main" xmlns="" val="20000"/>
                     </a:ext>
                   </a:extLst>
                 </a:gridCol>
@@ -15544,7 +16089,7 @@
                 </a:tc>
                 <a:extLst>
                   <a:ext uri="{0D108BD9-81ED-4DB2-BD59-A6C34878D82A}">
-                    <a16:rowId xmlns:a16="http://schemas.microsoft.com/office/drawing/2014/main" val="10000"/>
+                    <a16:rowId xmlns:a16="http://schemas.microsoft.com/office/drawing/2014/main" xmlns="" val="10000"/>
                   </a:ext>
                 </a:extLst>
               </a:tr>
@@ -15588,7 +16133,7 @@
                 </a:tc>
                 <a:extLst>
                   <a:ext uri="{0D108BD9-81ED-4DB2-BD59-A6C34878D82A}">
-                    <a16:rowId xmlns:a16="http://schemas.microsoft.com/office/drawing/2014/main" val="10001"/>
+                    <a16:rowId xmlns:a16="http://schemas.microsoft.com/office/drawing/2014/main" xmlns="" val="10001"/>
                   </a:ext>
                 </a:extLst>
               </a:tr>
@@ -15622,7 +16167,7 @@
                 </a:tc>
                 <a:extLst>
                   <a:ext uri="{0D108BD9-81ED-4DB2-BD59-A6C34878D82A}">
-                    <a16:rowId xmlns:a16="http://schemas.microsoft.com/office/drawing/2014/main" val="10002"/>
+                    <a16:rowId xmlns:a16="http://schemas.microsoft.com/office/drawing/2014/main" xmlns="" val="10002"/>
                   </a:ext>
                 </a:extLst>
               </a:tr>
@@ -15674,7 +16219,7 @@
                 </a:tc>
                 <a:extLst>
                   <a:ext uri="{0D108BD9-81ED-4DB2-BD59-A6C34878D82A}">
-                    <a16:rowId xmlns:a16="http://schemas.microsoft.com/office/drawing/2014/main" val="10003"/>
+                    <a16:rowId xmlns:a16="http://schemas.microsoft.com/office/drawing/2014/main" xmlns="" val="10003"/>
                   </a:ext>
                 </a:extLst>
               </a:tr>
@@ -15710,7 +16255,7 @@
                 <a:gridCol w="1872000">
                   <a:extLst>
                     <a:ext uri="{9D8B030D-6E8A-4147-A177-3AD203B41FA5}">
-                      <a16:colId xmlns:a16="http://schemas.microsoft.com/office/drawing/2014/main" val="20000"/>
+                      <a16:colId xmlns:a16="http://schemas.microsoft.com/office/drawing/2014/main" xmlns="" val="20000"/>
                     </a:ext>
                   </a:extLst>
                 </a:gridCol>
@@ -15735,7 +16280,7 @@
                 </a:tc>
                 <a:extLst>
                   <a:ext uri="{0D108BD9-81ED-4DB2-BD59-A6C34878D82A}">
-                    <a16:rowId xmlns:a16="http://schemas.microsoft.com/office/drawing/2014/main" val="10000"/>
+                    <a16:rowId xmlns:a16="http://schemas.microsoft.com/office/drawing/2014/main" xmlns="" val="10000"/>
                   </a:ext>
                 </a:extLst>
               </a:tr>
@@ -15762,7 +16307,7 @@
                 </a:tc>
                 <a:extLst>
                   <a:ext uri="{0D108BD9-81ED-4DB2-BD59-A6C34878D82A}">
-                    <a16:rowId xmlns:a16="http://schemas.microsoft.com/office/drawing/2014/main" val="10001"/>
+                    <a16:rowId xmlns:a16="http://schemas.microsoft.com/office/drawing/2014/main" xmlns="" val="10001"/>
                   </a:ext>
                 </a:extLst>
               </a:tr>
@@ -15813,7 +16358,7 @@
                 </a:tc>
                 <a:extLst>
                   <a:ext uri="{0D108BD9-81ED-4DB2-BD59-A6C34878D82A}">
-                    <a16:rowId xmlns:a16="http://schemas.microsoft.com/office/drawing/2014/main" val="10002"/>
+                    <a16:rowId xmlns:a16="http://schemas.microsoft.com/office/drawing/2014/main" xmlns="" val="10002"/>
                   </a:ext>
                 </a:extLst>
               </a:tr>
@@ -15875,7 +16420,7 @@
                 </a:tc>
                 <a:extLst>
                   <a:ext uri="{0D108BD9-81ED-4DB2-BD59-A6C34878D82A}">
-                    <a16:rowId xmlns:a16="http://schemas.microsoft.com/office/drawing/2014/main" val="10003"/>
+                    <a16:rowId xmlns:a16="http://schemas.microsoft.com/office/drawing/2014/main" xmlns="" val="10003"/>
                   </a:ext>
                 </a:extLst>
               </a:tr>
@@ -15930,7 +16475,7 @@
                 </a:tc>
                 <a:extLst>
                   <a:ext uri="{0D108BD9-81ED-4DB2-BD59-A6C34878D82A}">
-                    <a16:rowId xmlns:a16="http://schemas.microsoft.com/office/drawing/2014/main" val="10004"/>
+                    <a16:rowId xmlns:a16="http://schemas.microsoft.com/office/drawing/2014/main" xmlns="" val="10004"/>
                   </a:ext>
                 </a:extLst>
               </a:tr>
@@ -15982,7 +16527,7 @@
                 </a:tc>
                 <a:extLst>
                   <a:ext uri="{0D108BD9-81ED-4DB2-BD59-A6C34878D82A}">
-                    <a16:rowId xmlns:a16="http://schemas.microsoft.com/office/drawing/2014/main" val="10005"/>
+                    <a16:rowId xmlns:a16="http://schemas.microsoft.com/office/drawing/2014/main" xmlns="" val="10005"/>
                   </a:ext>
                 </a:extLst>
               </a:tr>
@@ -16018,7 +16563,7 @@
                 <a:gridCol w="2052000">
                   <a:extLst>
                     <a:ext uri="{9D8B030D-6E8A-4147-A177-3AD203B41FA5}">
-                      <a16:colId xmlns:a16="http://schemas.microsoft.com/office/drawing/2014/main" val="20000"/>
+                      <a16:colId xmlns:a16="http://schemas.microsoft.com/office/drawing/2014/main" xmlns="" val="20000"/>
                     </a:ext>
                   </a:extLst>
                 </a:gridCol>
@@ -16047,7 +16592,7 @@
                 </a:tc>
                 <a:extLst>
                   <a:ext uri="{0D108BD9-81ED-4DB2-BD59-A6C34878D82A}">
-                    <a16:rowId xmlns:a16="http://schemas.microsoft.com/office/drawing/2014/main" val="10000"/>
+                    <a16:rowId xmlns:a16="http://schemas.microsoft.com/office/drawing/2014/main" xmlns="" val="10000"/>
                   </a:ext>
                 </a:extLst>
               </a:tr>
@@ -16102,7 +16647,7 @@
                 </a:tc>
                 <a:extLst>
                   <a:ext uri="{0D108BD9-81ED-4DB2-BD59-A6C34878D82A}">
-                    <a16:rowId xmlns:a16="http://schemas.microsoft.com/office/drawing/2014/main" val="10001"/>
+                    <a16:rowId xmlns:a16="http://schemas.microsoft.com/office/drawing/2014/main" xmlns="" val="10001"/>
                   </a:ext>
                 </a:extLst>
               </a:tr>
@@ -16160,7 +16705,7 @@
                 </a:tc>
                 <a:extLst>
                   <a:ext uri="{0D108BD9-81ED-4DB2-BD59-A6C34878D82A}">
-                    <a16:rowId xmlns:a16="http://schemas.microsoft.com/office/drawing/2014/main" val="10002"/>
+                    <a16:rowId xmlns:a16="http://schemas.microsoft.com/office/drawing/2014/main" xmlns="" val="10002"/>
                   </a:ext>
                 </a:extLst>
               </a:tr>
@@ -16218,7 +16763,7 @@
                 </a:tc>
                 <a:extLst>
                   <a:ext uri="{0D108BD9-81ED-4DB2-BD59-A6C34878D82A}">
-                    <a16:rowId xmlns:a16="http://schemas.microsoft.com/office/drawing/2014/main" val="10003"/>
+                    <a16:rowId xmlns:a16="http://schemas.microsoft.com/office/drawing/2014/main" xmlns="" val="10003"/>
                   </a:ext>
                 </a:extLst>
               </a:tr>
@@ -16269,7 +16814,7 @@
                 </a:tc>
                 <a:extLst>
                   <a:ext uri="{0D108BD9-81ED-4DB2-BD59-A6C34878D82A}">
-                    <a16:rowId xmlns:a16="http://schemas.microsoft.com/office/drawing/2014/main" val="10004"/>
+                    <a16:rowId xmlns:a16="http://schemas.microsoft.com/office/drawing/2014/main" xmlns="" val="10004"/>
                   </a:ext>
                 </a:extLst>
               </a:tr>
@@ -16324,7 +16869,7 @@
                 </a:tc>
                 <a:extLst>
                   <a:ext uri="{0D108BD9-81ED-4DB2-BD59-A6C34878D82A}">
-                    <a16:rowId xmlns:a16="http://schemas.microsoft.com/office/drawing/2014/main" val="10005"/>
+                    <a16:rowId xmlns:a16="http://schemas.microsoft.com/office/drawing/2014/main" xmlns="" val="10005"/>
                   </a:ext>
                 </a:extLst>
               </a:tr>
@@ -16372,7 +16917,7 @@
                 </a:tc>
                 <a:extLst>
                   <a:ext uri="{0D108BD9-81ED-4DB2-BD59-A6C34878D82A}">
-                    <a16:rowId xmlns:a16="http://schemas.microsoft.com/office/drawing/2014/main" val="10006"/>
+                    <a16:rowId xmlns:a16="http://schemas.microsoft.com/office/drawing/2014/main" xmlns="" val="10006"/>
                   </a:ext>
                 </a:extLst>
               </a:tr>
@@ -18602,7 +19147,7 @@
                 <a:gridCol w="971998">
                   <a:extLst>
                     <a:ext uri="{9D8B030D-6E8A-4147-A177-3AD203B41FA5}">
-                      <a16:colId xmlns:a16="http://schemas.microsoft.com/office/drawing/2014/main" val="20000"/>
+                      <a16:colId xmlns:a16="http://schemas.microsoft.com/office/drawing/2014/main" xmlns="" val="20000"/>
                     </a:ext>
                   </a:extLst>
                 </a:gridCol>
@@ -18637,7 +19182,7 @@
                 </a:tc>
                 <a:extLst>
                   <a:ext uri="{0D108BD9-81ED-4DB2-BD59-A6C34878D82A}">
-                    <a16:rowId xmlns:a16="http://schemas.microsoft.com/office/drawing/2014/main" val="10000"/>
+                    <a16:rowId xmlns:a16="http://schemas.microsoft.com/office/drawing/2014/main" xmlns="" val="10000"/>
                   </a:ext>
                 </a:extLst>
               </a:tr>
@@ -18664,7 +19209,7 @@
                 </a:tc>
                 <a:extLst>
                   <a:ext uri="{0D108BD9-81ED-4DB2-BD59-A6C34878D82A}">
-                    <a16:rowId xmlns:a16="http://schemas.microsoft.com/office/drawing/2014/main" val="10001"/>
+                    <a16:rowId xmlns:a16="http://schemas.microsoft.com/office/drawing/2014/main" xmlns="" val="10001"/>
                   </a:ext>
                 </a:extLst>
               </a:tr>
@@ -18698,7 +19243,7 @@
                 </a:tc>
                 <a:extLst>
                   <a:ext uri="{0D108BD9-81ED-4DB2-BD59-A6C34878D82A}">
-                    <a16:rowId xmlns:a16="http://schemas.microsoft.com/office/drawing/2014/main" val="10002"/>
+                    <a16:rowId xmlns:a16="http://schemas.microsoft.com/office/drawing/2014/main" xmlns="" val="10002"/>
                   </a:ext>
                 </a:extLst>
               </a:tr>
@@ -18732,7 +19277,7 @@
                 </a:tc>
                 <a:extLst>
                   <a:ext uri="{0D108BD9-81ED-4DB2-BD59-A6C34878D82A}">
-                    <a16:rowId xmlns:a16="http://schemas.microsoft.com/office/drawing/2014/main" val="10003"/>
+                    <a16:rowId xmlns:a16="http://schemas.microsoft.com/office/drawing/2014/main" xmlns="" val="10003"/>
                   </a:ext>
                 </a:extLst>
               </a:tr>
@@ -18766,7 +19311,7 @@
                 </a:tc>
                 <a:extLst>
                   <a:ext uri="{0D108BD9-81ED-4DB2-BD59-A6C34878D82A}">
-                    <a16:rowId xmlns:a16="http://schemas.microsoft.com/office/drawing/2014/main" val="10004"/>
+                    <a16:rowId xmlns:a16="http://schemas.microsoft.com/office/drawing/2014/main" xmlns="" val="10004"/>
                   </a:ext>
                 </a:extLst>
               </a:tr>
@@ -18800,7 +19345,7 @@
                 </a:tc>
                 <a:extLst>
                   <a:ext uri="{0D108BD9-81ED-4DB2-BD59-A6C34878D82A}">
-                    <a16:rowId xmlns:a16="http://schemas.microsoft.com/office/drawing/2014/main" val="10005"/>
+                    <a16:rowId xmlns:a16="http://schemas.microsoft.com/office/drawing/2014/main" xmlns="" val="10005"/>
                   </a:ext>
                 </a:extLst>
               </a:tr>
@@ -18831,7 +19376,7 @@
                 </a:tc>
                 <a:extLst>
                   <a:ext uri="{0D108BD9-81ED-4DB2-BD59-A6C34878D82A}">
-                    <a16:rowId xmlns:a16="http://schemas.microsoft.com/office/drawing/2014/main" val="10006"/>
+                    <a16:rowId xmlns:a16="http://schemas.microsoft.com/office/drawing/2014/main" xmlns="" val="10006"/>
                   </a:ext>
                 </a:extLst>
               </a:tr>
@@ -18843,6 +19388,95 @@
     <p:extLst>
       <p:ext uri="{BB962C8B-B14F-4D97-AF65-F5344CB8AC3E}">
         <p14:creationId xmlns:p14="http://schemas.microsoft.com/office/powerpoint/2010/main" val="3031284384"/>
+      </p:ext>
+    </p:extLst>
+  </p:cSld>
+  <p:clrMapOvr>
+    <a:masterClrMapping/>
+  </p:clrMapOvr>
+</p:sld>
+</file>
+
+<file path=ppt/slides/slide20.xml><?xml version="1.0" encoding="utf-8"?>
+<p:sld xmlns:a="http://schemas.openxmlformats.org/drawingml/2006/main" xmlns:r="http://schemas.openxmlformats.org/officeDocument/2006/relationships" xmlns:p="http://schemas.openxmlformats.org/presentationml/2006/main">
+  <p:cSld>
+    <p:spTree>
+      <p:nvGrpSpPr>
+        <p:cNvPr id="1" name=""/>
+        <p:cNvGrpSpPr/>
+        <p:nvPr/>
+      </p:nvGrpSpPr>
+      <p:grpSpPr>
+        <a:xfrm>
+          <a:off x="0" y="0"/>
+          <a:ext cx="0" cy="0"/>
+          <a:chOff x="0" y="0"/>
+          <a:chExt cx="0" cy="0"/>
+        </a:xfrm>
+      </p:grpSpPr>
+      <p:pic>
+        <p:nvPicPr>
+          <p:cNvPr id="4" name="Grafik 3"/>
+          <p:cNvPicPr>
+            <a:picLocks noChangeAspect="1"/>
+          </p:cNvPicPr>
+          <p:nvPr/>
+        </p:nvPicPr>
+        <p:blipFill>
+          <a:blip r:embed="rId2" cstate="print">
+            <a:extLst>
+              <a:ext uri="{28A0092B-C50C-407E-A947-70E740481C1C}">
+                <a14:useLocalDpi xmlns:a14="http://schemas.microsoft.com/office/drawing/2010/main" val="0"/>
+              </a:ext>
+            </a:extLst>
+          </a:blip>
+          <a:stretch>
+            <a:fillRect/>
+          </a:stretch>
+        </p:blipFill>
+        <p:spPr>
+          <a:xfrm>
+            <a:off x="1856309" y="285750"/>
+            <a:ext cx="5431382" cy="5143500"/>
+          </a:xfrm>
+          <a:prstGeom prst="rect">
+            <a:avLst/>
+          </a:prstGeom>
+        </p:spPr>
+      </p:pic>
+      <p:sp>
+        <p:nvSpPr>
+          <p:cNvPr id="2" name="Textfeld 1"/>
+          <p:cNvSpPr txBox="1"/>
+          <p:nvPr/>
+        </p:nvSpPr>
+        <p:spPr>
+          <a:xfrm>
+            <a:off x="63165" y="330869"/>
+            <a:ext cx="1696453" cy="254365"/>
+          </a:xfrm>
+          <a:prstGeom prst="rect">
+            <a:avLst/>
+          </a:prstGeom>
+          <a:noFill/>
+        </p:spPr>
+        <p:txBody>
+          <a:bodyPr wrap="square" rtlCol="0">
+            <a:spAutoFit/>
+          </a:bodyPr>
+          <a:lstStyle/>
+          <a:p>
+            <a:r>
+              <a:rPr lang="en-US" sz="1053" dirty="0"/>
+              <a:t>Solution</a:t>
+            </a:r>
+          </a:p>
+        </p:txBody>
+      </p:sp>
+    </p:spTree>
+    <p:extLst>
+      <p:ext uri="{BB962C8B-B14F-4D97-AF65-F5344CB8AC3E}">
+        <p14:creationId xmlns:p14="http://schemas.microsoft.com/office/powerpoint/2010/main" val="1619922475"/>
       </p:ext>
     </p:extLst>
   </p:cSld>
@@ -18897,7 +19531,7 @@
                 <a:gridCol w="1872000">
                   <a:extLst>
                     <a:ext uri="{9D8B030D-6E8A-4147-A177-3AD203B41FA5}">
-                      <a16:colId xmlns:a16="http://schemas.microsoft.com/office/drawing/2014/main" val="20000"/>
+                      <a16:colId xmlns:a16="http://schemas.microsoft.com/office/drawing/2014/main" xmlns="" val="20000"/>
                     </a:ext>
                   </a:extLst>
                 </a:gridCol>
@@ -18922,7 +19556,7 @@
                 </a:tc>
                 <a:extLst>
                   <a:ext uri="{0D108BD9-81ED-4DB2-BD59-A6C34878D82A}">
-                    <a16:rowId xmlns:a16="http://schemas.microsoft.com/office/drawing/2014/main" val="10000"/>
+                    <a16:rowId xmlns:a16="http://schemas.microsoft.com/office/drawing/2014/main" xmlns="" val="10000"/>
                   </a:ext>
                 </a:extLst>
               </a:tr>
@@ -18955,7 +19589,7 @@
                 </a:tc>
                 <a:extLst>
                   <a:ext uri="{0D108BD9-81ED-4DB2-BD59-A6C34878D82A}">
-                    <a16:rowId xmlns:a16="http://schemas.microsoft.com/office/drawing/2014/main" val="10001"/>
+                    <a16:rowId xmlns:a16="http://schemas.microsoft.com/office/drawing/2014/main" xmlns="" val="10001"/>
                   </a:ext>
                 </a:extLst>
               </a:tr>
@@ -18991,7 +19625,7 @@
                 <a:gridCol w="1872000">
                   <a:extLst>
                     <a:ext uri="{9D8B030D-6E8A-4147-A177-3AD203B41FA5}">
-                      <a16:colId xmlns:a16="http://schemas.microsoft.com/office/drawing/2014/main" val="20000"/>
+                      <a16:colId xmlns:a16="http://schemas.microsoft.com/office/drawing/2014/main" xmlns="" val="20000"/>
                     </a:ext>
                   </a:extLst>
                 </a:gridCol>
@@ -19016,7 +19650,7 @@
                 </a:tc>
                 <a:extLst>
                   <a:ext uri="{0D108BD9-81ED-4DB2-BD59-A6C34878D82A}">
-                    <a16:rowId xmlns:a16="http://schemas.microsoft.com/office/drawing/2014/main" val="10000"/>
+                    <a16:rowId xmlns:a16="http://schemas.microsoft.com/office/drawing/2014/main" xmlns="" val="10000"/>
                   </a:ext>
                 </a:extLst>
               </a:tr>
@@ -19043,7 +19677,7 @@
                 </a:tc>
                 <a:extLst>
                   <a:ext uri="{0D108BD9-81ED-4DB2-BD59-A6C34878D82A}">
-                    <a16:rowId xmlns:a16="http://schemas.microsoft.com/office/drawing/2014/main" val="10001"/>
+                    <a16:rowId xmlns:a16="http://schemas.microsoft.com/office/drawing/2014/main" xmlns="" val="10001"/>
                   </a:ext>
                 </a:extLst>
               </a:tr>
@@ -19091,7 +19725,7 @@
                 </a:tc>
                 <a:extLst>
                   <a:ext uri="{0D108BD9-81ED-4DB2-BD59-A6C34878D82A}">
-                    <a16:rowId xmlns:a16="http://schemas.microsoft.com/office/drawing/2014/main" val="10002"/>
+                    <a16:rowId xmlns:a16="http://schemas.microsoft.com/office/drawing/2014/main" xmlns="" val="10002"/>
                   </a:ext>
                 </a:extLst>
               </a:tr>
@@ -19129,7 +19763,7 @@
                 </a:tc>
                 <a:extLst>
                   <a:ext uri="{0D108BD9-81ED-4DB2-BD59-A6C34878D82A}">
-                    <a16:rowId xmlns:a16="http://schemas.microsoft.com/office/drawing/2014/main" val="10003"/>
+                    <a16:rowId xmlns:a16="http://schemas.microsoft.com/office/drawing/2014/main" xmlns="" val="10003"/>
                   </a:ext>
                 </a:extLst>
               </a:tr>
@@ -19164,7 +19798,7 @@
                 </a:tc>
                 <a:extLst>
                   <a:ext uri="{0D108BD9-81ED-4DB2-BD59-A6C34878D82A}">
-                    <a16:rowId xmlns:a16="http://schemas.microsoft.com/office/drawing/2014/main" val="10004"/>
+                    <a16:rowId xmlns:a16="http://schemas.microsoft.com/office/drawing/2014/main" xmlns="" val="10004"/>
                   </a:ext>
                 </a:extLst>
               </a:tr>
@@ -19200,7 +19834,7 @@
                 <a:gridCol w="1594584">
                   <a:extLst>
                     <a:ext uri="{9D8B030D-6E8A-4147-A177-3AD203B41FA5}">
-                      <a16:colId xmlns:a16="http://schemas.microsoft.com/office/drawing/2014/main" val="20000"/>
+                      <a16:colId xmlns:a16="http://schemas.microsoft.com/office/drawing/2014/main" xmlns="" val="20000"/>
                     </a:ext>
                   </a:extLst>
                 </a:gridCol>
@@ -19225,7 +19859,7 @@
                 </a:tc>
                 <a:extLst>
                   <a:ext uri="{0D108BD9-81ED-4DB2-BD59-A6C34878D82A}">
-                    <a16:rowId xmlns:a16="http://schemas.microsoft.com/office/drawing/2014/main" val="10000"/>
+                    <a16:rowId xmlns:a16="http://schemas.microsoft.com/office/drawing/2014/main" xmlns="" val="10000"/>
                   </a:ext>
                 </a:extLst>
               </a:tr>
@@ -19252,7 +19886,7 @@
                 </a:tc>
                 <a:extLst>
                   <a:ext uri="{0D108BD9-81ED-4DB2-BD59-A6C34878D82A}">
-                    <a16:rowId xmlns:a16="http://schemas.microsoft.com/office/drawing/2014/main" val="10001"/>
+                    <a16:rowId xmlns:a16="http://schemas.microsoft.com/office/drawing/2014/main" xmlns="" val="10001"/>
                   </a:ext>
                 </a:extLst>
               </a:tr>
@@ -19304,7 +19938,7 @@
                 </a:tc>
                 <a:extLst>
                   <a:ext uri="{0D108BD9-81ED-4DB2-BD59-A6C34878D82A}">
-                    <a16:rowId xmlns:a16="http://schemas.microsoft.com/office/drawing/2014/main" val="10002"/>
+                    <a16:rowId xmlns:a16="http://schemas.microsoft.com/office/drawing/2014/main" xmlns="" val="10002"/>
                   </a:ext>
                 </a:extLst>
               </a:tr>
@@ -19335,7 +19969,7 @@
                 </a:tc>
                 <a:extLst>
                   <a:ext uri="{0D108BD9-81ED-4DB2-BD59-A6C34878D82A}">
-                    <a16:rowId xmlns:a16="http://schemas.microsoft.com/office/drawing/2014/main" val="10003"/>
+                    <a16:rowId xmlns:a16="http://schemas.microsoft.com/office/drawing/2014/main" xmlns="" val="10003"/>
                   </a:ext>
                 </a:extLst>
               </a:tr>
@@ -19371,7 +20005,7 @@
                 <a:gridCol w="1594584">
                   <a:extLst>
                     <a:ext uri="{9D8B030D-6E8A-4147-A177-3AD203B41FA5}">
-                      <a16:colId xmlns:a16="http://schemas.microsoft.com/office/drawing/2014/main" val="20000"/>
+                      <a16:colId xmlns:a16="http://schemas.microsoft.com/office/drawing/2014/main" xmlns="" val="20000"/>
                     </a:ext>
                   </a:extLst>
                 </a:gridCol>
@@ -19400,7 +20034,7 @@
                 </a:tc>
                 <a:extLst>
                   <a:ext uri="{0D108BD9-81ED-4DB2-BD59-A6C34878D82A}">
-                    <a16:rowId xmlns:a16="http://schemas.microsoft.com/office/drawing/2014/main" val="10000"/>
+                    <a16:rowId xmlns:a16="http://schemas.microsoft.com/office/drawing/2014/main" xmlns="" val="10000"/>
                   </a:ext>
                 </a:extLst>
               </a:tr>
@@ -19427,7 +20061,7 @@
                 </a:tc>
                 <a:extLst>
                   <a:ext uri="{0D108BD9-81ED-4DB2-BD59-A6C34878D82A}">
-                    <a16:rowId xmlns:a16="http://schemas.microsoft.com/office/drawing/2014/main" val="10001"/>
+                    <a16:rowId xmlns:a16="http://schemas.microsoft.com/office/drawing/2014/main" xmlns="" val="10001"/>
                   </a:ext>
                 </a:extLst>
               </a:tr>
@@ -19485,7 +20119,7 @@
                 </a:tc>
                 <a:extLst>
                   <a:ext uri="{0D108BD9-81ED-4DB2-BD59-A6C34878D82A}">
-                    <a16:rowId xmlns:a16="http://schemas.microsoft.com/office/drawing/2014/main" val="10002"/>
+                    <a16:rowId xmlns:a16="http://schemas.microsoft.com/office/drawing/2014/main" xmlns="" val="10002"/>
                   </a:ext>
                 </a:extLst>
               </a:tr>
@@ -19543,7 +20177,7 @@
                 </a:tc>
                 <a:extLst>
                   <a:ext uri="{0D108BD9-81ED-4DB2-BD59-A6C34878D82A}">
-                    <a16:rowId xmlns:a16="http://schemas.microsoft.com/office/drawing/2014/main" val="10003"/>
+                    <a16:rowId xmlns:a16="http://schemas.microsoft.com/office/drawing/2014/main" xmlns="" val="10003"/>
                   </a:ext>
                 </a:extLst>
               </a:tr>
@@ -19594,7 +20228,7 @@
                 </a:tc>
                 <a:extLst>
                   <a:ext uri="{0D108BD9-81ED-4DB2-BD59-A6C34878D82A}">
-                    <a16:rowId xmlns:a16="http://schemas.microsoft.com/office/drawing/2014/main" val="10004"/>
+                    <a16:rowId xmlns:a16="http://schemas.microsoft.com/office/drawing/2014/main" xmlns="" val="10004"/>
                   </a:ext>
                 </a:extLst>
               </a:tr>
@@ -19652,7 +20286,7 @@
                 </a:tc>
                 <a:extLst>
                   <a:ext uri="{0D108BD9-81ED-4DB2-BD59-A6C34878D82A}">
-                    <a16:rowId xmlns:a16="http://schemas.microsoft.com/office/drawing/2014/main" val="10005"/>
+                    <a16:rowId xmlns:a16="http://schemas.microsoft.com/office/drawing/2014/main" xmlns="" val="10005"/>
                   </a:ext>
                 </a:extLst>
               </a:tr>
@@ -19710,7 +20344,7 @@
                 </a:tc>
                 <a:extLst>
                   <a:ext uri="{0D108BD9-81ED-4DB2-BD59-A6C34878D82A}">
-                    <a16:rowId xmlns:a16="http://schemas.microsoft.com/office/drawing/2014/main" val="10006"/>
+                    <a16:rowId xmlns:a16="http://schemas.microsoft.com/office/drawing/2014/main" xmlns="" val="10006"/>
                   </a:ext>
                 </a:extLst>
               </a:tr>
@@ -19744,7 +20378,7 @@
                 </a:tc>
                 <a:extLst>
                   <a:ext uri="{0D108BD9-81ED-4DB2-BD59-A6C34878D82A}">
-                    <a16:rowId xmlns:a16="http://schemas.microsoft.com/office/drawing/2014/main" val="10007"/>
+                    <a16:rowId xmlns:a16="http://schemas.microsoft.com/office/drawing/2014/main" xmlns="" val="10007"/>
                   </a:ext>
                 </a:extLst>
               </a:tr>
@@ -19792,7 +20426,7 @@
                 </a:tc>
                 <a:extLst>
                   <a:ext uri="{0D108BD9-81ED-4DB2-BD59-A6C34878D82A}">
-                    <a16:rowId xmlns:a16="http://schemas.microsoft.com/office/drawing/2014/main" val="10008"/>
+                    <a16:rowId xmlns:a16="http://schemas.microsoft.com/office/drawing/2014/main" xmlns="" val="10008"/>
                   </a:ext>
                 </a:extLst>
               </a:tr>
@@ -19809,14 +20443,14 @@
           <p:nvPr>
             <p:extLst>
               <p:ext uri="{D42A27DB-BD31-4B8C-83A1-F6EECF244321}">
-                <p14:modId xmlns:p14="http://schemas.microsoft.com/office/powerpoint/2010/main" val="2867317389"/>
+                <p14:modId xmlns:p14="http://schemas.microsoft.com/office/powerpoint/2010/main" val="2343495862"/>
               </p:ext>
             </p:extLst>
           </p:nvPr>
         </p:nvGraphicFramePr>
         <p:xfrm>
-          <a:off x="902631" y="1672363"/>
-          <a:ext cx="1530117" cy="1620000"/>
+          <a:off x="902631" y="1911170"/>
+          <a:ext cx="1530117" cy="1260000"/>
         </p:xfrm>
         <a:graphic>
           <a:graphicData uri="http://schemas.openxmlformats.org/drawingml/2006/table">
@@ -19828,7 +20462,7 @@
                 <a:gridCol w="1530117">
                   <a:extLst>
                     <a:ext uri="{9D8B030D-6E8A-4147-A177-3AD203B41FA5}">
-                      <a16:colId xmlns:a16="http://schemas.microsoft.com/office/drawing/2014/main" val="20000"/>
+                      <a16:colId xmlns:a16="http://schemas.microsoft.com/office/drawing/2014/main" xmlns="" val="20000"/>
                     </a:ext>
                   </a:extLst>
                 </a:gridCol>
@@ -19857,34 +20491,7 @@
                 </a:tc>
                 <a:extLst>
                   <a:ext uri="{0D108BD9-81ED-4DB2-BD59-A6C34878D82A}">
-                    <a16:rowId xmlns:a16="http://schemas.microsoft.com/office/drawing/2014/main" val="10000"/>
-                  </a:ext>
-                </a:extLst>
-              </a:tr>
-              <a:tr h="180000">
-                <a:tc>
-                  <a:txBody>
-                    <a:bodyPr/>
-                    <a:lstStyle/>
-                    <a:p>
-                      <a:r>
-                        <a:rPr lang="en-US" sz="800" b="0" dirty="0">
-                          <a:latin typeface="Arial" panose="020B0604020202020204" pitchFamily="34" charset="0"/>
-                          <a:cs typeface="Arial" panose="020B0604020202020204" pitchFamily="34" charset="0"/>
-                        </a:rPr>
-                        <a:t>fixed_co2: Float</a:t>
-                      </a:r>
-                    </a:p>
-                  </a:txBody>
-                  <a:tcPr marR="0" marT="0" marB="0" anchor="ctr">
-                    <a:lnB w="12700" cmpd="sng">
-                      <a:noFill/>
-                    </a:lnB>
-                  </a:tcPr>
-                </a:tc>
-                <a:extLst>
-                  <a:ext uri="{0D108BD9-81ED-4DB2-BD59-A6C34878D82A}">
-                    <a16:rowId xmlns:a16="http://schemas.microsoft.com/office/drawing/2014/main" val="10001"/>
+                    <a16:rowId xmlns:a16="http://schemas.microsoft.com/office/drawing/2014/main" xmlns="" val="10000"/>
                   </a:ext>
                 </a:extLst>
               </a:tr>
@@ -19912,29 +20519,22 @@
                         <a:defRPr/>
                       </a:pPr>
                       <a:r>
-                        <a:rPr lang="en-US" sz="800" b="0" dirty="0" err="1">
+                        <a:rPr lang="en-US" sz="800" b="0" dirty="0" smtClean="0">
                           <a:latin typeface="Arial" panose="020B0604020202020204" pitchFamily="34" charset="0"/>
                           <a:cs typeface="Arial" panose="020B0604020202020204" pitchFamily="34" charset="0"/>
                         </a:rPr>
-                        <a:t>fixed_price</a:t>
+                        <a:t>price: </a:t>
                       </a:r>
                       <a:r>
                         <a:rPr lang="en-US" sz="800" b="0" dirty="0">
                           <a:latin typeface="Arial" panose="020B0604020202020204" pitchFamily="34" charset="0"/>
                           <a:cs typeface="Arial" panose="020B0604020202020204" pitchFamily="34" charset="0"/>
                         </a:rPr>
-                        <a:t>: Float</a:t>
+                        <a:t>Float</a:t>
                       </a:r>
                     </a:p>
                   </a:txBody>
                   <a:tcPr marR="0" marT="0" marB="0" anchor="ctr">
-                    <a:lnT w="12700" cap="flat" cmpd="sng" algn="ctr">
-                      <a:noFill/>
-                      <a:prstDash val="solid"/>
-                      <a:round/>
-                      <a:headEnd type="none" w="med" len="med"/>
-                      <a:tailEnd type="none" w="med" len="med"/>
-                    </a:lnT>
                     <a:lnB w="12700" cmpd="sng">
                       <a:noFill/>
                     </a:lnB>
@@ -19942,7 +20542,7 @@
                 </a:tc>
                 <a:extLst>
                   <a:ext uri="{0D108BD9-81ED-4DB2-BD59-A6C34878D82A}">
-                    <a16:rowId xmlns:a16="http://schemas.microsoft.com/office/drawing/2014/main" val="10002"/>
+                    <a16:rowId xmlns:a16="http://schemas.microsoft.com/office/drawing/2014/main" xmlns="" val="10002"/>
                   </a:ext>
                 </a:extLst>
               </a:tr>
@@ -19970,19 +20570,16 @@
                         <a:defRPr/>
                       </a:pPr>
                       <a:r>
-                        <a:rPr lang="en-US" sz="800" b="0" dirty="0" err="1">
+                        <a:rPr lang="en-US" sz="800" b="0" dirty="0" smtClean="0">
                           <a:latin typeface="Arial" panose="020B0604020202020204" pitchFamily="34" charset="0"/>
                           <a:cs typeface="Arial" panose="020B0604020202020204" pitchFamily="34" charset="0"/>
                         </a:rPr>
-                        <a:t>fixed_quantity</a:t>
+                        <a:t>co2: Float</a:t>
                       </a:r>
-                      <a:r>
-                        <a:rPr lang="en-US" sz="800" b="0" dirty="0">
-                          <a:latin typeface="Arial" panose="020B0604020202020204" pitchFamily="34" charset="0"/>
-                          <a:cs typeface="Arial" panose="020B0604020202020204" pitchFamily="34" charset="0"/>
-                        </a:rPr>
-                        <a:t>: Float</a:t>
-                      </a:r>
+                      <a:endParaRPr lang="en-US" sz="800" b="0" dirty="0">
+                        <a:latin typeface="Arial" panose="020B0604020202020204" pitchFamily="34" charset="0"/>
+                        <a:cs typeface="Arial" panose="020B0604020202020204" pitchFamily="34" charset="0"/>
+                      </a:endParaRPr>
                     </a:p>
                   </a:txBody>
                   <a:tcPr marR="0" marT="0" marB="0" anchor="ctr">
@@ -20000,7 +20597,7 @@
                 </a:tc>
                 <a:extLst>
                   <a:ext uri="{0D108BD9-81ED-4DB2-BD59-A6C34878D82A}">
-                    <a16:rowId xmlns:a16="http://schemas.microsoft.com/office/drawing/2014/main" val="10003"/>
+                    <a16:rowId xmlns:a16="http://schemas.microsoft.com/office/drawing/2014/main" xmlns="" val="10003"/>
                   </a:ext>
                 </a:extLst>
               </a:tr>
@@ -20028,12 +20625,23 @@
                         <a:defRPr/>
                       </a:pPr>
                       <a:r>
-                        <a:rPr lang="en-US" sz="800" b="0" dirty="0">
+                        <a:rPr lang="en-US" sz="800" b="0" dirty="0" err="1" smtClean="0">
                           <a:latin typeface="Arial" panose="020B0604020202020204" pitchFamily="34" charset="0"/>
                           <a:cs typeface="Arial" panose="020B0604020202020204" pitchFamily="34" charset="0"/>
                         </a:rPr>
-                        <a:t>variable_co2: Float</a:t>
+                        <a:t>fixed_quantity</a:t>
                       </a:r>
+                      <a:r>
+                        <a:rPr lang="en-US" sz="800" b="0" dirty="0" smtClean="0">
+                          <a:latin typeface="Arial" panose="020B0604020202020204" pitchFamily="34" charset="0"/>
+                          <a:cs typeface="Arial" panose="020B0604020202020204" pitchFamily="34" charset="0"/>
+                        </a:rPr>
+                        <a:t>: Float</a:t>
+                      </a:r>
+                      <a:endParaRPr lang="en-US" sz="800" b="0" dirty="0">
+                        <a:latin typeface="Arial" panose="020B0604020202020204" pitchFamily="34" charset="0"/>
+                        <a:cs typeface="Arial" panose="020B0604020202020204" pitchFamily="34" charset="0"/>
+                      </a:endParaRPr>
                     </a:p>
                   </a:txBody>
                   <a:tcPr marR="0" marT="0" marB="0" anchor="ctr">
@@ -20051,65 +20659,7 @@
                 </a:tc>
                 <a:extLst>
                   <a:ext uri="{0D108BD9-81ED-4DB2-BD59-A6C34878D82A}">
-                    <a16:rowId xmlns:a16="http://schemas.microsoft.com/office/drawing/2014/main" val="10004"/>
-                  </a:ext>
-                </a:extLst>
-              </a:tr>
-              <a:tr h="180000">
-                <a:tc>
-                  <a:txBody>
-                    <a:bodyPr/>
-                    <a:lstStyle/>
-                    <a:p>
-                      <a:pPr marL="0" marR="0" lvl="0" indent="0" algn="l" defTabSz="685800" rtl="0" eaLnBrk="1" fontAlgn="auto" latinLnBrk="0" hangingPunct="1">
-                        <a:lnSpc>
-                          <a:spcPct val="100000"/>
-                        </a:lnSpc>
-                        <a:spcBef>
-                          <a:spcPts val="0"/>
-                        </a:spcBef>
-                        <a:spcAft>
-                          <a:spcPts val="0"/>
-                        </a:spcAft>
-                        <a:buClrTx/>
-                        <a:buSzTx/>
-                        <a:buFontTx/>
-                        <a:buNone/>
-                        <a:tabLst/>
-                        <a:defRPr/>
-                      </a:pPr>
-                      <a:r>
-                        <a:rPr lang="en-US" sz="800" b="0" dirty="0" err="1">
-                          <a:latin typeface="Arial" panose="020B0604020202020204" pitchFamily="34" charset="0"/>
-                          <a:cs typeface="Arial" panose="020B0604020202020204" pitchFamily="34" charset="0"/>
-                        </a:rPr>
-                        <a:t>variable_price</a:t>
-                      </a:r>
-                      <a:r>
-                        <a:rPr lang="en-US" sz="800" b="0" dirty="0">
-                          <a:latin typeface="Arial" panose="020B0604020202020204" pitchFamily="34" charset="0"/>
-                          <a:cs typeface="Arial" panose="020B0604020202020204" pitchFamily="34" charset="0"/>
-                        </a:rPr>
-                        <a:t>: Float</a:t>
-                      </a:r>
-                    </a:p>
-                  </a:txBody>
-                  <a:tcPr marR="0" marT="0" marB="0" anchor="ctr">
-                    <a:lnT w="12700" cap="flat" cmpd="sng" algn="ctr">
-                      <a:noFill/>
-                      <a:prstDash val="solid"/>
-                      <a:round/>
-                      <a:headEnd type="none" w="med" len="med"/>
-                      <a:tailEnd type="none" w="med" len="med"/>
-                    </a:lnT>
-                    <a:lnB w="12700" cmpd="sng">
-                      <a:noFill/>
-                    </a:lnB>
-                  </a:tcPr>
-                </a:tc>
-                <a:extLst>
-                  <a:ext uri="{0D108BD9-81ED-4DB2-BD59-A6C34878D82A}">
-                    <a16:rowId xmlns:a16="http://schemas.microsoft.com/office/drawing/2014/main" val="10005"/>
+                    <a16:rowId xmlns:a16="http://schemas.microsoft.com/office/drawing/2014/main" xmlns="" val="10004"/>
                   </a:ext>
                 </a:extLst>
               </a:tr>
@@ -20167,7 +20717,7 @@
                 </a:tc>
                 <a:extLst>
                   <a:ext uri="{0D108BD9-81ED-4DB2-BD59-A6C34878D82A}">
-                    <a16:rowId xmlns:a16="http://schemas.microsoft.com/office/drawing/2014/main" val="10006"/>
+                    <a16:rowId xmlns:a16="http://schemas.microsoft.com/office/drawing/2014/main" xmlns="" val="10006"/>
                   </a:ext>
                 </a:extLst>
               </a:tr>
@@ -20201,7 +20751,7 @@
                 </a:tc>
                 <a:extLst>
                   <a:ext uri="{0D108BD9-81ED-4DB2-BD59-A6C34878D82A}">
-                    <a16:rowId xmlns:a16="http://schemas.microsoft.com/office/drawing/2014/main" val="10007"/>
+                    <a16:rowId xmlns:a16="http://schemas.microsoft.com/office/drawing/2014/main" xmlns="" val="10007"/>
                   </a:ext>
                 </a:extLst>
               </a:tr>
@@ -20267,7 +20817,7 @@
                 </a:tc>
                 <a:extLst>
                   <a:ext uri="{0D108BD9-81ED-4DB2-BD59-A6C34878D82A}">
-                    <a16:rowId xmlns:a16="http://schemas.microsoft.com/office/drawing/2014/main" val="10008"/>
+                    <a16:rowId xmlns:a16="http://schemas.microsoft.com/office/drawing/2014/main" xmlns="" val="10008"/>
                   </a:ext>
                 </a:extLst>
               </a:tr>
@@ -20303,7 +20853,7 @@
                 <a:gridCol w="1530116">
                   <a:extLst>
                     <a:ext uri="{9D8B030D-6E8A-4147-A177-3AD203B41FA5}">
-                      <a16:colId xmlns:a16="http://schemas.microsoft.com/office/drawing/2014/main" val="20000"/>
+                      <a16:colId xmlns:a16="http://schemas.microsoft.com/office/drawing/2014/main" xmlns="" val="20000"/>
                     </a:ext>
                   </a:extLst>
                 </a:gridCol>
@@ -20328,7 +20878,7 @@
                 </a:tc>
                 <a:extLst>
                   <a:ext uri="{0D108BD9-81ED-4DB2-BD59-A6C34878D82A}">
-                    <a16:rowId xmlns:a16="http://schemas.microsoft.com/office/drawing/2014/main" val="10000"/>
+                    <a16:rowId xmlns:a16="http://schemas.microsoft.com/office/drawing/2014/main" xmlns="" val="10000"/>
                   </a:ext>
                 </a:extLst>
               </a:tr>
@@ -20355,7 +20905,7 @@
                 </a:tc>
                 <a:extLst>
                   <a:ext uri="{0D108BD9-81ED-4DB2-BD59-A6C34878D82A}">
-                    <a16:rowId xmlns:a16="http://schemas.microsoft.com/office/drawing/2014/main" val="10001"/>
+                    <a16:rowId xmlns:a16="http://schemas.microsoft.com/office/drawing/2014/main" xmlns="" val="10001"/>
                   </a:ext>
                 </a:extLst>
               </a:tr>
@@ -20390,7 +20940,7 @@
                 </a:tc>
                 <a:extLst>
                   <a:ext uri="{0D108BD9-81ED-4DB2-BD59-A6C34878D82A}">
-                    <a16:rowId xmlns:a16="http://schemas.microsoft.com/office/drawing/2014/main" val="10002"/>
+                    <a16:rowId xmlns:a16="http://schemas.microsoft.com/office/drawing/2014/main" xmlns="" val="10002"/>
                   </a:ext>
                 </a:extLst>
               </a:tr>
@@ -20426,7 +20976,7 @@
                 <a:gridCol w="1605997">
                   <a:extLst>
                     <a:ext uri="{9D8B030D-6E8A-4147-A177-3AD203B41FA5}">
-                      <a16:colId xmlns:a16="http://schemas.microsoft.com/office/drawing/2014/main" val="20000"/>
+                      <a16:colId xmlns:a16="http://schemas.microsoft.com/office/drawing/2014/main" xmlns="" val="20000"/>
                     </a:ext>
                   </a:extLst>
                 </a:gridCol>
@@ -20451,7 +21001,7 @@
                 </a:tc>
                 <a:extLst>
                   <a:ext uri="{0D108BD9-81ED-4DB2-BD59-A6C34878D82A}">
-                    <a16:rowId xmlns:a16="http://schemas.microsoft.com/office/drawing/2014/main" val="10000"/>
+                    <a16:rowId xmlns:a16="http://schemas.microsoft.com/office/drawing/2014/main" xmlns="" val="10000"/>
                   </a:ext>
                 </a:extLst>
               </a:tr>
@@ -20478,7 +21028,7 @@
                 </a:tc>
                 <a:extLst>
                   <a:ext uri="{0D108BD9-81ED-4DB2-BD59-A6C34878D82A}">
-                    <a16:rowId xmlns:a16="http://schemas.microsoft.com/office/drawing/2014/main" val="10001"/>
+                    <a16:rowId xmlns:a16="http://schemas.microsoft.com/office/drawing/2014/main" xmlns="" val="10001"/>
                   </a:ext>
                 </a:extLst>
               </a:tr>
@@ -20527,7 +21077,7 @@
                 </a:tc>
                 <a:extLst>
                   <a:ext uri="{0D108BD9-81ED-4DB2-BD59-A6C34878D82A}">
-                    <a16:rowId xmlns:a16="http://schemas.microsoft.com/office/drawing/2014/main" val="10002"/>
+                    <a16:rowId xmlns:a16="http://schemas.microsoft.com/office/drawing/2014/main" xmlns="" val="10002"/>
                   </a:ext>
                 </a:extLst>
               </a:tr>
@@ -20563,7 +21113,7 @@
                 <a:gridCol w="1602386">
                   <a:extLst>
                     <a:ext uri="{9D8B030D-6E8A-4147-A177-3AD203B41FA5}">
-                      <a16:colId xmlns:a16="http://schemas.microsoft.com/office/drawing/2014/main" val="20000"/>
+                      <a16:colId xmlns:a16="http://schemas.microsoft.com/office/drawing/2014/main" xmlns="" val="20000"/>
                     </a:ext>
                   </a:extLst>
                 </a:gridCol>
@@ -20592,7 +21142,7 @@
                 </a:tc>
                 <a:extLst>
                   <a:ext uri="{0D108BD9-81ED-4DB2-BD59-A6C34878D82A}">
-                    <a16:rowId xmlns:a16="http://schemas.microsoft.com/office/drawing/2014/main" val="10000"/>
+                    <a16:rowId xmlns:a16="http://schemas.microsoft.com/office/drawing/2014/main" xmlns="" val="10000"/>
                   </a:ext>
                 </a:extLst>
               </a:tr>
@@ -20643,7 +21193,7 @@
                 </a:tc>
                 <a:extLst>
                   <a:ext uri="{0D108BD9-81ED-4DB2-BD59-A6C34878D82A}">
-                    <a16:rowId xmlns:a16="http://schemas.microsoft.com/office/drawing/2014/main" val="10001"/>
+                    <a16:rowId xmlns:a16="http://schemas.microsoft.com/office/drawing/2014/main" xmlns="" val="10001"/>
                   </a:ext>
                 </a:extLst>
               </a:tr>
@@ -20695,7 +21245,7 @@
                 </a:tc>
                 <a:extLst>
                   <a:ext uri="{0D108BD9-81ED-4DB2-BD59-A6C34878D82A}">
-                    <a16:rowId xmlns:a16="http://schemas.microsoft.com/office/drawing/2014/main" val="10002"/>
+                    <a16:rowId xmlns:a16="http://schemas.microsoft.com/office/drawing/2014/main" xmlns="" val="10002"/>
                   </a:ext>
                 </a:extLst>
               </a:tr>
@@ -20731,7 +21281,7 @@
                 <a:gridCol w="1595078">
                   <a:extLst>
                     <a:ext uri="{9D8B030D-6E8A-4147-A177-3AD203B41FA5}">
-                      <a16:colId xmlns:a16="http://schemas.microsoft.com/office/drawing/2014/main" val="20000"/>
+                      <a16:colId xmlns:a16="http://schemas.microsoft.com/office/drawing/2014/main" xmlns="" val="20000"/>
                     </a:ext>
                   </a:extLst>
                 </a:gridCol>
@@ -20756,7 +21306,7 @@
                 </a:tc>
                 <a:extLst>
                   <a:ext uri="{0D108BD9-81ED-4DB2-BD59-A6C34878D82A}">
-                    <a16:rowId xmlns:a16="http://schemas.microsoft.com/office/drawing/2014/main" val="10000"/>
+                    <a16:rowId xmlns:a16="http://schemas.microsoft.com/office/drawing/2014/main" xmlns="" val="10000"/>
                   </a:ext>
                 </a:extLst>
               </a:tr>
@@ -20789,7 +21339,7 @@
                 </a:tc>
                 <a:extLst>
                   <a:ext uri="{0D108BD9-81ED-4DB2-BD59-A6C34878D82A}">
-                    <a16:rowId xmlns:a16="http://schemas.microsoft.com/office/drawing/2014/main" val="10001"/>
+                    <a16:rowId xmlns:a16="http://schemas.microsoft.com/office/drawing/2014/main" xmlns="" val="10001"/>
                   </a:ext>
                 </a:extLst>
               </a:tr>
@@ -20825,7 +21375,7 @@
                 <a:gridCol w="1611262">
                   <a:extLst>
                     <a:ext uri="{9D8B030D-6E8A-4147-A177-3AD203B41FA5}">
-                      <a16:colId xmlns:a16="http://schemas.microsoft.com/office/drawing/2014/main" val="20000"/>
+                      <a16:colId xmlns:a16="http://schemas.microsoft.com/office/drawing/2014/main" xmlns="" val="20000"/>
                     </a:ext>
                   </a:extLst>
                 </a:gridCol>
@@ -20850,7 +21400,7 @@
                 </a:tc>
                 <a:extLst>
                   <a:ext uri="{0D108BD9-81ED-4DB2-BD59-A6C34878D82A}">
-                    <a16:rowId xmlns:a16="http://schemas.microsoft.com/office/drawing/2014/main" val="10000"/>
+                    <a16:rowId xmlns:a16="http://schemas.microsoft.com/office/drawing/2014/main" xmlns="" val="10000"/>
                   </a:ext>
                 </a:extLst>
               </a:tr>
@@ -20894,7 +21444,7 @@
                 </a:tc>
                 <a:extLst>
                   <a:ext uri="{0D108BD9-81ED-4DB2-BD59-A6C34878D82A}">
-                    <a16:rowId xmlns:a16="http://schemas.microsoft.com/office/drawing/2014/main" val="10001"/>
+                    <a16:rowId xmlns:a16="http://schemas.microsoft.com/office/drawing/2014/main" xmlns="" val="10001"/>
                   </a:ext>
                 </a:extLst>
               </a:tr>
@@ -20934,7 +21484,7 @@
                 </a:tc>
                 <a:extLst>
                   <a:ext uri="{0D108BD9-81ED-4DB2-BD59-A6C34878D82A}">
-                    <a16:rowId xmlns:a16="http://schemas.microsoft.com/office/drawing/2014/main" val="10002"/>
+                    <a16:rowId xmlns:a16="http://schemas.microsoft.com/office/drawing/2014/main" xmlns="" val="10002"/>
                   </a:ext>
                 </a:extLst>
               </a:tr>
@@ -20970,7 +21520,7 @@
                 <a:gridCol w="1872000">
                   <a:extLst>
                     <a:ext uri="{9D8B030D-6E8A-4147-A177-3AD203B41FA5}">
-                      <a16:colId xmlns:a16="http://schemas.microsoft.com/office/drawing/2014/main" val="20000"/>
+                      <a16:colId xmlns:a16="http://schemas.microsoft.com/office/drawing/2014/main" xmlns="" val="20000"/>
                     </a:ext>
                   </a:extLst>
                 </a:gridCol>
@@ -20995,7 +21545,7 @@
                 </a:tc>
                 <a:extLst>
                   <a:ext uri="{0D108BD9-81ED-4DB2-BD59-A6C34878D82A}">
-                    <a16:rowId xmlns:a16="http://schemas.microsoft.com/office/drawing/2014/main" val="10000"/>
+                    <a16:rowId xmlns:a16="http://schemas.microsoft.com/office/drawing/2014/main" xmlns="" val="10000"/>
                   </a:ext>
                 </a:extLst>
               </a:tr>
@@ -21022,7 +21572,7 @@
                 </a:tc>
                 <a:extLst>
                   <a:ext uri="{0D108BD9-81ED-4DB2-BD59-A6C34878D82A}">
-                    <a16:rowId xmlns:a16="http://schemas.microsoft.com/office/drawing/2014/main" val="10001"/>
+                    <a16:rowId xmlns:a16="http://schemas.microsoft.com/office/drawing/2014/main" xmlns="" val="10001"/>
                   </a:ext>
                 </a:extLst>
               </a:tr>
@@ -21073,7 +21623,7 @@
                 </a:tc>
                 <a:extLst>
                   <a:ext uri="{0D108BD9-81ED-4DB2-BD59-A6C34878D82A}">
-                    <a16:rowId xmlns:a16="http://schemas.microsoft.com/office/drawing/2014/main" val="10002"/>
+                    <a16:rowId xmlns:a16="http://schemas.microsoft.com/office/drawing/2014/main" xmlns="" val="10002"/>
                   </a:ext>
                 </a:extLst>
               </a:tr>
@@ -21135,7 +21685,7 @@
                 </a:tc>
                 <a:extLst>
                   <a:ext uri="{0D108BD9-81ED-4DB2-BD59-A6C34878D82A}">
-                    <a16:rowId xmlns:a16="http://schemas.microsoft.com/office/drawing/2014/main" val="10003"/>
+                    <a16:rowId xmlns:a16="http://schemas.microsoft.com/office/drawing/2014/main" xmlns="" val="10003"/>
                   </a:ext>
                 </a:extLst>
               </a:tr>
@@ -21204,7 +21754,7 @@
                 </a:tc>
                 <a:extLst>
                   <a:ext uri="{0D108BD9-81ED-4DB2-BD59-A6C34878D82A}">
-                    <a16:rowId xmlns:a16="http://schemas.microsoft.com/office/drawing/2014/main" val="10004"/>
+                    <a16:rowId xmlns:a16="http://schemas.microsoft.com/office/drawing/2014/main" xmlns="" val="10004"/>
                   </a:ext>
                 </a:extLst>
               </a:tr>
@@ -21252,7 +21802,7 @@
                 </a:tc>
                 <a:extLst>
                   <a:ext uri="{0D108BD9-81ED-4DB2-BD59-A6C34878D82A}">
-                    <a16:rowId xmlns:a16="http://schemas.microsoft.com/office/drawing/2014/main" val="10005"/>
+                    <a16:rowId xmlns:a16="http://schemas.microsoft.com/office/drawing/2014/main" xmlns="" val="10005"/>
                   </a:ext>
                 </a:extLst>
               </a:tr>
@@ -21288,7 +21838,7 @@
                 <a:gridCol w="2052000">
                   <a:extLst>
                     <a:ext uri="{9D8B030D-6E8A-4147-A177-3AD203B41FA5}">
-                      <a16:colId xmlns:a16="http://schemas.microsoft.com/office/drawing/2014/main" val="20000"/>
+                      <a16:colId xmlns:a16="http://schemas.microsoft.com/office/drawing/2014/main" xmlns="" val="20000"/>
                     </a:ext>
                   </a:extLst>
                 </a:gridCol>
@@ -21317,7 +21867,7 @@
                 </a:tc>
                 <a:extLst>
                   <a:ext uri="{0D108BD9-81ED-4DB2-BD59-A6C34878D82A}">
-                    <a16:rowId xmlns:a16="http://schemas.microsoft.com/office/drawing/2014/main" val="10000"/>
+                    <a16:rowId xmlns:a16="http://schemas.microsoft.com/office/drawing/2014/main" xmlns="" val="10000"/>
                   </a:ext>
                 </a:extLst>
               </a:tr>
@@ -21372,7 +21922,7 @@
                 </a:tc>
                 <a:extLst>
                   <a:ext uri="{0D108BD9-81ED-4DB2-BD59-A6C34878D82A}">
-                    <a16:rowId xmlns:a16="http://schemas.microsoft.com/office/drawing/2014/main" val="10001"/>
+                    <a16:rowId xmlns:a16="http://schemas.microsoft.com/office/drawing/2014/main" xmlns="" val="10001"/>
                   </a:ext>
                 </a:extLst>
               </a:tr>
@@ -21430,7 +21980,7 @@
                 </a:tc>
                 <a:extLst>
                   <a:ext uri="{0D108BD9-81ED-4DB2-BD59-A6C34878D82A}">
-                    <a16:rowId xmlns:a16="http://schemas.microsoft.com/office/drawing/2014/main" val="10002"/>
+                    <a16:rowId xmlns:a16="http://schemas.microsoft.com/office/drawing/2014/main" xmlns="" val="10002"/>
                   </a:ext>
                 </a:extLst>
               </a:tr>
@@ -21488,7 +22038,7 @@
                 </a:tc>
                 <a:extLst>
                   <a:ext uri="{0D108BD9-81ED-4DB2-BD59-A6C34878D82A}">
-                    <a16:rowId xmlns:a16="http://schemas.microsoft.com/office/drawing/2014/main" val="10003"/>
+                    <a16:rowId xmlns:a16="http://schemas.microsoft.com/office/drawing/2014/main" xmlns="" val="10003"/>
                   </a:ext>
                 </a:extLst>
               </a:tr>
@@ -21539,7 +22089,7 @@
                 </a:tc>
                 <a:extLst>
                   <a:ext uri="{0D108BD9-81ED-4DB2-BD59-A6C34878D82A}">
-                    <a16:rowId xmlns:a16="http://schemas.microsoft.com/office/drawing/2014/main" val="10004"/>
+                    <a16:rowId xmlns:a16="http://schemas.microsoft.com/office/drawing/2014/main" xmlns="" val="10004"/>
                   </a:ext>
                 </a:extLst>
               </a:tr>
@@ -21621,7 +22171,7 @@
                 </a:tc>
                 <a:extLst>
                   <a:ext uri="{0D108BD9-81ED-4DB2-BD59-A6C34878D82A}">
-                    <a16:rowId xmlns:a16="http://schemas.microsoft.com/office/drawing/2014/main" val="10005"/>
+                    <a16:rowId xmlns:a16="http://schemas.microsoft.com/office/drawing/2014/main" xmlns="" val="10005"/>
                   </a:ext>
                 </a:extLst>
               </a:tr>
@@ -21960,8 +22510,8 @@
         </p:nvCxnSpPr>
         <p:spPr>
           <a:xfrm flipV="1">
-            <a:off x="1667689" y="3409796"/>
-            <a:ext cx="1545" cy="433010"/>
+            <a:off x="1667689" y="3291348"/>
+            <a:ext cx="1545" cy="551458"/>
           </a:xfrm>
           <a:prstGeom prst="line">
             <a:avLst/>
@@ -22578,7 +23128,7 @@
         </p:nvSpPr>
         <p:spPr>
           <a:xfrm>
-            <a:off x="1462956" y="3304711"/>
+            <a:off x="1462956" y="3179046"/>
             <a:ext cx="155492" cy="123111"/>
           </a:xfrm>
           <a:prstGeom prst="rect">
@@ -23308,7 +23858,7 @@
         </p:nvSpPr>
         <p:spPr>
           <a:xfrm rot="16200000">
-            <a:off x="1615234" y="3319796"/>
+            <a:off x="1615234" y="3201348"/>
             <a:ext cx="108000" cy="72000"/>
           </a:xfrm>
           <a:prstGeom prst="diamond">
@@ -23408,7 +23958,7 @@
                 <a:gridCol w="971998">
                   <a:extLst>
                     <a:ext uri="{9D8B030D-6E8A-4147-A177-3AD203B41FA5}">
-                      <a16:colId xmlns:a16="http://schemas.microsoft.com/office/drawing/2014/main" val="20000"/>
+                      <a16:colId xmlns:a16="http://schemas.microsoft.com/office/drawing/2014/main" xmlns="" val="20000"/>
                     </a:ext>
                   </a:extLst>
                 </a:gridCol>
@@ -23443,7 +23993,7 @@
                 </a:tc>
                 <a:extLst>
                   <a:ext uri="{0D108BD9-81ED-4DB2-BD59-A6C34878D82A}">
-                    <a16:rowId xmlns:a16="http://schemas.microsoft.com/office/drawing/2014/main" val="10000"/>
+                    <a16:rowId xmlns:a16="http://schemas.microsoft.com/office/drawing/2014/main" xmlns="" val="10000"/>
                   </a:ext>
                 </a:extLst>
               </a:tr>
@@ -23470,7 +24020,7 @@
                 </a:tc>
                 <a:extLst>
                   <a:ext uri="{0D108BD9-81ED-4DB2-BD59-A6C34878D82A}">
-                    <a16:rowId xmlns:a16="http://schemas.microsoft.com/office/drawing/2014/main" val="10001"/>
+                    <a16:rowId xmlns:a16="http://schemas.microsoft.com/office/drawing/2014/main" xmlns="" val="10001"/>
                   </a:ext>
                 </a:extLst>
               </a:tr>
@@ -23504,7 +24054,7 @@
                 </a:tc>
                 <a:extLst>
                   <a:ext uri="{0D108BD9-81ED-4DB2-BD59-A6C34878D82A}">
-                    <a16:rowId xmlns:a16="http://schemas.microsoft.com/office/drawing/2014/main" val="10002"/>
+                    <a16:rowId xmlns:a16="http://schemas.microsoft.com/office/drawing/2014/main" xmlns="" val="10002"/>
                   </a:ext>
                 </a:extLst>
               </a:tr>
@@ -23538,7 +24088,7 @@
                 </a:tc>
                 <a:extLst>
                   <a:ext uri="{0D108BD9-81ED-4DB2-BD59-A6C34878D82A}">
-                    <a16:rowId xmlns:a16="http://schemas.microsoft.com/office/drawing/2014/main" val="10003"/>
+                    <a16:rowId xmlns:a16="http://schemas.microsoft.com/office/drawing/2014/main" xmlns="" val="10003"/>
                   </a:ext>
                 </a:extLst>
               </a:tr>
@@ -23572,7 +24122,7 @@
                 </a:tc>
                 <a:extLst>
                   <a:ext uri="{0D108BD9-81ED-4DB2-BD59-A6C34878D82A}">
-                    <a16:rowId xmlns:a16="http://schemas.microsoft.com/office/drawing/2014/main" val="10004"/>
+                    <a16:rowId xmlns:a16="http://schemas.microsoft.com/office/drawing/2014/main" xmlns="" val="10004"/>
                   </a:ext>
                 </a:extLst>
               </a:tr>
@@ -23606,7 +24156,7 @@
                 </a:tc>
                 <a:extLst>
                   <a:ext uri="{0D108BD9-81ED-4DB2-BD59-A6C34878D82A}">
-                    <a16:rowId xmlns:a16="http://schemas.microsoft.com/office/drawing/2014/main" val="10005"/>
+                    <a16:rowId xmlns:a16="http://schemas.microsoft.com/office/drawing/2014/main" xmlns="" val="10005"/>
                   </a:ext>
                 </a:extLst>
               </a:tr>
@@ -23637,7 +24187,7 @@
                 </a:tc>
                 <a:extLst>
                   <a:ext uri="{0D108BD9-81ED-4DB2-BD59-A6C34878D82A}">
-                    <a16:rowId xmlns:a16="http://schemas.microsoft.com/office/drawing/2014/main" val="10006"/>
+                    <a16:rowId xmlns:a16="http://schemas.microsoft.com/office/drawing/2014/main" xmlns="" val="10006"/>
                   </a:ext>
                 </a:extLst>
               </a:tr>
@@ -23673,7 +24223,7 @@
                 <a:gridCol w="972000">
                   <a:extLst>
                     <a:ext uri="{9D8B030D-6E8A-4147-A177-3AD203B41FA5}">
-                      <a16:colId xmlns:a16="http://schemas.microsoft.com/office/drawing/2014/main" val="20000"/>
+                      <a16:colId xmlns:a16="http://schemas.microsoft.com/office/drawing/2014/main" xmlns="" val="20000"/>
                     </a:ext>
                   </a:extLst>
                 </a:gridCol>
@@ -23715,7 +24265,7 @@
                 </a:tc>
                 <a:extLst>
                   <a:ext uri="{0D108BD9-81ED-4DB2-BD59-A6C34878D82A}">
-                    <a16:rowId xmlns:a16="http://schemas.microsoft.com/office/drawing/2014/main" val="10000"/>
+                    <a16:rowId xmlns:a16="http://schemas.microsoft.com/office/drawing/2014/main" xmlns="" val="10000"/>
                   </a:ext>
                 </a:extLst>
               </a:tr>
@@ -23746,7 +24296,7 @@
                 </a:tc>
                 <a:extLst>
                   <a:ext uri="{0D108BD9-81ED-4DB2-BD59-A6C34878D82A}">
-                    <a16:rowId xmlns:a16="http://schemas.microsoft.com/office/drawing/2014/main" val="10001"/>
+                    <a16:rowId xmlns:a16="http://schemas.microsoft.com/office/drawing/2014/main" xmlns="" val="10001"/>
                   </a:ext>
                 </a:extLst>
               </a:tr>
@@ -23780,7 +24330,7 @@
                 </a:tc>
                 <a:extLst>
                   <a:ext uri="{0D108BD9-81ED-4DB2-BD59-A6C34878D82A}">
-                    <a16:rowId xmlns:a16="http://schemas.microsoft.com/office/drawing/2014/main" val="10002"/>
+                    <a16:rowId xmlns:a16="http://schemas.microsoft.com/office/drawing/2014/main" xmlns="" val="10002"/>
                   </a:ext>
                 </a:extLst>
               </a:tr>
@@ -23814,7 +24364,7 @@
                 </a:tc>
                 <a:extLst>
                   <a:ext uri="{0D108BD9-81ED-4DB2-BD59-A6C34878D82A}">
-                    <a16:rowId xmlns:a16="http://schemas.microsoft.com/office/drawing/2014/main" val="10003"/>
+                    <a16:rowId xmlns:a16="http://schemas.microsoft.com/office/drawing/2014/main" xmlns="" val="10003"/>
                   </a:ext>
                 </a:extLst>
               </a:tr>
@@ -23854,7 +24404,7 @@
                 </a:tc>
                 <a:extLst>
                   <a:ext uri="{0D108BD9-81ED-4DB2-BD59-A6C34878D82A}">
-                    <a16:rowId xmlns:a16="http://schemas.microsoft.com/office/drawing/2014/main" val="10004"/>
+                    <a16:rowId xmlns:a16="http://schemas.microsoft.com/office/drawing/2014/main" xmlns="" val="10004"/>
                   </a:ext>
                 </a:extLst>
               </a:tr>
@@ -23890,7 +24440,7 @@
                 <a:gridCol w="1440000">
                   <a:extLst>
                     <a:ext uri="{9D8B030D-6E8A-4147-A177-3AD203B41FA5}">
-                      <a16:colId xmlns:a16="http://schemas.microsoft.com/office/drawing/2014/main" val="20000"/>
+                      <a16:colId xmlns:a16="http://schemas.microsoft.com/office/drawing/2014/main" xmlns="" val="20000"/>
                     </a:ext>
                   </a:extLst>
                 </a:gridCol>
@@ -23915,7 +24465,7 @@
                 </a:tc>
                 <a:extLst>
                   <a:ext uri="{0D108BD9-81ED-4DB2-BD59-A6C34878D82A}">
-                    <a16:rowId xmlns:a16="http://schemas.microsoft.com/office/drawing/2014/main" val="10000"/>
+                    <a16:rowId xmlns:a16="http://schemas.microsoft.com/office/drawing/2014/main" xmlns="" val="10000"/>
                   </a:ext>
                 </a:extLst>
               </a:tr>
@@ -23946,7 +24496,7 @@
                 </a:tc>
                 <a:extLst>
                   <a:ext uri="{0D108BD9-81ED-4DB2-BD59-A6C34878D82A}">
-                    <a16:rowId xmlns:a16="http://schemas.microsoft.com/office/drawing/2014/main" val="10001"/>
+                    <a16:rowId xmlns:a16="http://schemas.microsoft.com/office/drawing/2014/main" xmlns="" val="10001"/>
                   </a:ext>
                 </a:extLst>
               </a:tr>
@@ -23987,7 +24537,7 @@
                 </a:tc>
                 <a:extLst>
                   <a:ext uri="{0D108BD9-81ED-4DB2-BD59-A6C34878D82A}">
-                    <a16:rowId xmlns:a16="http://schemas.microsoft.com/office/drawing/2014/main" val="10002"/>
+                    <a16:rowId xmlns:a16="http://schemas.microsoft.com/office/drawing/2014/main" xmlns="" val="10002"/>
                   </a:ext>
                 </a:extLst>
               </a:tr>
@@ -24027,7 +24577,7 @@
                 </a:tc>
                 <a:extLst>
                   <a:ext uri="{0D108BD9-81ED-4DB2-BD59-A6C34878D82A}">
-                    <a16:rowId xmlns:a16="http://schemas.microsoft.com/office/drawing/2014/main" val="10003"/>
+                    <a16:rowId xmlns:a16="http://schemas.microsoft.com/office/drawing/2014/main" xmlns="" val="10003"/>
                   </a:ext>
                 </a:extLst>
               </a:tr>
@@ -24084,7 +24634,7 @@
             <p:cNvPr id="2" name="Freeform 390">
               <a:extLst>
                 <a:ext uri="{FF2B5EF4-FFF2-40B4-BE49-F238E27FC236}">
-                  <a16:creationId xmlns:a16="http://schemas.microsoft.com/office/drawing/2014/main" id="{DC225B88-4404-4AFD-8BCC-F7DEF4947EA2}"/>
+                  <a16:creationId xmlns:a16="http://schemas.microsoft.com/office/drawing/2014/main" xmlns="" id="{DC225B88-4404-4AFD-8BCC-F7DEF4947EA2}"/>
                 </a:ext>
               </a:extLst>
             </p:cNvPr>
@@ -24621,7 +25171,7 @@
             <p:cNvPr id="7" name="Freeform 390">
               <a:extLst>
                 <a:ext uri="{FF2B5EF4-FFF2-40B4-BE49-F238E27FC236}">
-                  <a16:creationId xmlns:a16="http://schemas.microsoft.com/office/drawing/2014/main" id="{DC225B88-4404-4AFD-8BCC-F7DEF4947EA2}"/>
+                  <a16:creationId xmlns:a16="http://schemas.microsoft.com/office/drawing/2014/main" xmlns="" id="{DC225B88-4404-4AFD-8BCC-F7DEF4947EA2}"/>
                 </a:ext>
               </a:extLst>
             </p:cNvPr>
@@ -25131,7 +25681,7 @@
             <p:cNvPr id="10" name="Freeform 390">
               <a:extLst>
                 <a:ext uri="{FF2B5EF4-FFF2-40B4-BE49-F238E27FC236}">
-                  <a16:creationId xmlns:a16="http://schemas.microsoft.com/office/drawing/2014/main" id="{DC225B88-4404-4AFD-8BCC-F7DEF4947EA2}"/>
+                  <a16:creationId xmlns:a16="http://schemas.microsoft.com/office/drawing/2014/main" xmlns="" id="{DC225B88-4404-4AFD-8BCC-F7DEF4947EA2}"/>
                 </a:ext>
               </a:extLst>
             </p:cNvPr>
@@ -26189,7 +26739,7 @@
           <p:cNvPr id="27" name="Gruppieren 26">
             <a:extLst>
               <a:ext uri="{FF2B5EF4-FFF2-40B4-BE49-F238E27FC236}">
-                <a16:creationId xmlns:a16="http://schemas.microsoft.com/office/drawing/2014/main" id="{57E138DD-CA36-492F-BC62-5946AA67744D}"/>
+                <a16:creationId xmlns:a16="http://schemas.microsoft.com/office/drawing/2014/main" xmlns="" id="{57E138DD-CA36-492F-BC62-5946AA67744D}"/>
               </a:ext>
             </a:extLst>
           </p:cNvPr>
@@ -26209,7 +26759,7 @@
             <p:cNvPr id="30" name="Freeform 390">
               <a:extLst>
                 <a:ext uri="{FF2B5EF4-FFF2-40B4-BE49-F238E27FC236}">
-                  <a16:creationId xmlns:a16="http://schemas.microsoft.com/office/drawing/2014/main" id="{8C3C48EB-CB6E-4DD9-A54C-F29F165BED2E}"/>
+                  <a16:creationId xmlns:a16="http://schemas.microsoft.com/office/drawing/2014/main" xmlns="" id="{8C3C48EB-CB6E-4DD9-A54C-F29F165BED2E}"/>
                 </a:ext>
               </a:extLst>
             </p:cNvPr>
@@ -26658,7 +27208,7 @@
             <p:cNvPr id="32" name="Textfeld 31">
               <a:extLst>
                 <a:ext uri="{FF2B5EF4-FFF2-40B4-BE49-F238E27FC236}">
-                  <a16:creationId xmlns:a16="http://schemas.microsoft.com/office/drawing/2014/main" id="{7E764ACB-9C61-4033-A93F-3BDDE8FFEF39}"/>
+                  <a16:creationId xmlns:a16="http://schemas.microsoft.com/office/drawing/2014/main" xmlns="" id="{7E764ACB-9C61-4033-A93F-3BDDE8FFEF39}"/>
                 </a:ext>
               </a:extLst>
             </p:cNvPr>
@@ -26698,7 +27248,7 @@
           <p:cNvPr id="33" name="Gruppieren 32">
             <a:extLst>
               <a:ext uri="{FF2B5EF4-FFF2-40B4-BE49-F238E27FC236}">
-                <a16:creationId xmlns:a16="http://schemas.microsoft.com/office/drawing/2014/main" id="{84FF5CD8-72BC-47E0-BB40-BD6605CBD0B6}"/>
+                <a16:creationId xmlns:a16="http://schemas.microsoft.com/office/drawing/2014/main" xmlns="" id="{84FF5CD8-72BC-47E0-BB40-BD6605CBD0B6}"/>
               </a:ext>
             </a:extLst>
           </p:cNvPr>
@@ -26718,7 +27268,7 @@
             <p:cNvPr id="35" name="Freeform 390">
               <a:extLst>
                 <a:ext uri="{FF2B5EF4-FFF2-40B4-BE49-F238E27FC236}">
-                  <a16:creationId xmlns:a16="http://schemas.microsoft.com/office/drawing/2014/main" id="{5CA765ED-5EE9-499C-A0E8-89D83C4C1DBF}"/>
+                  <a16:creationId xmlns:a16="http://schemas.microsoft.com/office/drawing/2014/main" xmlns="" id="{5CA765ED-5EE9-499C-A0E8-89D83C4C1DBF}"/>
                 </a:ext>
               </a:extLst>
             </p:cNvPr>
@@ -27167,7 +27717,7 @@
             <p:cNvPr id="36" name="Textfeld 35">
               <a:extLst>
                 <a:ext uri="{FF2B5EF4-FFF2-40B4-BE49-F238E27FC236}">
-                  <a16:creationId xmlns:a16="http://schemas.microsoft.com/office/drawing/2014/main" id="{6EC63AD9-36F9-4D51-9D72-3C3C8E8800D5}"/>
+                  <a16:creationId xmlns:a16="http://schemas.microsoft.com/office/drawing/2014/main" xmlns="" id="{6EC63AD9-36F9-4D51-9D72-3C3C8E8800D5}"/>
                 </a:ext>
               </a:extLst>
             </p:cNvPr>
@@ -27220,7 +27770,7 @@
           <p:cNvPr id="38" name="Gruppieren 37">
             <a:extLst>
               <a:ext uri="{FF2B5EF4-FFF2-40B4-BE49-F238E27FC236}">
-                <a16:creationId xmlns:a16="http://schemas.microsoft.com/office/drawing/2014/main" id="{65E198C1-0D03-4316-97D9-E060FA974B0A}"/>
+                <a16:creationId xmlns:a16="http://schemas.microsoft.com/office/drawing/2014/main" xmlns="" id="{65E198C1-0D03-4316-97D9-E060FA974B0A}"/>
               </a:ext>
             </a:extLst>
           </p:cNvPr>
@@ -27240,7 +27790,7 @@
             <p:cNvPr id="39" name="Freeform 390">
               <a:extLst>
                 <a:ext uri="{FF2B5EF4-FFF2-40B4-BE49-F238E27FC236}">
-                  <a16:creationId xmlns:a16="http://schemas.microsoft.com/office/drawing/2014/main" id="{3EA3C93F-E1E7-4028-AF50-AFDEE054EDE2}"/>
+                  <a16:creationId xmlns:a16="http://schemas.microsoft.com/office/drawing/2014/main" xmlns="" id="{3EA3C93F-E1E7-4028-AF50-AFDEE054EDE2}"/>
                 </a:ext>
               </a:extLst>
             </p:cNvPr>
@@ -27689,7 +28239,7 @@
             <p:cNvPr id="40" name="Textfeld 39">
               <a:extLst>
                 <a:ext uri="{FF2B5EF4-FFF2-40B4-BE49-F238E27FC236}">
-                  <a16:creationId xmlns:a16="http://schemas.microsoft.com/office/drawing/2014/main" id="{73109C73-EDF4-45F2-AAEF-EFFE88FC2261}"/>
+                  <a16:creationId xmlns:a16="http://schemas.microsoft.com/office/drawing/2014/main" xmlns="" id="{73109C73-EDF4-45F2-AAEF-EFFE88FC2261}"/>
                 </a:ext>
               </a:extLst>
             </p:cNvPr>
@@ -27742,7 +28292,7 @@
           <p:cNvPr id="41" name="Textfeld 40">
             <a:extLst>
               <a:ext uri="{FF2B5EF4-FFF2-40B4-BE49-F238E27FC236}">
-                <a16:creationId xmlns:a16="http://schemas.microsoft.com/office/drawing/2014/main" id="{FAC13EB6-1045-4C2B-BC02-B86822B1EAF9}"/>
+                <a16:creationId xmlns:a16="http://schemas.microsoft.com/office/drawing/2014/main" xmlns="" id="{FAC13EB6-1045-4C2B-BC02-B86822B1EAF9}"/>
               </a:ext>
             </a:extLst>
           </p:cNvPr>
@@ -27786,7 +28336,7 @@
           <p:cNvPr id="42" name="Textfeld 41">
             <a:extLst>
               <a:ext uri="{FF2B5EF4-FFF2-40B4-BE49-F238E27FC236}">
-                <a16:creationId xmlns:a16="http://schemas.microsoft.com/office/drawing/2014/main" id="{6EED0C29-E9BA-4348-A2BC-BA724B4F0D8C}"/>
+                <a16:creationId xmlns:a16="http://schemas.microsoft.com/office/drawing/2014/main" xmlns="" id="{6EED0C29-E9BA-4348-A2BC-BA724B4F0D8C}"/>
               </a:ext>
             </a:extLst>
           </p:cNvPr>
@@ -27843,7 +28393,7 @@
           <p:cNvPr id="43" name="Textfeld 42">
             <a:extLst>
               <a:ext uri="{FF2B5EF4-FFF2-40B4-BE49-F238E27FC236}">
-                <a16:creationId xmlns:a16="http://schemas.microsoft.com/office/drawing/2014/main" id="{C6A797B4-1A86-43FC-8639-98F3134A24FA}"/>
+                <a16:creationId xmlns:a16="http://schemas.microsoft.com/office/drawing/2014/main" xmlns="" id="{C6A797B4-1A86-43FC-8639-98F3134A24FA}"/>
               </a:ext>
             </a:extLst>
           </p:cNvPr>
@@ -27887,7 +28437,7 @@
           <p:cNvPr id="44" name="Textfeld 43">
             <a:extLst>
               <a:ext uri="{FF2B5EF4-FFF2-40B4-BE49-F238E27FC236}">
-                <a16:creationId xmlns:a16="http://schemas.microsoft.com/office/drawing/2014/main" id="{B2D7B4E4-8490-4703-95BE-57F333FFC8D1}"/>
+                <a16:creationId xmlns:a16="http://schemas.microsoft.com/office/drawing/2014/main" xmlns="" id="{B2D7B4E4-8490-4703-95BE-57F333FFC8D1}"/>
               </a:ext>
             </a:extLst>
           </p:cNvPr>
@@ -27944,7 +28494,7 @@
           <p:cNvPr id="45" name="Gerader Verbinder 44">
             <a:extLst>
               <a:ext uri="{FF2B5EF4-FFF2-40B4-BE49-F238E27FC236}">
-                <a16:creationId xmlns:a16="http://schemas.microsoft.com/office/drawing/2014/main" id="{110F5CBC-FBCD-4495-B70E-1AEB26846D6B}"/>
+                <a16:creationId xmlns:a16="http://schemas.microsoft.com/office/drawing/2014/main" xmlns="" id="{110F5CBC-FBCD-4495-B70E-1AEB26846D6B}"/>
               </a:ext>
             </a:extLst>
           </p:cNvPr>
@@ -27989,7 +28539,7 @@
           <p:cNvPr id="46" name="Gerader Verbinder 45">
             <a:extLst>
               <a:ext uri="{FF2B5EF4-FFF2-40B4-BE49-F238E27FC236}">
-                <a16:creationId xmlns:a16="http://schemas.microsoft.com/office/drawing/2014/main" id="{BE5E6605-7F88-4BEE-8B5D-DA8CCE964D94}"/>
+                <a16:creationId xmlns:a16="http://schemas.microsoft.com/office/drawing/2014/main" xmlns="" id="{BE5E6605-7F88-4BEE-8B5D-DA8CCE964D94}"/>
               </a:ext>
             </a:extLst>
           </p:cNvPr>
@@ -28034,7 +28584,7 @@
           <p:cNvPr id="48" name="Gewinkelte Verbindung 25">
             <a:extLst>
               <a:ext uri="{FF2B5EF4-FFF2-40B4-BE49-F238E27FC236}">
-                <a16:creationId xmlns:a16="http://schemas.microsoft.com/office/drawing/2014/main" id="{03B2C230-4D64-47B6-A9D3-8B72E0182003}"/>
+                <a16:creationId xmlns:a16="http://schemas.microsoft.com/office/drawing/2014/main" xmlns="" id="{03B2C230-4D64-47B6-A9D3-8B72E0182003}"/>
               </a:ext>
             </a:extLst>
           </p:cNvPr>
@@ -28080,7 +28630,7 @@
           <p:cNvPr id="49" name="Gerader Verbinder 48">
             <a:extLst>
               <a:ext uri="{FF2B5EF4-FFF2-40B4-BE49-F238E27FC236}">
-                <a16:creationId xmlns:a16="http://schemas.microsoft.com/office/drawing/2014/main" id="{2524AAED-FF73-49C5-9C76-7287B6B8BCAA}"/>
+                <a16:creationId xmlns:a16="http://schemas.microsoft.com/office/drawing/2014/main" xmlns="" id="{2524AAED-FF73-49C5-9C76-7287B6B8BCAA}"/>
               </a:ext>
             </a:extLst>
           </p:cNvPr>
@@ -28126,7 +28676,7 @@
           <p:cNvPr id="50" name="Gerader Verbinder 49">
             <a:extLst>
               <a:ext uri="{FF2B5EF4-FFF2-40B4-BE49-F238E27FC236}">
-                <a16:creationId xmlns:a16="http://schemas.microsoft.com/office/drawing/2014/main" id="{441F3ACF-991A-421D-828D-565A526D18EC}"/>
+                <a16:creationId xmlns:a16="http://schemas.microsoft.com/office/drawing/2014/main" xmlns="" id="{441F3ACF-991A-421D-828D-565A526D18EC}"/>
               </a:ext>
             </a:extLst>
           </p:cNvPr>
@@ -28172,7 +28722,7 @@
           <p:cNvPr id="51" name="Gerader Verbinder 50">
             <a:extLst>
               <a:ext uri="{FF2B5EF4-FFF2-40B4-BE49-F238E27FC236}">
-                <a16:creationId xmlns:a16="http://schemas.microsoft.com/office/drawing/2014/main" id="{3A7689A3-459E-4F7F-817E-3F0CB7A130D0}"/>
+                <a16:creationId xmlns:a16="http://schemas.microsoft.com/office/drawing/2014/main" xmlns="" id="{3A7689A3-459E-4F7F-817E-3F0CB7A130D0}"/>
               </a:ext>
             </a:extLst>
           </p:cNvPr>
@@ -28217,7 +28767,7 @@
           <p:cNvPr id="52" name="Gewinkelte Verbindung 36">
             <a:extLst>
               <a:ext uri="{FF2B5EF4-FFF2-40B4-BE49-F238E27FC236}">
-                <a16:creationId xmlns:a16="http://schemas.microsoft.com/office/drawing/2014/main" id="{C5881A37-F79E-425B-A24E-3D25B14E5469}"/>
+                <a16:creationId xmlns:a16="http://schemas.microsoft.com/office/drawing/2014/main" xmlns="" id="{C5881A37-F79E-425B-A24E-3D25B14E5469}"/>
               </a:ext>
             </a:extLst>
           </p:cNvPr>
@@ -28263,7 +28813,7 @@
           <p:cNvPr id="53" name="Textfeld 52">
             <a:extLst>
               <a:ext uri="{FF2B5EF4-FFF2-40B4-BE49-F238E27FC236}">
-                <a16:creationId xmlns:a16="http://schemas.microsoft.com/office/drawing/2014/main" id="{107AF632-69AB-4549-8AD5-C629AD7C8E79}"/>
+                <a16:creationId xmlns:a16="http://schemas.microsoft.com/office/drawing/2014/main" xmlns="" id="{107AF632-69AB-4549-8AD5-C629AD7C8E79}"/>
               </a:ext>
             </a:extLst>
           </p:cNvPr>
@@ -28302,7 +28852,7 @@
           <p:cNvPr id="54" name="Gewinkelte Verbindung 23">
             <a:extLst>
               <a:ext uri="{FF2B5EF4-FFF2-40B4-BE49-F238E27FC236}">
-                <a16:creationId xmlns:a16="http://schemas.microsoft.com/office/drawing/2014/main" id="{19589BEB-EE95-4F03-951E-6FB6749F36BC}"/>
+                <a16:creationId xmlns:a16="http://schemas.microsoft.com/office/drawing/2014/main" xmlns="" id="{19589BEB-EE95-4F03-951E-6FB6749F36BC}"/>
               </a:ext>
             </a:extLst>
           </p:cNvPr>
@@ -28349,7 +28899,7 @@
           <p:cNvPr id="55" name="Textfeld 54">
             <a:extLst>
               <a:ext uri="{FF2B5EF4-FFF2-40B4-BE49-F238E27FC236}">
-                <a16:creationId xmlns:a16="http://schemas.microsoft.com/office/drawing/2014/main" id="{155FDE48-E0D7-4D7C-A4C6-4F8E7A6E7518}"/>
+                <a16:creationId xmlns:a16="http://schemas.microsoft.com/office/drawing/2014/main" xmlns="" id="{155FDE48-E0D7-4D7C-A4C6-4F8E7A6E7518}"/>
               </a:ext>
             </a:extLst>
           </p:cNvPr>
@@ -28388,7 +28938,7 @@
           <p:cNvPr id="56" name="Textfeld 55">
             <a:extLst>
               <a:ext uri="{FF2B5EF4-FFF2-40B4-BE49-F238E27FC236}">
-                <a16:creationId xmlns:a16="http://schemas.microsoft.com/office/drawing/2014/main" id="{4ADB5F0C-FF30-4A1C-9E87-FA5EE77C9A78}"/>
+                <a16:creationId xmlns:a16="http://schemas.microsoft.com/office/drawing/2014/main" xmlns="" id="{4ADB5F0C-FF30-4A1C-9E87-FA5EE77C9A78}"/>
               </a:ext>
             </a:extLst>
           </p:cNvPr>
@@ -28435,7 +28985,7 @@
           <p:cNvPr id="57" name="Gerader Verbinder 56">
             <a:extLst>
               <a:ext uri="{FF2B5EF4-FFF2-40B4-BE49-F238E27FC236}">
-                <a16:creationId xmlns:a16="http://schemas.microsoft.com/office/drawing/2014/main" id="{D745DEA0-0195-4BF2-9B20-F267315D7F7F}"/>
+                <a16:creationId xmlns:a16="http://schemas.microsoft.com/office/drawing/2014/main" xmlns="" id="{D745DEA0-0195-4BF2-9B20-F267315D7F7F}"/>
               </a:ext>
             </a:extLst>
           </p:cNvPr>
@@ -28482,7 +29032,7 @@
           <p:cNvPr id="58" name="Gerader Verbinder 57">
             <a:extLst>
               <a:ext uri="{FF2B5EF4-FFF2-40B4-BE49-F238E27FC236}">
-                <a16:creationId xmlns:a16="http://schemas.microsoft.com/office/drawing/2014/main" id="{2A45D524-CD32-45D1-A464-CCC6B53F7AB7}"/>
+                <a16:creationId xmlns:a16="http://schemas.microsoft.com/office/drawing/2014/main" xmlns="" id="{2A45D524-CD32-45D1-A464-CCC6B53F7AB7}"/>
               </a:ext>
             </a:extLst>
           </p:cNvPr>
@@ -28728,7 +29278,7 @@
           <p:cNvPr id="7" name="Grafik 6">
             <a:extLst>
               <a:ext uri="{FF2B5EF4-FFF2-40B4-BE49-F238E27FC236}">
-                <a16:creationId xmlns:a16="http://schemas.microsoft.com/office/drawing/2014/main" id="{F6031F79-9D44-4D1D-AD90-78D2794BB64C}"/>
+                <a16:creationId xmlns:a16="http://schemas.microsoft.com/office/drawing/2014/main" xmlns="" id="{F6031F79-9D44-4D1D-AD90-78D2794BB64C}"/>
               </a:ext>
             </a:extLst>
           </p:cNvPr>
@@ -28763,7 +29313,7 @@
           <p:cNvPr id="5" name="Grafik 4">
             <a:extLst>
               <a:ext uri="{FF2B5EF4-FFF2-40B4-BE49-F238E27FC236}">
-                <a16:creationId xmlns:a16="http://schemas.microsoft.com/office/drawing/2014/main" id="{E728183D-9A55-469B-AC0F-4E46553F1FCE}"/>
+                <a16:creationId xmlns:a16="http://schemas.microsoft.com/office/drawing/2014/main" xmlns="" id="{E728183D-9A55-469B-AC0F-4E46553F1FCE}"/>
               </a:ext>
             </a:extLst>
           </p:cNvPr>
@@ -28808,7 +29358,7 @@
           <p:cNvPr id="9" name="Textfeld 8">
             <a:extLst>
               <a:ext uri="{FF2B5EF4-FFF2-40B4-BE49-F238E27FC236}">
-                <a16:creationId xmlns:a16="http://schemas.microsoft.com/office/drawing/2014/main" id="{E2B0D9F2-BADB-4193-8559-9FA7D8273F2D}"/>
+                <a16:creationId xmlns:a16="http://schemas.microsoft.com/office/drawing/2014/main" xmlns="" id="{E2B0D9F2-BADB-4193-8559-9FA7D8273F2D}"/>
               </a:ext>
             </a:extLst>
           </p:cNvPr>
@@ -28847,7 +29397,7 @@
           <p:cNvPr id="10" name="Textfeld 9">
             <a:extLst>
               <a:ext uri="{FF2B5EF4-FFF2-40B4-BE49-F238E27FC236}">
-                <a16:creationId xmlns:a16="http://schemas.microsoft.com/office/drawing/2014/main" id="{C5EC8453-F10A-4BE3-B5BA-F526C43A6184}"/>
+                <a16:creationId xmlns:a16="http://schemas.microsoft.com/office/drawing/2014/main" xmlns="" id="{C5EC8453-F10A-4BE3-B5BA-F526C43A6184}"/>
               </a:ext>
             </a:extLst>
           </p:cNvPr>
@@ -28886,7 +29436,7 @@
           <p:cNvPr id="11" name="Textfeld 10">
             <a:extLst>
               <a:ext uri="{FF2B5EF4-FFF2-40B4-BE49-F238E27FC236}">
-                <a16:creationId xmlns:a16="http://schemas.microsoft.com/office/drawing/2014/main" id="{DC7B35DD-7157-490C-81EB-93CF9BE51B57}"/>
+                <a16:creationId xmlns:a16="http://schemas.microsoft.com/office/drawing/2014/main" xmlns="" id="{DC7B35DD-7157-490C-81EB-93CF9BE51B57}"/>
               </a:ext>
             </a:extLst>
           </p:cNvPr>
@@ -29363,7 +29913,7 @@
           <p:cNvPr id="4" name="Grafik 3">
             <a:extLst>
               <a:ext uri="{FF2B5EF4-FFF2-40B4-BE49-F238E27FC236}">
-                <a16:creationId xmlns:a16="http://schemas.microsoft.com/office/drawing/2014/main" id="{F102F122-8A04-4312-8818-63BC6D1290D5}"/>
+                <a16:creationId xmlns:a16="http://schemas.microsoft.com/office/drawing/2014/main" xmlns="" id="{F102F122-8A04-4312-8818-63BC6D1290D5}"/>
               </a:ext>
             </a:extLst>
           </p:cNvPr>
@@ -29393,7 +29943,7 @@
           <p:cNvPr id="5" name="Rechteck 4">
             <a:extLst>
               <a:ext uri="{FF2B5EF4-FFF2-40B4-BE49-F238E27FC236}">
-                <a16:creationId xmlns:a16="http://schemas.microsoft.com/office/drawing/2014/main" id="{8E603DAC-4DC8-4076-8914-C5BBCBD57F68}"/>
+                <a16:creationId xmlns:a16="http://schemas.microsoft.com/office/drawing/2014/main" xmlns="" id="{8E603DAC-4DC8-4076-8914-C5BBCBD57F68}"/>
               </a:ext>
             </a:extLst>
           </p:cNvPr>
@@ -29452,7 +30002,7 @@
           <p:cNvPr id="6" name="Rechteck 5">
             <a:extLst>
               <a:ext uri="{FF2B5EF4-FFF2-40B4-BE49-F238E27FC236}">
-                <a16:creationId xmlns:a16="http://schemas.microsoft.com/office/drawing/2014/main" id="{A8593190-A0E2-4313-9D6F-D2781F19A52A}"/>
+                <a16:creationId xmlns:a16="http://schemas.microsoft.com/office/drawing/2014/main" xmlns="" id="{A8593190-A0E2-4313-9D6F-D2781F19A52A}"/>
               </a:ext>
             </a:extLst>
           </p:cNvPr>
@@ -29541,7 +30091,7 @@
           <p:cNvPr id="4" name="Grafik 3">
             <a:extLst>
               <a:ext uri="{FF2B5EF4-FFF2-40B4-BE49-F238E27FC236}">
-                <a16:creationId xmlns:a16="http://schemas.microsoft.com/office/drawing/2014/main" id="{560C84DC-4FB5-4462-9BF6-8194223CA2D7}"/>
+                <a16:creationId xmlns:a16="http://schemas.microsoft.com/office/drawing/2014/main" xmlns="" id="{560C84DC-4FB5-4462-9BF6-8194223CA2D7}"/>
               </a:ext>
             </a:extLst>
           </p:cNvPr>
@@ -29577,7 +30127,7 @@
           <p:cNvPr id="5" name="Rechteck 4">
             <a:extLst>
               <a:ext uri="{FF2B5EF4-FFF2-40B4-BE49-F238E27FC236}">
-                <a16:creationId xmlns:a16="http://schemas.microsoft.com/office/drawing/2014/main" id="{F72387A0-6C91-4517-B497-D0D9C0F9F647}"/>
+                <a16:creationId xmlns:a16="http://schemas.microsoft.com/office/drawing/2014/main" xmlns="" id="{F72387A0-6C91-4517-B497-D0D9C0F9F647}"/>
               </a:ext>
             </a:extLst>
           </p:cNvPr>
@@ -29638,7 +30188,7 @@
           <p:cNvPr id="6" name="Rechteck 5">
             <a:extLst>
               <a:ext uri="{FF2B5EF4-FFF2-40B4-BE49-F238E27FC236}">
-                <a16:creationId xmlns:a16="http://schemas.microsoft.com/office/drawing/2014/main" id="{61F122B4-CEF5-478B-B953-C445BC049AB4}"/>
+                <a16:creationId xmlns:a16="http://schemas.microsoft.com/office/drawing/2014/main" xmlns="" id="{61F122B4-CEF5-478B-B953-C445BC049AB4}"/>
               </a:ext>
             </a:extLst>
           </p:cNvPr>
@@ -29699,7 +30249,7 @@
           <p:cNvPr id="7" name="Ellipse 6">
             <a:extLst>
               <a:ext uri="{FF2B5EF4-FFF2-40B4-BE49-F238E27FC236}">
-                <a16:creationId xmlns:a16="http://schemas.microsoft.com/office/drawing/2014/main" id="{E67A8D6D-27AE-4BE1-9EE3-29278694AB45}"/>
+                <a16:creationId xmlns:a16="http://schemas.microsoft.com/office/drawing/2014/main" xmlns="" id="{E67A8D6D-27AE-4BE1-9EE3-29278694AB45}"/>
               </a:ext>
             </a:extLst>
           </p:cNvPr>
@@ -29760,7 +30310,7 @@
           <p:cNvPr id="8" name="Ellipse 7">
             <a:extLst>
               <a:ext uri="{FF2B5EF4-FFF2-40B4-BE49-F238E27FC236}">
-                <a16:creationId xmlns:a16="http://schemas.microsoft.com/office/drawing/2014/main" id="{538D60FD-4AE9-42A0-811D-A0F07C3AF5E0}"/>
+                <a16:creationId xmlns:a16="http://schemas.microsoft.com/office/drawing/2014/main" xmlns="" id="{538D60FD-4AE9-42A0-811D-A0F07C3AF5E0}"/>
               </a:ext>
             </a:extLst>
           </p:cNvPr>
@@ -29821,7 +30371,7 @@
           <p:cNvPr id="10" name="Grafik 9">
             <a:extLst>
               <a:ext uri="{FF2B5EF4-FFF2-40B4-BE49-F238E27FC236}">
-                <a16:creationId xmlns:a16="http://schemas.microsoft.com/office/drawing/2014/main" id="{38EE9FEA-701D-4D8F-895E-2A5F5ADC256F}"/>
+                <a16:creationId xmlns:a16="http://schemas.microsoft.com/office/drawing/2014/main" xmlns="" id="{38EE9FEA-701D-4D8F-895E-2A5F5ADC256F}"/>
               </a:ext>
             </a:extLst>
           </p:cNvPr>
@@ -29856,7 +30406,7 @@
           <p:cNvPr id="11" name="Ellipse 10">
             <a:extLst>
               <a:ext uri="{FF2B5EF4-FFF2-40B4-BE49-F238E27FC236}">
-                <a16:creationId xmlns:a16="http://schemas.microsoft.com/office/drawing/2014/main" id="{F9E9A39D-63B6-4AAC-B1DD-F61B6A2140DD}"/>
+                <a16:creationId xmlns:a16="http://schemas.microsoft.com/office/drawing/2014/main" xmlns="" id="{F9E9A39D-63B6-4AAC-B1DD-F61B6A2140DD}"/>
               </a:ext>
             </a:extLst>
           </p:cNvPr>
@@ -29917,7 +30467,7 @@
           <p:cNvPr id="12" name="Rechteck 11">
             <a:extLst>
               <a:ext uri="{FF2B5EF4-FFF2-40B4-BE49-F238E27FC236}">
-                <a16:creationId xmlns:a16="http://schemas.microsoft.com/office/drawing/2014/main" id="{E1DC2741-E497-4319-A38C-8BD9DEB98EA9}"/>
+                <a16:creationId xmlns:a16="http://schemas.microsoft.com/office/drawing/2014/main" xmlns="" id="{E1DC2741-E497-4319-A38C-8BD9DEB98EA9}"/>
               </a:ext>
             </a:extLst>
           </p:cNvPr>
@@ -29965,382 +30515,6 @@
                 <a:schemeClr val="tx1"/>
               </a:solidFill>
             </a:endParaRPr>
-          </a:p>
-        </p:txBody>
-      </p:sp>
-      <p:sp>
-        <p:nvSpPr>
-          <p:cNvPr id="16" name="Rechteck 15">
-            <a:extLst>
-              <a:ext uri="{FF2B5EF4-FFF2-40B4-BE49-F238E27FC236}">
-                <a16:creationId xmlns:a16="http://schemas.microsoft.com/office/drawing/2014/main" id="{1A7A2681-3883-4133-8015-8733E86B0E93}"/>
-              </a:ext>
-            </a:extLst>
-          </p:cNvPr>
-          <p:cNvSpPr/>
-          <p:nvPr/>
-        </p:nvSpPr>
-        <p:spPr>
-          <a:xfrm>
-            <a:off x="4855151" y="3317153"/>
-            <a:ext cx="1164649" cy="357801"/>
-          </a:xfrm>
-          <a:prstGeom prst="rect">
-            <a:avLst/>
-          </a:prstGeom>
-        </p:spPr>
-        <p:style>
-          <a:lnRef idx="2">
-            <a:schemeClr val="accent1">
-              <a:shade val="50000"/>
-            </a:schemeClr>
-          </a:lnRef>
-          <a:fillRef idx="1">
-            <a:schemeClr val="accent1"/>
-          </a:fillRef>
-          <a:effectRef idx="0">
-            <a:schemeClr val="accent1"/>
-          </a:effectRef>
-          <a:fontRef idx="minor">
-            <a:schemeClr val="lt1"/>
-          </a:fontRef>
-        </p:style>
-        <p:txBody>
-          <a:bodyPr rtlCol="0" anchor="ctr"/>
-          <a:lstStyle/>
-          <a:p>
-            <a:pPr algn="ctr"/>
-            <a:r>
-              <a:rPr lang="de-DE" dirty="0" err="1"/>
-              <a:t>Quantity</a:t>
-            </a:r>
-            <a:r>
-              <a:rPr lang="de-DE" dirty="0"/>
-              <a:t> vol.</a:t>
-            </a:r>
-          </a:p>
-        </p:txBody>
-      </p:sp>
-      <p:sp>
-        <p:nvSpPr>
-          <p:cNvPr id="17" name="Rechteck 16">
-            <a:extLst>
-              <a:ext uri="{FF2B5EF4-FFF2-40B4-BE49-F238E27FC236}">
-                <a16:creationId xmlns:a16="http://schemas.microsoft.com/office/drawing/2014/main" id="{CC98C0CD-B1D8-4936-81A7-5849F77E5390}"/>
-              </a:ext>
-            </a:extLst>
-          </p:cNvPr>
-          <p:cNvSpPr/>
-          <p:nvPr/>
-        </p:nvSpPr>
-        <p:spPr>
-          <a:xfrm>
-            <a:off x="4855150" y="3893307"/>
-            <a:ext cx="1164650" cy="357801"/>
-          </a:xfrm>
-          <a:prstGeom prst="rect">
-            <a:avLst/>
-          </a:prstGeom>
-        </p:spPr>
-        <p:style>
-          <a:lnRef idx="2">
-            <a:schemeClr val="accent1">
-              <a:shade val="50000"/>
-            </a:schemeClr>
-          </a:lnRef>
-          <a:fillRef idx="1">
-            <a:schemeClr val="accent1"/>
-          </a:fillRef>
-          <a:effectRef idx="0">
-            <a:schemeClr val="accent1"/>
-          </a:effectRef>
-          <a:fontRef idx="minor">
-            <a:schemeClr val="lt1"/>
-          </a:fontRef>
-        </p:style>
-        <p:txBody>
-          <a:bodyPr rtlCol="0" anchor="ctr"/>
-          <a:lstStyle/>
-          <a:p>
-            <a:pPr algn="ctr"/>
-            <a:r>
-              <a:rPr lang="de-DE" dirty="0" err="1"/>
-              <a:t>Quantity</a:t>
-            </a:r>
-            <a:r>
-              <a:rPr lang="de-DE" dirty="0"/>
-              <a:t> vol.</a:t>
-            </a:r>
-          </a:p>
-        </p:txBody>
-      </p:sp>
-      <p:sp>
-        <p:nvSpPr>
-          <p:cNvPr id="19" name="Rechteck 18">
-            <a:extLst>
-              <a:ext uri="{FF2B5EF4-FFF2-40B4-BE49-F238E27FC236}">
-                <a16:creationId xmlns:a16="http://schemas.microsoft.com/office/drawing/2014/main" id="{257A908E-4F4D-4EDA-B360-98D7BCAFDD7C}"/>
-              </a:ext>
-            </a:extLst>
-          </p:cNvPr>
-          <p:cNvSpPr/>
-          <p:nvPr/>
-        </p:nvSpPr>
-        <p:spPr>
-          <a:xfrm>
-            <a:off x="1059180" y="311900"/>
-            <a:ext cx="3322319" cy="1373753"/>
-          </a:xfrm>
-          <a:prstGeom prst="rect">
-            <a:avLst/>
-          </a:prstGeom>
-        </p:spPr>
-        <p:style>
-          <a:lnRef idx="2">
-            <a:schemeClr val="accent1">
-              <a:shade val="50000"/>
-            </a:schemeClr>
-          </a:lnRef>
-          <a:fillRef idx="1">
-            <a:schemeClr val="accent1"/>
-          </a:fillRef>
-          <a:effectRef idx="0">
-            <a:schemeClr val="accent1"/>
-          </a:effectRef>
-          <a:fontRef idx="minor">
-            <a:schemeClr val="lt1"/>
-          </a:fontRef>
-        </p:style>
-        <p:txBody>
-          <a:bodyPr rtlCol="0" anchor="ctr"/>
-          <a:lstStyle/>
-          <a:p>
-            <a:pPr marL="342900" indent="-342900" algn="ctr">
-              <a:buAutoNum type="arabicPeriod"/>
-            </a:pPr>
-            <a:r>
-              <a:rPr lang="de-DE" dirty="0"/>
-              <a:t>Grundplatte (Blech) bereitstellen + 5% </a:t>
-            </a:r>
-          </a:p>
-          <a:p>
-            <a:pPr marL="342900" indent="-342900" algn="ctr">
-              <a:buAutoNum type="arabicPeriod"/>
-            </a:pPr>
-            <a:r>
-              <a:rPr lang="de-DE" dirty="0"/>
-              <a:t>Laserschneiden (Kontur + Bohrungen)</a:t>
-            </a:r>
-          </a:p>
-          <a:p>
-            <a:pPr marL="342900" indent="-342900" algn="ctr">
-              <a:buAutoNum type="arabicPeriod"/>
-            </a:pPr>
-            <a:r>
-              <a:rPr lang="de-DE" dirty="0"/>
-              <a:t>Druckprozess</a:t>
-            </a:r>
-          </a:p>
-          <a:p>
-            <a:pPr marL="342900" indent="-342900" algn="ctr">
-              <a:buAutoNum type="arabicPeriod"/>
-            </a:pPr>
-            <a:r>
-              <a:rPr lang="de-DE" dirty="0"/>
-              <a:t>Fräsen (inkl. Bohrung)</a:t>
-            </a:r>
-          </a:p>
-          <a:p>
-            <a:pPr marL="342900" indent="-342900" algn="ctr">
-              <a:buAutoNum type="arabicPeriod"/>
-            </a:pPr>
-            <a:r>
-              <a:rPr lang="de-DE" dirty="0"/>
-              <a:t>Oberflächen finish</a:t>
-            </a:r>
-          </a:p>
-        </p:txBody>
-      </p:sp>
-      <p:sp>
-        <p:nvSpPr>
-          <p:cNvPr id="20" name="Rechteck 19">
-            <a:extLst>
-              <a:ext uri="{FF2B5EF4-FFF2-40B4-BE49-F238E27FC236}">
-                <a16:creationId xmlns:a16="http://schemas.microsoft.com/office/drawing/2014/main" id="{AF102469-7C14-46EE-B92E-2F3C83C2C098}"/>
-              </a:ext>
-            </a:extLst>
-          </p:cNvPr>
-          <p:cNvSpPr/>
-          <p:nvPr/>
-        </p:nvSpPr>
-        <p:spPr>
-          <a:xfrm>
-            <a:off x="4785362" y="322419"/>
-            <a:ext cx="2635309" cy="1373753"/>
-          </a:xfrm>
-          <a:prstGeom prst="rect">
-            <a:avLst/>
-          </a:prstGeom>
-        </p:spPr>
-        <p:style>
-          <a:lnRef idx="2">
-            <a:schemeClr val="accent1">
-              <a:shade val="50000"/>
-            </a:schemeClr>
-          </a:lnRef>
-          <a:fillRef idx="1">
-            <a:schemeClr val="accent1"/>
-          </a:fillRef>
-          <a:effectRef idx="0">
-            <a:schemeClr val="accent1"/>
-          </a:effectRef>
-          <a:fontRef idx="minor">
-            <a:schemeClr val="lt1"/>
-          </a:fontRef>
-        </p:style>
-        <p:txBody>
-          <a:bodyPr rtlCol="0" anchor="ctr"/>
-          <a:lstStyle/>
-          <a:p>
-            <a:pPr marL="342900" indent="-342900" algn="ctr">
-              <a:buAutoNum type="arabicPeriod"/>
-            </a:pPr>
-            <a:r>
-              <a:rPr lang="de-DE" dirty="0"/>
-              <a:t>Grundmaterial (Halbzeug) bereitstellen + 5% </a:t>
-            </a:r>
-          </a:p>
-          <a:p>
-            <a:pPr marL="342900" indent="-342900" algn="ctr">
-              <a:buAutoNum type="arabicPeriod"/>
-            </a:pPr>
-            <a:r>
-              <a:rPr lang="de-DE" dirty="0"/>
-              <a:t>Fräsen (inkl. Bohrung)</a:t>
-            </a:r>
-          </a:p>
-          <a:p>
-            <a:pPr marL="342900" indent="-342900" algn="ctr">
-              <a:buAutoNum type="arabicPeriod"/>
-            </a:pPr>
-            <a:r>
-              <a:rPr lang="de-DE" dirty="0"/>
-              <a:t>Oberflächen finish</a:t>
-            </a:r>
-          </a:p>
-        </p:txBody>
-      </p:sp>
-      <p:sp>
-        <p:nvSpPr>
-          <p:cNvPr id="21" name="Rechteck 20">
-            <a:extLst>
-              <a:ext uri="{FF2B5EF4-FFF2-40B4-BE49-F238E27FC236}">
-                <a16:creationId xmlns:a16="http://schemas.microsoft.com/office/drawing/2014/main" id="{0E1D4A5F-A36A-49DB-9CD8-0280CA02330C}"/>
-              </a:ext>
-            </a:extLst>
-          </p:cNvPr>
-          <p:cNvSpPr/>
-          <p:nvPr/>
-        </p:nvSpPr>
-        <p:spPr>
-          <a:xfrm>
-            <a:off x="2377442" y="1627241"/>
-            <a:ext cx="4213858" cy="1596019"/>
-          </a:xfrm>
-          <a:prstGeom prst="rect">
-            <a:avLst/>
-          </a:prstGeom>
-        </p:spPr>
-        <p:style>
-          <a:lnRef idx="2">
-            <a:schemeClr val="accent1">
-              <a:shade val="50000"/>
-            </a:schemeClr>
-          </a:lnRef>
-          <a:fillRef idx="1">
-            <a:schemeClr val="accent1"/>
-          </a:fillRef>
-          <a:effectRef idx="0">
-            <a:schemeClr val="accent1"/>
-          </a:effectRef>
-          <a:fontRef idx="minor">
-            <a:schemeClr val="lt1"/>
-          </a:fontRef>
-        </p:style>
-        <p:txBody>
-          <a:bodyPr rtlCol="0" anchor="ctr"/>
-          <a:lstStyle/>
-          <a:p>
-            <a:pPr marL="342900" indent="-342900" algn="ctr">
-              <a:buAutoNum type="arabicPeriod"/>
-            </a:pPr>
-            <a:r>
-              <a:rPr lang="de-DE" dirty="0"/>
-              <a:t>Blech</a:t>
-            </a:r>
-          </a:p>
-          <a:p>
-            <a:pPr marL="342900" indent="-342900" algn="ctr">
-              <a:buAutoNum type="arabicPeriod"/>
-            </a:pPr>
-            <a:r>
-              <a:rPr lang="de-DE" dirty="0"/>
-              <a:t>Halbzeug</a:t>
-            </a:r>
-          </a:p>
-          <a:p>
-            <a:pPr marL="342900" indent="-342900" algn="ctr">
-              <a:buAutoNum type="arabicPeriod"/>
-            </a:pPr>
-            <a:r>
-              <a:rPr lang="de-DE" dirty="0"/>
-              <a:t>Fräsmaschine</a:t>
-            </a:r>
-          </a:p>
-          <a:p>
-            <a:pPr marL="699516" lvl="1" indent="-342900" algn="ctr">
-              <a:buAutoNum type="arabicPeriod"/>
-            </a:pPr>
-            <a:r>
-              <a:rPr lang="de-DE" dirty="0" err="1"/>
-              <a:t>Skill</a:t>
-            </a:r>
-            <a:r>
-              <a:rPr lang="de-DE" dirty="0"/>
-              <a:t> 1 Grob</a:t>
-            </a:r>
-          </a:p>
-          <a:p>
-            <a:pPr marL="699516" lvl="1" indent="-342900" algn="ctr">
-              <a:buAutoNum type="arabicPeriod"/>
-            </a:pPr>
-            <a:r>
-              <a:rPr lang="de-DE" dirty="0" err="1"/>
-              <a:t>Skill</a:t>
-            </a:r>
-            <a:r>
-              <a:rPr lang="de-DE" dirty="0"/>
-              <a:t> 2 Fein</a:t>
-            </a:r>
-          </a:p>
-          <a:p>
-            <a:pPr marL="342900" indent="-342900" algn="ctr">
-              <a:buAutoNum type="arabicPeriod"/>
-            </a:pPr>
-            <a:r>
-              <a:rPr lang="de-DE" dirty="0"/>
-              <a:t>Laserschneidmaschine</a:t>
-            </a:r>
-          </a:p>
-          <a:p>
-            <a:pPr marL="342900" indent="-342900" algn="ctr">
-              <a:buAutoNum type="arabicPeriod"/>
-            </a:pPr>
-            <a:r>
-              <a:rPr lang="de-DE" dirty="0" err="1"/>
-              <a:t>LMWD</a:t>
-            </a:r>
-            <a:endParaRPr lang="de-DE" dirty="0"/>
           </a:p>
         </p:txBody>
       </p:sp>

</xml_diff>